<commit_message>
Time table small change
</commit_message>
<xml_diff>
--- a/presentatie/SWOP Presentatie Inhoud.pptx
+++ b/presentatie/SWOP Presentatie Inhoud.pptx
@@ -110,6 +110,22 @@
       </a:defRPr>
     </a:lvl9pPr>
   </p:defaultTextStyle>
+  <p:extLst>
+    <p:ext uri="{EFAFB233-063F-42B5-8137-9DF3F51BA10A}">
+      <p15:sldGuideLst xmlns:p15="http://schemas.microsoft.com/office/powerpoint/2012/main">
+        <p15:guide id="1" orient="horz" pos="2160">
+          <p15:clr>
+            <a:srgbClr val="A4A3A4"/>
+          </p15:clr>
+        </p15:guide>
+        <p15:guide id="2" pos="2880">
+          <p15:clr>
+            <a:srgbClr val="A4A3A4"/>
+          </p15:clr>
+        </p15:guide>
+      </p15:sldGuideLst>
+    </p:ext>
+  </p:extLst>
 </p:presentation>
 </file>
 
@@ -294,7 +310,7 @@
           <a:p>
             <a:fld id="{0F5E03E0-8FDD-4F94-8780-E28EA23ED5EC}" type="datetimeFigureOut">
               <a:rPr lang="nl-BE" smtClean="0"/>
-              <a:t>14/03/2016</a:t>
+              <a:t>15/03/16</a:t>
             </a:fld>
             <a:endParaRPr lang="nl-BE"/>
           </a:p>
@@ -464,7 +480,7 @@
           <a:p>
             <a:fld id="{0F5E03E0-8FDD-4F94-8780-E28EA23ED5EC}" type="datetimeFigureOut">
               <a:rPr lang="nl-BE" smtClean="0"/>
-              <a:t>14/03/2016</a:t>
+              <a:t>15/03/16</a:t>
             </a:fld>
             <a:endParaRPr lang="nl-BE"/>
           </a:p>
@@ -644,7 +660,7 @@
           <a:p>
             <a:fld id="{0F5E03E0-8FDD-4F94-8780-E28EA23ED5EC}" type="datetimeFigureOut">
               <a:rPr lang="nl-BE" smtClean="0"/>
-              <a:t>14/03/2016</a:t>
+              <a:t>15/03/16</a:t>
             </a:fld>
             <a:endParaRPr lang="nl-BE"/>
           </a:p>
@@ -814,7 +830,7 @@
           <a:p>
             <a:fld id="{0F5E03E0-8FDD-4F94-8780-E28EA23ED5EC}" type="datetimeFigureOut">
               <a:rPr lang="nl-BE" smtClean="0"/>
-              <a:t>14/03/2016</a:t>
+              <a:t>15/03/16</a:t>
             </a:fld>
             <a:endParaRPr lang="nl-BE"/>
           </a:p>
@@ -1060,7 +1076,7 @@
           <a:p>
             <a:fld id="{0F5E03E0-8FDD-4F94-8780-E28EA23ED5EC}" type="datetimeFigureOut">
               <a:rPr lang="nl-BE" smtClean="0"/>
-              <a:t>14/03/2016</a:t>
+              <a:t>15/03/16</a:t>
             </a:fld>
             <a:endParaRPr lang="nl-BE"/>
           </a:p>
@@ -1348,7 +1364,7 @@
           <a:p>
             <a:fld id="{0F5E03E0-8FDD-4F94-8780-E28EA23ED5EC}" type="datetimeFigureOut">
               <a:rPr lang="nl-BE" smtClean="0"/>
-              <a:t>14/03/2016</a:t>
+              <a:t>15/03/16</a:t>
             </a:fld>
             <a:endParaRPr lang="nl-BE"/>
           </a:p>
@@ -1770,7 +1786,7 @@
           <a:p>
             <a:fld id="{0F5E03E0-8FDD-4F94-8780-E28EA23ED5EC}" type="datetimeFigureOut">
               <a:rPr lang="nl-BE" smtClean="0"/>
-              <a:t>14/03/2016</a:t>
+              <a:t>15/03/16</a:t>
             </a:fld>
             <a:endParaRPr lang="nl-BE"/>
           </a:p>
@@ -1888,7 +1904,7 @@
           <a:p>
             <a:fld id="{0F5E03E0-8FDD-4F94-8780-E28EA23ED5EC}" type="datetimeFigureOut">
               <a:rPr lang="nl-BE" smtClean="0"/>
-              <a:t>14/03/2016</a:t>
+              <a:t>15/03/16</a:t>
             </a:fld>
             <a:endParaRPr lang="nl-BE"/>
           </a:p>
@@ -1983,7 +1999,7 @@
           <a:p>
             <a:fld id="{0F5E03E0-8FDD-4F94-8780-E28EA23ED5EC}" type="datetimeFigureOut">
               <a:rPr lang="nl-BE" smtClean="0"/>
-              <a:t>14/03/2016</a:t>
+              <a:t>15/03/16</a:t>
             </a:fld>
             <a:endParaRPr lang="nl-BE"/>
           </a:p>
@@ -2260,7 +2276,7 @@
           <a:p>
             <a:fld id="{0F5E03E0-8FDD-4F94-8780-E28EA23ED5EC}" type="datetimeFigureOut">
               <a:rPr lang="nl-BE" smtClean="0"/>
-              <a:t>14/03/2016</a:t>
+              <a:t>15/03/16</a:t>
             </a:fld>
             <a:endParaRPr lang="nl-BE"/>
           </a:p>
@@ -2513,7 +2529,7 @@
           <a:p>
             <a:fld id="{0F5E03E0-8FDD-4F94-8780-E28EA23ED5EC}" type="datetimeFigureOut">
               <a:rPr lang="nl-BE" smtClean="0"/>
-              <a:t>14/03/2016</a:t>
+              <a:t>15/03/16</a:t>
             </a:fld>
             <a:endParaRPr lang="nl-BE"/>
           </a:p>
@@ -2726,7 +2742,7 @@
           <a:p>
             <a:fld id="{0F5E03E0-8FDD-4F94-8780-E28EA23ED5EC}" type="datetimeFigureOut">
               <a:rPr lang="nl-BE" smtClean="0"/>
-              <a:t>14/03/2016</a:t>
+              <a:t>15/03/16</a:t>
             </a:fld>
             <a:endParaRPr lang="nl-BE"/>
           </a:p>
@@ -3167,7 +3183,6 @@
               <a:rPr lang="nl-BE" dirty="0" smtClean="0"/>
               <a:t>Tom Houben</a:t>
             </a:r>
-            <a:endParaRPr lang="nl-BE" dirty="0" smtClean="0"/>
           </a:p>
           <a:p>
             <a:r>
@@ -3697,6 +3712,38 @@
             </a:pPr>
             <a:r>
               <a:rPr lang="nl-BE" sz="2400" dirty="0" smtClean="0"/>
+              <a:t>Group work: 33 	Individual Work: </a:t>
+            </a:r>
+            <a:r>
+              <a:rPr lang="nl-BE" sz="2400" dirty="0" smtClean="0"/>
+              <a:t>22</a:t>
+            </a:r>
+            <a:r>
+              <a:rPr lang="nl-BE" sz="2400" dirty="0" smtClean="0"/>
+              <a:t>	Study: 7</a:t>
+            </a:r>
+            <a:endParaRPr lang="nl-BE" sz="2400" b="1" dirty="0"/>
+          </a:p>
+          <a:p>
+            <a:pPr marL="0" indent="0">
+              <a:buNone/>
+            </a:pPr>
+            <a:r>
+              <a:rPr lang="nl-BE" b="1" dirty="0" smtClean="0"/>
+              <a:t>Laurens </a:t>
+            </a:r>
+            <a:r>
+              <a:rPr lang="nl-BE" b="1" dirty="0" err="1" smtClean="0"/>
+              <a:t>Cleemput</a:t>
+            </a:r>
+            <a:endParaRPr lang="nl-BE" b="1" dirty="0" smtClean="0"/>
+          </a:p>
+          <a:p>
+            <a:pPr marL="0" indent="0">
+              <a:buNone/>
+            </a:pPr>
+            <a:r>
+              <a:rPr lang="nl-BE" sz="2400" dirty="0" smtClean="0"/>
               <a:t>Group </a:t>
             </a:r>
             <a:r>
@@ -3706,70 +3753,6 @@
             <a:r>
               <a:rPr lang="nl-BE" sz="2400" dirty="0" smtClean="0"/>
               <a:t>: 33 	</a:t>
-            </a:r>
-            <a:r>
-              <a:rPr lang="nl-BE" sz="2400" dirty="0" err="1" smtClean="0"/>
-              <a:t>Individual</a:t>
-            </a:r>
-            <a:r>
-              <a:rPr lang="nl-BE" sz="2400" dirty="0" smtClean="0"/>
-              <a:t> </a:t>
-            </a:r>
-            <a:r>
-              <a:rPr lang="nl-BE" sz="2400" dirty="0" err="1" smtClean="0"/>
-              <a:t>Work</a:t>
-            </a:r>
-            <a:r>
-              <a:rPr lang="nl-BE" sz="2400" dirty="0" smtClean="0"/>
-              <a:t>: 18	</a:t>
-            </a:r>
-            <a:r>
-              <a:rPr lang="nl-BE" sz="2400" dirty="0" err="1" smtClean="0"/>
-              <a:t>Study</a:t>
-            </a:r>
-            <a:r>
-              <a:rPr lang="nl-BE" sz="2400" dirty="0" smtClean="0"/>
-              <a:t>: 7</a:t>
-            </a:r>
-            <a:endParaRPr lang="nl-BE" sz="2400" b="1" dirty="0"/>
-          </a:p>
-          <a:p>
-            <a:pPr marL="0" indent="0">
-              <a:buNone/>
-            </a:pPr>
-            <a:r>
-              <a:rPr lang="nl-BE" b="1" dirty="0" smtClean="0"/>
-              <a:t>Laurens </a:t>
-            </a:r>
-            <a:r>
-              <a:rPr lang="nl-BE" b="1" dirty="0" err="1" smtClean="0"/>
-              <a:t>Cleemput</a:t>
-            </a:r>
-            <a:endParaRPr lang="nl-BE" b="1" dirty="0" smtClean="0"/>
-          </a:p>
-          <a:p>
-            <a:pPr marL="0" indent="0">
-              <a:buNone/>
-            </a:pPr>
-            <a:r>
-              <a:rPr lang="nl-BE" sz="2400" dirty="0" smtClean="0"/>
-              <a:t>Group </a:t>
-            </a:r>
-            <a:r>
-              <a:rPr lang="nl-BE" sz="2400" dirty="0" err="1" smtClean="0"/>
-              <a:t>work</a:t>
-            </a:r>
-            <a:r>
-              <a:rPr lang="nl-BE" sz="2400" dirty="0" smtClean="0"/>
-              <a:t>: </a:t>
-            </a:r>
-            <a:r>
-              <a:rPr lang="nl-BE" sz="2400" dirty="0" smtClean="0"/>
-              <a:t>33 </a:t>
-            </a:r>
-            <a:r>
-              <a:rPr lang="nl-BE" sz="2400" dirty="0" smtClean="0"/>
-              <a:t>	</a:t>
             </a:r>
             <a:r>
               <a:rPr lang="nl-BE" sz="2400" dirty="0" err="1" smtClean="0"/>

</xml_diff>

<commit_message>
presentatie is nu mooi, do not touch it, thx
</commit_message>
<xml_diff>
--- a/presentatie/SWOP Presentatie Inhoud.pptx
+++ b/presentatie/SWOP Presentatie Inhoud.pptx
@@ -112,7 +112,7 @@
   </p:defaultTextStyle>
   <p:extLst>
     <p:ext uri="{EFAFB233-063F-42B5-8137-9DF3F51BA10A}">
-      <p15:sldGuideLst xmlns:p15="http://schemas.microsoft.com/office/powerpoint/2012/main">
+      <p15:sldGuideLst xmlns:p15="http://schemas.microsoft.com/office/powerpoint/2012/main" xmlns="">
         <p15:guide id="1" orient="horz" pos="2160">
           <p15:clr>
             <a:srgbClr val="A4A3A4"/>
@@ -310,7 +310,8 @@
           <a:p>
             <a:fld id="{0F5E03E0-8FDD-4F94-8780-E28EA23ED5EC}" type="datetimeFigureOut">
               <a:rPr lang="nl-BE" smtClean="0"/>
-              <a:t>15/03/16</a:t>
+              <a:pPr/>
+              <a:t>15/03/2016</a:t>
             </a:fld>
             <a:endParaRPr lang="nl-BE"/>
           </a:p>
@@ -352,7 +353,8 @@
           <a:p>
             <a:fld id="{91663F60-0288-4BD7-9F87-79CFFEA98662}" type="slidenum">
               <a:rPr lang="nl-BE" smtClean="0"/>
-              <a:t>‹nr.›</a:t>
+              <a:pPr/>
+              <a:t>‹Nr.›</a:t>
             </a:fld>
             <a:endParaRPr lang="nl-BE"/>
           </a:p>
@@ -361,7 +363,7 @@
     </p:spTree>
     <p:extLst>
       <p:ext uri="{BB962C8B-B14F-4D97-AF65-F5344CB8AC3E}">
-        <p14:creationId xmlns:p14="http://schemas.microsoft.com/office/powerpoint/2010/main" val="3963083300"/>
+        <p14:creationId xmlns:p14="http://schemas.microsoft.com/office/powerpoint/2010/main" xmlns="" val="3963083300"/>
       </p:ext>
     </p:extLst>
   </p:cSld>
@@ -480,7 +482,8 @@
           <a:p>
             <a:fld id="{0F5E03E0-8FDD-4F94-8780-E28EA23ED5EC}" type="datetimeFigureOut">
               <a:rPr lang="nl-BE" smtClean="0"/>
-              <a:t>15/03/16</a:t>
+              <a:pPr/>
+              <a:t>15/03/2016</a:t>
             </a:fld>
             <a:endParaRPr lang="nl-BE"/>
           </a:p>
@@ -522,7 +525,8 @@
           <a:p>
             <a:fld id="{91663F60-0288-4BD7-9F87-79CFFEA98662}" type="slidenum">
               <a:rPr lang="nl-BE" smtClean="0"/>
-              <a:t>‹nr.›</a:t>
+              <a:pPr/>
+              <a:t>‹Nr.›</a:t>
             </a:fld>
             <a:endParaRPr lang="nl-BE"/>
           </a:p>
@@ -531,7 +535,7 @@
     </p:spTree>
     <p:extLst>
       <p:ext uri="{BB962C8B-B14F-4D97-AF65-F5344CB8AC3E}">
-        <p14:creationId xmlns:p14="http://schemas.microsoft.com/office/powerpoint/2010/main" val="1367293728"/>
+        <p14:creationId xmlns:p14="http://schemas.microsoft.com/office/powerpoint/2010/main" xmlns="" val="1367293728"/>
       </p:ext>
     </p:extLst>
   </p:cSld>
@@ -660,7 +664,8 @@
           <a:p>
             <a:fld id="{0F5E03E0-8FDD-4F94-8780-E28EA23ED5EC}" type="datetimeFigureOut">
               <a:rPr lang="nl-BE" smtClean="0"/>
-              <a:t>15/03/16</a:t>
+              <a:pPr/>
+              <a:t>15/03/2016</a:t>
             </a:fld>
             <a:endParaRPr lang="nl-BE"/>
           </a:p>
@@ -702,7 +707,8 @@
           <a:p>
             <a:fld id="{91663F60-0288-4BD7-9F87-79CFFEA98662}" type="slidenum">
               <a:rPr lang="nl-BE" smtClean="0"/>
-              <a:t>‹nr.›</a:t>
+              <a:pPr/>
+              <a:t>‹Nr.›</a:t>
             </a:fld>
             <a:endParaRPr lang="nl-BE"/>
           </a:p>
@@ -711,7 +717,7 @@
     </p:spTree>
     <p:extLst>
       <p:ext uri="{BB962C8B-B14F-4D97-AF65-F5344CB8AC3E}">
-        <p14:creationId xmlns:p14="http://schemas.microsoft.com/office/powerpoint/2010/main" val="3320721104"/>
+        <p14:creationId xmlns:p14="http://schemas.microsoft.com/office/powerpoint/2010/main" xmlns="" val="3320721104"/>
       </p:ext>
     </p:extLst>
   </p:cSld>
@@ -830,7 +836,8 @@
           <a:p>
             <a:fld id="{0F5E03E0-8FDD-4F94-8780-E28EA23ED5EC}" type="datetimeFigureOut">
               <a:rPr lang="nl-BE" smtClean="0"/>
-              <a:t>15/03/16</a:t>
+              <a:pPr/>
+              <a:t>15/03/2016</a:t>
             </a:fld>
             <a:endParaRPr lang="nl-BE"/>
           </a:p>
@@ -872,7 +879,8 @@
           <a:p>
             <a:fld id="{91663F60-0288-4BD7-9F87-79CFFEA98662}" type="slidenum">
               <a:rPr lang="nl-BE" smtClean="0"/>
-              <a:t>‹nr.›</a:t>
+              <a:pPr/>
+              <a:t>‹Nr.›</a:t>
             </a:fld>
             <a:endParaRPr lang="nl-BE"/>
           </a:p>
@@ -881,7 +889,7 @@
     </p:spTree>
     <p:extLst>
       <p:ext uri="{BB962C8B-B14F-4D97-AF65-F5344CB8AC3E}">
-        <p14:creationId xmlns:p14="http://schemas.microsoft.com/office/powerpoint/2010/main" val="1971972017"/>
+        <p14:creationId xmlns:p14="http://schemas.microsoft.com/office/powerpoint/2010/main" xmlns="" val="1971972017"/>
       </p:ext>
     </p:extLst>
   </p:cSld>
@@ -1076,7 +1084,8 @@
           <a:p>
             <a:fld id="{0F5E03E0-8FDD-4F94-8780-E28EA23ED5EC}" type="datetimeFigureOut">
               <a:rPr lang="nl-BE" smtClean="0"/>
-              <a:t>15/03/16</a:t>
+              <a:pPr/>
+              <a:t>15/03/2016</a:t>
             </a:fld>
             <a:endParaRPr lang="nl-BE"/>
           </a:p>
@@ -1118,7 +1127,8 @@
           <a:p>
             <a:fld id="{91663F60-0288-4BD7-9F87-79CFFEA98662}" type="slidenum">
               <a:rPr lang="nl-BE" smtClean="0"/>
-              <a:t>‹nr.›</a:t>
+              <a:pPr/>
+              <a:t>‹Nr.›</a:t>
             </a:fld>
             <a:endParaRPr lang="nl-BE"/>
           </a:p>
@@ -1127,7 +1137,7 @@
     </p:spTree>
     <p:extLst>
       <p:ext uri="{BB962C8B-B14F-4D97-AF65-F5344CB8AC3E}">
-        <p14:creationId xmlns:p14="http://schemas.microsoft.com/office/powerpoint/2010/main" val="1541596771"/>
+        <p14:creationId xmlns:p14="http://schemas.microsoft.com/office/powerpoint/2010/main" xmlns="" val="1541596771"/>
       </p:ext>
     </p:extLst>
   </p:cSld>
@@ -1364,7 +1374,8 @@
           <a:p>
             <a:fld id="{0F5E03E0-8FDD-4F94-8780-E28EA23ED5EC}" type="datetimeFigureOut">
               <a:rPr lang="nl-BE" smtClean="0"/>
-              <a:t>15/03/16</a:t>
+              <a:pPr/>
+              <a:t>15/03/2016</a:t>
             </a:fld>
             <a:endParaRPr lang="nl-BE"/>
           </a:p>
@@ -1406,7 +1417,8 @@
           <a:p>
             <a:fld id="{91663F60-0288-4BD7-9F87-79CFFEA98662}" type="slidenum">
               <a:rPr lang="nl-BE" smtClean="0"/>
-              <a:t>‹nr.›</a:t>
+              <a:pPr/>
+              <a:t>‹Nr.›</a:t>
             </a:fld>
             <a:endParaRPr lang="nl-BE"/>
           </a:p>
@@ -1415,7 +1427,7 @@
     </p:spTree>
     <p:extLst>
       <p:ext uri="{BB962C8B-B14F-4D97-AF65-F5344CB8AC3E}">
-        <p14:creationId xmlns:p14="http://schemas.microsoft.com/office/powerpoint/2010/main" val="1047982118"/>
+        <p14:creationId xmlns:p14="http://schemas.microsoft.com/office/powerpoint/2010/main" xmlns="" val="1047982118"/>
       </p:ext>
     </p:extLst>
   </p:cSld>
@@ -1786,7 +1798,8 @@
           <a:p>
             <a:fld id="{0F5E03E0-8FDD-4F94-8780-E28EA23ED5EC}" type="datetimeFigureOut">
               <a:rPr lang="nl-BE" smtClean="0"/>
-              <a:t>15/03/16</a:t>
+              <a:pPr/>
+              <a:t>15/03/2016</a:t>
             </a:fld>
             <a:endParaRPr lang="nl-BE"/>
           </a:p>
@@ -1828,7 +1841,8 @@
           <a:p>
             <a:fld id="{91663F60-0288-4BD7-9F87-79CFFEA98662}" type="slidenum">
               <a:rPr lang="nl-BE" smtClean="0"/>
-              <a:t>‹nr.›</a:t>
+              <a:pPr/>
+              <a:t>‹Nr.›</a:t>
             </a:fld>
             <a:endParaRPr lang="nl-BE"/>
           </a:p>
@@ -1837,7 +1851,7 @@
     </p:spTree>
     <p:extLst>
       <p:ext uri="{BB962C8B-B14F-4D97-AF65-F5344CB8AC3E}">
-        <p14:creationId xmlns:p14="http://schemas.microsoft.com/office/powerpoint/2010/main" val="2185725893"/>
+        <p14:creationId xmlns:p14="http://schemas.microsoft.com/office/powerpoint/2010/main" xmlns="" val="2185725893"/>
       </p:ext>
     </p:extLst>
   </p:cSld>
@@ -1904,7 +1918,8 @@
           <a:p>
             <a:fld id="{0F5E03E0-8FDD-4F94-8780-E28EA23ED5EC}" type="datetimeFigureOut">
               <a:rPr lang="nl-BE" smtClean="0"/>
-              <a:t>15/03/16</a:t>
+              <a:pPr/>
+              <a:t>15/03/2016</a:t>
             </a:fld>
             <a:endParaRPr lang="nl-BE"/>
           </a:p>
@@ -1946,7 +1961,8 @@
           <a:p>
             <a:fld id="{91663F60-0288-4BD7-9F87-79CFFEA98662}" type="slidenum">
               <a:rPr lang="nl-BE" smtClean="0"/>
-              <a:t>‹nr.›</a:t>
+              <a:pPr/>
+              <a:t>‹Nr.›</a:t>
             </a:fld>
             <a:endParaRPr lang="nl-BE"/>
           </a:p>
@@ -1955,7 +1971,7 @@
     </p:spTree>
     <p:extLst>
       <p:ext uri="{BB962C8B-B14F-4D97-AF65-F5344CB8AC3E}">
-        <p14:creationId xmlns:p14="http://schemas.microsoft.com/office/powerpoint/2010/main" val="1565659618"/>
+        <p14:creationId xmlns:p14="http://schemas.microsoft.com/office/powerpoint/2010/main" xmlns="" val="1565659618"/>
       </p:ext>
     </p:extLst>
   </p:cSld>
@@ -1999,7 +2015,8 @@
           <a:p>
             <a:fld id="{0F5E03E0-8FDD-4F94-8780-E28EA23ED5EC}" type="datetimeFigureOut">
               <a:rPr lang="nl-BE" smtClean="0"/>
-              <a:t>15/03/16</a:t>
+              <a:pPr/>
+              <a:t>15/03/2016</a:t>
             </a:fld>
             <a:endParaRPr lang="nl-BE"/>
           </a:p>
@@ -2041,7 +2058,8 @@
           <a:p>
             <a:fld id="{91663F60-0288-4BD7-9F87-79CFFEA98662}" type="slidenum">
               <a:rPr lang="nl-BE" smtClean="0"/>
-              <a:t>‹nr.›</a:t>
+              <a:pPr/>
+              <a:t>‹Nr.›</a:t>
             </a:fld>
             <a:endParaRPr lang="nl-BE"/>
           </a:p>
@@ -2050,7 +2068,7 @@
     </p:spTree>
     <p:extLst>
       <p:ext uri="{BB962C8B-B14F-4D97-AF65-F5344CB8AC3E}">
-        <p14:creationId xmlns:p14="http://schemas.microsoft.com/office/powerpoint/2010/main" val="2302775655"/>
+        <p14:creationId xmlns:p14="http://schemas.microsoft.com/office/powerpoint/2010/main" xmlns="" val="2302775655"/>
       </p:ext>
     </p:extLst>
   </p:cSld>
@@ -2276,7 +2294,8 @@
           <a:p>
             <a:fld id="{0F5E03E0-8FDD-4F94-8780-E28EA23ED5EC}" type="datetimeFigureOut">
               <a:rPr lang="nl-BE" smtClean="0"/>
-              <a:t>15/03/16</a:t>
+              <a:pPr/>
+              <a:t>15/03/2016</a:t>
             </a:fld>
             <a:endParaRPr lang="nl-BE"/>
           </a:p>
@@ -2318,7 +2337,8 @@
           <a:p>
             <a:fld id="{91663F60-0288-4BD7-9F87-79CFFEA98662}" type="slidenum">
               <a:rPr lang="nl-BE" smtClean="0"/>
-              <a:t>‹nr.›</a:t>
+              <a:pPr/>
+              <a:t>‹Nr.›</a:t>
             </a:fld>
             <a:endParaRPr lang="nl-BE"/>
           </a:p>
@@ -2327,7 +2347,7 @@
     </p:spTree>
     <p:extLst>
       <p:ext uri="{BB962C8B-B14F-4D97-AF65-F5344CB8AC3E}">
-        <p14:creationId xmlns:p14="http://schemas.microsoft.com/office/powerpoint/2010/main" val="2384358470"/>
+        <p14:creationId xmlns:p14="http://schemas.microsoft.com/office/powerpoint/2010/main" xmlns="" val="2384358470"/>
       </p:ext>
     </p:extLst>
   </p:cSld>
@@ -2529,7 +2549,8 @@
           <a:p>
             <a:fld id="{0F5E03E0-8FDD-4F94-8780-E28EA23ED5EC}" type="datetimeFigureOut">
               <a:rPr lang="nl-BE" smtClean="0"/>
-              <a:t>15/03/16</a:t>
+              <a:pPr/>
+              <a:t>15/03/2016</a:t>
             </a:fld>
             <a:endParaRPr lang="nl-BE"/>
           </a:p>
@@ -2571,7 +2592,8 @@
           <a:p>
             <a:fld id="{91663F60-0288-4BD7-9F87-79CFFEA98662}" type="slidenum">
               <a:rPr lang="nl-BE" smtClean="0"/>
-              <a:t>‹nr.›</a:t>
+              <a:pPr/>
+              <a:t>‹Nr.›</a:t>
             </a:fld>
             <a:endParaRPr lang="nl-BE"/>
           </a:p>
@@ -2580,7 +2602,7 @@
     </p:spTree>
     <p:extLst>
       <p:ext uri="{BB962C8B-B14F-4D97-AF65-F5344CB8AC3E}">
-        <p14:creationId xmlns:p14="http://schemas.microsoft.com/office/powerpoint/2010/main" val="221485852"/>
+        <p14:creationId xmlns:p14="http://schemas.microsoft.com/office/powerpoint/2010/main" xmlns="" val="221485852"/>
       </p:ext>
     </p:extLst>
   </p:cSld>
@@ -2594,9 +2616,33 @@
 <p:sldMaster xmlns:a="http://schemas.openxmlformats.org/drawingml/2006/main" xmlns:r="http://schemas.openxmlformats.org/officeDocument/2006/relationships" xmlns:p="http://schemas.openxmlformats.org/presentationml/2006/main">
   <p:cSld>
     <p:bg>
-      <p:bgRef idx="1001">
-        <a:schemeClr val="bg1"/>
-      </p:bgRef>
+      <p:bgPr>
+        <a:gradFill flip="none" rotWithShape="1">
+          <a:gsLst>
+            <a:gs pos="0">
+              <a:srgbClr val="FFEFD1">
+                <a:alpha val="75000"/>
+              </a:srgbClr>
+            </a:gs>
+            <a:gs pos="64999">
+              <a:schemeClr val="bg1">
+                <a:lumMod val="95000"/>
+                <a:alpha val="83000"/>
+              </a:schemeClr>
+            </a:gs>
+            <a:gs pos="100000">
+              <a:schemeClr val="accent4">
+                <a:lumMod val="20000"/>
+                <a:lumOff val="80000"/>
+                <a:alpha val="60000"/>
+              </a:schemeClr>
+            </a:gs>
+          </a:gsLst>
+          <a:lin ang="5400000" scaled="0"/>
+          <a:tileRect/>
+        </a:gradFill>
+        <a:effectLst/>
+      </p:bgPr>
     </p:bg>
     <p:spTree>
       <p:nvGrpSpPr>
@@ -2742,7 +2788,8 @@
           <a:p>
             <a:fld id="{0F5E03E0-8FDD-4F94-8780-E28EA23ED5EC}" type="datetimeFigureOut">
               <a:rPr lang="nl-BE" smtClean="0"/>
-              <a:t>15/03/16</a:t>
+              <a:pPr/>
+              <a:t>15/03/2016</a:t>
             </a:fld>
             <a:endParaRPr lang="nl-BE"/>
           </a:p>
@@ -2820,7 +2867,8 @@
           <a:p>
             <a:fld id="{91663F60-0288-4BD7-9F87-79CFFEA98662}" type="slidenum">
               <a:rPr lang="nl-BE" smtClean="0"/>
-              <a:t>‹nr.›</a:t>
+              <a:pPr/>
+              <a:t>‹Nr.›</a:t>
             </a:fld>
             <a:endParaRPr lang="nl-BE"/>
           </a:p>
@@ -2829,7 +2877,7 @@
     </p:spTree>
     <p:extLst>
       <p:ext uri="{BB962C8B-B14F-4D97-AF65-F5344CB8AC3E}">
-        <p14:creationId xmlns:p14="http://schemas.microsoft.com/office/powerpoint/2010/main" val="2268232388"/>
+        <p14:creationId xmlns:p14="http://schemas.microsoft.com/office/powerpoint/2010/main" xmlns="" val="2268232388"/>
       </p:ext>
     </p:extLst>
   </p:cSld>
@@ -3127,16 +3175,57 @@
             <p:ph type="ctrTitle"/>
           </p:nvPr>
         </p:nvSpPr>
-        <p:spPr/>
-        <p:txBody>
-          <a:bodyPr/>
-          <a:lstStyle/>
-          <a:p>
-            <a:r>
-              <a:rPr lang="nl-BE" dirty="0" smtClean="0"/>
-              <a:t>SWOP Presentatie: Iteratie 1 </a:t>
-            </a:r>
-            <a:endParaRPr lang="nl-BE" dirty="0"/>
+        <p:spPr>
+          <a:xfrm>
+            <a:off x="683568" y="2060848"/>
+            <a:ext cx="7772400" cy="1470025"/>
+          </a:xfrm>
+        </p:spPr>
+        <p:txBody>
+          <a:bodyPr>
+            <a:normAutofit/>
+          </a:bodyPr>
+          <a:lstStyle/>
+          <a:p>
+            <a:r>
+              <a:rPr lang="nl-BE" sz="5400" cap="small" dirty="0" smtClean="0">
+                <a:ln w="18415" cmpd="sng">
+                  <a:solidFill>
+                    <a:schemeClr val="tx1">
+                      <a:alpha val="0"/>
+                    </a:schemeClr>
+                  </a:solidFill>
+                  <a:prstDash val="solid"/>
+                </a:ln>
+                <a:effectLst>
+                  <a:outerShdw blurRad="25400" dir="3600000" algn="tl" rotWithShape="0">
+                    <a:srgbClr val="000000">
+                      <a:alpha val="70000"/>
+                    </a:srgbClr>
+                  </a:outerShdw>
+                </a:effectLst>
+                <a:latin typeface="Sitka Text" pitchFamily="2" charset="0"/>
+              </a:rPr>
+              <a:t>Software-ontwerp</a:t>
+            </a:r>
+            <a:endParaRPr lang="nl-BE" sz="5400" cap="small" dirty="0">
+              <a:ln w="18415" cmpd="sng">
+                <a:solidFill>
+                  <a:schemeClr val="tx1">
+                    <a:alpha val="0"/>
+                  </a:schemeClr>
+                </a:solidFill>
+                <a:prstDash val="solid"/>
+              </a:ln>
+              <a:effectLst>
+                <a:outerShdw blurRad="25400" dir="3600000" algn="tl" rotWithShape="0">
+                  <a:srgbClr val="000000">
+                    <a:alpha val="70000"/>
+                  </a:srgbClr>
+                </a:outerShdw>
+              </a:effectLst>
+              <a:latin typeface="Sitka Text" pitchFamily="2" charset="0"/>
+            </a:endParaRPr>
           </a:p>
         </p:txBody>
       </p:sp>
@@ -3150,63 +3239,297 @@
             <p:ph type="subTitle" idx="1"/>
           </p:nvPr>
         </p:nvSpPr>
-        <p:spPr/>
-        <p:txBody>
-          <a:bodyPr>
-            <a:normAutofit fontScale="85000" lnSpcReduction="20000"/>
+        <p:spPr>
+          <a:xfrm>
+            <a:off x="1403648" y="4797152"/>
+            <a:ext cx="6400800" cy="1584176"/>
+          </a:xfrm>
+        </p:spPr>
+        <p:txBody>
+          <a:bodyPr anchor="ctr" anchorCtr="0">
+            <a:noAutofit/>
           </a:bodyPr>
           <a:lstStyle/>
           <a:p>
-            <a:r>
-              <a:rPr lang="nl-BE" dirty="0" smtClean="0"/>
+            <a:pPr>
+              <a:spcBef>
+                <a:spcPts val="0"/>
+              </a:spcBef>
+            </a:pPr>
+            <a:r>
+              <a:rPr lang="nl-BE" sz="2000" dirty="0" smtClean="0">
+                <a:solidFill>
+                  <a:schemeClr val="accent4">
+                    <a:lumMod val="50000"/>
+                  </a:schemeClr>
+                </a:solidFill>
+                <a:effectLst>
+                  <a:outerShdw blurRad="127000" dist="38100" dir="5400000" algn="t" rotWithShape="0">
+                    <a:prstClr val="black">
+                      <a:alpha val="40000"/>
+                    </a:prstClr>
+                  </a:outerShdw>
+                </a:effectLst>
+                <a:latin typeface="Sitka Banner" pitchFamily="2" charset="0"/>
+              </a:rPr>
               <a:t>Karina </a:t>
             </a:r>
             <a:r>
-              <a:rPr lang="nl-BE" dirty="0" err="1" smtClean="0"/>
+              <a:rPr lang="nl-BE" sz="2000" dirty="0" err="1" smtClean="0">
+                <a:solidFill>
+                  <a:schemeClr val="accent4">
+                    <a:lumMod val="50000"/>
+                  </a:schemeClr>
+                </a:solidFill>
+                <a:effectLst>
+                  <a:outerShdw blurRad="127000" dist="38100" dir="5400000" algn="t" rotWithShape="0">
+                    <a:prstClr val="black">
+                      <a:alpha val="40000"/>
+                    </a:prstClr>
+                  </a:outerShdw>
+                </a:effectLst>
+                <a:latin typeface="Sitka Banner" pitchFamily="2" charset="0"/>
+              </a:rPr>
               <a:t>Karapetyan</a:t>
             </a:r>
-            <a:endParaRPr lang="nl-BE" dirty="0" smtClean="0"/>
-          </a:p>
-          <a:p>
-            <a:r>
-              <a:rPr lang="nl-BE" dirty="0" smtClean="0"/>
+            <a:endParaRPr lang="nl-BE" sz="2000" dirty="0" smtClean="0">
+              <a:solidFill>
+                <a:schemeClr val="accent4">
+                  <a:lumMod val="50000"/>
+                </a:schemeClr>
+              </a:solidFill>
+              <a:effectLst>
+                <a:outerShdw blurRad="127000" dist="38100" dir="5400000" algn="t" rotWithShape="0">
+                  <a:prstClr val="black">
+                    <a:alpha val="40000"/>
+                  </a:prstClr>
+                </a:outerShdw>
+              </a:effectLst>
+              <a:latin typeface="Sitka Banner" pitchFamily="2" charset="0"/>
+            </a:endParaRPr>
+          </a:p>
+          <a:p>
+            <a:pPr>
+              <a:spcBef>
+                <a:spcPts val="0"/>
+              </a:spcBef>
+            </a:pPr>
+            <a:r>
+              <a:rPr lang="nl-BE" sz="2000" dirty="0" smtClean="0">
+                <a:solidFill>
+                  <a:schemeClr val="accent4">
+                    <a:lumMod val="50000"/>
+                  </a:schemeClr>
+                </a:solidFill>
+                <a:effectLst>
+                  <a:outerShdw blurRad="127000" dist="38100" dir="5400000" algn="t" rotWithShape="0">
+                    <a:prstClr val="black">
+                      <a:alpha val="40000"/>
+                    </a:prstClr>
+                  </a:outerShdw>
+                </a:effectLst>
+                <a:latin typeface="Sitka Banner" pitchFamily="2" charset="0"/>
+              </a:rPr>
               <a:t>Laurens </a:t>
             </a:r>
             <a:r>
-              <a:rPr lang="nl-BE" dirty="0" err="1" smtClean="0"/>
+              <a:rPr lang="nl-BE" sz="2000" dirty="0" err="1" smtClean="0">
+                <a:solidFill>
+                  <a:schemeClr val="accent4">
+                    <a:lumMod val="50000"/>
+                  </a:schemeClr>
+                </a:solidFill>
+                <a:effectLst>
+                  <a:outerShdw blurRad="127000" dist="38100" dir="5400000" algn="t" rotWithShape="0">
+                    <a:prstClr val="black">
+                      <a:alpha val="40000"/>
+                    </a:prstClr>
+                  </a:outerShdw>
+                </a:effectLst>
+                <a:latin typeface="Sitka Banner" pitchFamily="2" charset="0"/>
+              </a:rPr>
               <a:t>Cleemput</a:t>
             </a:r>
-            <a:endParaRPr lang="nl-BE" dirty="0" smtClean="0"/>
-          </a:p>
-          <a:p>
-            <a:r>
-              <a:rPr lang="nl-BE" dirty="0" smtClean="0"/>
+            <a:endParaRPr lang="nl-BE" sz="2000" dirty="0" smtClean="0">
+              <a:solidFill>
+                <a:schemeClr val="accent4">
+                  <a:lumMod val="50000"/>
+                </a:schemeClr>
+              </a:solidFill>
+              <a:effectLst>
+                <a:outerShdw blurRad="127000" dist="38100" dir="5400000" algn="t" rotWithShape="0">
+                  <a:prstClr val="black">
+                    <a:alpha val="40000"/>
+                  </a:prstClr>
+                </a:outerShdw>
+              </a:effectLst>
+              <a:latin typeface="Sitka Banner" pitchFamily="2" charset="0"/>
+            </a:endParaRPr>
+          </a:p>
+          <a:p>
+            <a:pPr>
+              <a:spcBef>
+                <a:spcPts val="0"/>
+              </a:spcBef>
+            </a:pPr>
+            <a:r>
+              <a:rPr lang="nl-BE" sz="2000" dirty="0" smtClean="0">
+                <a:solidFill>
+                  <a:schemeClr val="accent4">
+                    <a:lumMod val="50000"/>
+                  </a:schemeClr>
+                </a:solidFill>
+                <a:effectLst>
+                  <a:outerShdw blurRad="127000" dist="38100" dir="5400000" algn="t" rotWithShape="0">
+                    <a:prstClr val="black">
+                      <a:alpha val="40000"/>
+                    </a:prstClr>
+                  </a:outerShdw>
+                </a:effectLst>
+                <a:latin typeface="Sitka Banner" pitchFamily="2" charset="0"/>
+              </a:rPr>
               <a:t>Tom Houben</a:t>
             </a:r>
           </a:p>
           <a:p>
-            <a:r>
-              <a:rPr lang="nl-BE" dirty="0" smtClean="0"/>
+            <a:pPr>
+              <a:spcBef>
+                <a:spcPts val="0"/>
+              </a:spcBef>
+            </a:pPr>
+            <a:r>
+              <a:rPr lang="nl-BE" sz="2000" dirty="0" smtClean="0">
+                <a:solidFill>
+                  <a:schemeClr val="accent4">
+                    <a:lumMod val="50000"/>
+                  </a:schemeClr>
+                </a:solidFill>
+                <a:effectLst>
+                  <a:outerShdw blurRad="127000" dist="38100" dir="5400000" algn="t" rotWithShape="0">
+                    <a:prstClr val="black">
+                      <a:alpha val="40000"/>
+                    </a:prstClr>
+                  </a:outerShdw>
+                </a:effectLst>
+                <a:latin typeface="Sitka Banner" pitchFamily="2" charset="0"/>
+              </a:rPr>
               <a:t>Tri </a:t>
             </a:r>
             <a:r>
-              <a:rPr lang="nl-BE" dirty="0" err="1" smtClean="0"/>
+              <a:rPr lang="nl-BE" sz="2000" dirty="0" err="1" smtClean="0">
+                <a:solidFill>
+                  <a:schemeClr val="accent4">
+                    <a:lumMod val="50000"/>
+                  </a:schemeClr>
+                </a:solidFill>
+                <a:effectLst>
+                  <a:outerShdw blurRad="127000" dist="38100" dir="5400000" algn="t" rotWithShape="0">
+                    <a:prstClr val="black">
+                      <a:alpha val="40000"/>
+                    </a:prstClr>
+                  </a:outerShdw>
+                </a:effectLst>
+                <a:latin typeface="Sitka Banner" pitchFamily="2" charset="0"/>
+              </a:rPr>
               <a:t>Tran</a:t>
             </a:r>
-            <a:endParaRPr lang="nl-BE" dirty="0"/>
+            <a:endParaRPr lang="nl-BE" sz="2000" dirty="0">
+              <a:solidFill>
+                <a:schemeClr val="accent4">
+                  <a:lumMod val="50000"/>
+                </a:schemeClr>
+              </a:solidFill>
+              <a:effectLst>
+                <a:outerShdw blurRad="127000" dist="38100" dir="5400000" algn="t" rotWithShape="0">
+                  <a:prstClr val="black">
+                    <a:alpha val="40000"/>
+                  </a:prstClr>
+                </a:outerShdw>
+              </a:effectLst>
+              <a:latin typeface="Sitka Banner" pitchFamily="2" charset="0"/>
+            </a:endParaRPr>
+          </a:p>
+        </p:txBody>
+      </p:sp>
+      <p:sp>
+        <p:nvSpPr>
+          <p:cNvPr id="4" name="Textfeld 3"/>
+          <p:cNvSpPr txBox="1"/>
+          <p:nvPr/>
+        </p:nvSpPr>
+        <p:spPr>
+          <a:xfrm>
+            <a:off x="2051720" y="3068960"/>
+            <a:ext cx="4896544" cy="523220"/>
+          </a:xfrm>
+          <a:prstGeom prst="rect">
+            <a:avLst/>
+          </a:prstGeom>
+          <a:noFill/>
+        </p:spPr>
+        <p:txBody>
+          <a:bodyPr wrap="square" rtlCol="0" anchor="ctr" anchorCtr="0">
+            <a:spAutoFit/>
+          </a:bodyPr>
+          <a:lstStyle/>
+          <a:p>
+            <a:pPr algn="ctr"/>
+            <a:r>
+              <a:rPr lang="nl-BE" sz="2700" cap="small" dirty="0" smtClean="0">
+                <a:effectLst>
+                  <a:outerShdw blurRad="50800" dist="38100" dir="5400000" algn="t" rotWithShape="0">
+                    <a:prstClr val="black">
+                      <a:alpha val="40000"/>
+                    </a:prstClr>
+                  </a:outerShdw>
+                </a:effectLst>
+                <a:latin typeface="Sitka Text" pitchFamily="2" charset="0"/>
+              </a:rPr>
+              <a:t>Presentatie: Iteratie </a:t>
+            </a:r>
+            <a:r>
+              <a:rPr lang="nl-BE" sz="2700" cap="small" dirty="0" smtClean="0">
+                <a:effectLst>
+                  <a:outerShdw blurRad="50800" dist="38100" dir="5400000" algn="t" rotWithShape="0">
+                    <a:prstClr val="black">
+                      <a:alpha val="40000"/>
+                    </a:prstClr>
+                  </a:outerShdw>
+                </a:effectLst>
+                <a:latin typeface="Sitka Text" pitchFamily="2" charset="0"/>
+              </a:rPr>
+              <a:t>1</a:t>
+            </a:r>
+            <a:endParaRPr lang="en-GB" sz="2700" cap="small" dirty="0">
+              <a:effectLst>
+                <a:outerShdw blurRad="50800" dist="38100" dir="5400000" algn="t" rotWithShape="0">
+                  <a:prstClr val="black">
+                    <a:alpha val="40000"/>
+                  </a:prstClr>
+                </a:outerShdw>
+              </a:effectLst>
+              <a:latin typeface="Sitka Text" pitchFamily="2" charset="0"/>
+            </a:endParaRPr>
           </a:p>
         </p:txBody>
       </p:sp>
     </p:spTree>
     <p:extLst>
       <p:ext uri="{BB962C8B-B14F-4D97-AF65-F5344CB8AC3E}">
-        <p14:creationId xmlns:p14="http://schemas.microsoft.com/office/powerpoint/2010/main" val="1089514898"/>
+        <p14:creationId xmlns:p14="http://schemas.microsoft.com/office/powerpoint/2010/main" xmlns="" val="1089514898"/>
       </p:ext>
     </p:extLst>
   </p:cSld>
   <p:clrMapOvr>
     <a:masterClrMapping/>
   </p:clrMapOvr>
+  <p:timing>
+    <p:tnLst>
+      <p:par>
+        <p:cTn id="1" dur="indefinite" restart="never" nodeType="tmRoot"/>
+      </p:par>
+    </p:tnLst>
+  </p:timing>
 </p:sld>
 </file>
 
@@ -3244,33 +3567,50 @@
           </a:xfrm>
         </p:spPr>
         <p:txBody>
-          <a:bodyPr/>
-          <a:lstStyle/>
-          <a:p>
-            <a:r>
-              <a:rPr lang="nl-BE" dirty="0" smtClean="0"/>
+          <a:bodyPr>
+            <a:normAutofit/>
+          </a:bodyPr>
+          <a:lstStyle/>
+          <a:p>
+            <a:r>
+              <a:rPr lang="nl-BE" sz="3600" cap="small" dirty="0" smtClean="0">
+                <a:ln w="18415" cmpd="sng">
+                  <a:solidFill>
+                    <a:schemeClr val="tx1">
+                      <a:alpha val="0"/>
+                    </a:schemeClr>
+                  </a:solidFill>
+                  <a:prstDash val="solid"/>
+                </a:ln>
+                <a:effectLst>
+                  <a:outerShdw blurRad="25400" dir="3600000" algn="tl" rotWithShape="0">
+                    <a:srgbClr val="000000">
+                      <a:alpha val="70000"/>
+                    </a:srgbClr>
+                  </a:outerShdw>
+                </a:effectLst>
+                <a:latin typeface="Sitka Text" pitchFamily="2" charset="0"/>
+              </a:rPr>
               <a:t>High Level Design</a:t>
             </a:r>
-            <a:endParaRPr lang="nl-BE" dirty="0"/>
-          </a:p>
-        </p:txBody>
-      </p:sp>
-      <p:sp>
-        <p:nvSpPr>
-          <p:cNvPr id="3" name="Tijdelijke aanduiding voor inhoud 2"/>
-          <p:cNvSpPr>
-            <a:spLocks noGrp="1"/>
-          </p:cNvSpPr>
-          <p:nvPr>
-            <p:ph idx="1"/>
-          </p:nvPr>
-        </p:nvSpPr>
-        <p:spPr/>
-        <p:txBody>
-          <a:bodyPr/>
-          <a:lstStyle/>
-          <a:p>
-            <a:endParaRPr lang="nl-BE" dirty="0"/>
+            <a:endParaRPr lang="nl-BE" sz="3600" cap="small" dirty="0">
+              <a:ln w="18415" cmpd="sng">
+                <a:solidFill>
+                  <a:schemeClr val="tx1">
+                    <a:alpha val="0"/>
+                  </a:schemeClr>
+                </a:solidFill>
+                <a:prstDash val="solid"/>
+              </a:ln>
+              <a:effectLst>
+                <a:outerShdw blurRad="25400" dir="3600000" algn="tl" rotWithShape="0">
+                  <a:srgbClr val="000000">
+                    <a:alpha val="70000"/>
+                  </a:srgbClr>
+                </a:outerShdw>
+              </a:effectLst>
+              <a:latin typeface="Sitka Text" pitchFamily="2" charset="0"/>
+            </a:endParaRPr>
           </a:p>
         </p:txBody>
       </p:sp>
@@ -3283,22 +3623,26 @@
           <p:nvPr/>
         </p:nvPicPr>
         <p:blipFill>
-          <a:blip r:embed="rId2">
-            <a:extLst>
-              <a:ext uri="{28A0092B-C50C-407E-A947-70E740481C1C}">
-                <a14:useLocalDpi xmlns:a14="http://schemas.microsoft.com/office/drawing/2010/main" val="0"/>
-              </a:ext>
-            </a:extLst>
+          <a:blip r:embed="rId2" cstate="print">
+            <a:clrChange>
+              <a:clrFrom>
+                <a:srgbClr val="FFFFFF"/>
+              </a:clrFrom>
+              <a:clrTo>
+                <a:srgbClr val="FFFFFF">
+                  <a:alpha val="0"/>
+                </a:srgbClr>
+              </a:clrTo>
+            </a:clrChange>
           </a:blip>
-          <a:srcRect/>
           <a:stretch>
             <a:fillRect/>
           </a:stretch>
         </p:blipFill>
         <p:spPr bwMode="auto">
           <a:xfrm>
-            <a:off x="68262" y="1052736"/>
-            <a:ext cx="9075738" cy="5619750"/>
+            <a:off x="68262" y="1053227"/>
+            <a:ext cx="9075738" cy="5618767"/>
           </a:xfrm>
           <a:prstGeom prst="rect">
             <a:avLst/>
@@ -3306,7 +3650,7 @@
           <a:noFill/>
           <a:extLst>
             <a:ext uri="{909E8E84-426E-40DD-AFC4-6F175D3DCCD1}">
-              <a14:hiddenFill xmlns:a14="http://schemas.microsoft.com/office/drawing/2010/main">
+              <a14:hiddenFill xmlns:a14="http://schemas.microsoft.com/office/drawing/2010/main" xmlns="">
                 <a:solidFill>
                   <a:srgbClr val="FFFFFF"/>
                 </a:solidFill>
@@ -3318,13 +3662,20 @@
     </p:spTree>
     <p:extLst>
       <p:ext uri="{BB962C8B-B14F-4D97-AF65-F5344CB8AC3E}">
-        <p14:creationId xmlns:p14="http://schemas.microsoft.com/office/powerpoint/2010/main" val="439526893"/>
+        <p14:creationId xmlns:p14="http://schemas.microsoft.com/office/powerpoint/2010/main" xmlns="" val="439526893"/>
       </p:ext>
     </p:extLst>
   </p:cSld>
   <p:clrMapOvr>
     <a:masterClrMapping/>
   </p:clrMapOvr>
+  <p:timing>
+    <p:tnLst>
+      <p:par>
+        <p:cTn id="1" dur="indefinite" restart="never" nodeType="tmRoot"/>
+      </p:par>
+    </p:tnLst>
+  </p:timing>
 </p:sld>
 </file>
 
@@ -3357,26 +3708,113 @@
         </p:nvSpPr>
         <p:spPr/>
         <p:txBody>
-          <a:bodyPr/>
-          <a:lstStyle/>
-          <a:p>
-            <a:r>
-              <a:rPr lang="nl-BE" dirty="0" smtClean="0"/>
+          <a:bodyPr>
+            <a:normAutofit/>
+          </a:bodyPr>
+          <a:lstStyle/>
+          <a:p>
+            <a:r>
+              <a:rPr lang="nl-BE" sz="3600" cap="small" dirty="0" smtClean="0">
+                <a:ln w="18415" cmpd="sng">
+                  <a:solidFill>
+                    <a:schemeClr val="tx1">
+                      <a:alpha val="0"/>
+                    </a:schemeClr>
+                  </a:solidFill>
+                  <a:prstDash val="solid"/>
+                </a:ln>
+                <a:effectLst>
+                  <a:outerShdw blurRad="25400" dir="3600000" algn="tl" rotWithShape="0">
+                    <a:srgbClr val="000000">
+                      <a:alpha val="70000"/>
+                    </a:srgbClr>
+                  </a:outerShdw>
+                </a:effectLst>
+                <a:latin typeface="Sitka Text" pitchFamily="2" charset="0"/>
+              </a:rPr>
               <a:t>More </a:t>
             </a:r>
             <a:r>
-              <a:rPr lang="nl-BE" dirty="0" err="1" smtClean="0"/>
+              <a:rPr lang="nl-BE" sz="3600" cap="small" dirty="0" err="1" smtClean="0">
+                <a:ln w="18415" cmpd="sng">
+                  <a:solidFill>
+                    <a:schemeClr val="tx1">
+                      <a:alpha val="0"/>
+                    </a:schemeClr>
+                  </a:solidFill>
+                  <a:prstDash val="solid"/>
+                </a:ln>
+                <a:effectLst>
+                  <a:outerShdw blurRad="25400" dir="3600000" algn="tl" rotWithShape="0">
+                    <a:srgbClr val="000000">
+                      <a:alpha val="70000"/>
+                    </a:srgbClr>
+                  </a:outerShdw>
+                </a:effectLst>
+                <a:latin typeface="Sitka Text" pitchFamily="2" charset="0"/>
+              </a:rPr>
               <a:t>detailed</a:t>
             </a:r>
             <a:r>
-              <a:rPr lang="nl-BE" dirty="0" smtClean="0"/>
+              <a:rPr lang="nl-BE" sz="3600" cap="small" dirty="0" smtClean="0">
+                <a:ln w="18415" cmpd="sng">
+                  <a:solidFill>
+                    <a:schemeClr val="tx1">
+                      <a:alpha val="0"/>
+                    </a:schemeClr>
+                  </a:solidFill>
+                  <a:prstDash val="solid"/>
+                </a:ln>
+                <a:effectLst>
+                  <a:outerShdw blurRad="25400" dir="3600000" algn="tl" rotWithShape="0">
+                    <a:srgbClr val="000000">
+                      <a:alpha val="70000"/>
+                    </a:srgbClr>
+                  </a:outerShdw>
+                </a:effectLst>
+                <a:latin typeface="Sitka Text" pitchFamily="2" charset="0"/>
+              </a:rPr>
               <a:t> </a:t>
             </a:r>
             <a:r>
-              <a:rPr lang="nl-BE" dirty="0" err="1" smtClean="0"/>
+              <a:rPr lang="nl-BE" sz="3600" cap="small" dirty="0" err="1" smtClean="0">
+                <a:ln w="18415" cmpd="sng">
+                  <a:solidFill>
+                    <a:schemeClr val="tx1">
+                      <a:alpha val="0"/>
+                    </a:schemeClr>
+                  </a:solidFill>
+                  <a:prstDash val="solid"/>
+                </a:ln>
+                <a:effectLst>
+                  <a:outerShdw blurRad="25400" dir="3600000" algn="tl" rotWithShape="0">
+                    <a:srgbClr val="000000">
+                      <a:alpha val="70000"/>
+                    </a:srgbClr>
+                  </a:outerShdw>
+                </a:effectLst>
+                <a:latin typeface="Sitka Text" pitchFamily="2" charset="0"/>
+              </a:rPr>
               <a:t>parts</a:t>
             </a:r>
-            <a:endParaRPr lang="nl-BE" dirty="0"/>
+            <a:endParaRPr lang="nl-BE" sz="3600" cap="small" dirty="0">
+              <a:ln w="18415" cmpd="sng">
+                <a:solidFill>
+                  <a:schemeClr val="tx1">
+                    <a:alpha val="0"/>
+                  </a:schemeClr>
+                </a:solidFill>
+                <a:prstDash val="solid"/>
+              </a:ln>
+              <a:effectLst>
+                <a:outerShdw blurRad="25400" dir="3600000" algn="tl" rotWithShape="0">
+                  <a:srgbClr val="000000">
+                    <a:alpha val="70000"/>
+                  </a:srgbClr>
+                </a:outerShdw>
+              </a:effectLst>
+              <a:latin typeface="Sitka Text" pitchFamily="2" charset="0"/>
+            </a:endParaRPr>
           </a:p>
         </p:txBody>
       </p:sp>
@@ -3402,13 +3840,20 @@
     </p:spTree>
     <p:extLst>
       <p:ext uri="{BB962C8B-B14F-4D97-AF65-F5344CB8AC3E}">
-        <p14:creationId xmlns:p14="http://schemas.microsoft.com/office/powerpoint/2010/main" val="983478496"/>
+        <p14:creationId xmlns:p14="http://schemas.microsoft.com/office/powerpoint/2010/main" xmlns="" val="983478496"/>
       </p:ext>
     </p:extLst>
   </p:cSld>
   <p:clrMapOvr>
     <a:masterClrMapping/>
   </p:clrMapOvr>
+  <p:timing>
+    <p:tnLst>
+      <p:par>
+        <p:cTn id="1" dur="indefinite" restart="never" nodeType="tmRoot"/>
+      </p:par>
+    </p:tnLst>
+  </p:timing>
 </p:sld>
 </file>
 
@@ -3441,50 +3886,110 @@
         </p:nvSpPr>
         <p:spPr/>
         <p:txBody>
+          <a:bodyPr>
+            <a:normAutofit/>
+          </a:bodyPr>
+          <a:lstStyle/>
+          <a:p>
+            <a:r>
+              <a:rPr lang="nl-BE" sz="3600" cap="small" dirty="0" err="1" smtClean="0">
+                <a:ln w="18415" cmpd="sng">
+                  <a:solidFill>
+                    <a:schemeClr val="tx1">
+                      <a:alpha val="0"/>
+                    </a:schemeClr>
+                  </a:solidFill>
+                  <a:prstDash val="solid"/>
+                </a:ln>
+                <a:effectLst>
+                  <a:outerShdw blurRad="25400" dir="3600000" algn="tl" rotWithShape="0">
+                    <a:srgbClr val="000000">
+                      <a:alpha val="70000"/>
+                    </a:srgbClr>
+                  </a:outerShdw>
+                </a:effectLst>
+                <a:latin typeface="Sitka Text" pitchFamily="2" charset="0"/>
+              </a:rPr>
+              <a:t>Extensibility</a:t>
+            </a:r>
+            <a:r>
+              <a:rPr lang="nl-BE" sz="3600" cap="small" dirty="0" smtClean="0">
+                <a:ln w="18415" cmpd="sng">
+                  <a:solidFill>
+                    <a:schemeClr val="tx1">
+                      <a:alpha val="0"/>
+                    </a:schemeClr>
+                  </a:solidFill>
+                  <a:prstDash val="solid"/>
+                </a:ln>
+                <a:effectLst>
+                  <a:outerShdw blurRad="25400" dir="3600000" algn="tl" rotWithShape="0">
+                    <a:srgbClr val="000000">
+                      <a:alpha val="70000"/>
+                    </a:srgbClr>
+                  </a:outerShdw>
+                </a:effectLst>
+                <a:latin typeface="Sitka Text" pitchFamily="2" charset="0"/>
+              </a:rPr>
+              <a:t> of system</a:t>
+            </a:r>
+            <a:endParaRPr lang="nl-BE" sz="3600" cap="small" dirty="0">
+              <a:ln w="18415" cmpd="sng">
+                <a:solidFill>
+                  <a:schemeClr val="tx1">
+                    <a:alpha val="0"/>
+                  </a:schemeClr>
+                </a:solidFill>
+                <a:prstDash val="solid"/>
+              </a:ln>
+              <a:effectLst>
+                <a:outerShdw blurRad="25400" dir="3600000" algn="tl" rotWithShape="0">
+                  <a:srgbClr val="000000">
+                    <a:alpha val="70000"/>
+                  </a:srgbClr>
+                </a:outerShdw>
+              </a:effectLst>
+              <a:latin typeface="Sitka Text" pitchFamily="2" charset="0"/>
+            </a:endParaRPr>
+          </a:p>
+        </p:txBody>
+      </p:sp>
+      <p:sp>
+        <p:nvSpPr>
+          <p:cNvPr id="3" name="Tijdelijke aanduiding voor inhoud 2"/>
+          <p:cNvSpPr>
+            <a:spLocks noGrp="1"/>
+          </p:cNvSpPr>
+          <p:nvPr>
+            <p:ph idx="1"/>
+          </p:nvPr>
+        </p:nvSpPr>
+        <p:spPr/>
+        <p:txBody>
           <a:bodyPr/>
           <a:lstStyle/>
           <a:p>
-            <a:r>
-              <a:rPr lang="nl-BE" dirty="0" err="1" smtClean="0"/>
-              <a:t>Extensibility</a:t>
-            </a:r>
-            <a:r>
-              <a:rPr lang="nl-BE" dirty="0" smtClean="0"/>
-              <a:t> of system</a:t>
-            </a:r>
             <a:endParaRPr lang="nl-BE" dirty="0"/>
-          </a:p>
-        </p:txBody>
-      </p:sp>
-      <p:sp>
-        <p:nvSpPr>
-          <p:cNvPr id="3" name="Tijdelijke aanduiding voor inhoud 2"/>
-          <p:cNvSpPr>
-            <a:spLocks noGrp="1"/>
-          </p:cNvSpPr>
-          <p:nvPr>
-            <p:ph idx="1"/>
-          </p:nvPr>
-        </p:nvSpPr>
-        <p:spPr/>
-        <p:txBody>
-          <a:bodyPr/>
-          <a:lstStyle/>
-          <a:p>
-            <a:endParaRPr lang="nl-BE"/>
           </a:p>
         </p:txBody>
       </p:sp>
     </p:spTree>
     <p:extLst>
       <p:ext uri="{BB962C8B-B14F-4D97-AF65-F5344CB8AC3E}">
-        <p14:creationId xmlns:p14="http://schemas.microsoft.com/office/powerpoint/2010/main" val="2444210159"/>
+        <p14:creationId xmlns:p14="http://schemas.microsoft.com/office/powerpoint/2010/main" xmlns="" val="2444210159"/>
       </p:ext>
     </p:extLst>
   </p:cSld>
   <p:clrMapOvr>
     <a:masterClrMapping/>
   </p:clrMapOvr>
+  <p:timing>
+    <p:tnLst>
+      <p:par>
+        <p:cTn id="1" dur="indefinite" restart="never" nodeType="tmRoot"/>
+      </p:par>
+    </p:tnLst>
+  </p:timing>
 </p:sld>
 </file>
 
@@ -3517,18 +4022,71 @@
         </p:nvSpPr>
         <p:spPr/>
         <p:txBody>
-          <a:bodyPr/>
-          <a:lstStyle/>
-          <a:p>
-            <a:r>
-              <a:rPr lang="nl-BE" dirty="0" err="1" smtClean="0"/>
+          <a:bodyPr>
+            <a:normAutofit/>
+          </a:bodyPr>
+          <a:lstStyle/>
+          <a:p>
+            <a:r>
+              <a:rPr lang="nl-BE" sz="3600" cap="small" dirty="0" err="1" smtClean="0">
+                <a:ln w="18415" cmpd="sng">
+                  <a:solidFill>
+                    <a:schemeClr val="tx1">
+                      <a:alpha val="0"/>
+                    </a:schemeClr>
+                  </a:solidFill>
+                  <a:prstDash val="solid"/>
+                </a:ln>
+                <a:effectLst>
+                  <a:outerShdw blurRad="25400" dir="3600000" algn="tl" rotWithShape="0">
+                    <a:srgbClr val="000000">
+                      <a:alpha val="70000"/>
+                    </a:srgbClr>
+                  </a:outerShdw>
+                </a:effectLst>
+                <a:latin typeface="Sitka Text" pitchFamily="2" charset="0"/>
+              </a:rPr>
               <a:t>Testing</a:t>
             </a:r>
             <a:r>
-              <a:rPr lang="nl-BE" dirty="0" smtClean="0"/>
+              <a:rPr lang="nl-BE" sz="3600" cap="small" dirty="0" smtClean="0">
+                <a:ln w="18415" cmpd="sng">
+                  <a:solidFill>
+                    <a:schemeClr val="tx1">
+                      <a:alpha val="0"/>
+                    </a:schemeClr>
+                  </a:solidFill>
+                  <a:prstDash val="solid"/>
+                </a:ln>
+                <a:effectLst>
+                  <a:outerShdw blurRad="25400" dir="3600000" algn="tl" rotWithShape="0">
+                    <a:srgbClr val="000000">
+                      <a:alpha val="70000"/>
+                    </a:srgbClr>
+                  </a:outerShdw>
+                </a:effectLst>
+                <a:latin typeface="Sitka Text" pitchFamily="2" charset="0"/>
+              </a:rPr>
               <a:t> approach</a:t>
             </a:r>
-            <a:endParaRPr lang="nl-BE" dirty="0"/>
+            <a:endParaRPr lang="nl-BE" sz="3600" cap="small" dirty="0">
+              <a:ln w="18415" cmpd="sng">
+                <a:solidFill>
+                  <a:schemeClr val="tx1">
+                    <a:alpha val="0"/>
+                  </a:schemeClr>
+                </a:solidFill>
+                <a:prstDash val="solid"/>
+              </a:ln>
+              <a:effectLst>
+                <a:outerShdw blurRad="25400" dir="3600000" algn="tl" rotWithShape="0">
+                  <a:srgbClr val="000000">
+                    <a:alpha val="70000"/>
+                  </a:srgbClr>
+                </a:outerShdw>
+              </a:effectLst>
+              <a:latin typeface="Sitka Text" pitchFamily="2" charset="0"/>
+            </a:endParaRPr>
           </a:p>
         </p:txBody>
       </p:sp>
@@ -3554,13 +4112,20 @@
     </p:spTree>
     <p:extLst>
       <p:ext uri="{BB962C8B-B14F-4D97-AF65-F5344CB8AC3E}">
-        <p14:creationId xmlns:p14="http://schemas.microsoft.com/office/powerpoint/2010/main" val="3176464878"/>
+        <p14:creationId xmlns:p14="http://schemas.microsoft.com/office/powerpoint/2010/main" xmlns="" val="3176464878"/>
       </p:ext>
     </p:extLst>
   </p:cSld>
   <p:clrMapOvr>
     <a:masterClrMapping/>
   </p:clrMapOvr>
+  <p:timing>
+    <p:tnLst>
+      <p:par>
+        <p:cTn id="1" dur="indefinite" restart="never" nodeType="tmRoot"/>
+      </p:par>
+    </p:tnLst>
+  </p:timing>
 </p:sld>
 </file>
 
@@ -3593,14 +4158,50 @@
         </p:nvSpPr>
         <p:spPr/>
         <p:txBody>
-          <a:bodyPr/>
-          <a:lstStyle/>
-          <a:p>
-            <a:r>
-              <a:rPr lang="nl-BE" dirty="0" smtClean="0"/>
+          <a:bodyPr>
+            <a:normAutofit/>
+          </a:bodyPr>
+          <a:lstStyle/>
+          <a:p>
+            <a:r>
+              <a:rPr lang="nl-BE" sz="3600" cap="small" dirty="0" smtClean="0">
+                <a:ln w="18415" cmpd="sng">
+                  <a:solidFill>
+                    <a:schemeClr val="tx1">
+                      <a:alpha val="0"/>
+                    </a:schemeClr>
+                  </a:solidFill>
+                  <a:prstDash val="solid"/>
+                </a:ln>
+                <a:effectLst>
+                  <a:outerShdw blurRad="25400" dir="3600000" algn="tl" rotWithShape="0">
+                    <a:srgbClr val="000000">
+                      <a:alpha val="70000"/>
+                    </a:srgbClr>
+                  </a:outerShdw>
+                </a:effectLst>
+                <a:latin typeface="Sitka Text" pitchFamily="2" charset="0"/>
+              </a:rPr>
               <a:t>(Einde Presentatie)</a:t>
             </a:r>
-            <a:endParaRPr lang="nl-BE" dirty="0"/>
+            <a:endParaRPr lang="nl-BE" sz="3600" cap="small" dirty="0">
+              <a:ln w="18415" cmpd="sng">
+                <a:solidFill>
+                  <a:schemeClr val="tx1">
+                    <a:alpha val="0"/>
+                  </a:schemeClr>
+                </a:solidFill>
+                <a:prstDash val="solid"/>
+              </a:ln>
+              <a:effectLst>
+                <a:outerShdw blurRad="25400" dir="3600000" algn="tl" rotWithShape="0">
+                  <a:srgbClr val="000000">
+                    <a:alpha val="70000"/>
+                  </a:srgbClr>
+                </a:outerShdw>
+              </a:effectLst>
+              <a:latin typeface="Sitka Text" pitchFamily="2" charset="0"/>
+            </a:endParaRPr>
           </a:p>
         </p:txBody>
       </p:sp>
@@ -3626,13 +4227,20 @@
     </p:spTree>
     <p:extLst>
       <p:ext uri="{BB962C8B-B14F-4D97-AF65-F5344CB8AC3E}">
-        <p14:creationId xmlns:p14="http://schemas.microsoft.com/office/powerpoint/2010/main" val="3405605565"/>
+        <p14:creationId xmlns:p14="http://schemas.microsoft.com/office/powerpoint/2010/main" xmlns="" val="3405605565"/>
       </p:ext>
     </p:extLst>
   </p:cSld>
   <p:clrMapOvr>
     <a:masterClrMapping/>
   </p:clrMapOvr>
+  <p:timing>
+    <p:tnLst>
+      <p:par>
+        <p:cTn id="1" dur="indefinite" restart="never" nodeType="tmRoot"/>
+      </p:par>
+    </p:tnLst>
+  </p:timing>
 </p:sld>
 </file>
 
@@ -3665,127 +4273,371 @@
         </p:nvSpPr>
         <p:spPr/>
         <p:txBody>
-          <a:bodyPr/>
-          <a:lstStyle/>
-          <a:p>
-            <a:r>
-              <a:rPr lang="nl-BE" dirty="0" smtClean="0"/>
-              <a:t>Project management (in uren)</a:t>
-            </a:r>
-            <a:endParaRPr lang="nl-BE" dirty="0"/>
-          </a:p>
-        </p:txBody>
-      </p:sp>
-      <p:sp>
-        <p:nvSpPr>
-          <p:cNvPr id="3" name="Tijdelijke aanduiding voor inhoud 2"/>
-          <p:cNvSpPr>
-            <a:spLocks noGrp="1"/>
-          </p:cNvSpPr>
-          <p:nvPr>
-            <p:ph idx="1"/>
-          </p:nvPr>
-        </p:nvSpPr>
-        <p:spPr/>
-        <p:txBody>
           <a:bodyPr>
             <a:normAutofit/>
           </a:bodyPr>
           <a:lstStyle/>
           <a:p>
+            <a:r>
+              <a:rPr lang="nl-BE" sz="3600" cap="small" dirty="0" smtClean="0">
+                <a:ln w="18415" cmpd="sng">
+                  <a:solidFill>
+                    <a:schemeClr val="tx1">
+                      <a:alpha val="0"/>
+                    </a:schemeClr>
+                  </a:solidFill>
+                  <a:prstDash val="solid"/>
+                </a:ln>
+                <a:effectLst>
+                  <a:outerShdw blurRad="25400" dir="3600000" algn="tl" rotWithShape="0">
+                    <a:srgbClr val="000000">
+                      <a:alpha val="70000"/>
+                    </a:srgbClr>
+                  </a:outerShdw>
+                </a:effectLst>
+                <a:latin typeface="Sitka Text" pitchFamily="2" charset="0"/>
+              </a:rPr>
+              <a:t>Project management (in uren)</a:t>
+            </a:r>
+            <a:endParaRPr lang="nl-BE" sz="3600" cap="small" dirty="0">
+              <a:ln w="18415" cmpd="sng">
+                <a:solidFill>
+                  <a:schemeClr val="tx1">
+                    <a:alpha val="0"/>
+                  </a:schemeClr>
+                </a:solidFill>
+                <a:prstDash val="solid"/>
+              </a:ln>
+              <a:effectLst>
+                <a:outerShdw blurRad="25400" dir="3600000" algn="tl" rotWithShape="0">
+                  <a:srgbClr val="000000">
+                    <a:alpha val="70000"/>
+                  </a:srgbClr>
+                </a:outerShdw>
+              </a:effectLst>
+              <a:latin typeface="Sitka Text" pitchFamily="2" charset="0"/>
+            </a:endParaRPr>
+          </a:p>
+        </p:txBody>
+      </p:sp>
+      <p:sp>
+        <p:nvSpPr>
+          <p:cNvPr id="3" name="Tijdelijke aanduiding voor inhoud 2"/>
+          <p:cNvSpPr>
+            <a:spLocks noGrp="1"/>
+          </p:cNvSpPr>
+          <p:nvPr>
+            <p:ph idx="1"/>
+          </p:nvPr>
+        </p:nvSpPr>
+        <p:spPr/>
+        <p:txBody>
+          <a:bodyPr>
+            <a:normAutofit/>
+          </a:bodyPr>
+          <a:lstStyle/>
+          <a:p>
             <a:pPr marL="0" indent="0">
               <a:buNone/>
             </a:pPr>
             <a:r>
-              <a:rPr lang="nl-BE" b="1" dirty="0" smtClean="0"/>
+              <a:rPr lang="nl-BE" sz="2700" cap="small" dirty="0" smtClean="0">
+                <a:effectLst>
+                  <a:outerShdw blurRad="50800" dist="38100" dir="5400000" algn="t" rotWithShape="0">
+                    <a:prstClr val="black">
+                      <a:alpha val="40000"/>
+                    </a:prstClr>
+                  </a:outerShdw>
+                </a:effectLst>
+                <a:latin typeface="Sitka Text" pitchFamily="2" charset="0"/>
+              </a:rPr>
               <a:t>Karina </a:t>
             </a:r>
             <a:r>
-              <a:rPr lang="nl-BE" b="1" dirty="0" err="1" smtClean="0"/>
+              <a:rPr lang="nl-BE" sz="2700" cap="small" dirty="0" err="1" smtClean="0">
+                <a:effectLst>
+                  <a:outerShdw blurRad="50800" dist="38100" dir="5400000" algn="t" rotWithShape="0">
+                    <a:prstClr val="black">
+                      <a:alpha val="40000"/>
+                    </a:prstClr>
+                  </a:outerShdw>
+                </a:effectLst>
+                <a:latin typeface="Sitka Text" pitchFamily="2" charset="0"/>
+              </a:rPr>
               <a:t>Karapetyan</a:t>
             </a:r>
-            <a:endParaRPr lang="nl-BE" b="1" dirty="0" smtClean="0"/>
+            <a:endParaRPr lang="nl-BE" sz="2700" cap="small" dirty="0" smtClean="0">
+              <a:effectLst>
+                <a:outerShdw blurRad="50800" dist="38100" dir="5400000" algn="t" rotWithShape="0">
+                  <a:prstClr val="black">
+                    <a:alpha val="40000"/>
+                  </a:prstClr>
+                </a:outerShdw>
+              </a:effectLst>
+              <a:latin typeface="Sitka Text" pitchFamily="2" charset="0"/>
+            </a:endParaRPr>
           </a:p>
           <a:p>
             <a:pPr marL="0" indent="0">
               <a:buNone/>
             </a:pPr>
             <a:r>
-              <a:rPr lang="nl-BE" sz="2400" dirty="0" smtClean="0"/>
-              <a:t>Group work: 33 	Individual Work: </a:t>
-            </a:r>
-            <a:r>
-              <a:rPr lang="nl-BE" sz="2400" dirty="0" smtClean="0"/>
-              <a:t>22</a:t>
-            </a:r>
-            <a:r>
-              <a:rPr lang="nl-BE" sz="2400" dirty="0" smtClean="0"/>
-              <a:t>	Study: 7</a:t>
-            </a:r>
-            <a:endParaRPr lang="nl-BE" sz="2400" b="1" dirty="0"/>
+              <a:rPr lang="nl-BE" sz="2400" dirty="0" smtClean="0">
+                <a:solidFill>
+                  <a:schemeClr val="accent4">
+                    <a:lumMod val="50000"/>
+                  </a:schemeClr>
+                </a:solidFill>
+                <a:effectLst>
+                  <a:outerShdw blurRad="76200" dist="38100" dir="5400000" algn="t" rotWithShape="0">
+                    <a:prstClr val="black">
+                      <a:alpha val="27000"/>
+                    </a:prstClr>
+                  </a:outerShdw>
+                </a:effectLst>
+                <a:latin typeface="Sitka Banner" pitchFamily="2" charset="0"/>
+              </a:rPr>
+              <a:t>Group work: 33 	Individual Work: 22	Study: 7</a:t>
+            </a:r>
+            <a:endParaRPr lang="nl-BE" sz="2400" dirty="0">
+              <a:solidFill>
+                <a:schemeClr val="accent4">
+                  <a:lumMod val="50000"/>
+                </a:schemeClr>
+              </a:solidFill>
+              <a:effectLst>
+                <a:outerShdw blurRad="76200" dist="38100" dir="5400000" algn="t" rotWithShape="0">
+                  <a:prstClr val="black">
+                    <a:alpha val="27000"/>
+                  </a:prstClr>
+                </a:outerShdw>
+              </a:effectLst>
+              <a:latin typeface="Sitka Banner" pitchFamily="2" charset="0"/>
+            </a:endParaRPr>
           </a:p>
           <a:p>
             <a:pPr marL="0" indent="0">
               <a:buNone/>
             </a:pPr>
             <a:r>
-              <a:rPr lang="nl-BE" b="1" dirty="0" smtClean="0"/>
+              <a:rPr lang="nl-BE" sz="2700" cap="small" dirty="0" smtClean="0">
+                <a:effectLst>
+                  <a:outerShdw blurRad="50800" dist="38100" dir="5400000" algn="t" rotWithShape="0">
+                    <a:prstClr val="black">
+                      <a:alpha val="40000"/>
+                    </a:prstClr>
+                  </a:outerShdw>
+                </a:effectLst>
+                <a:latin typeface="Sitka Text" pitchFamily="2" charset="0"/>
+              </a:rPr>
               <a:t>Laurens </a:t>
             </a:r>
             <a:r>
-              <a:rPr lang="nl-BE" b="1" dirty="0" err="1" smtClean="0"/>
+              <a:rPr lang="nl-BE" sz="2700" cap="small" dirty="0" err="1" smtClean="0">
+                <a:effectLst>
+                  <a:outerShdw blurRad="50800" dist="38100" dir="5400000" algn="t" rotWithShape="0">
+                    <a:prstClr val="black">
+                      <a:alpha val="40000"/>
+                    </a:prstClr>
+                  </a:outerShdw>
+                </a:effectLst>
+                <a:latin typeface="Sitka Text" pitchFamily="2" charset="0"/>
+              </a:rPr>
               <a:t>Cleemput</a:t>
             </a:r>
-            <a:endParaRPr lang="nl-BE" b="1" dirty="0" smtClean="0"/>
+            <a:endParaRPr lang="nl-BE" sz="2700" cap="small" dirty="0" smtClean="0">
+              <a:effectLst>
+                <a:outerShdw blurRad="50800" dist="38100" dir="5400000" algn="t" rotWithShape="0">
+                  <a:prstClr val="black">
+                    <a:alpha val="40000"/>
+                  </a:prstClr>
+                </a:outerShdw>
+              </a:effectLst>
+              <a:latin typeface="Sitka Text" pitchFamily="2" charset="0"/>
+            </a:endParaRPr>
           </a:p>
           <a:p>
             <a:pPr marL="0" indent="0">
               <a:buNone/>
             </a:pPr>
             <a:r>
-              <a:rPr lang="nl-BE" sz="2400" dirty="0" smtClean="0"/>
+              <a:rPr lang="nl-BE" sz="2400" dirty="0" smtClean="0">
+                <a:solidFill>
+                  <a:schemeClr val="accent4">
+                    <a:lumMod val="50000"/>
+                  </a:schemeClr>
+                </a:solidFill>
+                <a:effectLst>
+                  <a:outerShdw blurRad="76200" dist="38100" dir="5400000" algn="t" rotWithShape="0">
+                    <a:prstClr val="black">
+                      <a:alpha val="27000"/>
+                    </a:prstClr>
+                  </a:outerShdw>
+                </a:effectLst>
+                <a:latin typeface="Sitka Banner" pitchFamily="2" charset="0"/>
+              </a:rPr>
               <a:t>Group </a:t>
             </a:r>
             <a:r>
-              <a:rPr lang="nl-BE" sz="2400" dirty="0" err="1" smtClean="0"/>
+              <a:rPr lang="nl-BE" sz="2400" dirty="0" err="1" smtClean="0">
+                <a:solidFill>
+                  <a:schemeClr val="accent4">
+                    <a:lumMod val="50000"/>
+                  </a:schemeClr>
+                </a:solidFill>
+                <a:effectLst>
+                  <a:outerShdw blurRad="76200" dist="38100" dir="5400000" algn="t" rotWithShape="0">
+                    <a:prstClr val="black">
+                      <a:alpha val="27000"/>
+                    </a:prstClr>
+                  </a:outerShdw>
+                </a:effectLst>
+                <a:latin typeface="Sitka Banner" pitchFamily="2" charset="0"/>
+              </a:rPr>
               <a:t>work</a:t>
             </a:r>
             <a:r>
-              <a:rPr lang="nl-BE" sz="2400" dirty="0" smtClean="0"/>
+              <a:rPr lang="nl-BE" sz="2400" dirty="0" smtClean="0">
+                <a:solidFill>
+                  <a:schemeClr val="accent4">
+                    <a:lumMod val="50000"/>
+                  </a:schemeClr>
+                </a:solidFill>
+                <a:effectLst>
+                  <a:outerShdw blurRad="76200" dist="38100" dir="5400000" algn="t" rotWithShape="0">
+                    <a:prstClr val="black">
+                      <a:alpha val="27000"/>
+                    </a:prstClr>
+                  </a:outerShdw>
+                </a:effectLst>
+                <a:latin typeface="Sitka Banner" pitchFamily="2" charset="0"/>
+              </a:rPr>
               <a:t>: 33 	</a:t>
             </a:r>
             <a:r>
-              <a:rPr lang="nl-BE" sz="2400" dirty="0" err="1" smtClean="0"/>
+              <a:rPr lang="nl-BE" sz="2400" dirty="0" err="1" smtClean="0">
+                <a:solidFill>
+                  <a:schemeClr val="accent4">
+                    <a:lumMod val="50000"/>
+                  </a:schemeClr>
+                </a:solidFill>
+                <a:effectLst>
+                  <a:outerShdw blurRad="76200" dist="38100" dir="5400000" algn="t" rotWithShape="0">
+                    <a:prstClr val="black">
+                      <a:alpha val="27000"/>
+                    </a:prstClr>
+                  </a:outerShdw>
+                </a:effectLst>
+                <a:latin typeface="Sitka Banner" pitchFamily="2" charset="0"/>
+              </a:rPr>
               <a:t>Individual</a:t>
             </a:r>
             <a:r>
-              <a:rPr lang="nl-BE" sz="2400" dirty="0" smtClean="0"/>
+              <a:rPr lang="nl-BE" sz="2400" dirty="0" smtClean="0">
+                <a:solidFill>
+                  <a:schemeClr val="accent4">
+                    <a:lumMod val="50000"/>
+                  </a:schemeClr>
+                </a:solidFill>
+                <a:effectLst>
+                  <a:outerShdw blurRad="76200" dist="38100" dir="5400000" algn="t" rotWithShape="0">
+                    <a:prstClr val="black">
+                      <a:alpha val="27000"/>
+                    </a:prstClr>
+                  </a:outerShdw>
+                </a:effectLst>
+                <a:latin typeface="Sitka Banner" pitchFamily="2" charset="0"/>
+              </a:rPr>
               <a:t> </a:t>
             </a:r>
             <a:r>
-              <a:rPr lang="nl-BE" sz="2400" dirty="0" err="1" smtClean="0"/>
+              <a:rPr lang="nl-BE" sz="2400" dirty="0" err="1" smtClean="0">
+                <a:solidFill>
+                  <a:schemeClr val="accent4">
+                    <a:lumMod val="50000"/>
+                  </a:schemeClr>
+                </a:solidFill>
+                <a:effectLst>
+                  <a:outerShdw blurRad="76200" dist="38100" dir="5400000" algn="t" rotWithShape="0">
+                    <a:prstClr val="black">
+                      <a:alpha val="27000"/>
+                    </a:prstClr>
+                  </a:outerShdw>
+                </a:effectLst>
+                <a:latin typeface="Sitka Banner" pitchFamily="2" charset="0"/>
+              </a:rPr>
               <a:t>Work</a:t>
             </a:r>
             <a:r>
-              <a:rPr lang="nl-BE" sz="2400" dirty="0" smtClean="0"/>
+              <a:rPr lang="nl-BE" sz="2400" dirty="0" smtClean="0">
+                <a:solidFill>
+                  <a:schemeClr val="accent4">
+                    <a:lumMod val="50000"/>
+                  </a:schemeClr>
+                </a:solidFill>
+                <a:effectLst>
+                  <a:outerShdw blurRad="76200" dist="38100" dir="5400000" algn="t" rotWithShape="0">
+                    <a:prstClr val="black">
+                      <a:alpha val="27000"/>
+                    </a:prstClr>
+                  </a:outerShdw>
+                </a:effectLst>
+                <a:latin typeface="Sitka Banner" pitchFamily="2" charset="0"/>
+              </a:rPr>
               <a:t>: 16	</a:t>
             </a:r>
             <a:r>
-              <a:rPr lang="nl-BE" sz="2400" dirty="0" err="1" smtClean="0"/>
+              <a:rPr lang="nl-BE" sz="2400" dirty="0" err="1" smtClean="0">
+                <a:solidFill>
+                  <a:schemeClr val="accent4">
+                    <a:lumMod val="50000"/>
+                  </a:schemeClr>
+                </a:solidFill>
+                <a:effectLst>
+                  <a:outerShdw blurRad="76200" dist="38100" dir="5400000" algn="t" rotWithShape="0">
+                    <a:prstClr val="black">
+                      <a:alpha val="27000"/>
+                    </a:prstClr>
+                  </a:outerShdw>
+                </a:effectLst>
+                <a:latin typeface="Sitka Banner" pitchFamily="2" charset="0"/>
+              </a:rPr>
               <a:t>Study</a:t>
             </a:r>
             <a:r>
-              <a:rPr lang="nl-BE" sz="2400" dirty="0" smtClean="0"/>
+              <a:rPr lang="nl-BE" sz="2400" dirty="0" smtClean="0">
+                <a:solidFill>
+                  <a:schemeClr val="accent4">
+                    <a:lumMod val="50000"/>
+                  </a:schemeClr>
+                </a:solidFill>
+                <a:effectLst>
+                  <a:outerShdw blurRad="76200" dist="38100" dir="5400000" algn="t" rotWithShape="0">
+                    <a:prstClr val="black">
+                      <a:alpha val="27000"/>
+                    </a:prstClr>
+                  </a:outerShdw>
+                </a:effectLst>
+                <a:latin typeface="Sitka Banner" pitchFamily="2" charset="0"/>
+              </a:rPr>
               <a:t>: 8</a:t>
             </a:r>
-            <a:endParaRPr lang="nl-BE" sz="2400" dirty="0"/>
           </a:p>
           <a:p>
             <a:pPr marL="0" indent="0">
               <a:buNone/>
             </a:pPr>
             <a:r>
-              <a:rPr lang="nl-BE" b="1" dirty="0" smtClean="0"/>
+              <a:rPr lang="nl-BE" sz="2700" cap="small" dirty="0" smtClean="0">
+                <a:effectLst>
+                  <a:outerShdw blurRad="50800" dist="38100" dir="5400000" algn="t" rotWithShape="0">
+                    <a:prstClr val="black">
+                      <a:alpha val="40000"/>
+                    </a:prstClr>
+                  </a:outerShdw>
+                </a:effectLst>
+                <a:latin typeface="Sitka Text" pitchFamily="2" charset="0"/>
+              </a:rPr>
               <a:t>Tom Houben</a:t>
             </a:r>
           </a:p>
@@ -3794,95 +4646,373 @@
               <a:buNone/>
             </a:pPr>
             <a:r>
-              <a:rPr lang="nl-BE" sz="2400" dirty="0" smtClean="0"/>
+              <a:rPr lang="nl-BE" sz="2400" dirty="0" smtClean="0">
+                <a:solidFill>
+                  <a:schemeClr val="accent4">
+                    <a:lumMod val="50000"/>
+                  </a:schemeClr>
+                </a:solidFill>
+                <a:effectLst>
+                  <a:outerShdw blurRad="76200" dist="38100" dir="5400000" algn="t" rotWithShape="0">
+                    <a:prstClr val="black">
+                      <a:alpha val="27000"/>
+                    </a:prstClr>
+                  </a:outerShdw>
+                </a:effectLst>
+                <a:latin typeface="Sitka Banner" pitchFamily="2" charset="0"/>
+              </a:rPr>
               <a:t>Group </a:t>
             </a:r>
             <a:r>
-              <a:rPr lang="nl-BE" sz="2400" dirty="0" err="1" smtClean="0"/>
+              <a:rPr lang="nl-BE" sz="2400" dirty="0" err="1" smtClean="0">
+                <a:solidFill>
+                  <a:schemeClr val="accent4">
+                    <a:lumMod val="50000"/>
+                  </a:schemeClr>
+                </a:solidFill>
+                <a:effectLst>
+                  <a:outerShdw blurRad="76200" dist="38100" dir="5400000" algn="t" rotWithShape="0">
+                    <a:prstClr val="black">
+                      <a:alpha val="27000"/>
+                    </a:prstClr>
+                  </a:outerShdw>
+                </a:effectLst>
+                <a:latin typeface="Sitka Banner" pitchFamily="2" charset="0"/>
+              </a:rPr>
               <a:t>work</a:t>
             </a:r>
             <a:r>
-              <a:rPr lang="nl-BE" sz="2400" dirty="0" smtClean="0"/>
+              <a:rPr lang="nl-BE" sz="2400" dirty="0" smtClean="0">
+                <a:solidFill>
+                  <a:schemeClr val="accent4">
+                    <a:lumMod val="50000"/>
+                  </a:schemeClr>
+                </a:solidFill>
+                <a:effectLst>
+                  <a:outerShdw blurRad="76200" dist="38100" dir="5400000" algn="t" rotWithShape="0">
+                    <a:prstClr val="black">
+                      <a:alpha val="27000"/>
+                    </a:prstClr>
+                  </a:outerShdw>
+                </a:effectLst>
+                <a:latin typeface="Sitka Banner" pitchFamily="2" charset="0"/>
+              </a:rPr>
               <a:t>:  33	</a:t>
             </a:r>
             <a:r>
-              <a:rPr lang="nl-BE" sz="2400" dirty="0" err="1" smtClean="0"/>
+              <a:rPr lang="nl-BE" sz="2400" dirty="0" err="1" smtClean="0">
+                <a:solidFill>
+                  <a:schemeClr val="accent4">
+                    <a:lumMod val="50000"/>
+                  </a:schemeClr>
+                </a:solidFill>
+                <a:effectLst>
+                  <a:outerShdw blurRad="76200" dist="38100" dir="5400000" algn="t" rotWithShape="0">
+                    <a:prstClr val="black">
+                      <a:alpha val="27000"/>
+                    </a:prstClr>
+                  </a:outerShdw>
+                </a:effectLst>
+                <a:latin typeface="Sitka Banner" pitchFamily="2" charset="0"/>
+              </a:rPr>
               <a:t>Individual</a:t>
             </a:r>
             <a:r>
-              <a:rPr lang="nl-BE" sz="2400" dirty="0" smtClean="0"/>
+              <a:rPr lang="nl-BE" sz="2400" dirty="0" smtClean="0">
+                <a:solidFill>
+                  <a:schemeClr val="accent4">
+                    <a:lumMod val="50000"/>
+                  </a:schemeClr>
+                </a:solidFill>
+                <a:effectLst>
+                  <a:outerShdw blurRad="76200" dist="38100" dir="5400000" algn="t" rotWithShape="0">
+                    <a:prstClr val="black">
+                      <a:alpha val="27000"/>
+                    </a:prstClr>
+                  </a:outerShdw>
+                </a:effectLst>
+                <a:latin typeface="Sitka Banner" pitchFamily="2" charset="0"/>
+              </a:rPr>
               <a:t> </a:t>
             </a:r>
             <a:r>
-              <a:rPr lang="nl-BE" sz="2400" dirty="0" err="1" smtClean="0"/>
+              <a:rPr lang="nl-BE" sz="2400" dirty="0" err="1" smtClean="0">
+                <a:solidFill>
+                  <a:schemeClr val="accent4">
+                    <a:lumMod val="50000"/>
+                  </a:schemeClr>
+                </a:solidFill>
+                <a:effectLst>
+                  <a:outerShdw blurRad="76200" dist="38100" dir="5400000" algn="t" rotWithShape="0">
+                    <a:prstClr val="black">
+                      <a:alpha val="27000"/>
+                    </a:prstClr>
+                  </a:outerShdw>
+                </a:effectLst>
+                <a:latin typeface="Sitka Banner" pitchFamily="2" charset="0"/>
+              </a:rPr>
               <a:t>Work</a:t>
             </a:r>
             <a:r>
-              <a:rPr lang="nl-BE" sz="2400" dirty="0" smtClean="0"/>
+              <a:rPr lang="nl-BE" sz="2400" dirty="0" smtClean="0">
+                <a:solidFill>
+                  <a:schemeClr val="accent4">
+                    <a:lumMod val="50000"/>
+                  </a:schemeClr>
+                </a:solidFill>
+                <a:effectLst>
+                  <a:outerShdw blurRad="76200" dist="38100" dir="5400000" algn="t" rotWithShape="0">
+                    <a:prstClr val="black">
+                      <a:alpha val="27000"/>
+                    </a:prstClr>
+                  </a:outerShdw>
+                </a:effectLst>
+                <a:latin typeface="Sitka Banner" pitchFamily="2" charset="0"/>
+              </a:rPr>
               <a:t>: 20	</a:t>
             </a:r>
             <a:r>
-              <a:rPr lang="nl-BE" sz="2400" dirty="0" err="1" smtClean="0"/>
+              <a:rPr lang="nl-BE" sz="2400" dirty="0" err="1" smtClean="0">
+                <a:solidFill>
+                  <a:schemeClr val="accent4">
+                    <a:lumMod val="50000"/>
+                  </a:schemeClr>
+                </a:solidFill>
+                <a:effectLst>
+                  <a:outerShdw blurRad="76200" dist="38100" dir="5400000" algn="t" rotWithShape="0">
+                    <a:prstClr val="black">
+                      <a:alpha val="27000"/>
+                    </a:prstClr>
+                  </a:outerShdw>
+                </a:effectLst>
+                <a:latin typeface="Sitka Banner" pitchFamily="2" charset="0"/>
+              </a:rPr>
               <a:t>Study</a:t>
             </a:r>
             <a:r>
-              <a:rPr lang="nl-BE" sz="2400" dirty="0" smtClean="0"/>
+              <a:rPr lang="nl-BE" sz="2400" dirty="0" smtClean="0">
+                <a:solidFill>
+                  <a:schemeClr val="accent4">
+                    <a:lumMod val="50000"/>
+                  </a:schemeClr>
+                </a:solidFill>
+                <a:effectLst>
+                  <a:outerShdw blurRad="76200" dist="38100" dir="5400000" algn="t" rotWithShape="0">
+                    <a:prstClr val="black">
+                      <a:alpha val="27000"/>
+                    </a:prstClr>
+                  </a:outerShdw>
+                </a:effectLst>
+                <a:latin typeface="Sitka Banner" pitchFamily="2" charset="0"/>
+              </a:rPr>
               <a:t>: 6</a:t>
             </a:r>
-            <a:endParaRPr lang="nl-BE" sz="2400" b="1" dirty="0"/>
           </a:p>
           <a:p>
             <a:pPr marL="0" indent="0">
               <a:buNone/>
             </a:pPr>
             <a:r>
-              <a:rPr lang="nl-BE" b="1" dirty="0" smtClean="0"/>
+              <a:rPr lang="nl-BE" sz="2700" cap="small" dirty="0" smtClean="0">
+                <a:effectLst>
+                  <a:outerShdw blurRad="50800" dist="38100" dir="5400000" algn="t" rotWithShape="0">
+                    <a:prstClr val="black">
+                      <a:alpha val="40000"/>
+                    </a:prstClr>
+                  </a:outerShdw>
+                </a:effectLst>
+                <a:latin typeface="Sitka Text" pitchFamily="2" charset="0"/>
+              </a:rPr>
               <a:t>Tri </a:t>
             </a:r>
             <a:r>
-              <a:rPr lang="nl-BE" b="1" dirty="0" err="1" smtClean="0"/>
+              <a:rPr lang="nl-BE" sz="2700" cap="small" dirty="0" err="1" smtClean="0">
+                <a:effectLst>
+                  <a:outerShdw blurRad="50800" dist="38100" dir="5400000" algn="t" rotWithShape="0">
+                    <a:prstClr val="black">
+                      <a:alpha val="40000"/>
+                    </a:prstClr>
+                  </a:outerShdw>
+                </a:effectLst>
+                <a:latin typeface="Sitka Text" pitchFamily="2" charset="0"/>
+              </a:rPr>
               <a:t>Tran</a:t>
             </a:r>
-            <a:endParaRPr lang="nl-BE" b="1" dirty="0" smtClean="0"/>
+            <a:endParaRPr lang="nl-BE" sz="2700" cap="small" dirty="0" smtClean="0">
+              <a:effectLst>
+                <a:outerShdw blurRad="50800" dist="38100" dir="5400000" algn="t" rotWithShape="0">
+                  <a:prstClr val="black">
+                    <a:alpha val="40000"/>
+                  </a:prstClr>
+                </a:outerShdw>
+              </a:effectLst>
+              <a:latin typeface="Sitka Text" pitchFamily="2" charset="0"/>
+            </a:endParaRPr>
           </a:p>
           <a:p>
             <a:pPr marL="0" indent="0">
               <a:buNone/>
             </a:pPr>
             <a:r>
-              <a:rPr lang="nl-BE" sz="2400" dirty="0" smtClean="0"/>
+              <a:rPr lang="nl-BE" sz="2400" dirty="0" smtClean="0">
+                <a:solidFill>
+                  <a:schemeClr val="accent4">
+                    <a:lumMod val="50000"/>
+                  </a:schemeClr>
+                </a:solidFill>
+                <a:effectLst>
+                  <a:outerShdw blurRad="76200" dist="38100" dir="5400000" algn="t" rotWithShape="0">
+                    <a:prstClr val="black">
+                      <a:alpha val="27000"/>
+                    </a:prstClr>
+                  </a:outerShdw>
+                </a:effectLst>
+                <a:latin typeface="Sitka Banner" pitchFamily="2" charset="0"/>
+              </a:rPr>
               <a:t>Group </a:t>
             </a:r>
             <a:r>
-              <a:rPr lang="nl-BE" sz="2400" dirty="0" err="1" smtClean="0"/>
+              <a:rPr lang="nl-BE" sz="2400" dirty="0" err="1" smtClean="0">
+                <a:solidFill>
+                  <a:schemeClr val="accent4">
+                    <a:lumMod val="50000"/>
+                  </a:schemeClr>
+                </a:solidFill>
+                <a:effectLst>
+                  <a:outerShdw blurRad="76200" dist="38100" dir="5400000" algn="t" rotWithShape="0">
+                    <a:prstClr val="black">
+                      <a:alpha val="27000"/>
+                    </a:prstClr>
+                  </a:outerShdw>
+                </a:effectLst>
+                <a:latin typeface="Sitka Banner" pitchFamily="2" charset="0"/>
+              </a:rPr>
               <a:t>work</a:t>
             </a:r>
             <a:r>
-              <a:rPr lang="nl-BE" sz="2400" dirty="0" smtClean="0"/>
+              <a:rPr lang="nl-BE" sz="2400" dirty="0" smtClean="0">
+                <a:solidFill>
+                  <a:schemeClr val="accent4">
+                    <a:lumMod val="50000"/>
+                  </a:schemeClr>
+                </a:solidFill>
+                <a:effectLst>
+                  <a:outerShdw blurRad="76200" dist="38100" dir="5400000" algn="t" rotWithShape="0">
+                    <a:prstClr val="black">
+                      <a:alpha val="27000"/>
+                    </a:prstClr>
+                  </a:outerShdw>
+                </a:effectLst>
+                <a:latin typeface="Sitka Banner" pitchFamily="2" charset="0"/>
+              </a:rPr>
               <a:t>: 33 	</a:t>
             </a:r>
             <a:r>
-              <a:rPr lang="nl-BE" sz="2400" dirty="0" err="1" smtClean="0"/>
+              <a:rPr lang="nl-BE" sz="2400" dirty="0" err="1" smtClean="0">
+                <a:solidFill>
+                  <a:schemeClr val="accent4">
+                    <a:lumMod val="50000"/>
+                  </a:schemeClr>
+                </a:solidFill>
+                <a:effectLst>
+                  <a:outerShdw blurRad="76200" dist="38100" dir="5400000" algn="t" rotWithShape="0">
+                    <a:prstClr val="black">
+                      <a:alpha val="27000"/>
+                    </a:prstClr>
+                  </a:outerShdw>
+                </a:effectLst>
+                <a:latin typeface="Sitka Banner" pitchFamily="2" charset="0"/>
+              </a:rPr>
               <a:t>Individual</a:t>
             </a:r>
             <a:r>
-              <a:rPr lang="nl-BE" sz="2400" dirty="0" smtClean="0"/>
+              <a:rPr lang="nl-BE" sz="2400" dirty="0" smtClean="0">
+                <a:solidFill>
+                  <a:schemeClr val="accent4">
+                    <a:lumMod val="50000"/>
+                  </a:schemeClr>
+                </a:solidFill>
+                <a:effectLst>
+                  <a:outerShdw blurRad="76200" dist="38100" dir="5400000" algn="t" rotWithShape="0">
+                    <a:prstClr val="black">
+                      <a:alpha val="27000"/>
+                    </a:prstClr>
+                  </a:outerShdw>
+                </a:effectLst>
+                <a:latin typeface="Sitka Banner" pitchFamily="2" charset="0"/>
+              </a:rPr>
               <a:t> </a:t>
             </a:r>
             <a:r>
-              <a:rPr lang="nl-BE" sz="2400" dirty="0" err="1" smtClean="0"/>
+              <a:rPr lang="nl-BE" sz="2400" dirty="0" err="1" smtClean="0">
+                <a:solidFill>
+                  <a:schemeClr val="accent4">
+                    <a:lumMod val="50000"/>
+                  </a:schemeClr>
+                </a:solidFill>
+                <a:effectLst>
+                  <a:outerShdw blurRad="76200" dist="38100" dir="5400000" algn="t" rotWithShape="0">
+                    <a:prstClr val="black">
+                      <a:alpha val="27000"/>
+                    </a:prstClr>
+                  </a:outerShdw>
+                </a:effectLst>
+                <a:latin typeface="Sitka Banner" pitchFamily="2" charset="0"/>
+              </a:rPr>
               <a:t>Work</a:t>
             </a:r>
             <a:r>
-              <a:rPr lang="nl-BE" sz="2400" dirty="0" smtClean="0"/>
+              <a:rPr lang="nl-BE" sz="2400" dirty="0" smtClean="0">
+                <a:solidFill>
+                  <a:schemeClr val="accent4">
+                    <a:lumMod val="50000"/>
+                  </a:schemeClr>
+                </a:solidFill>
+                <a:effectLst>
+                  <a:outerShdw blurRad="76200" dist="38100" dir="5400000" algn="t" rotWithShape="0">
+                    <a:prstClr val="black">
+                      <a:alpha val="27000"/>
+                    </a:prstClr>
+                  </a:outerShdw>
+                </a:effectLst>
+                <a:latin typeface="Sitka Banner" pitchFamily="2" charset="0"/>
+              </a:rPr>
               <a:t>: 40	</a:t>
             </a:r>
             <a:r>
-              <a:rPr lang="nl-BE" sz="2400" dirty="0" err="1" smtClean="0"/>
+              <a:rPr lang="nl-BE" sz="2400" dirty="0" err="1" smtClean="0">
+                <a:solidFill>
+                  <a:schemeClr val="accent4">
+                    <a:lumMod val="50000"/>
+                  </a:schemeClr>
+                </a:solidFill>
+                <a:effectLst>
+                  <a:outerShdw blurRad="76200" dist="38100" dir="5400000" algn="t" rotWithShape="0">
+                    <a:prstClr val="black">
+                      <a:alpha val="27000"/>
+                    </a:prstClr>
+                  </a:outerShdw>
+                </a:effectLst>
+                <a:latin typeface="Sitka Banner" pitchFamily="2" charset="0"/>
+              </a:rPr>
               <a:t>Study</a:t>
             </a:r>
             <a:r>
-              <a:rPr lang="nl-BE" sz="2400" dirty="0" smtClean="0"/>
+              <a:rPr lang="nl-BE" sz="2400" dirty="0" smtClean="0">
+                <a:solidFill>
+                  <a:schemeClr val="accent4">
+                    <a:lumMod val="50000"/>
+                  </a:schemeClr>
+                </a:solidFill>
+                <a:effectLst>
+                  <a:outerShdw blurRad="76200" dist="38100" dir="5400000" algn="t" rotWithShape="0">
+                    <a:prstClr val="black">
+                      <a:alpha val="27000"/>
+                    </a:prstClr>
+                  </a:outerShdw>
+                </a:effectLst>
+                <a:latin typeface="Sitka Banner" pitchFamily="2" charset="0"/>
+              </a:rPr>
               <a:t>: 15</a:t>
             </a:r>
           </a:p>
@@ -3897,13 +5027,20 @@
     </p:spTree>
     <p:extLst>
       <p:ext uri="{BB962C8B-B14F-4D97-AF65-F5344CB8AC3E}">
-        <p14:creationId xmlns:p14="http://schemas.microsoft.com/office/powerpoint/2010/main" val="1581702792"/>
+        <p14:creationId xmlns:p14="http://schemas.microsoft.com/office/powerpoint/2010/main" xmlns="" val="1581702792"/>
       </p:ext>
     </p:extLst>
   </p:cSld>
   <p:clrMapOvr>
     <a:masterClrMapping/>
   </p:clrMapOvr>
+  <p:timing>
+    <p:tnLst>
+      <p:par>
+        <p:cTn id="1" dur="indefinite" restart="never" nodeType="tmRoot"/>
+      </p:par>
+    </p:tnLst>
+  </p:timing>
 </p:sld>
 </file>
 

</xml_diff>

<commit_message>
Tekst voor slides toegevoegd.
</commit_message>
<xml_diff>
--- a/presentatie/SWOP Presentatie Inhoud.pptx
+++ b/presentatie/SWOP Presentatie Inhoud.pptx
@@ -7,11 +7,20 @@
   <p:sldIdLst>
     <p:sldId id="256" r:id="rId2"/>
     <p:sldId id="257" r:id="rId3"/>
-    <p:sldId id="258" r:id="rId4"/>
-    <p:sldId id="259" r:id="rId5"/>
-    <p:sldId id="260" r:id="rId6"/>
-    <p:sldId id="261" r:id="rId7"/>
-    <p:sldId id="262" r:id="rId8"/>
+    <p:sldId id="263" r:id="rId4"/>
+    <p:sldId id="264" r:id="rId5"/>
+    <p:sldId id="265" r:id="rId6"/>
+    <p:sldId id="258" r:id="rId7"/>
+    <p:sldId id="266" r:id="rId8"/>
+    <p:sldId id="268" r:id="rId9"/>
+    <p:sldId id="267" r:id="rId10"/>
+    <p:sldId id="259" r:id="rId11"/>
+    <p:sldId id="269" r:id="rId12"/>
+    <p:sldId id="270" r:id="rId13"/>
+    <p:sldId id="260" r:id="rId14"/>
+    <p:sldId id="261" r:id="rId15"/>
+    <p:sldId id="271" r:id="rId16"/>
+    <p:sldId id="262" r:id="rId17"/>
   </p:sldIdLst>
   <p:sldSz cx="9144000" cy="6858000" type="screen4x3"/>
   <p:notesSz cx="6858000" cy="9144000"/>
@@ -112,7 +121,7 @@
   </p:defaultTextStyle>
   <p:extLst>
     <p:ext uri="{EFAFB233-063F-42B5-8137-9DF3F51BA10A}">
-      <p15:sldGuideLst xmlns:p15="http://schemas.microsoft.com/office/powerpoint/2012/main" xmlns="">
+      <p15:sldGuideLst xmlns="" xmlns:p15="http://schemas.microsoft.com/office/powerpoint/2012/main">
         <p15:guide id="1" orient="horz" pos="2160">
           <p15:clr>
             <a:srgbClr val="A4A3A4"/>
@@ -354,7 +363,7 @@
             <a:fld id="{91663F60-0288-4BD7-9F87-79CFFEA98662}" type="slidenum">
               <a:rPr lang="nl-BE" smtClean="0"/>
               <a:pPr/>
-              <a:t>‹Nr.›</a:t>
+              <a:t>‹nr.›</a:t>
             </a:fld>
             <a:endParaRPr lang="nl-BE"/>
           </a:p>
@@ -363,7 +372,7 @@
     </p:spTree>
     <p:extLst>
       <p:ext uri="{BB962C8B-B14F-4D97-AF65-F5344CB8AC3E}">
-        <p14:creationId xmlns:p14="http://schemas.microsoft.com/office/powerpoint/2010/main" xmlns="" val="3963083300"/>
+        <p14:creationId xmlns:p14="http://schemas.microsoft.com/office/powerpoint/2010/main" val="3963083300"/>
       </p:ext>
     </p:extLst>
   </p:cSld>
@@ -526,7 +535,7 @@
             <a:fld id="{91663F60-0288-4BD7-9F87-79CFFEA98662}" type="slidenum">
               <a:rPr lang="nl-BE" smtClean="0"/>
               <a:pPr/>
-              <a:t>‹Nr.›</a:t>
+              <a:t>‹nr.›</a:t>
             </a:fld>
             <a:endParaRPr lang="nl-BE"/>
           </a:p>
@@ -535,7 +544,7 @@
     </p:spTree>
     <p:extLst>
       <p:ext uri="{BB962C8B-B14F-4D97-AF65-F5344CB8AC3E}">
-        <p14:creationId xmlns:p14="http://schemas.microsoft.com/office/powerpoint/2010/main" xmlns="" val="1367293728"/>
+        <p14:creationId xmlns:p14="http://schemas.microsoft.com/office/powerpoint/2010/main" val="1367293728"/>
       </p:ext>
     </p:extLst>
   </p:cSld>
@@ -708,7 +717,7 @@
             <a:fld id="{91663F60-0288-4BD7-9F87-79CFFEA98662}" type="slidenum">
               <a:rPr lang="nl-BE" smtClean="0"/>
               <a:pPr/>
-              <a:t>‹Nr.›</a:t>
+              <a:t>‹nr.›</a:t>
             </a:fld>
             <a:endParaRPr lang="nl-BE"/>
           </a:p>
@@ -717,7 +726,7 @@
     </p:spTree>
     <p:extLst>
       <p:ext uri="{BB962C8B-B14F-4D97-AF65-F5344CB8AC3E}">
-        <p14:creationId xmlns:p14="http://schemas.microsoft.com/office/powerpoint/2010/main" xmlns="" val="3320721104"/>
+        <p14:creationId xmlns:p14="http://schemas.microsoft.com/office/powerpoint/2010/main" val="3320721104"/>
       </p:ext>
     </p:extLst>
   </p:cSld>
@@ -880,7 +889,7 @@
             <a:fld id="{91663F60-0288-4BD7-9F87-79CFFEA98662}" type="slidenum">
               <a:rPr lang="nl-BE" smtClean="0"/>
               <a:pPr/>
-              <a:t>‹Nr.›</a:t>
+              <a:t>‹nr.›</a:t>
             </a:fld>
             <a:endParaRPr lang="nl-BE"/>
           </a:p>
@@ -889,7 +898,7 @@
     </p:spTree>
     <p:extLst>
       <p:ext uri="{BB962C8B-B14F-4D97-AF65-F5344CB8AC3E}">
-        <p14:creationId xmlns:p14="http://schemas.microsoft.com/office/powerpoint/2010/main" xmlns="" val="1971972017"/>
+        <p14:creationId xmlns:p14="http://schemas.microsoft.com/office/powerpoint/2010/main" val="1971972017"/>
       </p:ext>
     </p:extLst>
   </p:cSld>
@@ -1128,7 +1137,7 @@
             <a:fld id="{91663F60-0288-4BD7-9F87-79CFFEA98662}" type="slidenum">
               <a:rPr lang="nl-BE" smtClean="0"/>
               <a:pPr/>
-              <a:t>‹Nr.›</a:t>
+              <a:t>‹nr.›</a:t>
             </a:fld>
             <a:endParaRPr lang="nl-BE"/>
           </a:p>
@@ -1137,7 +1146,7 @@
     </p:spTree>
     <p:extLst>
       <p:ext uri="{BB962C8B-B14F-4D97-AF65-F5344CB8AC3E}">
-        <p14:creationId xmlns:p14="http://schemas.microsoft.com/office/powerpoint/2010/main" xmlns="" val="1541596771"/>
+        <p14:creationId xmlns:p14="http://schemas.microsoft.com/office/powerpoint/2010/main" val="1541596771"/>
       </p:ext>
     </p:extLst>
   </p:cSld>
@@ -1418,7 +1427,7 @@
             <a:fld id="{91663F60-0288-4BD7-9F87-79CFFEA98662}" type="slidenum">
               <a:rPr lang="nl-BE" smtClean="0"/>
               <a:pPr/>
-              <a:t>‹Nr.›</a:t>
+              <a:t>‹nr.›</a:t>
             </a:fld>
             <a:endParaRPr lang="nl-BE"/>
           </a:p>
@@ -1427,7 +1436,7 @@
     </p:spTree>
     <p:extLst>
       <p:ext uri="{BB962C8B-B14F-4D97-AF65-F5344CB8AC3E}">
-        <p14:creationId xmlns:p14="http://schemas.microsoft.com/office/powerpoint/2010/main" xmlns="" val="1047982118"/>
+        <p14:creationId xmlns:p14="http://schemas.microsoft.com/office/powerpoint/2010/main" val="1047982118"/>
       </p:ext>
     </p:extLst>
   </p:cSld>
@@ -1842,7 +1851,7 @@
             <a:fld id="{91663F60-0288-4BD7-9F87-79CFFEA98662}" type="slidenum">
               <a:rPr lang="nl-BE" smtClean="0"/>
               <a:pPr/>
-              <a:t>‹Nr.›</a:t>
+              <a:t>‹nr.›</a:t>
             </a:fld>
             <a:endParaRPr lang="nl-BE"/>
           </a:p>
@@ -1851,7 +1860,7 @@
     </p:spTree>
     <p:extLst>
       <p:ext uri="{BB962C8B-B14F-4D97-AF65-F5344CB8AC3E}">
-        <p14:creationId xmlns:p14="http://schemas.microsoft.com/office/powerpoint/2010/main" xmlns="" val="2185725893"/>
+        <p14:creationId xmlns:p14="http://schemas.microsoft.com/office/powerpoint/2010/main" val="2185725893"/>
       </p:ext>
     </p:extLst>
   </p:cSld>
@@ -1962,7 +1971,7 @@
             <a:fld id="{91663F60-0288-4BD7-9F87-79CFFEA98662}" type="slidenum">
               <a:rPr lang="nl-BE" smtClean="0"/>
               <a:pPr/>
-              <a:t>‹Nr.›</a:t>
+              <a:t>‹nr.›</a:t>
             </a:fld>
             <a:endParaRPr lang="nl-BE"/>
           </a:p>
@@ -1971,7 +1980,7 @@
     </p:spTree>
     <p:extLst>
       <p:ext uri="{BB962C8B-B14F-4D97-AF65-F5344CB8AC3E}">
-        <p14:creationId xmlns:p14="http://schemas.microsoft.com/office/powerpoint/2010/main" xmlns="" val="1565659618"/>
+        <p14:creationId xmlns:p14="http://schemas.microsoft.com/office/powerpoint/2010/main" val="1565659618"/>
       </p:ext>
     </p:extLst>
   </p:cSld>
@@ -2059,7 +2068,7 @@
             <a:fld id="{91663F60-0288-4BD7-9F87-79CFFEA98662}" type="slidenum">
               <a:rPr lang="nl-BE" smtClean="0"/>
               <a:pPr/>
-              <a:t>‹Nr.›</a:t>
+              <a:t>‹nr.›</a:t>
             </a:fld>
             <a:endParaRPr lang="nl-BE"/>
           </a:p>
@@ -2068,7 +2077,7 @@
     </p:spTree>
     <p:extLst>
       <p:ext uri="{BB962C8B-B14F-4D97-AF65-F5344CB8AC3E}">
-        <p14:creationId xmlns:p14="http://schemas.microsoft.com/office/powerpoint/2010/main" xmlns="" val="2302775655"/>
+        <p14:creationId xmlns:p14="http://schemas.microsoft.com/office/powerpoint/2010/main" val="2302775655"/>
       </p:ext>
     </p:extLst>
   </p:cSld>
@@ -2338,7 +2347,7 @@
             <a:fld id="{91663F60-0288-4BD7-9F87-79CFFEA98662}" type="slidenum">
               <a:rPr lang="nl-BE" smtClean="0"/>
               <a:pPr/>
-              <a:t>‹Nr.›</a:t>
+              <a:t>‹nr.›</a:t>
             </a:fld>
             <a:endParaRPr lang="nl-BE"/>
           </a:p>
@@ -2347,7 +2356,7 @@
     </p:spTree>
     <p:extLst>
       <p:ext uri="{BB962C8B-B14F-4D97-AF65-F5344CB8AC3E}">
-        <p14:creationId xmlns:p14="http://schemas.microsoft.com/office/powerpoint/2010/main" xmlns="" val="2384358470"/>
+        <p14:creationId xmlns:p14="http://schemas.microsoft.com/office/powerpoint/2010/main" val="2384358470"/>
       </p:ext>
     </p:extLst>
   </p:cSld>
@@ -2593,7 +2602,7 @@
             <a:fld id="{91663F60-0288-4BD7-9F87-79CFFEA98662}" type="slidenum">
               <a:rPr lang="nl-BE" smtClean="0"/>
               <a:pPr/>
-              <a:t>‹Nr.›</a:t>
+              <a:t>‹nr.›</a:t>
             </a:fld>
             <a:endParaRPr lang="nl-BE"/>
           </a:p>
@@ -2602,7 +2611,7 @@
     </p:spTree>
     <p:extLst>
       <p:ext uri="{BB962C8B-B14F-4D97-AF65-F5344CB8AC3E}">
-        <p14:creationId xmlns:p14="http://schemas.microsoft.com/office/powerpoint/2010/main" xmlns="" val="221485852"/>
+        <p14:creationId xmlns:p14="http://schemas.microsoft.com/office/powerpoint/2010/main" val="221485852"/>
       </p:ext>
     </p:extLst>
   </p:cSld>
@@ -2868,7 +2877,7 @@
             <a:fld id="{91663F60-0288-4BD7-9F87-79CFFEA98662}" type="slidenum">
               <a:rPr lang="nl-BE" smtClean="0"/>
               <a:pPr/>
-              <a:t>‹Nr.›</a:t>
+              <a:t>‹nr.›</a:t>
             </a:fld>
             <a:endParaRPr lang="nl-BE"/>
           </a:p>
@@ -2877,7 +2886,7 @@
     </p:spTree>
     <p:extLst>
       <p:ext uri="{BB962C8B-B14F-4D97-AF65-F5344CB8AC3E}">
-        <p14:creationId xmlns:p14="http://schemas.microsoft.com/office/powerpoint/2010/main" xmlns="" val="2268232388"/>
+        <p14:creationId xmlns:p14="http://schemas.microsoft.com/office/powerpoint/2010/main" val="2268232388"/>
       </p:ext>
     </p:extLst>
   </p:cSld>
@@ -3485,20 +3494,7 @@
                 </a:effectLst>
                 <a:latin typeface="Sitka Text" pitchFamily="2" charset="0"/>
               </a:rPr>
-              <a:t>Presentatie: Iteratie </a:t>
-            </a:r>
-            <a:r>
-              <a:rPr lang="nl-BE" sz="2700" cap="small" dirty="0" smtClean="0">
-                <a:effectLst>
-                  <a:outerShdw blurRad="50800" dist="38100" dir="5400000" algn="t" rotWithShape="0">
-                    <a:prstClr val="black">
-                      <a:alpha val="40000"/>
-                    </a:prstClr>
-                  </a:outerShdw>
-                </a:effectLst>
-                <a:latin typeface="Sitka Text" pitchFamily="2" charset="0"/>
-              </a:rPr>
-              <a:t>1</a:t>
+              <a:t>Presentatie: Iteratie 1</a:t>
             </a:r>
             <a:endParaRPr lang="en-GB" sz="2700" cap="small" dirty="0">
               <a:effectLst>
@@ -3516,7 +3512,2046 @@
     </p:spTree>
     <p:extLst>
       <p:ext uri="{BB962C8B-B14F-4D97-AF65-F5344CB8AC3E}">
-        <p14:creationId xmlns:p14="http://schemas.microsoft.com/office/powerpoint/2010/main" xmlns="" val="1089514898"/>
+        <p14:creationId xmlns:p14="http://schemas.microsoft.com/office/powerpoint/2010/main" val="1089514898"/>
+      </p:ext>
+    </p:extLst>
+  </p:cSld>
+  <p:clrMapOvr>
+    <a:masterClrMapping/>
+  </p:clrMapOvr>
+  <p:timing>
+    <p:tnLst>
+      <p:par>
+        <p:cTn id="1" dur="indefinite" restart="never" nodeType="tmRoot"/>
+      </p:par>
+    </p:tnLst>
+  </p:timing>
+</p:sld>
+</file>
+
+<file path=ppt/slides/slide10.xml><?xml version="1.0" encoding="utf-8"?>
+<p:sld xmlns:a="http://schemas.openxmlformats.org/drawingml/2006/main" xmlns:r="http://schemas.openxmlformats.org/officeDocument/2006/relationships" xmlns:p="http://schemas.openxmlformats.org/presentationml/2006/main">
+  <p:cSld>
+    <p:spTree>
+      <p:nvGrpSpPr>
+        <p:cNvPr id="1" name=""/>
+        <p:cNvGrpSpPr/>
+        <p:nvPr/>
+      </p:nvGrpSpPr>
+      <p:grpSpPr>
+        <a:xfrm>
+          <a:off x="0" y="0"/>
+          <a:ext cx="0" cy="0"/>
+          <a:chOff x="0" y="0"/>
+          <a:chExt cx="0" cy="0"/>
+        </a:xfrm>
+      </p:grpSpPr>
+      <p:sp>
+        <p:nvSpPr>
+          <p:cNvPr id="2" name="Titel 1"/>
+          <p:cNvSpPr>
+            <a:spLocks noGrp="1"/>
+          </p:cNvSpPr>
+          <p:nvPr>
+            <p:ph type="title"/>
+          </p:nvPr>
+        </p:nvSpPr>
+        <p:spPr/>
+        <p:txBody>
+          <a:bodyPr>
+            <a:normAutofit/>
+          </a:bodyPr>
+          <a:lstStyle/>
+          <a:p>
+            <a:r>
+              <a:rPr lang="nl-BE" sz="3600" cap="small" dirty="0" err="1" smtClean="0">
+                <a:ln w="18415" cmpd="sng">
+                  <a:solidFill>
+                    <a:schemeClr val="tx1">
+                      <a:alpha val="0"/>
+                    </a:schemeClr>
+                  </a:solidFill>
+                  <a:prstDash val="solid"/>
+                </a:ln>
+                <a:effectLst>
+                  <a:outerShdw blurRad="25400" dir="3600000" algn="tl" rotWithShape="0">
+                    <a:srgbClr val="000000">
+                      <a:alpha val="70000"/>
+                    </a:srgbClr>
+                  </a:outerShdw>
+                </a:effectLst>
+                <a:latin typeface="Sitka Text" pitchFamily="2" charset="0"/>
+              </a:rPr>
+              <a:t>Extensibility</a:t>
+            </a:r>
+            <a:r>
+              <a:rPr lang="nl-BE" sz="3600" cap="small" dirty="0" smtClean="0">
+                <a:ln w="18415" cmpd="sng">
+                  <a:solidFill>
+                    <a:schemeClr val="tx1">
+                      <a:alpha val="0"/>
+                    </a:schemeClr>
+                  </a:solidFill>
+                  <a:prstDash val="solid"/>
+                </a:ln>
+                <a:effectLst>
+                  <a:outerShdw blurRad="25400" dir="3600000" algn="tl" rotWithShape="0">
+                    <a:srgbClr val="000000">
+                      <a:alpha val="70000"/>
+                    </a:srgbClr>
+                  </a:outerShdw>
+                </a:effectLst>
+                <a:latin typeface="Sitka Text" pitchFamily="2" charset="0"/>
+              </a:rPr>
+              <a:t> of </a:t>
+            </a:r>
+            <a:r>
+              <a:rPr lang="nl-BE" sz="3600" cap="small" dirty="0" smtClean="0">
+                <a:ln w="18415" cmpd="sng">
+                  <a:solidFill>
+                    <a:schemeClr val="tx1">
+                      <a:alpha val="0"/>
+                    </a:schemeClr>
+                  </a:solidFill>
+                  <a:prstDash val="solid"/>
+                </a:ln>
+                <a:effectLst>
+                  <a:outerShdw blurRad="25400" dir="3600000" algn="tl" rotWithShape="0">
+                    <a:srgbClr val="000000">
+                      <a:alpha val="70000"/>
+                    </a:srgbClr>
+                  </a:outerShdw>
+                </a:effectLst>
+                <a:latin typeface="Sitka Text" pitchFamily="2" charset="0"/>
+              </a:rPr>
+              <a:t>system: Controller </a:t>
+            </a:r>
+            <a:r>
+              <a:rPr lang="nl-BE" sz="3600" cap="small" dirty="0" err="1" smtClean="0">
+                <a:ln w="18415" cmpd="sng">
+                  <a:solidFill>
+                    <a:schemeClr val="tx1">
+                      <a:alpha val="0"/>
+                    </a:schemeClr>
+                  </a:solidFill>
+                  <a:prstDash val="solid"/>
+                </a:ln>
+                <a:effectLst>
+                  <a:outerShdw blurRad="25400" dir="3600000" algn="tl" rotWithShape="0">
+                    <a:srgbClr val="000000">
+                      <a:alpha val="70000"/>
+                    </a:srgbClr>
+                  </a:outerShdw>
+                </a:effectLst>
+                <a:latin typeface="Sitka Text" pitchFamily="2" charset="0"/>
+              </a:rPr>
+              <a:t>layer</a:t>
+            </a:r>
+            <a:endParaRPr lang="nl-BE" sz="3600" cap="small" dirty="0">
+              <a:ln w="18415" cmpd="sng">
+                <a:solidFill>
+                  <a:schemeClr val="tx1">
+                    <a:alpha val="0"/>
+                  </a:schemeClr>
+                </a:solidFill>
+                <a:prstDash val="solid"/>
+              </a:ln>
+              <a:effectLst>
+                <a:outerShdw blurRad="25400" dir="3600000" algn="tl" rotWithShape="0">
+                  <a:srgbClr val="000000">
+                    <a:alpha val="70000"/>
+                  </a:srgbClr>
+                </a:outerShdw>
+              </a:effectLst>
+              <a:latin typeface="Sitka Text" pitchFamily="2" charset="0"/>
+            </a:endParaRPr>
+          </a:p>
+        </p:txBody>
+      </p:sp>
+      <p:sp>
+        <p:nvSpPr>
+          <p:cNvPr id="3" name="Tijdelijke aanduiding voor inhoud 2"/>
+          <p:cNvSpPr>
+            <a:spLocks noGrp="1"/>
+          </p:cNvSpPr>
+          <p:nvPr>
+            <p:ph idx="1"/>
+          </p:nvPr>
+        </p:nvSpPr>
+        <p:spPr/>
+        <p:txBody>
+          <a:bodyPr>
+            <a:normAutofit/>
+          </a:bodyPr>
+          <a:lstStyle/>
+          <a:p>
+            <a:r>
+              <a:rPr lang="nl-BE" sz="2400" dirty="0" smtClean="0"/>
+              <a:t>Flexibel toevoegen van </a:t>
+            </a:r>
+            <a:r>
+              <a:rPr lang="nl-BE" sz="2400" dirty="0" err="1" smtClean="0"/>
+              <a:t>use</a:t>
+            </a:r>
+            <a:r>
+              <a:rPr lang="nl-BE" sz="2400" dirty="0" smtClean="0"/>
+              <a:t> cases</a:t>
+            </a:r>
+          </a:p>
+          <a:p>
+            <a:r>
+              <a:rPr lang="nl-BE" sz="2400" dirty="0" smtClean="0"/>
+              <a:t>User type toevoegen gaat eenvoudig</a:t>
+            </a:r>
+          </a:p>
+          <a:p>
+            <a:r>
+              <a:rPr lang="nl-BE" sz="2400" dirty="0" smtClean="0"/>
+              <a:t>UI is onafhankelijk van </a:t>
+            </a:r>
+            <a:r>
+              <a:rPr lang="nl-BE" sz="2400" dirty="0" err="1" smtClean="0"/>
+              <a:t>domeinlaag</a:t>
+            </a:r>
+            <a:endParaRPr lang="nl-BE" sz="2400" dirty="0" smtClean="0"/>
+          </a:p>
+          <a:p>
+            <a:r>
+              <a:rPr lang="nl-BE" sz="2400" dirty="0" smtClean="0"/>
+              <a:t>Interface voor </a:t>
+            </a:r>
+            <a:r>
+              <a:rPr lang="nl-BE" sz="2400" dirty="0" err="1" smtClean="0"/>
+              <a:t>initializer</a:t>
+            </a:r>
+            <a:r>
+              <a:rPr lang="nl-BE" sz="2400" dirty="0" smtClean="0"/>
+              <a:t> maakt nieuwe beginsituaties eenvoudig te implementeren</a:t>
+            </a:r>
+          </a:p>
+          <a:p>
+            <a:endParaRPr lang="nl-BE" sz="2400" dirty="0"/>
+          </a:p>
+        </p:txBody>
+      </p:sp>
+    </p:spTree>
+    <p:extLst>
+      <p:ext uri="{BB962C8B-B14F-4D97-AF65-F5344CB8AC3E}">
+        <p14:creationId xmlns:p14="http://schemas.microsoft.com/office/powerpoint/2010/main" val="2444210159"/>
+      </p:ext>
+    </p:extLst>
+  </p:cSld>
+  <p:clrMapOvr>
+    <a:masterClrMapping/>
+  </p:clrMapOvr>
+  <p:timing>
+    <p:tnLst>
+      <p:par>
+        <p:cTn id="1" dur="indefinite" restart="never" nodeType="tmRoot"/>
+      </p:par>
+    </p:tnLst>
+  </p:timing>
+</p:sld>
+</file>
+
+<file path=ppt/slides/slide11.xml><?xml version="1.0" encoding="utf-8"?>
+<p:sld xmlns:a="http://schemas.openxmlformats.org/drawingml/2006/main" xmlns:r="http://schemas.openxmlformats.org/officeDocument/2006/relationships" xmlns:p="http://schemas.openxmlformats.org/presentationml/2006/main">
+  <p:cSld>
+    <p:spTree>
+      <p:nvGrpSpPr>
+        <p:cNvPr id="1" name=""/>
+        <p:cNvGrpSpPr/>
+        <p:nvPr/>
+      </p:nvGrpSpPr>
+      <p:grpSpPr>
+        <a:xfrm>
+          <a:off x="0" y="0"/>
+          <a:ext cx="0" cy="0"/>
+          <a:chOff x="0" y="0"/>
+          <a:chExt cx="0" cy="0"/>
+        </a:xfrm>
+      </p:grpSpPr>
+      <p:sp>
+        <p:nvSpPr>
+          <p:cNvPr id="2" name="Titel 1"/>
+          <p:cNvSpPr>
+            <a:spLocks noGrp="1"/>
+          </p:cNvSpPr>
+          <p:nvPr>
+            <p:ph type="title"/>
+          </p:nvPr>
+        </p:nvSpPr>
+        <p:spPr/>
+        <p:txBody>
+          <a:bodyPr>
+            <a:normAutofit/>
+          </a:bodyPr>
+          <a:lstStyle/>
+          <a:p>
+            <a:r>
+              <a:rPr lang="nl-BE" sz="3600" cap="small" dirty="0" err="1" smtClean="0">
+                <a:ln w="18415" cmpd="sng">
+                  <a:solidFill>
+                    <a:schemeClr val="tx1">
+                      <a:alpha val="0"/>
+                    </a:schemeClr>
+                  </a:solidFill>
+                  <a:prstDash val="solid"/>
+                </a:ln>
+                <a:effectLst>
+                  <a:outerShdw blurRad="25400" dir="3600000" algn="tl" rotWithShape="0">
+                    <a:srgbClr val="000000">
+                      <a:alpha val="70000"/>
+                    </a:srgbClr>
+                  </a:outerShdw>
+                </a:effectLst>
+                <a:latin typeface="Sitka Text" pitchFamily="2" charset="0"/>
+              </a:rPr>
+              <a:t>Extensibility</a:t>
+            </a:r>
+            <a:r>
+              <a:rPr lang="nl-BE" sz="3600" cap="small" dirty="0" smtClean="0">
+                <a:ln w="18415" cmpd="sng">
+                  <a:solidFill>
+                    <a:schemeClr val="tx1">
+                      <a:alpha val="0"/>
+                    </a:schemeClr>
+                  </a:solidFill>
+                  <a:prstDash val="solid"/>
+                </a:ln>
+                <a:effectLst>
+                  <a:outerShdw blurRad="25400" dir="3600000" algn="tl" rotWithShape="0">
+                    <a:srgbClr val="000000">
+                      <a:alpha val="70000"/>
+                    </a:srgbClr>
+                  </a:outerShdw>
+                </a:effectLst>
+                <a:latin typeface="Sitka Text" pitchFamily="2" charset="0"/>
+              </a:rPr>
+              <a:t> of </a:t>
+            </a:r>
+            <a:r>
+              <a:rPr lang="nl-BE" sz="3600" cap="small" dirty="0" smtClean="0">
+                <a:ln w="18415" cmpd="sng">
+                  <a:solidFill>
+                    <a:schemeClr val="tx1">
+                      <a:alpha val="0"/>
+                    </a:schemeClr>
+                  </a:solidFill>
+                  <a:prstDash val="solid"/>
+                </a:ln>
+                <a:effectLst>
+                  <a:outerShdw blurRad="25400" dir="3600000" algn="tl" rotWithShape="0">
+                    <a:srgbClr val="000000">
+                      <a:alpha val="70000"/>
+                    </a:srgbClr>
+                  </a:outerShdw>
+                </a:effectLst>
+                <a:latin typeface="Sitka Text" pitchFamily="2" charset="0"/>
+              </a:rPr>
+              <a:t>system: Domain </a:t>
+            </a:r>
+            <a:r>
+              <a:rPr lang="nl-BE" sz="3600" cap="small" dirty="0" err="1" smtClean="0">
+                <a:ln w="18415" cmpd="sng">
+                  <a:solidFill>
+                    <a:schemeClr val="tx1">
+                      <a:alpha val="0"/>
+                    </a:schemeClr>
+                  </a:solidFill>
+                  <a:prstDash val="solid"/>
+                </a:ln>
+                <a:effectLst>
+                  <a:outerShdw blurRad="25400" dir="3600000" algn="tl" rotWithShape="0">
+                    <a:srgbClr val="000000">
+                      <a:alpha val="70000"/>
+                    </a:srgbClr>
+                  </a:outerShdw>
+                </a:effectLst>
+                <a:latin typeface="Sitka Text" pitchFamily="2" charset="0"/>
+              </a:rPr>
+              <a:t>layer</a:t>
+            </a:r>
+            <a:endParaRPr lang="nl-BE" sz="3600" cap="small" dirty="0">
+              <a:ln w="18415" cmpd="sng">
+                <a:solidFill>
+                  <a:schemeClr val="tx1">
+                    <a:alpha val="0"/>
+                  </a:schemeClr>
+                </a:solidFill>
+                <a:prstDash val="solid"/>
+              </a:ln>
+              <a:effectLst>
+                <a:outerShdw blurRad="25400" dir="3600000" algn="tl" rotWithShape="0">
+                  <a:srgbClr val="000000">
+                    <a:alpha val="70000"/>
+                  </a:srgbClr>
+                </a:outerShdw>
+              </a:effectLst>
+              <a:latin typeface="Sitka Text" pitchFamily="2" charset="0"/>
+            </a:endParaRPr>
+          </a:p>
+        </p:txBody>
+      </p:sp>
+      <p:sp>
+        <p:nvSpPr>
+          <p:cNvPr id="3" name="Tijdelijke aanduiding voor inhoud 2"/>
+          <p:cNvSpPr>
+            <a:spLocks noGrp="1"/>
+          </p:cNvSpPr>
+          <p:nvPr>
+            <p:ph idx="1"/>
+          </p:nvPr>
+        </p:nvSpPr>
+        <p:spPr/>
+        <p:txBody>
+          <a:bodyPr>
+            <a:normAutofit/>
+          </a:bodyPr>
+          <a:lstStyle/>
+          <a:p>
+            <a:r>
+              <a:rPr lang="nl-BE" sz="2400" dirty="0" err="1" smtClean="0"/>
+              <a:t>Domeinlaag</a:t>
+            </a:r>
+            <a:r>
+              <a:rPr lang="nl-BE" sz="2400" dirty="0" smtClean="0"/>
+              <a:t> is opgesplitst:</a:t>
+            </a:r>
+          </a:p>
+          <a:p>
+            <a:pPr lvl="1"/>
+            <a:r>
+              <a:rPr lang="nl-BE" sz="2000" dirty="0" smtClean="0"/>
+              <a:t>Functies doorgeven aan services</a:t>
+            </a:r>
+          </a:p>
+          <a:p>
+            <a:pPr lvl="1"/>
+            <a:r>
+              <a:rPr lang="nl-BE" sz="2000" dirty="0" smtClean="0"/>
+              <a:t>Lagere koppeling met andere functies uit eenzelfde laag (?)</a:t>
+            </a:r>
+          </a:p>
+          <a:p>
+            <a:pPr lvl="1"/>
+            <a:r>
+              <a:rPr lang="nl-BE" sz="2000" dirty="0" smtClean="0"/>
+              <a:t>Voorbeeld: geen dubbele associaties</a:t>
+            </a:r>
+          </a:p>
+          <a:p>
+            <a:pPr lvl="1"/>
+            <a:endParaRPr lang="nl-BE" sz="2000" dirty="0"/>
+          </a:p>
+          <a:p>
+            <a:pPr marL="400050"/>
+            <a:r>
+              <a:rPr lang="nl-BE" sz="2400" dirty="0" smtClean="0"/>
+              <a:t>Eenvoudig om nieuwe tags toe te voegen</a:t>
+            </a:r>
+          </a:p>
+          <a:p>
+            <a:pPr marL="400050"/>
+            <a:endParaRPr lang="nl-BE" sz="2400" dirty="0"/>
+          </a:p>
+          <a:p>
+            <a:pPr marL="400050"/>
+            <a:r>
+              <a:rPr lang="nl-BE" sz="2400" dirty="0" err="1" smtClean="0"/>
+              <a:t>Subsystems</a:t>
+            </a:r>
+            <a:r>
+              <a:rPr lang="nl-BE" sz="2400" dirty="0" smtClean="0"/>
+              <a:t> + </a:t>
+            </a:r>
+            <a:r>
+              <a:rPr lang="nl-BE" sz="2400" dirty="0" err="1" smtClean="0"/>
+              <a:t>bugreports</a:t>
+            </a:r>
+            <a:r>
+              <a:rPr lang="nl-BE" sz="2400" dirty="0" smtClean="0"/>
+              <a:t> zijn “</a:t>
+            </a:r>
+            <a:r>
+              <a:rPr lang="nl-BE" sz="2400" dirty="0" err="1" smtClean="0"/>
+              <a:t>value”klassen</a:t>
+            </a:r>
+            <a:r>
+              <a:rPr lang="nl-BE" sz="2400" dirty="0" smtClean="0"/>
+              <a:t> </a:t>
+            </a:r>
+          </a:p>
+          <a:p>
+            <a:endParaRPr lang="nl-BE" sz="2400" dirty="0"/>
+          </a:p>
+        </p:txBody>
+      </p:sp>
+    </p:spTree>
+    <p:extLst>
+      <p:ext uri="{BB962C8B-B14F-4D97-AF65-F5344CB8AC3E}">
+        <p14:creationId xmlns:p14="http://schemas.microsoft.com/office/powerpoint/2010/main" val="2991894533"/>
+      </p:ext>
+    </p:extLst>
+  </p:cSld>
+  <p:clrMapOvr>
+    <a:masterClrMapping/>
+  </p:clrMapOvr>
+  <p:timing>
+    <p:tnLst>
+      <p:par>
+        <p:cTn id="1" dur="indefinite" restart="never" nodeType="tmRoot"/>
+      </p:par>
+    </p:tnLst>
+  </p:timing>
+</p:sld>
+</file>
+
+<file path=ppt/slides/slide12.xml><?xml version="1.0" encoding="utf-8"?>
+<p:sld xmlns:a="http://schemas.openxmlformats.org/drawingml/2006/main" xmlns:r="http://schemas.openxmlformats.org/officeDocument/2006/relationships" xmlns:p="http://schemas.openxmlformats.org/presentationml/2006/main">
+  <p:cSld>
+    <p:spTree>
+      <p:nvGrpSpPr>
+        <p:cNvPr id="1" name=""/>
+        <p:cNvGrpSpPr/>
+        <p:nvPr/>
+      </p:nvGrpSpPr>
+      <p:grpSpPr>
+        <a:xfrm>
+          <a:off x="0" y="0"/>
+          <a:ext cx="0" cy="0"/>
+          <a:chOff x="0" y="0"/>
+          <a:chExt cx="0" cy="0"/>
+        </a:xfrm>
+      </p:grpSpPr>
+      <p:sp>
+        <p:nvSpPr>
+          <p:cNvPr id="2" name="Titel 1"/>
+          <p:cNvSpPr>
+            <a:spLocks noGrp="1"/>
+          </p:cNvSpPr>
+          <p:nvPr>
+            <p:ph type="title"/>
+          </p:nvPr>
+        </p:nvSpPr>
+        <p:spPr/>
+        <p:txBody>
+          <a:bodyPr>
+            <a:normAutofit/>
+          </a:bodyPr>
+          <a:lstStyle/>
+          <a:p>
+            <a:r>
+              <a:rPr lang="nl-BE" sz="3600" cap="small" dirty="0" err="1" smtClean="0">
+                <a:ln w="18415" cmpd="sng">
+                  <a:solidFill>
+                    <a:schemeClr val="tx1">
+                      <a:alpha val="0"/>
+                    </a:schemeClr>
+                  </a:solidFill>
+                  <a:prstDash val="solid"/>
+                </a:ln>
+                <a:effectLst>
+                  <a:outerShdw blurRad="25400" dir="3600000" algn="tl" rotWithShape="0">
+                    <a:srgbClr val="000000">
+                      <a:alpha val="70000"/>
+                    </a:srgbClr>
+                  </a:outerShdw>
+                </a:effectLst>
+                <a:latin typeface="Sitka Text" pitchFamily="2" charset="0"/>
+              </a:rPr>
+              <a:t>Possible</a:t>
+            </a:r>
+            <a:r>
+              <a:rPr lang="nl-BE" sz="3600" cap="small" dirty="0" smtClean="0">
+                <a:ln w="18415" cmpd="sng">
+                  <a:solidFill>
+                    <a:schemeClr val="tx1">
+                      <a:alpha val="0"/>
+                    </a:schemeClr>
+                  </a:solidFill>
+                  <a:prstDash val="solid"/>
+                </a:ln>
+                <a:effectLst>
+                  <a:outerShdw blurRad="25400" dir="3600000" algn="tl" rotWithShape="0">
+                    <a:srgbClr val="000000">
+                      <a:alpha val="70000"/>
+                    </a:srgbClr>
+                  </a:outerShdw>
+                </a:effectLst>
+                <a:latin typeface="Sitka Text" pitchFamily="2" charset="0"/>
+              </a:rPr>
+              <a:t> </a:t>
+            </a:r>
+            <a:r>
+              <a:rPr lang="nl-BE" sz="3600" cap="small" dirty="0" err="1" smtClean="0">
+                <a:ln w="18415" cmpd="sng">
+                  <a:solidFill>
+                    <a:schemeClr val="tx1">
+                      <a:alpha val="0"/>
+                    </a:schemeClr>
+                  </a:solidFill>
+                  <a:prstDash val="solid"/>
+                </a:ln>
+                <a:effectLst>
+                  <a:outerShdw blurRad="25400" dir="3600000" algn="tl" rotWithShape="0">
+                    <a:srgbClr val="000000">
+                      <a:alpha val="70000"/>
+                    </a:srgbClr>
+                  </a:outerShdw>
+                </a:effectLst>
+                <a:latin typeface="Sitka Text" pitchFamily="2" charset="0"/>
+              </a:rPr>
+              <a:t>improvements</a:t>
+            </a:r>
+            <a:endParaRPr lang="nl-BE" sz="3600" cap="small" dirty="0">
+              <a:ln w="18415" cmpd="sng">
+                <a:solidFill>
+                  <a:schemeClr val="tx1">
+                    <a:alpha val="0"/>
+                  </a:schemeClr>
+                </a:solidFill>
+                <a:prstDash val="solid"/>
+              </a:ln>
+              <a:effectLst>
+                <a:outerShdw blurRad="25400" dir="3600000" algn="tl" rotWithShape="0">
+                  <a:srgbClr val="000000">
+                    <a:alpha val="70000"/>
+                  </a:srgbClr>
+                </a:outerShdw>
+              </a:effectLst>
+              <a:latin typeface="Sitka Text" pitchFamily="2" charset="0"/>
+            </a:endParaRPr>
+          </a:p>
+        </p:txBody>
+      </p:sp>
+      <p:sp>
+        <p:nvSpPr>
+          <p:cNvPr id="3" name="Tijdelijke aanduiding voor inhoud 2"/>
+          <p:cNvSpPr>
+            <a:spLocks noGrp="1"/>
+          </p:cNvSpPr>
+          <p:nvPr>
+            <p:ph idx="1"/>
+          </p:nvPr>
+        </p:nvSpPr>
+        <p:spPr/>
+        <p:txBody>
+          <a:bodyPr>
+            <a:normAutofit/>
+          </a:bodyPr>
+          <a:lstStyle/>
+          <a:p>
+            <a:r>
+              <a:rPr lang="nl-BE" sz="2400" dirty="0" smtClean="0"/>
+              <a:t>Klassen voor </a:t>
+            </a:r>
+            <a:r>
+              <a:rPr lang="nl-BE" sz="2400" dirty="0" err="1" smtClean="0"/>
+              <a:t>Admin</a:t>
+            </a:r>
+            <a:r>
+              <a:rPr lang="nl-BE" sz="2400" dirty="0" smtClean="0"/>
+              <a:t>, </a:t>
+            </a:r>
+            <a:r>
+              <a:rPr lang="nl-BE" sz="2400" dirty="0" err="1" smtClean="0"/>
+              <a:t>Issuer</a:t>
+            </a:r>
+            <a:r>
+              <a:rPr lang="nl-BE" sz="2400" dirty="0" smtClean="0"/>
+              <a:t> &amp; Developer zijn overbodig</a:t>
+            </a:r>
+          </a:p>
+          <a:p>
+            <a:pPr lvl="1"/>
+            <a:r>
+              <a:rPr lang="nl-BE" sz="2000" dirty="0" smtClean="0"/>
+              <a:t>Functionaliteit in controller</a:t>
+            </a:r>
+          </a:p>
+          <a:p>
+            <a:endParaRPr lang="nl-BE" sz="2400" dirty="0"/>
+          </a:p>
+          <a:p>
+            <a:r>
+              <a:rPr lang="nl-BE" sz="2400" dirty="0" smtClean="0"/>
+              <a:t>Vermijden dat tags van elkaar afweten</a:t>
+            </a:r>
+            <a:endParaRPr lang="nl-BE" sz="2000" dirty="0"/>
+          </a:p>
+          <a:p>
+            <a:pPr lvl="1"/>
+            <a:r>
+              <a:rPr lang="nl-BE" sz="2000" dirty="0" smtClean="0"/>
+              <a:t>Nieuwe klasse voor </a:t>
+            </a:r>
+            <a:r>
+              <a:rPr lang="nl-BE" sz="2000" dirty="0" err="1" smtClean="0"/>
+              <a:t>overgangfunctionaliteit</a:t>
+            </a:r>
+            <a:endParaRPr lang="nl-BE" sz="2000" dirty="0" smtClean="0"/>
+          </a:p>
+          <a:p>
+            <a:endParaRPr lang="nl-BE" sz="2400" dirty="0"/>
+          </a:p>
+          <a:p>
+            <a:r>
+              <a:rPr lang="nl-BE" sz="2400" dirty="0" smtClean="0"/>
+              <a:t>Opzoeken van </a:t>
+            </a:r>
+            <a:r>
+              <a:rPr lang="nl-BE" sz="2400" dirty="0" err="1" smtClean="0"/>
+              <a:t>bugreport</a:t>
+            </a:r>
+            <a:r>
+              <a:rPr lang="nl-BE" sz="2400" dirty="0" smtClean="0"/>
+              <a:t> implementeren m.b.v. </a:t>
+            </a:r>
+            <a:r>
+              <a:rPr lang="nl-BE" sz="2400" dirty="0" err="1" smtClean="0"/>
+              <a:t>strategy</a:t>
+            </a:r>
+            <a:r>
+              <a:rPr lang="nl-BE" sz="2400" dirty="0" smtClean="0"/>
+              <a:t> </a:t>
+            </a:r>
+            <a:r>
+              <a:rPr lang="nl-BE" sz="2400" dirty="0" err="1" smtClean="0"/>
+              <a:t>pattern</a:t>
+            </a:r>
+            <a:endParaRPr lang="nl-BE" sz="2400" dirty="0" smtClean="0"/>
+          </a:p>
+          <a:p>
+            <a:pPr lvl="1"/>
+            <a:r>
+              <a:rPr lang="nl-BE" sz="2000" dirty="0" smtClean="0"/>
+              <a:t>Interface “</a:t>
+            </a:r>
+            <a:r>
+              <a:rPr lang="nl-BE" sz="2000" dirty="0" err="1" smtClean="0"/>
+              <a:t>ISearch</a:t>
+            </a:r>
+            <a:r>
+              <a:rPr lang="nl-BE" sz="2000" dirty="0" smtClean="0"/>
+              <a:t>”</a:t>
+            </a:r>
+          </a:p>
+          <a:p>
+            <a:pPr lvl="1"/>
+            <a:r>
+              <a:rPr lang="nl-BE" sz="2000" dirty="0" smtClean="0"/>
+              <a:t>Resulteert in lagere koppeling in </a:t>
+            </a:r>
+            <a:r>
+              <a:rPr lang="nl-BE" sz="2000" dirty="0" err="1" smtClean="0"/>
+              <a:t>BugReportService</a:t>
+            </a:r>
+            <a:endParaRPr lang="nl-BE" sz="2000" dirty="0" smtClean="0"/>
+          </a:p>
+        </p:txBody>
+      </p:sp>
+    </p:spTree>
+    <p:extLst>
+      <p:ext uri="{BB962C8B-B14F-4D97-AF65-F5344CB8AC3E}">
+        <p14:creationId xmlns:p14="http://schemas.microsoft.com/office/powerpoint/2010/main" val="674970378"/>
+      </p:ext>
+    </p:extLst>
+  </p:cSld>
+  <p:clrMapOvr>
+    <a:masterClrMapping/>
+  </p:clrMapOvr>
+  <p:timing>
+    <p:tnLst>
+      <p:par>
+        <p:cTn id="1" dur="indefinite" restart="never" nodeType="tmRoot"/>
+      </p:par>
+    </p:tnLst>
+  </p:timing>
+</p:sld>
+</file>
+
+<file path=ppt/slides/slide13.xml><?xml version="1.0" encoding="utf-8"?>
+<p:sld xmlns:a="http://schemas.openxmlformats.org/drawingml/2006/main" xmlns:r="http://schemas.openxmlformats.org/officeDocument/2006/relationships" xmlns:p="http://schemas.openxmlformats.org/presentationml/2006/main">
+  <p:cSld>
+    <p:spTree>
+      <p:nvGrpSpPr>
+        <p:cNvPr id="1" name=""/>
+        <p:cNvGrpSpPr/>
+        <p:nvPr/>
+      </p:nvGrpSpPr>
+      <p:grpSpPr>
+        <a:xfrm>
+          <a:off x="0" y="0"/>
+          <a:ext cx="0" cy="0"/>
+          <a:chOff x="0" y="0"/>
+          <a:chExt cx="0" cy="0"/>
+        </a:xfrm>
+      </p:grpSpPr>
+      <p:sp>
+        <p:nvSpPr>
+          <p:cNvPr id="2" name="Titel 1"/>
+          <p:cNvSpPr>
+            <a:spLocks noGrp="1"/>
+          </p:cNvSpPr>
+          <p:nvPr>
+            <p:ph type="title"/>
+          </p:nvPr>
+        </p:nvSpPr>
+        <p:spPr/>
+        <p:txBody>
+          <a:bodyPr>
+            <a:normAutofit/>
+          </a:bodyPr>
+          <a:lstStyle/>
+          <a:p>
+            <a:r>
+              <a:rPr lang="nl-BE" sz="3600" cap="small" dirty="0" err="1" smtClean="0">
+                <a:ln w="18415" cmpd="sng">
+                  <a:solidFill>
+                    <a:schemeClr val="tx1">
+                      <a:alpha val="0"/>
+                    </a:schemeClr>
+                  </a:solidFill>
+                  <a:prstDash val="solid"/>
+                </a:ln>
+                <a:effectLst>
+                  <a:outerShdw blurRad="25400" dir="3600000" algn="tl" rotWithShape="0">
+                    <a:srgbClr val="000000">
+                      <a:alpha val="70000"/>
+                    </a:srgbClr>
+                  </a:outerShdw>
+                </a:effectLst>
+                <a:latin typeface="Sitka Text" pitchFamily="2" charset="0"/>
+              </a:rPr>
+              <a:t>Testing</a:t>
+            </a:r>
+            <a:r>
+              <a:rPr lang="nl-BE" sz="3600" cap="small" dirty="0" smtClean="0">
+                <a:ln w="18415" cmpd="sng">
+                  <a:solidFill>
+                    <a:schemeClr val="tx1">
+                      <a:alpha val="0"/>
+                    </a:schemeClr>
+                  </a:solidFill>
+                  <a:prstDash val="solid"/>
+                </a:ln>
+                <a:effectLst>
+                  <a:outerShdw blurRad="25400" dir="3600000" algn="tl" rotWithShape="0">
+                    <a:srgbClr val="000000">
+                      <a:alpha val="70000"/>
+                    </a:srgbClr>
+                  </a:outerShdw>
+                </a:effectLst>
+                <a:latin typeface="Sitka Text" pitchFamily="2" charset="0"/>
+              </a:rPr>
+              <a:t> approach</a:t>
+            </a:r>
+            <a:endParaRPr lang="nl-BE" sz="3600" cap="small" dirty="0">
+              <a:ln w="18415" cmpd="sng">
+                <a:solidFill>
+                  <a:schemeClr val="tx1">
+                    <a:alpha val="0"/>
+                  </a:schemeClr>
+                </a:solidFill>
+                <a:prstDash val="solid"/>
+              </a:ln>
+              <a:effectLst>
+                <a:outerShdw blurRad="25400" dir="3600000" algn="tl" rotWithShape="0">
+                  <a:srgbClr val="000000">
+                    <a:alpha val="70000"/>
+                  </a:srgbClr>
+                </a:outerShdw>
+              </a:effectLst>
+              <a:latin typeface="Sitka Text" pitchFamily="2" charset="0"/>
+            </a:endParaRPr>
+          </a:p>
+        </p:txBody>
+      </p:sp>
+      <p:sp>
+        <p:nvSpPr>
+          <p:cNvPr id="3" name="Tijdelijke aanduiding voor inhoud 2"/>
+          <p:cNvSpPr>
+            <a:spLocks noGrp="1"/>
+          </p:cNvSpPr>
+          <p:nvPr>
+            <p:ph idx="1"/>
+          </p:nvPr>
+        </p:nvSpPr>
+        <p:spPr/>
+        <p:txBody>
+          <a:bodyPr>
+            <a:normAutofit/>
+          </a:bodyPr>
+          <a:lstStyle/>
+          <a:p>
+            <a:pPr marL="0" indent="0">
+              <a:buNone/>
+            </a:pPr>
+            <a:r>
+              <a:rPr lang="nl-BE" sz="2400" b="1" dirty="0" smtClean="0"/>
+              <a:t>Twee mogelijkheden:</a:t>
+            </a:r>
+          </a:p>
+          <a:p>
+            <a:pPr marL="457200" indent="-457200">
+              <a:buFont typeface="+mj-lt"/>
+              <a:buAutoNum type="arabicPeriod"/>
+            </a:pPr>
+            <a:r>
+              <a:rPr lang="nl-BE" sz="2400" dirty="0" smtClean="0"/>
+              <a:t>Test schrijven voor elke klasse in zelfde package</a:t>
+            </a:r>
+          </a:p>
+          <a:p>
+            <a:pPr marL="457200" indent="-457200">
+              <a:buFont typeface="+mj-lt"/>
+              <a:buAutoNum type="arabicPeriod"/>
+            </a:pPr>
+            <a:endParaRPr lang="nl-BE" sz="2400" dirty="0"/>
+          </a:p>
+          <a:p>
+            <a:pPr marL="457200" indent="-457200">
+              <a:buFont typeface="+mj-lt"/>
+              <a:buAutoNum type="arabicPeriod"/>
+            </a:pPr>
+            <a:r>
+              <a:rPr lang="nl-BE" sz="2400" dirty="0" smtClean="0"/>
+              <a:t>Via een hogere laag een lagere laag testen</a:t>
+            </a:r>
+          </a:p>
+          <a:p>
+            <a:pPr lvl="1" indent="-342900">
+              <a:buFont typeface="Wingdings"/>
+              <a:buChar char="à"/>
+            </a:pPr>
+            <a:r>
+              <a:rPr lang="nl-BE" sz="2000" dirty="0" smtClean="0">
+                <a:sym typeface="Wingdings" panose="05000000000000000000" pitchFamily="2" charset="2"/>
+              </a:rPr>
+              <a:t>Noodzakelijk wegens </a:t>
+            </a:r>
+            <a:r>
+              <a:rPr lang="nl-BE" sz="2000" dirty="0" err="1" smtClean="0">
+                <a:sym typeface="Wingdings" panose="05000000000000000000" pitchFamily="2" charset="2"/>
+              </a:rPr>
+              <a:t>visibility</a:t>
+            </a:r>
+            <a:r>
+              <a:rPr lang="nl-BE" sz="2000" dirty="0" smtClean="0">
+                <a:sym typeface="Wingdings" panose="05000000000000000000" pitchFamily="2" charset="2"/>
+              </a:rPr>
+              <a:t> constraints</a:t>
+            </a:r>
+          </a:p>
+          <a:p>
+            <a:pPr lvl="1" indent="-342900">
+              <a:buFont typeface="Wingdings"/>
+              <a:buChar char="à"/>
+            </a:pPr>
+            <a:r>
+              <a:rPr lang="nl-BE" sz="2000" dirty="0" smtClean="0">
+                <a:sym typeface="Wingdings" panose="05000000000000000000" pitchFamily="2" charset="2"/>
+              </a:rPr>
+              <a:t>Moeilijker wegens gelaagde hiërarchie</a:t>
+            </a:r>
+          </a:p>
+          <a:p>
+            <a:pPr marL="0" indent="0">
+              <a:buNone/>
+            </a:pPr>
+            <a:endParaRPr lang="nl-BE" sz="2400" dirty="0">
+              <a:sym typeface="Wingdings" panose="05000000000000000000" pitchFamily="2" charset="2"/>
+            </a:endParaRPr>
+          </a:p>
+          <a:p>
+            <a:pPr marL="0" indent="0">
+              <a:buNone/>
+            </a:pPr>
+            <a:r>
+              <a:rPr lang="nl-BE" sz="2400" b="1" dirty="0" smtClean="0">
+                <a:sym typeface="Wingdings" panose="05000000000000000000" pitchFamily="2" charset="2"/>
+              </a:rPr>
+              <a:t>Test strategie voor </a:t>
+            </a:r>
+            <a:r>
+              <a:rPr lang="nl-BE" sz="2400" b="1" dirty="0" err="1" smtClean="0">
+                <a:sym typeface="Wingdings" panose="05000000000000000000" pitchFamily="2" charset="2"/>
+              </a:rPr>
+              <a:t>use</a:t>
+            </a:r>
+            <a:r>
+              <a:rPr lang="nl-BE" sz="2400" b="1" dirty="0" smtClean="0">
+                <a:sym typeface="Wingdings" panose="05000000000000000000" pitchFamily="2" charset="2"/>
+              </a:rPr>
+              <a:t> cases</a:t>
+            </a:r>
+            <a:endParaRPr lang="nl-BE" sz="2400" dirty="0" smtClean="0">
+              <a:sym typeface="Wingdings" panose="05000000000000000000" pitchFamily="2" charset="2"/>
+            </a:endParaRPr>
+          </a:p>
+          <a:p>
+            <a:r>
+              <a:rPr lang="nl-BE" sz="2400" dirty="0" err="1" smtClean="0">
+                <a:sym typeface="Wingdings" panose="05000000000000000000" pitchFamily="2" charset="2"/>
+              </a:rPr>
+              <a:t>TestUI</a:t>
+            </a:r>
+            <a:r>
+              <a:rPr lang="nl-BE" sz="2400" dirty="0" smtClean="0">
+                <a:sym typeface="Wingdings" panose="05000000000000000000" pitchFamily="2" charset="2"/>
+              </a:rPr>
+              <a:t>  IUI  vaste waarden voor elke </a:t>
+            </a:r>
+            <a:r>
+              <a:rPr lang="nl-BE" sz="2400" dirty="0" err="1" smtClean="0">
+                <a:sym typeface="Wingdings" panose="05000000000000000000" pitchFamily="2" charset="2"/>
+              </a:rPr>
+              <a:t>use</a:t>
+            </a:r>
+            <a:r>
+              <a:rPr lang="nl-BE" sz="2400" dirty="0" smtClean="0">
+                <a:sym typeface="Wingdings" panose="05000000000000000000" pitchFamily="2" charset="2"/>
+              </a:rPr>
+              <a:t> case  testen</a:t>
+            </a:r>
+            <a:endParaRPr lang="nl-BE" sz="2400" dirty="0">
+              <a:sym typeface="Wingdings" panose="05000000000000000000" pitchFamily="2" charset="2"/>
+            </a:endParaRPr>
+          </a:p>
+        </p:txBody>
+      </p:sp>
+    </p:spTree>
+    <p:extLst>
+      <p:ext uri="{BB962C8B-B14F-4D97-AF65-F5344CB8AC3E}">
+        <p14:creationId xmlns:p14="http://schemas.microsoft.com/office/powerpoint/2010/main" val="3176464878"/>
+      </p:ext>
+    </p:extLst>
+  </p:cSld>
+  <p:clrMapOvr>
+    <a:masterClrMapping/>
+  </p:clrMapOvr>
+  <p:timing>
+    <p:tnLst>
+      <p:par>
+        <p:cTn id="1" dur="indefinite" restart="never" nodeType="tmRoot"/>
+      </p:par>
+    </p:tnLst>
+  </p:timing>
+</p:sld>
+</file>
+
+<file path=ppt/slides/slide14.xml><?xml version="1.0" encoding="utf-8"?>
+<p:sld xmlns:a="http://schemas.openxmlformats.org/drawingml/2006/main" xmlns:r="http://schemas.openxmlformats.org/officeDocument/2006/relationships" xmlns:p="http://schemas.openxmlformats.org/presentationml/2006/main">
+  <p:cSld>
+    <p:spTree>
+      <p:nvGrpSpPr>
+        <p:cNvPr id="1" name=""/>
+        <p:cNvGrpSpPr/>
+        <p:nvPr/>
+      </p:nvGrpSpPr>
+      <p:grpSpPr>
+        <a:xfrm>
+          <a:off x="0" y="0"/>
+          <a:ext cx="0" cy="0"/>
+          <a:chOff x="0" y="0"/>
+          <a:chExt cx="0" cy="0"/>
+        </a:xfrm>
+      </p:grpSpPr>
+      <p:sp>
+        <p:nvSpPr>
+          <p:cNvPr id="2" name="Titel 1"/>
+          <p:cNvSpPr>
+            <a:spLocks noGrp="1"/>
+          </p:cNvSpPr>
+          <p:nvPr>
+            <p:ph type="title"/>
+          </p:nvPr>
+        </p:nvSpPr>
+        <p:spPr/>
+        <p:txBody>
+          <a:bodyPr>
+            <a:normAutofit/>
+          </a:bodyPr>
+          <a:lstStyle/>
+          <a:p>
+            <a:r>
+              <a:rPr lang="nl-BE" sz="3600" cap="small" dirty="0" smtClean="0">
+                <a:ln w="18415" cmpd="sng">
+                  <a:solidFill>
+                    <a:schemeClr val="tx1">
+                      <a:alpha val="0"/>
+                    </a:schemeClr>
+                  </a:solidFill>
+                  <a:prstDash val="solid"/>
+                </a:ln>
+                <a:effectLst>
+                  <a:outerShdw blurRad="25400" dir="3600000" algn="tl" rotWithShape="0">
+                    <a:srgbClr val="000000">
+                      <a:alpha val="70000"/>
+                    </a:srgbClr>
+                  </a:outerShdw>
+                </a:effectLst>
+                <a:latin typeface="Sitka Text" pitchFamily="2" charset="0"/>
+              </a:rPr>
+              <a:t>Vragen?</a:t>
+            </a:r>
+            <a:endParaRPr lang="nl-BE" sz="3600" cap="small" dirty="0">
+              <a:ln w="18415" cmpd="sng">
+                <a:solidFill>
+                  <a:schemeClr val="tx1">
+                    <a:alpha val="0"/>
+                  </a:schemeClr>
+                </a:solidFill>
+                <a:prstDash val="solid"/>
+              </a:ln>
+              <a:effectLst>
+                <a:outerShdw blurRad="25400" dir="3600000" algn="tl" rotWithShape="0">
+                  <a:srgbClr val="000000">
+                    <a:alpha val="70000"/>
+                  </a:srgbClr>
+                </a:outerShdw>
+              </a:effectLst>
+              <a:latin typeface="Sitka Text" pitchFamily="2" charset="0"/>
+            </a:endParaRPr>
+          </a:p>
+        </p:txBody>
+      </p:sp>
+      <p:sp>
+        <p:nvSpPr>
+          <p:cNvPr id="3" name="Tijdelijke aanduiding voor inhoud 2"/>
+          <p:cNvSpPr>
+            <a:spLocks noGrp="1"/>
+          </p:cNvSpPr>
+          <p:nvPr>
+            <p:ph idx="1"/>
+          </p:nvPr>
+        </p:nvSpPr>
+        <p:spPr/>
+        <p:txBody>
+          <a:bodyPr/>
+          <a:lstStyle/>
+          <a:p>
+            <a:endParaRPr lang="nl-BE" dirty="0"/>
+          </a:p>
+        </p:txBody>
+      </p:sp>
+    </p:spTree>
+    <p:extLst>
+      <p:ext uri="{BB962C8B-B14F-4D97-AF65-F5344CB8AC3E}">
+        <p14:creationId xmlns:p14="http://schemas.microsoft.com/office/powerpoint/2010/main" val="3405605565"/>
+      </p:ext>
+    </p:extLst>
+  </p:cSld>
+  <p:clrMapOvr>
+    <a:masterClrMapping/>
+  </p:clrMapOvr>
+  <p:timing>
+    <p:tnLst>
+      <p:par>
+        <p:cTn id="1" dur="indefinite" restart="never" nodeType="tmRoot"/>
+      </p:par>
+    </p:tnLst>
+  </p:timing>
+</p:sld>
+</file>
+
+<file path=ppt/slides/slide15.xml><?xml version="1.0" encoding="utf-8"?>
+<p:sld xmlns:a="http://schemas.openxmlformats.org/drawingml/2006/main" xmlns:r="http://schemas.openxmlformats.org/officeDocument/2006/relationships" xmlns:p="http://schemas.openxmlformats.org/presentationml/2006/main">
+  <p:cSld>
+    <p:bg>
+      <p:bgPr>
+        <a:solidFill>
+          <a:schemeClr val="tx1"/>
+        </a:solidFill>
+        <a:effectLst/>
+      </p:bgPr>
+    </p:bg>
+    <p:spTree>
+      <p:nvGrpSpPr>
+        <p:cNvPr id="1" name=""/>
+        <p:cNvGrpSpPr/>
+        <p:nvPr/>
+      </p:nvGrpSpPr>
+      <p:grpSpPr>
+        <a:xfrm>
+          <a:off x="0" y="0"/>
+          <a:ext cx="0" cy="0"/>
+          <a:chOff x="0" y="0"/>
+          <a:chExt cx="0" cy="0"/>
+        </a:xfrm>
+      </p:grpSpPr>
+      <p:sp>
+        <p:nvSpPr>
+          <p:cNvPr id="2" name="Titel 1"/>
+          <p:cNvSpPr>
+            <a:spLocks noGrp="1"/>
+          </p:cNvSpPr>
+          <p:nvPr>
+            <p:ph type="title"/>
+          </p:nvPr>
+        </p:nvSpPr>
+        <p:spPr/>
+        <p:txBody>
+          <a:bodyPr/>
+          <a:lstStyle/>
+          <a:p>
+            <a:endParaRPr lang="nl-BE"/>
+          </a:p>
+        </p:txBody>
+      </p:sp>
+      <p:sp>
+        <p:nvSpPr>
+          <p:cNvPr id="3" name="Tijdelijke aanduiding voor inhoud 2"/>
+          <p:cNvSpPr>
+            <a:spLocks noGrp="1"/>
+          </p:cNvSpPr>
+          <p:nvPr>
+            <p:ph idx="1"/>
+          </p:nvPr>
+        </p:nvSpPr>
+        <p:spPr/>
+        <p:txBody>
+          <a:bodyPr/>
+          <a:lstStyle/>
+          <a:p>
+            <a:endParaRPr lang="nl-BE"/>
+          </a:p>
+        </p:txBody>
+      </p:sp>
+    </p:spTree>
+    <p:extLst>
+      <p:ext uri="{BB962C8B-B14F-4D97-AF65-F5344CB8AC3E}">
+        <p14:creationId xmlns:p14="http://schemas.microsoft.com/office/powerpoint/2010/main" val="353185348"/>
+      </p:ext>
+    </p:extLst>
+  </p:cSld>
+  <p:clrMapOvr>
+    <a:masterClrMapping/>
+  </p:clrMapOvr>
+</p:sld>
+</file>
+
+<file path=ppt/slides/slide16.xml><?xml version="1.0" encoding="utf-8"?>
+<p:sld xmlns:a="http://schemas.openxmlformats.org/drawingml/2006/main" xmlns:r="http://schemas.openxmlformats.org/officeDocument/2006/relationships" xmlns:p="http://schemas.openxmlformats.org/presentationml/2006/main">
+  <p:cSld>
+    <p:spTree>
+      <p:nvGrpSpPr>
+        <p:cNvPr id="1" name=""/>
+        <p:cNvGrpSpPr/>
+        <p:nvPr/>
+      </p:nvGrpSpPr>
+      <p:grpSpPr>
+        <a:xfrm>
+          <a:off x="0" y="0"/>
+          <a:ext cx="0" cy="0"/>
+          <a:chOff x="0" y="0"/>
+          <a:chExt cx="0" cy="0"/>
+        </a:xfrm>
+      </p:grpSpPr>
+      <p:sp>
+        <p:nvSpPr>
+          <p:cNvPr id="2" name="Titel 1"/>
+          <p:cNvSpPr>
+            <a:spLocks noGrp="1"/>
+          </p:cNvSpPr>
+          <p:nvPr>
+            <p:ph type="title"/>
+          </p:nvPr>
+        </p:nvSpPr>
+        <p:spPr/>
+        <p:txBody>
+          <a:bodyPr>
+            <a:normAutofit/>
+          </a:bodyPr>
+          <a:lstStyle/>
+          <a:p>
+            <a:r>
+              <a:rPr lang="nl-BE" sz="3600" cap="small" dirty="0" smtClean="0">
+                <a:ln w="18415" cmpd="sng">
+                  <a:solidFill>
+                    <a:schemeClr val="tx1">
+                      <a:alpha val="0"/>
+                    </a:schemeClr>
+                  </a:solidFill>
+                  <a:prstDash val="solid"/>
+                </a:ln>
+                <a:effectLst>
+                  <a:outerShdw blurRad="25400" dir="3600000" algn="tl" rotWithShape="0">
+                    <a:srgbClr val="000000">
+                      <a:alpha val="70000"/>
+                    </a:srgbClr>
+                  </a:outerShdw>
+                </a:effectLst>
+                <a:latin typeface="Sitka Text" pitchFamily="2" charset="0"/>
+              </a:rPr>
+              <a:t>Project management (in uren)</a:t>
+            </a:r>
+            <a:endParaRPr lang="nl-BE" sz="3600" cap="small" dirty="0">
+              <a:ln w="18415" cmpd="sng">
+                <a:solidFill>
+                  <a:schemeClr val="tx1">
+                    <a:alpha val="0"/>
+                  </a:schemeClr>
+                </a:solidFill>
+                <a:prstDash val="solid"/>
+              </a:ln>
+              <a:effectLst>
+                <a:outerShdw blurRad="25400" dir="3600000" algn="tl" rotWithShape="0">
+                  <a:srgbClr val="000000">
+                    <a:alpha val="70000"/>
+                  </a:srgbClr>
+                </a:outerShdw>
+              </a:effectLst>
+              <a:latin typeface="Sitka Text" pitchFamily="2" charset="0"/>
+            </a:endParaRPr>
+          </a:p>
+        </p:txBody>
+      </p:sp>
+      <p:sp>
+        <p:nvSpPr>
+          <p:cNvPr id="3" name="Tijdelijke aanduiding voor inhoud 2"/>
+          <p:cNvSpPr>
+            <a:spLocks noGrp="1"/>
+          </p:cNvSpPr>
+          <p:nvPr>
+            <p:ph idx="1"/>
+          </p:nvPr>
+        </p:nvSpPr>
+        <p:spPr/>
+        <p:txBody>
+          <a:bodyPr>
+            <a:normAutofit/>
+          </a:bodyPr>
+          <a:lstStyle/>
+          <a:p>
+            <a:pPr marL="0" indent="0">
+              <a:buNone/>
+            </a:pPr>
+            <a:r>
+              <a:rPr lang="nl-BE" sz="2700" cap="small" dirty="0" smtClean="0">
+                <a:effectLst>
+                  <a:outerShdw blurRad="50800" dist="38100" dir="5400000" algn="t" rotWithShape="0">
+                    <a:prstClr val="black">
+                      <a:alpha val="40000"/>
+                    </a:prstClr>
+                  </a:outerShdw>
+                </a:effectLst>
+                <a:latin typeface="Sitka Text" pitchFamily="2" charset="0"/>
+              </a:rPr>
+              <a:t>Karina </a:t>
+            </a:r>
+            <a:r>
+              <a:rPr lang="nl-BE" sz="2700" cap="small" dirty="0" err="1" smtClean="0">
+                <a:effectLst>
+                  <a:outerShdw blurRad="50800" dist="38100" dir="5400000" algn="t" rotWithShape="0">
+                    <a:prstClr val="black">
+                      <a:alpha val="40000"/>
+                    </a:prstClr>
+                  </a:outerShdw>
+                </a:effectLst>
+                <a:latin typeface="Sitka Text" pitchFamily="2" charset="0"/>
+              </a:rPr>
+              <a:t>Karapetyan</a:t>
+            </a:r>
+            <a:endParaRPr lang="nl-BE" sz="2700" cap="small" dirty="0" smtClean="0">
+              <a:effectLst>
+                <a:outerShdw blurRad="50800" dist="38100" dir="5400000" algn="t" rotWithShape="0">
+                  <a:prstClr val="black">
+                    <a:alpha val="40000"/>
+                  </a:prstClr>
+                </a:outerShdw>
+              </a:effectLst>
+              <a:latin typeface="Sitka Text" pitchFamily="2" charset="0"/>
+            </a:endParaRPr>
+          </a:p>
+          <a:p>
+            <a:pPr marL="0" indent="0">
+              <a:buNone/>
+            </a:pPr>
+            <a:r>
+              <a:rPr lang="nl-BE" sz="2400" dirty="0" smtClean="0">
+                <a:solidFill>
+                  <a:schemeClr val="accent4">
+                    <a:lumMod val="50000"/>
+                  </a:schemeClr>
+                </a:solidFill>
+                <a:effectLst>
+                  <a:outerShdw blurRad="76200" dist="38100" dir="5400000" algn="t" rotWithShape="0">
+                    <a:prstClr val="black">
+                      <a:alpha val="27000"/>
+                    </a:prstClr>
+                  </a:outerShdw>
+                </a:effectLst>
+                <a:latin typeface="Sitka Banner" pitchFamily="2" charset="0"/>
+              </a:rPr>
+              <a:t>Group work: 33 	Individual Work: 22	Study: 7</a:t>
+            </a:r>
+            <a:endParaRPr lang="nl-BE" sz="2400" dirty="0">
+              <a:solidFill>
+                <a:schemeClr val="accent4">
+                  <a:lumMod val="50000"/>
+                </a:schemeClr>
+              </a:solidFill>
+              <a:effectLst>
+                <a:outerShdw blurRad="76200" dist="38100" dir="5400000" algn="t" rotWithShape="0">
+                  <a:prstClr val="black">
+                    <a:alpha val="27000"/>
+                  </a:prstClr>
+                </a:outerShdw>
+              </a:effectLst>
+              <a:latin typeface="Sitka Banner" pitchFamily="2" charset="0"/>
+            </a:endParaRPr>
+          </a:p>
+          <a:p>
+            <a:pPr marL="0" indent="0">
+              <a:buNone/>
+            </a:pPr>
+            <a:r>
+              <a:rPr lang="nl-BE" sz="2700" cap="small" dirty="0" smtClean="0">
+                <a:effectLst>
+                  <a:outerShdw blurRad="50800" dist="38100" dir="5400000" algn="t" rotWithShape="0">
+                    <a:prstClr val="black">
+                      <a:alpha val="40000"/>
+                    </a:prstClr>
+                  </a:outerShdw>
+                </a:effectLst>
+                <a:latin typeface="Sitka Text" pitchFamily="2" charset="0"/>
+              </a:rPr>
+              <a:t>Laurens </a:t>
+            </a:r>
+            <a:r>
+              <a:rPr lang="nl-BE" sz="2700" cap="small" dirty="0" err="1" smtClean="0">
+                <a:effectLst>
+                  <a:outerShdw blurRad="50800" dist="38100" dir="5400000" algn="t" rotWithShape="0">
+                    <a:prstClr val="black">
+                      <a:alpha val="40000"/>
+                    </a:prstClr>
+                  </a:outerShdw>
+                </a:effectLst>
+                <a:latin typeface="Sitka Text" pitchFamily="2" charset="0"/>
+              </a:rPr>
+              <a:t>Cleemput</a:t>
+            </a:r>
+            <a:endParaRPr lang="nl-BE" sz="2700" cap="small" dirty="0" smtClean="0">
+              <a:effectLst>
+                <a:outerShdw blurRad="50800" dist="38100" dir="5400000" algn="t" rotWithShape="0">
+                  <a:prstClr val="black">
+                    <a:alpha val="40000"/>
+                  </a:prstClr>
+                </a:outerShdw>
+              </a:effectLst>
+              <a:latin typeface="Sitka Text" pitchFamily="2" charset="0"/>
+            </a:endParaRPr>
+          </a:p>
+          <a:p>
+            <a:pPr marL="0" indent="0">
+              <a:buNone/>
+            </a:pPr>
+            <a:r>
+              <a:rPr lang="nl-BE" sz="2400" dirty="0" smtClean="0">
+                <a:solidFill>
+                  <a:schemeClr val="accent4">
+                    <a:lumMod val="50000"/>
+                  </a:schemeClr>
+                </a:solidFill>
+                <a:effectLst>
+                  <a:outerShdw blurRad="76200" dist="38100" dir="5400000" algn="t" rotWithShape="0">
+                    <a:prstClr val="black">
+                      <a:alpha val="27000"/>
+                    </a:prstClr>
+                  </a:outerShdw>
+                </a:effectLst>
+                <a:latin typeface="Sitka Banner" pitchFamily="2" charset="0"/>
+              </a:rPr>
+              <a:t>Group </a:t>
+            </a:r>
+            <a:r>
+              <a:rPr lang="nl-BE" sz="2400" dirty="0" err="1" smtClean="0">
+                <a:solidFill>
+                  <a:schemeClr val="accent4">
+                    <a:lumMod val="50000"/>
+                  </a:schemeClr>
+                </a:solidFill>
+                <a:effectLst>
+                  <a:outerShdw blurRad="76200" dist="38100" dir="5400000" algn="t" rotWithShape="0">
+                    <a:prstClr val="black">
+                      <a:alpha val="27000"/>
+                    </a:prstClr>
+                  </a:outerShdw>
+                </a:effectLst>
+                <a:latin typeface="Sitka Banner" pitchFamily="2" charset="0"/>
+              </a:rPr>
+              <a:t>work</a:t>
+            </a:r>
+            <a:r>
+              <a:rPr lang="nl-BE" sz="2400" dirty="0" smtClean="0">
+                <a:solidFill>
+                  <a:schemeClr val="accent4">
+                    <a:lumMod val="50000"/>
+                  </a:schemeClr>
+                </a:solidFill>
+                <a:effectLst>
+                  <a:outerShdw blurRad="76200" dist="38100" dir="5400000" algn="t" rotWithShape="0">
+                    <a:prstClr val="black">
+                      <a:alpha val="27000"/>
+                    </a:prstClr>
+                  </a:outerShdw>
+                </a:effectLst>
+                <a:latin typeface="Sitka Banner" pitchFamily="2" charset="0"/>
+              </a:rPr>
+              <a:t>: 33 	</a:t>
+            </a:r>
+            <a:r>
+              <a:rPr lang="nl-BE" sz="2400" dirty="0" err="1" smtClean="0">
+                <a:solidFill>
+                  <a:schemeClr val="accent4">
+                    <a:lumMod val="50000"/>
+                  </a:schemeClr>
+                </a:solidFill>
+                <a:effectLst>
+                  <a:outerShdw blurRad="76200" dist="38100" dir="5400000" algn="t" rotWithShape="0">
+                    <a:prstClr val="black">
+                      <a:alpha val="27000"/>
+                    </a:prstClr>
+                  </a:outerShdw>
+                </a:effectLst>
+                <a:latin typeface="Sitka Banner" pitchFamily="2" charset="0"/>
+              </a:rPr>
+              <a:t>Individual</a:t>
+            </a:r>
+            <a:r>
+              <a:rPr lang="nl-BE" sz="2400" dirty="0" smtClean="0">
+                <a:solidFill>
+                  <a:schemeClr val="accent4">
+                    <a:lumMod val="50000"/>
+                  </a:schemeClr>
+                </a:solidFill>
+                <a:effectLst>
+                  <a:outerShdw blurRad="76200" dist="38100" dir="5400000" algn="t" rotWithShape="0">
+                    <a:prstClr val="black">
+                      <a:alpha val="27000"/>
+                    </a:prstClr>
+                  </a:outerShdw>
+                </a:effectLst>
+                <a:latin typeface="Sitka Banner" pitchFamily="2" charset="0"/>
+              </a:rPr>
+              <a:t> </a:t>
+            </a:r>
+            <a:r>
+              <a:rPr lang="nl-BE" sz="2400" dirty="0" err="1" smtClean="0">
+                <a:solidFill>
+                  <a:schemeClr val="accent4">
+                    <a:lumMod val="50000"/>
+                  </a:schemeClr>
+                </a:solidFill>
+                <a:effectLst>
+                  <a:outerShdw blurRad="76200" dist="38100" dir="5400000" algn="t" rotWithShape="0">
+                    <a:prstClr val="black">
+                      <a:alpha val="27000"/>
+                    </a:prstClr>
+                  </a:outerShdw>
+                </a:effectLst>
+                <a:latin typeface="Sitka Banner" pitchFamily="2" charset="0"/>
+              </a:rPr>
+              <a:t>Work</a:t>
+            </a:r>
+            <a:r>
+              <a:rPr lang="nl-BE" sz="2400" dirty="0" smtClean="0">
+                <a:solidFill>
+                  <a:schemeClr val="accent4">
+                    <a:lumMod val="50000"/>
+                  </a:schemeClr>
+                </a:solidFill>
+                <a:effectLst>
+                  <a:outerShdw blurRad="76200" dist="38100" dir="5400000" algn="t" rotWithShape="0">
+                    <a:prstClr val="black">
+                      <a:alpha val="27000"/>
+                    </a:prstClr>
+                  </a:outerShdw>
+                </a:effectLst>
+                <a:latin typeface="Sitka Banner" pitchFamily="2" charset="0"/>
+              </a:rPr>
+              <a:t>: </a:t>
+            </a:r>
+            <a:r>
+              <a:rPr lang="nl-BE" sz="2400" dirty="0" smtClean="0">
+                <a:solidFill>
+                  <a:schemeClr val="accent4">
+                    <a:lumMod val="50000"/>
+                  </a:schemeClr>
+                </a:solidFill>
+                <a:effectLst>
+                  <a:outerShdw blurRad="76200" dist="38100" dir="5400000" algn="t" rotWithShape="0">
+                    <a:prstClr val="black">
+                      <a:alpha val="27000"/>
+                    </a:prstClr>
+                  </a:outerShdw>
+                </a:effectLst>
+                <a:latin typeface="Sitka Banner" pitchFamily="2" charset="0"/>
+              </a:rPr>
+              <a:t>19</a:t>
+            </a:r>
+            <a:r>
+              <a:rPr lang="nl-BE" sz="2400" dirty="0" smtClean="0">
+                <a:solidFill>
+                  <a:schemeClr val="accent4">
+                    <a:lumMod val="50000"/>
+                  </a:schemeClr>
+                </a:solidFill>
+                <a:effectLst>
+                  <a:outerShdw blurRad="76200" dist="38100" dir="5400000" algn="t" rotWithShape="0">
+                    <a:prstClr val="black">
+                      <a:alpha val="27000"/>
+                    </a:prstClr>
+                  </a:outerShdw>
+                </a:effectLst>
+                <a:latin typeface="Sitka Banner" pitchFamily="2" charset="0"/>
+              </a:rPr>
+              <a:t>	</a:t>
+            </a:r>
+            <a:r>
+              <a:rPr lang="nl-BE" sz="2400" dirty="0" err="1" smtClean="0">
+                <a:solidFill>
+                  <a:schemeClr val="accent4">
+                    <a:lumMod val="50000"/>
+                  </a:schemeClr>
+                </a:solidFill>
+                <a:effectLst>
+                  <a:outerShdw blurRad="76200" dist="38100" dir="5400000" algn="t" rotWithShape="0">
+                    <a:prstClr val="black">
+                      <a:alpha val="27000"/>
+                    </a:prstClr>
+                  </a:outerShdw>
+                </a:effectLst>
+                <a:latin typeface="Sitka Banner" pitchFamily="2" charset="0"/>
+              </a:rPr>
+              <a:t>Study</a:t>
+            </a:r>
+            <a:r>
+              <a:rPr lang="nl-BE" sz="2400" dirty="0" smtClean="0">
+                <a:solidFill>
+                  <a:schemeClr val="accent4">
+                    <a:lumMod val="50000"/>
+                  </a:schemeClr>
+                </a:solidFill>
+                <a:effectLst>
+                  <a:outerShdw blurRad="76200" dist="38100" dir="5400000" algn="t" rotWithShape="0">
+                    <a:prstClr val="black">
+                      <a:alpha val="27000"/>
+                    </a:prstClr>
+                  </a:outerShdw>
+                </a:effectLst>
+                <a:latin typeface="Sitka Banner" pitchFamily="2" charset="0"/>
+              </a:rPr>
+              <a:t>: 8</a:t>
+            </a:r>
+          </a:p>
+          <a:p>
+            <a:pPr marL="0" indent="0">
+              <a:buNone/>
+            </a:pPr>
+            <a:r>
+              <a:rPr lang="nl-BE" sz="2700" cap="small" dirty="0" smtClean="0">
+                <a:effectLst>
+                  <a:outerShdw blurRad="50800" dist="38100" dir="5400000" algn="t" rotWithShape="0">
+                    <a:prstClr val="black">
+                      <a:alpha val="40000"/>
+                    </a:prstClr>
+                  </a:outerShdw>
+                </a:effectLst>
+                <a:latin typeface="Sitka Text" pitchFamily="2" charset="0"/>
+              </a:rPr>
+              <a:t>Tom Houben</a:t>
+            </a:r>
+          </a:p>
+          <a:p>
+            <a:pPr marL="0" indent="0">
+              <a:buNone/>
+            </a:pPr>
+            <a:r>
+              <a:rPr lang="nl-BE" sz="2400" dirty="0" smtClean="0">
+                <a:solidFill>
+                  <a:schemeClr val="accent4">
+                    <a:lumMod val="50000"/>
+                  </a:schemeClr>
+                </a:solidFill>
+                <a:effectLst>
+                  <a:outerShdw blurRad="76200" dist="38100" dir="5400000" algn="t" rotWithShape="0">
+                    <a:prstClr val="black">
+                      <a:alpha val="27000"/>
+                    </a:prstClr>
+                  </a:outerShdw>
+                </a:effectLst>
+                <a:latin typeface="Sitka Banner" pitchFamily="2" charset="0"/>
+              </a:rPr>
+              <a:t>Group </a:t>
+            </a:r>
+            <a:r>
+              <a:rPr lang="nl-BE" sz="2400" dirty="0" err="1" smtClean="0">
+                <a:solidFill>
+                  <a:schemeClr val="accent4">
+                    <a:lumMod val="50000"/>
+                  </a:schemeClr>
+                </a:solidFill>
+                <a:effectLst>
+                  <a:outerShdw blurRad="76200" dist="38100" dir="5400000" algn="t" rotWithShape="0">
+                    <a:prstClr val="black">
+                      <a:alpha val="27000"/>
+                    </a:prstClr>
+                  </a:outerShdw>
+                </a:effectLst>
+                <a:latin typeface="Sitka Banner" pitchFamily="2" charset="0"/>
+              </a:rPr>
+              <a:t>work</a:t>
+            </a:r>
+            <a:r>
+              <a:rPr lang="nl-BE" sz="2400" dirty="0" smtClean="0">
+                <a:solidFill>
+                  <a:schemeClr val="accent4">
+                    <a:lumMod val="50000"/>
+                  </a:schemeClr>
+                </a:solidFill>
+                <a:effectLst>
+                  <a:outerShdw blurRad="76200" dist="38100" dir="5400000" algn="t" rotWithShape="0">
+                    <a:prstClr val="black">
+                      <a:alpha val="27000"/>
+                    </a:prstClr>
+                  </a:outerShdw>
+                </a:effectLst>
+                <a:latin typeface="Sitka Banner" pitchFamily="2" charset="0"/>
+              </a:rPr>
+              <a:t>:  33	</a:t>
+            </a:r>
+            <a:r>
+              <a:rPr lang="nl-BE" sz="2400" dirty="0" err="1" smtClean="0">
+                <a:solidFill>
+                  <a:schemeClr val="accent4">
+                    <a:lumMod val="50000"/>
+                  </a:schemeClr>
+                </a:solidFill>
+                <a:effectLst>
+                  <a:outerShdw blurRad="76200" dist="38100" dir="5400000" algn="t" rotWithShape="0">
+                    <a:prstClr val="black">
+                      <a:alpha val="27000"/>
+                    </a:prstClr>
+                  </a:outerShdw>
+                </a:effectLst>
+                <a:latin typeface="Sitka Banner" pitchFamily="2" charset="0"/>
+              </a:rPr>
+              <a:t>Individual</a:t>
+            </a:r>
+            <a:r>
+              <a:rPr lang="nl-BE" sz="2400" dirty="0" smtClean="0">
+                <a:solidFill>
+                  <a:schemeClr val="accent4">
+                    <a:lumMod val="50000"/>
+                  </a:schemeClr>
+                </a:solidFill>
+                <a:effectLst>
+                  <a:outerShdw blurRad="76200" dist="38100" dir="5400000" algn="t" rotWithShape="0">
+                    <a:prstClr val="black">
+                      <a:alpha val="27000"/>
+                    </a:prstClr>
+                  </a:outerShdw>
+                </a:effectLst>
+                <a:latin typeface="Sitka Banner" pitchFamily="2" charset="0"/>
+              </a:rPr>
+              <a:t> </a:t>
+            </a:r>
+            <a:r>
+              <a:rPr lang="nl-BE" sz="2400" dirty="0" err="1" smtClean="0">
+                <a:solidFill>
+                  <a:schemeClr val="accent4">
+                    <a:lumMod val="50000"/>
+                  </a:schemeClr>
+                </a:solidFill>
+                <a:effectLst>
+                  <a:outerShdw blurRad="76200" dist="38100" dir="5400000" algn="t" rotWithShape="0">
+                    <a:prstClr val="black">
+                      <a:alpha val="27000"/>
+                    </a:prstClr>
+                  </a:outerShdw>
+                </a:effectLst>
+                <a:latin typeface="Sitka Banner" pitchFamily="2" charset="0"/>
+              </a:rPr>
+              <a:t>Work</a:t>
+            </a:r>
+            <a:r>
+              <a:rPr lang="nl-BE" sz="2400" dirty="0" smtClean="0">
+                <a:solidFill>
+                  <a:schemeClr val="accent4">
+                    <a:lumMod val="50000"/>
+                  </a:schemeClr>
+                </a:solidFill>
+                <a:effectLst>
+                  <a:outerShdw blurRad="76200" dist="38100" dir="5400000" algn="t" rotWithShape="0">
+                    <a:prstClr val="black">
+                      <a:alpha val="27000"/>
+                    </a:prstClr>
+                  </a:outerShdw>
+                </a:effectLst>
+                <a:latin typeface="Sitka Banner" pitchFamily="2" charset="0"/>
+              </a:rPr>
+              <a:t>: 20	</a:t>
+            </a:r>
+            <a:r>
+              <a:rPr lang="nl-BE" sz="2400" dirty="0" err="1" smtClean="0">
+                <a:solidFill>
+                  <a:schemeClr val="accent4">
+                    <a:lumMod val="50000"/>
+                  </a:schemeClr>
+                </a:solidFill>
+                <a:effectLst>
+                  <a:outerShdw blurRad="76200" dist="38100" dir="5400000" algn="t" rotWithShape="0">
+                    <a:prstClr val="black">
+                      <a:alpha val="27000"/>
+                    </a:prstClr>
+                  </a:outerShdw>
+                </a:effectLst>
+                <a:latin typeface="Sitka Banner" pitchFamily="2" charset="0"/>
+              </a:rPr>
+              <a:t>Study</a:t>
+            </a:r>
+            <a:r>
+              <a:rPr lang="nl-BE" sz="2400" dirty="0" smtClean="0">
+                <a:solidFill>
+                  <a:schemeClr val="accent4">
+                    <a:lumMod val="50000"/>
+                  </a:schemeClr>
+                </a:solidFill>
+                <a:effectLst>
+                  <a:outerShdw blurRad="76200" dist="38100" dir="5400000" algn="t" rotWithShape="0">
+                    <a:prstClr val="black">
+                      <a:alpha val="27000"/>
+                    </a:prstClr>
+                  </a:outerShdw>
+                </a:effectLst>
+                <a:latin typeface="Sitka Banner" pitchFamily="2" charset="0"/>
+              </a:rPr>
+              <a:t>: 6</a:t>
+            </a:r>
+          </a:p>
+          <a:p>
+            <a:pPr marL="0" indent="0">
+              <a:buNone/>
+            </a:pPr>
+            <a:r>
+              <a:rPr lang="nl-BE" sz="2700" cap="small" dirty="0" smtClean="0">
+                <a:effectLst>
+                  <a:outerShdw blurRad="50800" dist="38100" dir="5400000" algn="t" rotWithShape="0">
+                    <a:prstClr val="black">
+                      <a:alpha val="40000"/>
+                    </a:prstClr>
+                  </a:outerShdw>
+                </a:effectLst>
+                <a:latin typeface="Sitka Text" pitchFamily="2" charset="0"/>
+              </a:rPr>
+              <a:t>Tri </a:t>
+            </a:r>
+            <a:r>
+              <a:rPr lang="nl-BE" sz="2700" cap="small" dirty="0" err="1" smtClean="0">
+                <a:effectLst>
+                  <a:outerShdw blurRad="50800" dist="38100" dir="5400000" algn="t" rotWithShape="0">
+                    <a:prstClr val="black">
+                      <a:alpha val="40000"/>
+                    </a:prstClr>
+                  </a:outerShdw>
+                </a:effectLst>
+                <a:latin typeface="Sitka Text" pitchFamily="2" charset="0"/>
+              </a:rPr>
+              <a:t>Tran</a:t>
+            </a:r>
+            <a:endParaRPr lang="nl-BE" sz="2700" cap="small" dirty="0" smtClean="0">
+              <a:effectLst>
+                <a:outerShdw blurRad="50800" dist="38100" dir="5400000" algn="t" rotWithShape="0">
+                  <a:prstClr val="black">
+                    <a:alpha val="40000"/>
+                  </a:prstClr>
+                </a:outerShdw>
+              </a:effectLst>
+              <a:latin typeface="Sitka Text" pitchFamily="2" charset="0"/>
+            </a:endParaRPr>
+          </a:p>
+          <a:p>
+            <a:pPr marL="0" indent="0">
+              <a:buNone/>
+            </a:pPr>
+            <a:r>
+              <a:rPr lang="nl-BE" sz="2400" dirty="0" smtClean="0">
+                <a:solidFill>
+                  <a:schemeClr val="accent4">
+                    <a:lumMod val="50000"/>
+                  </a:schemeClr>
+                </a:solidFill>
+                <a:effectLst>
+                  <a:outerShdw blurRad="76200" dist="38100" dir="5400000" algn="t" rotWithShape="0">
+                    <a:prstClr val="black">
+                      <a:alpha val="27000"/>
+                    </a:prstClr>
+                  </a:outerShdw>
+                </a:effectLst>
+                <a:latin typeface="Sitka Banner" pitchFamily="2" charset="0"/>
+              </a:rPr>
+              <a:t>Group </a:t>
+            </a:r>
+            <a:r>
+              <a:rPr lang="nl-BE" sz="2400" dirty="0" err="1" smtClean="0">
+                <a:solidFill>
+                  <a:schemeClr val="accent4">
+                    <a:lumMod val="50000"/>
+                  </a:schemeClr>
+                </a:solidFill>
+                <a:effectLst>
+                  <a:outerShdw blurRad="76200" dist="38100" dir="5400000" algn="t" rotWithShape="0">
+                    <a:prstClr val="black">
+                      <a:alpha val="27000"/>
+                    </a:prstClr>
+                  </a:outerShdw>
+                </a:effectLst>
+                <a:latin typeface="Sitka Banner" pitchFamily="2" charset="0"/>
+              </a:rPr>
+              <a:t>work</a:t>
+            </a:r>
+            <a:r>
+              <a:rPr lang="nl-BE" sz="2400" dirty="0" smtClean="0">
+                <a:solidFill>
+                  <a:schemeClr val="accent4">
+                    <a:lumMod val="50000"/>
+                  </a:schemeClr>
+                </a:solidFill>
+                <a:effectLst>
+                  <a:outerShdw blurRad="76200" dist="38100" dir="5400000" algn="t" rotWithShape="0">
+                    <a:prstClr val="black">
+                      <a:alpha val="27000"/>
+                    </a:prstClr>
+                  </a:outerShdw>
+                </a:effectLst>
+                <a:latin typeface="Sitka Banner" pitchFamily="2" charset="0"/>
+              </a:rPr>
+              <a:t>: 33 	</a:t>
+            </a:r>
+            <a:r>
+              <a:rPr lang="nl-BE" sz="2400" dirty="0" err="1" smtClean="0">
+                <a:solidFill>
+                  <a:schemeClr val="accent4">
+                    <a:lumMod val="50000"/>
+                  </a:schemeClr>
+                </a:solidFill>
+                <a:effectLst>
+                  <a:outerShdw blurRad="76200" dist="38100" dir="5400000" algn="t" rotWithShape="0">
+                    <a:prstClr val="black">
+                      <a:alpha val="27000"/>
+                    </a:prstClr>
+                  </a:outerShdw>
+                </a:effectLst>
+                <a:latin typeface="Sitka Banner" pitchFamily="2" charset="0"/>
+              </a:rPr>
+              <a:t>Individual</a:t>
+            </a:r>
+            <a:r>
+              <a:rPr lang="nl-BE" sz="2400" dirty="0" smtClean="0">
+                <a:solidFill>
+                  <a:schemeClr val="accent4">
+                    <a:lumMod val="50000"/>
+                  </a:schemeClr>
+                </a:solidFill>
+                <a:effectLst>
+                  <a:outerShdw blurRad="76200" dist="38100" dir="5400000" algn="t" rotWithShape="0">
+                    <a:prstClr val="black">
+                      <a:alpha val="27000"/>
+                    </a:prstClr>
+                  </a:outerShdw>
+                </a:effectLst>
+                <a:latin typeface="Sitka Banner" pitchFamily="2" charset="0"/>
+              </a:rPr>
+              <a:t> </a:t>
+            </a:r>
+            <a:r>
+              <a:rPr lang="nl-BE" sz="2400" dirty="0" err="1" smtClean="0">
+                <a:solidFill>
+                  <a:schemeClr val="accent4">
+                    <a:lumMod val="50000"/>
+                  </a:schemeClr>
+                </a:solidFill>
+                <a:effectLst>
+                  <a:outerShdw blurRad="76200" dist="38100" dir="5400000" algn="t" rotWithShape="0">
+                    <a:prstClr val="black">
+                      <a:alpha val="27000"/>
+                    </a:prstClr>
+                  </a:outerShdw>
+                </a:effectLst>
+                <a:latin typeface="Sitka Banner" pitchFamily="2" charset="0"/>
+              </a:rPr>
+              <a:t>Work</a:t>
+            </a:r>
+            <a:r>
+              <a:rPr lang="nl-BE" sz="2400" dirty="0" smtClean="0">
+                <a:solidFill>
+                  <a:schemeClr val="accent4">
+                    <a:lumMod val="50000"/>
+                  </a:schemeClr>
+                </a:solidFill>
+                <a:effectLst>
+                  <a:outerShdw blurRad="76200" dist="38100" dir="5400000" algn="t" rotWithShape="0">
+                    <a:prstClr val="black">
+                      <a:alpha val="27000"/>
+                    </a:prstClr>
+                  </a:outerShdw>
+                </a:effectLst>
+                <a:latin typeface="Sitka Banner" pitchFamily="2" charset="0"/>
+              </a:rPr>
+              <a:t>: 40	</a:t>
+            </a:r>
+            <a:r>
+              <a:rPr lang="nl-BE" sz="2400" dirty="0" err="1" smtClean="0">
+                <a:solidFill>
+                  <a:schemeClr val="accent4">
+                    <a:lumMod val="50000"/>
+                  </a:schemeClr>
+                </a:solidFill>
+                <a:effectLst>
+                  <a:outerShdw blurRad="76200" dist="38100" dir="5400000" algn="t" rotWithShape="0">
+                    <a:prstClr val="black">
+                      <a:alpha val="27000"/>
+                    </a:prstClr>
+                  </a:outerShdw>
+                </a:effectLst>
+                <a:latin typeface="Sitka Banner" pitchFamily="2" charset="0"/>
+              </a:rPr>
+              <a:t>Study</a:t>
+            </a:r>
+            <a:r>
+              <a:rPr lang="nl-BE" sz="2400" dirty="0" smtClean="0">
+                <a:solidFill>
+                  <a:schemeClr val="accent4">
+                    <a:lumMod val="50000"/>
+                  </a:schemeClr>
+                </a:solidFill>
+                <a:effectLst>
+                  <a:outerShdw blurRad="76200" dist="38100" dir="5400000" algn="t" rotWithShape="0">
+                    <a:prstClr val="black">
+                      <a:alpha val="27000"/>
+                    </a:prstClr>
+                  </a:outerShdw>
+                </a:effectLst>
+                <a:latin typeface="Sitka Banner" pitchFamily="2" charset="0"/>
+              </a:rPr>
+              <a:t>: 15</a:t>
+            </a:r>
+          </a:p>
+          <a:p>
+            <a:pPr marL="0" indent="0">
+              <a:buNone/>
+            </a:pPr>
+            <a:endParaRPr lang="nl-BE" b="1" dirty="0"/>
+          </a:p>
+        </p:txBody>
+      </p:sp>
+    </p:spTree>
+    <p:extLst>
+      <p:ext uri="{BB962C8B-B14F-4D97-AF65-F5344CB8AC3E}">
+        <p14:creationId xmlns:p14="http://schemas.microsoft.com/office/powerpoint/2010/main" val="1581702792"/>
       </p:ext>
     </p:extLst>
   </p:cSld>
@@ -3650,7 +5685,7 @@
           <a:noFill/>
           <a:extLst>
             <a:ext uri="{909E8E84-426E-40DD-AFC4-6F175D3DCCD1}">
-              <a14:hiddenFill xmlns:a14="http://schemas.microsoft.com/office/drawing/2010/main" xmlns="">
+              <a14:hiddenFill xmlns:a14="http://schemas.microsoft.com/office/drawing/2010/main">
                 <a:solidFill>
                   <a:srgbClr val="FFFFFF"/>
                 </a:solidFill>
@@ -3659,10 +5694,99 @@
           </a:extLst>
         </p:spPr>
       </p:pic>
+      <p:sp>
+        <p:nvSpPr>
+          <p:cNvPr id="3" name="Tekstvak 2"/>
+          <p:cNvSpPr txBox="1"/>
+          <p:nvPr/>
+        </p:nvSpPr>
+        <p:spPr>
+          <a:xfrm>
+            <a:off x="5250775" y="2550383"/>
+            <a:ext cx="3497689" cy="2246769"/>
+          </a:xfrm>
+          <a:prstGeom prst="rect">
+            <a:avLst/>
+          </a:prstGeom>
+          <a:noFill/>
+        </p:spPr>
+        <p:txBody>
+          <a:bodyPr wrap="none" rtlCol="0">
+            <a:spAutoFit/>
+          </a:bodyPr>
+          <a:lstStyle/>
+          <a:p>
+            <a:pPr marL="285750" indent="-285750">
+              <a:buFont typeface="Arial" panose="020B0604020202020204" pitchFamily="34" charset="0"/>
+              <a:buChar char="•"/>
+            </a:pPr>
+            <a:r>
+              <a:rPr lang="nl-BE" sz="2000" dirty="0" err="1" smtClean="0"/>
+              <a:t>Main</a:t>
+            </a:r>
+            <a:r>
+              <a:rPr lang="nl-BE" sz="2000" dirty="0" smtClean="0"/>
+              <a:t>/UI laag</a:t>
+            </a:r>
+          </a:p>
+          <a:p>
+            <a:pPr marL="285750" indent="-285750">
+              <a:buFont typeface="Arial" panose="020B0604020202020204" pitchFamily="34" charset="0"/>
+              <a:buChar char="•"/>
+            </a:pPr>
+            <a:r>
+              <a:rPr lang="nl-BE" sz="2000" dirty="0" smtClean="0"/>
+              <a:t>Controller laag</a:t>
+            </a:r>
+          </a:p>
+          <a:p>
+            <a:pPr marL="285750" indent="-285750">
+              <a:buFont typeface="Arial" panose="020B0604020202020204" pitchFamily="34" charset="0"/>
+              <a:buChar char="•"/>
+            </a:pPr>
+            <a:r>
+              <a:rPr lang="nl-BE" sz="2000" dirty="0" smtClean="0"/>
+              <a:t>Service laag</a:t>
+            </a:r>
+          </a:p>
+          <a:p>
+            <a:pPr marL="285750" indent="-285750">
+              <a:buFont typeface="Arial" panose="020B0604020202020204" pitchFamily="34" charset="0"/>
+              <a:buChar char="•"/>
+            </a:pPr>
+            <a:r>
+              <a:rPr lang="nl-BE" sz="2000" dirty="0" err="1" smtClean="0"/>
+              <a:t>Domeinlaag</a:t>
+            </a:r>
+            <a:endParaRPr lang="nl-BE" sz="2000" dirty="0" smtClean="0"/>
+          </a:p>
+          <a:p>
+            <a:endParaRPr lang="nl-BE" sz="2000" dirty="0"/>
+          </a:p>
+          <a:p>
+            <a:r>
+              <a:rPr lang="nl-BE" sz="2000" b="1" dirty="0" smtClean="0"/>
+              <a:t>Geen directe verbinding tussen</a:t>
+            </a:r>
+            <a:br>
+              <a:rPr lang="nl-BE" sz="2000" b="1" dirty="0" smtClean="0"/>
+            </a:br>
+            <a:r>
+              <a:rPr lang="nl-BE" sz="2000" b="1" dirty="0" smtClean="0"/>
+              <a:t>UI en </a:t>
+            </a:r>
+            <a:r>
+              <a:rPr lang="nl-BE" sz="2000" b="1" dirty="0" err="1" smtClean="0"/>
+              <a:t>Domeinlaag</a:t>
+            </a:r>
+            <a:endParaRPr lang="nl-BE" sz="2000" b="1" dirty="0"/>
+          </a:p>
+        </p:txBody>
+      </p:sp>
     </p:spTree>
     <p:extLst>
       <p:ext uri="{BB962C8B-B14F-4D97-AF65-F5344CB8AC3E}">
-        <p14:creationId xmlns:p14="http://schemas.microsoft.com/office/powerpoint/2010/main" xmlns="" val="439526893"/>
+        <p14:creationId xmlns:p14="http://schemas.microsoft.com/office/powerpoint/2010/main" val="439526893"/>
       </p:ext>
     </p:extLst>
   </p:cSld>
@@ -3706,7 +5830,12 @@
             <p:ph type="title"/>
           </p:nvPr>
         </p:nvSpPr>
-        <p:spPr/>
+        <p:spPr>
+          <a:xfrm>
+            <a:off x="457200" y="-27384"/>
+            <a:ext cx="8229600" cy="1143000"/>
+          </a:xfrm>
+        </p:spPr>
         <p:txBody>
           <a:bodyPr>
             <a:normAutofit/>
@@ -3732,70 +5861,7 @@
                 </a:effectLst>
                 <a:latin typeface="Sitka Text" pitchFamily="2" charset="0"/>
               </a:rPr>
-              <a:t>More </a:t>
-            </a:r>
-            <a:r>
-              <a:rPr lang="nl-BE" sz="3600" cap="small" dirty="0" err="1" smtClean="0">
-                <a:ln w="18415" cmpd="sng">
-                  <a:solidFill>
-                    <a:schemeClr val="tx1">
-                      <a:alpha val="0"/>
-                    </a:schemeClr>
-                  </a:solidFill>
-                  <a:prstDash val="solid"/>
-                </a:ln>
-                <a:effectLst>
-                  <a:outerShdw blurRad="25400" dir="3600000" algn="tl" rotWithShape="0">
-                    <a:srgbClr val="000000">
-                      <a:alpha val="70000"/>
-                    </a:srgbClr>
-                  </a:outerShdw>
-                </a:effectLst>
-                <a:latin typeface="Sitka Text" pitchFamily="2" charset="0"/>
-              </a:rPr>
-              <a:t>detailed</a:t>
-            </a:r>
-            <a:r>
-              <a:rPr lang="nl-BE" sz="3600" cap="small" dirty="0" smtClean="0">
-                <a:ln w="18415" cmpd="sng">
-                  <a:solidFill>
-                    <a:schemeClr val="tx1">
-                      <a:alpha val="0"/>
-                    </a:schemeClr>
-                  </a:solidFill>
-                  <a:prstDash val="solid"/>
-                </a:ln>
-                <a:effectLst>
-                  <a:outerShdw blurRad="25400" dir="3600000" algn="tl" rotWithShape="0">
-                    <a:srgbClr val="000000">
-                      <a:alpha val="70000"/>
-                    </a:srgbClr>
-                  </a:outerShdw>
-                </a:effectLst>
-                <a:latin typeface="Sitka Text" pitchFamily="2" charset="0"/>
-              </a:rPr>
-              <a:t> </a:t>
-            </a:r>
-            <a:r>
-              <a:rPr lang="nl-BE" sz="3600" cap="small" dirty="0" err="1" smtClean="0">
-                <a:ln w="18415" cmpd="sng">
-                  <a:solidFill>
-                    <a:schemeClr val="tx1">
-                      <a:alpha val="0"/>
-                    </a:schemeClr>
-                  </a:solidFill>
-                  <a:prstDash val="solid"/>
-                </a:ln>
-                <a:effectLst>
-                  <a:outerShdw blurRad="25400" dir="3600000" algn="tl" rotWithShape="0">
-                    <a:srgbClr val="000000">
-                      <a:alpha val="70000"/>
-                    </a:srgbClr>
-                  </a:outerShdw>
-                </a:effectLst>
-                <a:latin typeface="Sitka Text" pitchFamily="2" charset="0"/>
-              </a:rPr>
-              <a:t>parts</a:t>
+              <a:t>High Level Design</a:t>
             </a:r>
             <a:endParaRPr lang="nl-BE" sz="3600" cap="small" dirty="0">
               <a:ln w="18415" cmpd="sng">
@@ -3818,29 +5884,136 @@
           </a:p>
         </p:txBody>
       </p:sp>
-      <p:sp>
-        <p:nvSpPr>
-          <p:cNvPr id="3" name="Tijdelijke aanduiding voor inhoud 2"/>
-          <p:cNvSpPr>
-            <a:spLocks noGrp="1"/>
-          </p:cNvSpPr>
-          <p:nvPr>
-            <p:ph idx="1"/>
-          </p:nvPr>
-        </p:nvSpPr>
-        <p:spPr/>
-        <p:txBody>
-          <a:bodyPr/>
+      <p:pic>
+        <p:nvPicPr>
+          <p:cNvPr id="1026" name="Picture 2" descr="C:\Users\Laurens\Documents\IntelliJ Projects\SWOP2016\presentatie\Diagram Images\UML Global Design.png"/>
+          <p:cNvPicPr>
+            <a:picLocks noChangeAspect="1" noChangeArrowheads="1"/>
+          </p:cNvPicPr>
+          <p:nvPr/>
+        </p:nvPicPr>
+        <p:blipFill>
+          <a:blip r:embed="rId2" cstate="print">
+            <a:clrChange>
+              <a:clrFrom>
+                <a:srgbClr val="FFFFFF"/>
+              </a:clrFrom>
+              <a:clrTo>
+                <a:srgbClr val="FFFFFF">
+                  <a:alpha val="0"/>
+                </a:srgbClr>
+              </a:clrTo>
+            </a:clrChange>
+          </a:blip>
+          <a:stretch>
+            <a:fillRect/>
+          </a:stretch>
+        </p:blipFill>
+        <p:spPr bwMode="auto">
+          <a:xfrm>
+            <a:off x="68262" y="1053227"/>
+            <a:ext cx="9075738" cy="5618767"/>
+          </a:xfrm>
+          <a:prstGeom prst="rect">
+            <a:avLst/>
+          </a:prstGeom>
+          <a:noFill/>
+          <a:extLst>
+            <a:ext uri="{909E8E84-426E-40DD-AFC4-6F175D3DCCD1}">
+              <a14:hiddenFill xmlns:a14="http://schemas.microsoft.com/office/drawing/2010/main">
+                <a:solidFill>
+                  <a:srgbClr val="FFFFFF"/>
+                </a:solidFill>
+              </a14:hiddenFill>
+            </a:ext>
+          </a:extLst>
+        </p:spPr>
+      </p:pic>
+      <p:sp>
+        <p:nvSpPr>
+          <p:cNvPr id="6" name="Tekstvak 5"/>
+          <p:cNvSpPr txBox="1"/>
+          <p:nvPr/>
+        </p:nvSpPr>
+        <p:spPr>
+          <a:xfrm>
+            <a:off x="4932040" y="2550383"/>
+            <a:ext cx="4091826" cy="2446824"/>
+          </a:xfrm>
+          <a:prstGeom prst="rect">
+            <a:avLst/>
+          </a:prstGeom>
+          <a:noFill/>
+        </p:spPr>
+        <p:txBody>
+          <a:bodyPr wrap="none" rtlCol="0">
+            <a:spAutoFit/>
+          </a:bodyPr>
           <a:lstStyle/>
           <a:p>
-            <a:endParaRPr lang="nl-BE"/>
+            <a:r>
+              <a:rPr lang="nl-BE" sz="2000" b="1" dirty="0" smtClean="0"/>
+              <a:t>GRASP</a:t>
+            </a:r>
+          </a:p>
+          <a:p>
+            <a:r>
+              <a:rPr lang="nl-BE" sz="1900" dirty="0" smtClean="0"/>
+              <a:t>Gelaagde structuur </a:t>
+            </a:r>
+            <a:r>
+              <a:rPr lang="nl-BE" sz="1900" dirty="0" smtClean="0">
+                <a:sym typeface="Wingdings" panose="05000000000000000000" pitchFamily="2" charset="2"/>
+              </a:rPr>
+              <a:t> lage koppeling</a:t>
+            </a:r>
+          </a:p>
+          <a:p>
+            <a:endParaRPr lang="nl-BE" sz="1900" dirty="0" smtClean="0">
+              <a:sym typeface="Wingdings" panose="05000000000000000000" pitchFamily="2" charset="2"/>
+            </a:endParaRPr>
+          </a:p>
+          <a:p>
+            <a:r>
+              <a:rPr lang="nl-BE" sz="1900" dirty="0" smtClean="0">
+                <a:sym typeface="Wingdings" panose="05000000000000000000" pitchFamily="2" charset="2"/>
+              </a:rPr>
+              <a:t>Bovenste lagen zijn information experts</a:t>
+            </a:r>
+          </a:p>
+          <a:p>
+            <a:endParaRPr lang="nl-BE" sz="1900" dirty="0">
+              <a:sym typeface="Wingdings" panose="05000000000000000000" pitchFamily="2" charset="2"/>
+            </a:endParaRPr>
+          </a:p>
+          <a:p>
+            <a:r>
+              <a:rPr lang="nl-BE" sz="1900" dirty="0" smtClean="0">
+                <a:sym typeface="Wingdings" panose="05000000000000000000" pitchFamily="2" charset="2"/>
+              </a:rPr>
+              <a:t>Bovenste lagen gebruiken methoden</a:t>
+            </a:r>
+            <a:br>
+              <a:rPr lang="nl-BE" sz="1900" dirty="0" smtClean="0">
+                <a:sym typeface="Wingdings" panose="05000000000000000000" pitchFamily="2" charset="2"/>
+              </a:rPr>
+            </a:br>
+            <a:r>
+              <a:rPr lang="nl-BE" sz="1900" dirty="0" smtClean="0">
+                <a:sym typeface="Wingdings" panose="05000000000000000000" pitchFamily="2" charset="2"/>
+              </a:rPr>
+              <a:t>aangeboden door lagere lagen</a:t>
+            </a:r>
+          </a:p>
+          <a:p>
+            <a:endParaRPr lang="nl-BE" sz="1900" dirty="0"/>
           </a:p>
         </p:txBody>
       </p:sp>
     </p:spTree>
     <p:extLst>
       <p:ext uri="{BB962C8B-B14F-4D97-AF65-F5344CB8AC3E}">
-        <p14:creationId xmlns:p14="http://schemas.microsoft.com/office/powerpoint/2010/main" xmlns="" val="983478496"/>
+        <p14:creationId xmlns:p14="http://schemas.microsoft.com/office/powerpoint/2010/main" val="3969713707"/>
       </p:ext>
     </p:extLst>
   </p:cSld>
@@ -3884,34 +6057,18 @@
             <p:ph type="title"/>
           </p:nvPr>
         </p:nvSpPr>
-        <p:spPr/>
+        <p:spPr>
+          <a:xfrm>
+            <a:off x="457200" y="-27384"/>
+            <a:ext cx="8229600" cy="1143000"/>
+          </a:xfrm>
+        </p:spPr>
         <p:txBody>
           <a:bodyPr>
             <a:normAutofit/>
           </a:bodyPr>
           <a:lstStyle/>
           <a:p>
-            <a:r>
-              <a:rPr lang="nl-BE" sz="3600" cap="small" dirty="0" err="1" smtClean="0">
-                <a:ln w="18415" cmpd="sng">
-                  <a:solidFill>
-                    <a:schemeClr val="tx1">
-                      <a:alpha val="0"/>
-                    </a:schemeClr>
-                  </a:solidFill>
-                  <a:prstDash val="solid"/>
-                </a:ln>
-                <a:effectLst>
-                  <a:outerShdw blurRad="25400" dir="3600000" algn="tl" rotWithShape="0">
-                    <a:srgbClr val="000000">
-                      <a:alpha val="70000"/>
-                    </a:srgbClr>
-                  </a:outerShdw>
-                </a:effectLst>
-                <a:latin typeface="Sitka Text" pitchFamily="2" charset="0"/>
-              </a:rPr>
-              <a:t>Extensibility</a:t>
-            </a:r>
             <a:r>
               <a:rPr lang="nl-BE" sz="3600" cap="small" dirty="0" smtClean="0">
                 <a:ln w="18415" cmpd="sng">
@@ -3931,7 +6088,7 @@
                 </a:effectLst>
                 <a:latin typeface="Sitka Text" pitchFamily="2" charset="0"/>
               </a:rPr>
-              <a:t> of system</a:t>
+              <a:t>High Level Design</a:t>
             </a:r>
             <a:endParaRPr lang="nl-BE" sz="3600" cap="small" dirty="0">
               <a:ln w="18415" cmpd="sng">
@@ -3954,29 +6111,142 @@
           </a:p>
         </p:txBody>
       </p:sp>
-      <p:sp>
-        <p:nvSpPr>
-          <p:cNvPr id="3" name="Tijdelijke aanduiding voor inhoud 2"/>
-          <p:cNvSpPr>
-            <a:spLocks noGrp="1"/>
-          </p:cNvSpPr>
-          <p:nvPr>
-            <p:ph idx="1"/>
-          </p:nvPr>
-        </p:nvSpPr>
-        <p:spPr/>
-        <p:txBody>
-          <a:bodyPr/>
+      <p:pic>
+        <p:nvPicPr>
+          <p:cNvPr id="1026" name="Picture 2" descr="C:\Users\Laurens\Documents\IntelliJ Projects\SWOP2016\presentatie\Diagram Images\UML Global Design.png"/>
+          <p:cNvPicPr>
+            <a:picLocks noChangeAspect="1" noChangeArrowheads="1"/>
+          </p:cNvPicPr>
+          <p:nvPr/>
+        </p:nvPicPr>
+        <p:blipFill>
+          <a:blip r:embed="rId2" cstate="print">
+            <a:clrChange>
+              <a:clrFrom>
+                <a:srgbClr val="FFFFFF"/>
+              </a:clrFrom>
+              <a:clrTo>
+                <a:srgbClr val="FFFFFF">
+                  <a:alpha val="0"/>
+                </a:srgbClr>
+              </a:clrTo>
+            </a:clrChange>
+          </a:blip>
+          <a:stretch>
+            <a:fillRect/>
+          </a:stretch>
+        </p:blipFill>
+        <p:spPr bwMode="auto">
+          <a:xfrm>
+            <a:off x="68262" y="1053227"/>
+            <a:ext cx="9075738" cy="5618767"/>
+          </a:xfrm>
+          <a:prstGeom prst="rect">
+            <a:avLst/>
+          </a:prstGeom>
+          <a:noFill/>
+          <a:extLst>
+            <a:ext uri="{909E8E84-426E-40DD-AFC4-6F175D3DCCD1}">
+              <a14:hiddenFill xmlns:a14="http://schemas.microsoft.com/office/drawing/2010/main">
+                <a:solidFill>
+                  <a:srgbClr val="FFFFFF"/>
+                </a:solidFill>
+              </a14:hiddenFill>
+            </a:ext>
+          </a:extLst>
+        </p:spPr>
+      </p:pic>
+      <p:sp>
+        <p:nvSpPr>
+          <p:cNvPr id="6" name="Tekstvak 5"/>
+          <p:cNvSpPr txBox="1"/>
+          <p:nvPr/>
+        </p:nvSpPr>
+        <p:spPr>
+          <a:xfrm>
+            <a:off x="4932040" y="2550383"/>
+            <a:ext cx="3995196" cy="2446824"/>
+          </a:xfrm>
+          <a:prstGeom prst="rect">
+            <a:avLst/>
+          </a:prstGeom>
+          <a:noFill/>
+        </p:spPr>
+        <p:txBody>
+          <a:bodyPr wrap="none" rtlCol="0">
+            <a:spAutoFit/>
+          </a:bodyPr>
           <a:lstStyle/>
           <a:p>
-            <a:endParaRPr lang="nl-BE" dirty="0"/>
+            <a:r>
+              <a:rPr lang="nl-BE" sz="2000" b="1" dirty="0" smtClean="0"/>
+              <a:t>Initialisatie</a:t>
+            </a:r>
+          </a:p>
+          <a:p>
+            <a:r>
+              <a:rPr lang="nl-BE" sz="1900" dirty="0" smtClean="0"/>
+              <a:t>Logincontroller om user in te loggen</a:t>
+            </a:r>
+          </a:p>
+          <a:p>
+            <a:r>
+              <a:rPr lang="nl-BE" sz="1900" dirty="0"/>
+              <a:t> </a:t>
+            </a:r>
+            <a:r>
+              <a:rPr lang="nl-BE" sz="1900" dirty="0" smtClean="0"/>
+              <a:t>   </a:t>
+            </a:r>
+            <a:r>
+              <a:rPr lang="nl-BE" sz="1900" dirty="0" smtClean="0">
+                <a:sym typeface="Wingdings" panose="05000000000000000000" pitchFamily="2" charset="2"/>
+              </a:rPr>
+              <a:t> gepaste usercontroller aanmaken</a:t>
+            </a:r>
+          </a:p>
+          <a:p>
+            <a:endParaRPr lang="nl-BE" sz="1900" dirty="0">
+              <a:sym typeface="Wingdings" panose="05000000000000000000" pitchFamily="2" charset="2"/>
+            </a:endParaRPr>
+          </a:p>
+          <a:p>
+            <a:r>
+              <a:rPr lang="nl-BE" sz="1900" dirty="0" smtClean="0">
+                <a:sym typeface="Wingdings" panose="05000000000000000000" pitchFamily="2" charset="2"/>
+              </a:rPr>
+              <a:t>Type usercontroller per soort user</a:t>
+            </a:r>
+          </a:p>
+          <a:p>
+            <a:r>
+              <a:rPr lang="nl-BE" sz="1900" dirty="0">
+                <a:sym typeface="Wingdings" panose="05000000000000000000" pitchFamily="2" charset="2"/>
+              </a:rPr>
+              <a:t> </a:t>
+            </a:r>
+            <a:r>
+              <a:rPr lang="nl-BE" sz="1900" dirty="0" smtClean="0">
+                <a:sym typeface="Wingdings" panose="05000000000000000000" pitchFamily="2" charset="2"/>
+              </a:rPr>
+              <a:t>     rechten beheren</a:t>
+            </a:r>
+            <a:endParaRPr lang="nl-BE" sz="1900" dirty="0" smtClean="0"/>
+          </a:p>
+          <a:p>
+            <a:endParaRPr lang="nl-BE" sz="1900" dirty="0" smtClean="0">
+              <a:sym typeface="Wingdings" panose="05000000000000000000" pitchFamily="2" charset="2"/>
+            </a:endParaRPr>
+          </a:p>
+          <a:p>
+            <a:endParaRPr lang="nl-BE" sz="1900" dirty="0"/>
           </a:p>
         </p:txBody>
       </p:sp>
     </p:spTree>
     <p:extLst>
       <p:ext uri="{BB962C8B-B14F-4D97-AF65-F5344CB8AC3E}">
-        <p14:creationId xmlns:p14="http://schemas.microsoft.com/office/powerpoint/2010/main" xmlns="" val="2444210159"/>
+        <p14:creationId xmlns:p14="http://schemas.microsoft.com/office/powerpoint/2010/main" val="3380860586"/>
       </p:ext>
     </p:extLst>
   </p:cSld>
@@ -4020,34 +6290,18 @@
             <p:ph type="title"/>
           </p:nvPr>
         </p:nvSpPr>
-        <p:spPr/>
+        <p:spPr>
+          <a:xfrm>
+            <a:off x="457200" y="-27384"/>
+            <a:ext cx="8229600" cy="1143000"/>
+          </a:xfrm>
+        </p:spPr>
         <p:txBody>
           <a:bodyPr>
             <a:normAutofit/>
           </a:bodyPr>
           <a:lstStyle/>
           <a:p>
-            <a:r>
-              <a:rPr lang="nl-BE" sz="3600" cap="small" dirty="0" err="1" smtClean="0">
-                <a:ln w="18415" cmpd="sng">
-                  <a:solidFill>
-                    <a:schemeClr val="tx1">
-                      <a:alpha val="0"/>
-                    </a:schemeClr>
-                  </a:solidFill>
-                  <a:prstDash val="solid"/>
-                </a:ln>
-                <a:effectLst>
-                  <a:outerShdw blurRad="25400" dir="3600000" algn="tl" rotWithShape="0">
-                    <a:srgbClr val="000000">
-                      <a:alpha val="70000"/>
-                    </a:srgbClr>
-                  </a:outerShdw>
-                </a:effectLst>
-                <a:latin typeface="Sitka Text" pitchFamily="2" charset="0"/>
-              </a:rPr>
-              <a:t>Testing</a:t>
-            </a:r>
             <a:r>
               <a:rPr lang="nl-BE" sz="3600" cap="small" dirty="0" smtClean="0">
                 <a:ln w="18415" cmpd="sng">
@@ -4067,7 +6321,7 @@
                 </a:effectLst>
                 <a:latin typeface="Sitka Text" pitchFamily="2" charset="0"/>
               </a:rPr>
-              <a:t> approach</a:t>
+              <a:t>High Level Design</a:t>
             </a:r>
             <a:endParaRPr lang="nl-BE" sz="3600" cap="small" dirty="0">
               <a:ln w="18415" cmpd="sng">
@@ -4090,29 +6344,165 @@
           </a:p>
         </p:txBody>
       </p:sp>
-      <p:sp>
-        <p:nvSpPr>
-          <p:cNvPr id="3" name="Tijdelijke aanduiding voor inhoud 2"/>
-          <p:cNvSpPr>
-            <a:spLocks noGrp="1"/>
-          </p:cNvSpPr>
-          <p:nvPr>
-            <p:ph idx="1"/>
-          </p:nvPr>
-        </p:nvSpPr>
-        <p:spPr/>
-        <p:txBody>
-          <a:bodyPr/>
+      <p:pic>
+        <p:nvPicPr>
+          <p:cNvPr id="1026" name="Picture 2" descr="C:\Users\Laurens\Documents\IntelliJ Projects\SWOP2016\presentatie\Diagram Images\UML Global Design.png"/>
+          <p:cNvPicPr>
+            <a:picLocks noChangeAspect="1" noChangeArrowheads="1"/>
+          </p:cNvPicPr>
+          <p:nvPr/>
+        </p:nvPicPr>
+        <p:blipFill>
+          <a:blip r:embed="rId2" cstate="print">
+            <a:clrChange>
+              <a:clrFrom>
+                <a:srgbClr val="FFFFFF"/>
+              </a:clrFrom>
+              <a:clrTo>
+                <a:srgbClr val="FFFFFF">
+                  <a:alpha val="0"/>
+                </a:srgbClr>
+              </a:clrTo>
+            </a:clrChange>
+          </a:blip>
+          <a:stretch>
+            <a:fillRect/>
+          </a:stretch>
+        </p:blipFill>
+        <p:spPr bwMode="auto">
+          <a:xfrm>
+            <a:off x="68262" y="1053227"/>
+            <a:ext cx="9075738" cy="5618767"/>
+          </a:xfrm>
+          <a:prstGeom prst="rect">
+            <a:avLst/>
+          </a:prstGeom>
+          <a:noFill/>
+          <a:extLst>
+            <a:ext uri="{909E8E84-426E-40DD-AFC4-6F175D3DCCD1}">
+              <a14:hiddenFill xmlns:a14="http://schemas.microsoft.com/office/drawing/2010/main">
+                <a:solidFill>
+                  <a:srgbClr val="FFFFFF"/>
+                </a:solidFill>
+              </a14:hiddenFill>
+            </a:ext>
+          </a:extLst>
+        </p:spPr>
+      </p:pic>
+      <p:sp>
+        <p:nvSpPr>
+          <p:cNvPr id="6" name="Tekstvak 5"/>
+          <p:cNvSpPr txBox="1"/>
+          <p:nvPr/>
+        </p:nvSpPr>
+        <p:spPr>
+          <a:xfrm>
+            <a:off x="4932040" y="2550383"/>
+            <a:ext cx="3998980" cy="2446824"/>
+          </a:xfrm>
+          <a:prstGeom prst="rect">
+            <a:avLst/>
+          </a:prstGeom>
+          <a:noFill/>
+        </p:spPr>
+        <p:txBody>
+          <a:bodyPr wrap="none" rtlCol="0">
+            <a:spAutoFit/>
+          </a:bodyPr>
           <a:lstStyle/>
           <a:p>
-            <a:endParaRPr lang="nl-BE"/>
+            <a:r>
+              <a:rPr lang="nl-BE" sz="2000" b="1" dirty="0" smtClean="0"/>
+              <a:t>Services</a:t>
+            </a:r>
+          </a:p>
+          <a:p>
+            <a:r>
+              <a:rPr lang="nl-BE" sz="1900" dirty="0" smtClean="0">
+                <a:sym typeface="Wingdings" panose="05000000000000000000" pitchFamily="2" charset="2"/>
+              </a:rPr>
+              <a:t>Behandelen </a:t>
+            </a:r>
+            <a:r>
+              <a:rPr lang="nl-BE" sz="1900" dirty="0" err="1" smtClean="0">
+                <a:sym typeface="Wingdings" panose="05000000000000000000" pitchFamily="2" charset="2"/>
+              </a:rPr>
+              <a:t>informatierequests</a:t>
+            </a:r>
+            <a:r>
+              <a:rPr lang="nl-BE" sz="1900" dirty="0" smtClean="0">
+                <a:sym typeface="Wingdings" panose="05000000000000000000" pitchFamily="2" charset="2"/>
+              </a:rPr>
+              <a:t> waar</a:t>
+            </a:r>
+            <a:br>
+              <a:rPr lang="nl-BE" sz="1900" dirty="0" smtClean="0">
+                <a:sym typeface="Wingdings" panose="05000000000000000000" pitchFamily="2" charset="2"/>
+              </a:rPr>
+            </a:br>
+            <a:r>
+              <a:rPr lang="nl-BE" sz="1900" dirty="0" smtClean="0">
+                <a:sym typeface="Wingdings" panose="05000000000000000000" pitchFamily="2" charset="2"/>
+              </a:rPr>
+              <a:t>meerdere </a:t>
+            </a:r>
+            <a:r>
+              <a:rPr lang="nl-BE" sz="1900" dirty="0">
+                <a:sym typeface="Wingdings" panose="05000000000000000000" pitchFamily="2" charset="2"/>
+              </a:rPr>
+              <a:t>c</a:t>
+            </a:r>
+            <a:r>
+              <a:rPr lang="nl-BE" sz="1900" dirty="0" smtClean="0">
+                <a:sym typeface="Wingdings" panose="05000000000000000000" pitchFamily="2" charset="2"/>
+              </a:rPr>
+              <a:t>lasses bij betrokken zijn</a:t>
+            </a:r>
+          </a:p>
+          <a:p>
+            <a:r>
+              <a:rPr lang="nl-BE" sz="1900" dirty="0" smtClean="0">
+                <a:sym typeface="Wingdings" panose="05000000000000000000" pitchFamily="2" charset="2"/>
+              </a:rPr>
+              <a:t>     hoge cohesie, lage koppeling</a:t>
+            </a:r>
+          </a:p>
+          <a:p>
+            <a:endParaRPr lang="nl-BE" sz="1900" dirty="0">
+              <a:sym typeface="Wingdings" panose="05000000000000000000" pitchFamily="2" charset="2"/>
+            </a:endParaRPr>
+          </a:p>
+          <a:p>
+            <a:r>
+              <a:rPr lang="nl-BE" sz="1900" dirty="0" smtClean="0">
+                <a:sym typeface="Wingdings" panose="05000000000000000000" pitchFamily="2" charset="2"/>
+              </a:rPr>
+              <a:t>Domein + services: bescherming tegen</a:t>
+            </a:r>
+          </a:p>
+          <a:p>
+            <a:r>
+              <a:rPr lang="nl-BE" sz="1900" dirty="0">
+                <a:sym typeface="Wingdings" panose="05000000000000000000" pitchFamily="2" charset="2"/>
+              </a:rPr>
+              <a:t>	</a:t>
+            </a:r>
+            <a:r>
+              <a:rPr lang="nl-BE" sz="1900" dirty="0" smtClean="0">
+                <a:sym typeface="Wingdings" panose="05000000000000000000" pitchFamily="2" charset="2"/>
+              </a:rPr>
+              <a:t>	 foutief gebruik</a:t>
+            </a:r>
+          </a:p>
+          <a:p>
+            <a:endParaRPr lang="nl-BE" sz="1900" dirty="0"/>
           </a:p>
         </p:txBody>
       </p:sp>
     </p:spTree>
     <p:extLst>
       <p:ext uri="{BB962C8B-B14F-4D97-AF65-F5344CB8AC3E}">
-        <p14:creationId xmlns:p14="http://schemas.microsoft.com/office/powerpoint/2010/main" xmlns="" val="3176464878"/>
+        <p14:creationId xmlns:p14="http://schemas.microsoft.com/office/powerpoint/2010/main" val="1739918512"/>
       </p:ext>
     </p:extLst>
   </p:cSld>
@@ -4182,7 +6572,70 @@
                 </a:effectLst>
                 <a:latin typeface="Sitka Text" pitchFamily="2" charset="0"/>
               </a:rPr>
-              <a:t>(Einde Presentatie)</a:t>
+              <a:t>More </a:t>
+            </a:r>
+            <a:r>
+              <a:rPr lang="nl-BE" sz="3600" cap="small" dirty="0" err="1" smtClean="0">
+                <a:ln w="18415" cmpd="sng">
+                  <a:solidFill>
+                    <a:schemeClr val="tx1">
+                      <a:alpha val="0"/>
+                    </a:schemeClr>
+                  </a:solidFill>
+                  <a:prstDash val="solid"/>
+                </a:ln>
+                <a:effectLst>
+                  <a:outerShdw blurRad="25400" dir="3600000" algn="tl" rotWithShape="0">
+                    <a:srgbClr val="000000">
+                      <a:alpha val="70000"/>
+                    </a:srgbClr>
+                  </a:outerShdw>
+                </a:effectLst>
+                <a:latin typeface="Sitka Text" pitchFamily="2" charset="0"/>
+              </a:rPr>
+              <a:t>detailed</a:t>
+            </a:r>
+            <a:r>
+              <a:rPr lang="nl-BE" sz="3600" cap="small" dirty="0" smtClean="0">
+                <a:ln w="18415" cmpd="sng">
+                  <a:solidFill>
+                    <a:schemeClr val="tx1">
+                      <a:alpha val="0"/>
+                    </a:schemeClr>
+                  </a:solidFill>
+                  <a:prstDash val="solid"/>
+                </a:ln>
+                <a:effectLst>
+                  <a:outerShdw blurRad="25400" dir="3600000" algn="tl" rotWithShape="0">
+                    <a:srgbClr val="000000">
+                      <a:alpha val="70000"/>
+                    </a:srgbClr>
+                  </a:outerShdw>
+                </a:effectLst>
+                <a:latin typeface="Sitka Text" pitchFamily="2" charset="0"/>
+              </a:rPr>
+              <a:t> </a:t>
+            </a:r>
+            <a:r>
+              <a:rPr lang="nl-BE" sz="3600" cap="small" dirty="0" err="1" smtClean="0">
+                <a:ln w="18415" cmpd="sng">
+                  <a:solidFill>
+                    <a:schemeClr val="tx1">
+                      <a:alpha val="0"/>
+                    </a:schemeClr>
+                  </a:solidFill>
+                  <a:prstDash val="solid"/>
+                </a:ln>
+                <a:effectLst>
+                  <a:outerShdw blurRad="25400" dir="3600000" algn="tl" rotWithShape="0">
+                    <a:srgbClr val="000000">
+                      <a:alpha val="70000"/>
+                    </a:srgbClr>
+                  </a:outerShdw>
+                </a:effectLst>
+                <a:latin typeface="Sitka Text" pitchFamily="2" charset="0"/>
+              </a:rPr>
+              <a:t>parts</a:t>
             </a:r>
             <a:endParaRPr lang="nl-BE" sz="3600" cap="small" dirty="0">
               <a:ln w="18415" cmpd="sng">
@@ -4217,17 +6670,139 @@
         </p:nvSpPr>
         <p:spPr/>
         <p:txBody>
-          <a:bodyPr/>
+          <a:bodyPr>
+            <a:normAutofit/>
+          </a:bodyPr>
           <a:lstStyle/>
           <a:p>
-            <a:endParaRPr lang="nl-BE"/>
-          </a:p>
-        </p:txBody>
-      </p:sp>
+            <a:pPr marL="0" indent="0">
+              <a:buNone/>
+            </a:pPr>
+            <a:r>
+              <a:rPr lang="nl-BE" sz="2800" dirty="0" smtClean="0"/>
+              <a:t>Belangrijke domeinklassen bevatten </a:t>
+            </a:r>
+            <a:r>
+              <a:rPr lang="nl-BE" sz="2800" b="1" dirty="0" smtClean="0"/>
+              <a:t>services</a:t>
+            </a:r>
+            <a:r>
+              <a:rPr lang="nl-BE" sz="2800" dirty="0" smtClean="0"/>
+              <a:t>.</a:t>
+            </a:r>
+          </a:p>
+          <a:p>
+            <a:pPr marL="0" indent="0">
+              <a:buNone/>
+            </a:pPr>
+            <a:endParaRPr lang="nl-BE" sz="2800" dirty="0"/>
+          </a:p>
+          <a:p>
+            <a:pPr marL="0" indent="0">
+              <a:buNone/>
+            </a:pPr>
+            <a:r>
+              <a:rPr lang="nl-BE" sz="2800" b="1" dirty="0" err="1" smtClean="0"/>
+              <a:t>UserService</a:t>
+            </a:r>
+            <a:endParaRPr lang="nl-BE" sz="2800" b="1" dirty="0" smtClean="0"/>
+          </a:p>
+          <a:p>
+            <a:r>
+              <a:rPr lang="nl-BE" sz="2800" dirty="0" smtClean="0"/>
+              <a:t>Bevat </a:t>
+            </a:r>
+            <a:r>
+              <a:rPr lang="nl-BE" sz="2800" dirty="0" err="1" smtClean="0"/>
+              <a:t>creator</a:t>
+            </a:r>
+            <a:r>
+              <a:rPr lang="nl-BE" sz="2800" dirty="0" smtClean="0"/>
+              <a:t> voor users</a:t>
+            </a:r>
+          </a:p>
+          <a:p>
+            <a:pPr lvl="1"/>
+            <a:r>
+              <a:rPr lang="nl-BE" sz="2400" dirty="0" smtClean="0"/>
+              <a:t>Controle op unieke username</a:t>
+            </a:r>
+          </a:p>
+          <a:p>
+            <a:pPr lvl="1"/>
+            <a:r>
+              <a:rPr lang="nl-BE" sz="2400" dirty="0" smtClean="0"/>
+              <a:t>Bevat default </a:t>
+            </a:r>
+            <a:r>
+              <a:rPr lang="nl-BE" sz="2400" dirty="0" err="1" smtClean="0"/>
+              <a:t>constructor</a:t>
+            </a:r>
+            <a:endParaRPr lang="nl-BE" sz="2400" dirty="0" smtClean="0"/>
+          </a:p>
+          <a:p>
+            <a:pPr marL="0" indent="0">
+              <a:buNone/>
+            </a:pPr>
+            <a:endParaRPr lang="nl-BE" sz="2800" dirty="0"/>
+          </a:p>
+        </p:txBody>
+      </p:sp>
+      <p:pic>
+        <p:nvPicPr>
+          <p:cNvPr id="1026" name="Picture 2" descr="C:\Users\Laurens\Documents\IntelliJ Projects\SWOP2016\presentatie\Diagram Images\Puntje 2\UserService.png"/>
+          <p:cNvPicPr>
+            <a:picLocks noChangeAspect="1" noChangeArrowheads="1"/>
+          </p:cNvPicPr>
+          <p:nvPr/>
+        </p:nvPicPr>
+        <p:blipFill>
+          <a:blip r:embed="rId2">
+            <a:clrChange>
+              <a:clrFrom>
+                <a:srgbClr val="FFFFFF"/>
+              </a:clrFrom>
+              <a:clrTo>
+                <a:srgbClr val="FFFFFF">
+                  <a:alpha val="0"/>
+                </a:srgbClr>
+              </a:clrTo>
+            </a:clrChange>
+            <a:extLst>
+              <a:ext uri="{28A0092B-C50C-407E-A947-70E740481C1C}">
+                <a14:useLocalDpi xmlns:a14="http://schemas.microsoft.com/office/drawing/2010/main" val="0"/>
+              </a:ext>
+            </a:extLst>
+          </a:blip>
+          <a:srcRect/>
+          <a:stretch>
+            <a:fillRect/>
+          </a:stretch>
+        </p:blipFill>
+        <p:spPr bwMode="auto">
+          <a:xfrm>
+            <a:off x="5580112" y="2276872"/>
+            <a:ext cx="1675184" cy="4248808"/>
+          </a:xfrm>
+          <a:prstGeom prst="rect">
+            <a:avLst/>
+          </a:prstGeom>
+          <a:noFill/>
+          <a:extLst>
+            <a:ext uri="{909E8E84-426E-40DD-AFC4-6F175D3DCCD1}">
+              <a14:hiddenFill xmlns:a14="http://schemas.microsoft.com/office/drawing/2010/main">
+                <a:solidFill>
+                  <a:srgbClr val="FFFFFF"/>
+                </a:solidFill>
+              </a14:hiddenFill>
+            </a:ext>
+          </a:extLst>
+        </p:spPr>
+      </p:pic>
     </p:spTree>
     <p:extLst>
       <p:ext uri="{BB962C8B-B14F-4D97-AF65-F5344CB8AC3E}">
-        <p14:creationId xmlns:p14="http://schemas.microsoft.com/office/powerpoint/2010/main" xmlns="" val="3405605565"/>
+        <p14:creationId xmlns:p14="http://schemas.microsoft.com/office/powerpoint/2010/main" val="983478496"/>
       </p:ext>
     </p:extLst>
   </p:cSld>
@@ -4279,6 +6854,27 @@
           <a:lstStyle/>
           <a:p>
             <a:r>
+              <a:rPr lang="nl-BE" sz="3600" cap="small" dirty="0" err="1" smtClean="0">
+                <a:ln w="18415" cmpd="sng">
+                  <a:solidFill>
+                    <a:schemeClr val="tx1">
+                      <a:alpha val="0"/>
+                    </a:schemeClr>
+                  </a:solidFill>
+                  <a:prstDash val="solid"/>
+                </a:ln>
+                <a:effectLst>
+                  <a:outerShdw blurRad="25400" dir="3600000" algn="tl" rotWithShape="0">
+                    <a:srgbClr val="000000">
+                      <a:alpha val="70000"/>
+                    </a:srgbClr>
+                  </a:outerShdw>
+                </a:effectLst>
+                <a:latin typeface="Sitka Text" pitchFamily="2" charset="0"/>
+              </a:rPr>
+              <a:t>BugReportService</a:t>
+            </a:r>
+            <a:r>
               <a:rPr lang="nl-BE" sz="3600" cap="small" dirty="0" smtClean="0">
                 <a:ln w="18415" cmpd="sng">
                   <a:solidFill>
@@ -4297,7 +6893,28 @@
                 </a:effectLst>
                 <a:latin typeface="Sitka Text" pitchFamily="2" charset="0"/>
               </a:rPr>
-              <a:t>Project management (in uren)</a:t>
+              <a:t> &amp; </a:t>
+            </a:r>
+            <a:r>
+              <a:rPr lang="nl-BE" sz="3600" cap="small" dirty="0" err="1" smtClean="0">
+                <a:ln w="18415" cmpd="sng">
+                  <a:solidFill>
+                    <a:schemeClr val="tx1">
+                      <a:alpha val="0"/>
+                    </a:schemeClr>
+                  </a:solidFill>
+                  <a:prstDash val="solid"/>
+                </a:ln>
+                <a:effectLst>
+                  <a:outerShdw blurRad="25400" dir="3600000" algn="tl" rotWithShape="0">
+                    <a:srgbClr val="000000">
+                      <a:alpha val="70000"/>
+                    </a:srgbClr>
+                  </a:outerShdw>
+                </a:effectLst>
+                <a:latin typeface="Sitka Text" pitchFamily="2" charset="0"/>
+              </a:rPr>
+              <a:t>ProjectService</a:t>
             </a:r>
             <a:endParaRPr lang="nl-BE" sz="3600" cap="small" dirty="0">
               <a:ln w="18415" cmpd="sng">
@@ -4330,7 +6947,12 @@
             <p:ph idx="1"/>
           </p:nvPr>
         </p:nvSpPr>
-        <p:spPr/>
+        <p:spPr>
+          <a:xfrm>
+            <a:off x="457200" y="1124744"/>
+            <a:ext cx="8229600" cy="5001419"/>
+          </a:xfrm>
+        </p:spPr>
         <p:txBody>
           <a:bodyPr>
             <a:normAutofit/>
@@ -4340,694 +6962,675 @@
             <a:pPr marL="0" indent="0">
               <a:buNone/>
             </a:pPr>
-            <a:r>
-              <a:rPr lang="nl-BE" sz="2700" cap="small" dirty="0" smtClean="0">
-                <a:effectLst>
-                  <a:outerShdw blurRad="50800" dist="38100" dir="5400000" algn="t" rotWithShape="0">
-                    <a:prstClr val="black">
-                      <a:alpha val="40000"/>
-                    </a:prstClr>
+            <a:endParaRPr lang="nl-BE" sz="2800" dirty="0"/>
+          </a:p>
+        </p:txBody>
+      </p:sp>
+      <p:pic>
+        <p:nvPicPr>
+          <p:cNvPr id="2050" name="Picture 2" descr="C:\Users\Laurens\Documents\IntelliJ Projects\SWOP2016\presentatie\Diagram Images\Puntje 2\BugReportServices.png"/>
+          <p:cNvPicPr>
+            <a:picLocks noChangeAspect="1" noChangeArrowheads="1"/>
+          </p:cNvPicPr>
+          <p:nvPr/>
+        </p:nvPicPr>
+        <p:blipFill>
+          <a:blip r:embed="rId2">
+            <a:clrChange>
+              <a:clrFrom>
+                <a:srgbClr val="FFFFFF"/>
+              </a:clrFrom>
+              <a:clrTo>
+                <a:srgbClr val="FFFFFF">
+                  <a:alpha val="0"/>
+                </a:srgbClr>
+              </a:clrTo>
+            </a:clrChange>
+            <a:extLst>
+              <a:ext uri="{28A0092B-C50C-407E-A947-70E740481C1C}">
+                <a14:useLocalDpi xmlns:a14="http://schemas.microsoft.com/office/drawing/2010/main" val="0"/>
+              </a:ext>
+            </a:extLst>
+          </a:blip>
+          <a:srcRect/>
+          <a:stretch>
+            <a:fillRect/>
+          </a:stretch>
+        </p:blipFill>
+        <p:spPr bwMode="auto">
+          <a:xfrm>
+            <a:off x="4355976" y="1161278"/>
+            <a:ext cx="4788024" cy="5662376"/>
+          </a:xfrm>
+          <a:prstGeom prst="rect">
+            <a:avLst/>
+          </a:prstGeom>
+          <a:noFill/>
+          <a:extLst>
+            <a:ext uri="{909E8E84-426E-40DD-AFC4-6F175D3DCCD1}">
+              <a14:hiddenFill xmlns:a14="http://schemas.microsoft.com/office/drawing/2010/main">
+                <a:solidFill>
+                  <a:srgbClr val="FFFFFF"/>
+                </a:solidFill>
+              </a14:hiddenFill>
+            </a:ext>
+          </a:extLst>
+        </p:spPr>
+      </p:pic>
+      <p:pic>
+        <p:nvPicPr>
+          <p:cNvPr id="2052" name="Picture 4" descr="C:\Users\Laurens\Documents\IntelliJ Projects\SWOP2016\presentatie\Diagram Images\Puntje 2\ProjectService.png"/>
+          <p:cNvPicPr>
+            <a:picLocks noChangeAspect="1" noChangeArrowheads="1"/>
+          </p:cNvPicPr>
+          <p:nvPr/>
+        </p:nvPicPr>
+        <p:blipFill>
+          <a:blip r:embed="rId3">
+            <a:clrChange>
+              <a:clrFrom>
+                <a:srgbClr val="FFFFFF"/>
+              </a:clrFrom>
+              <a:clrTo>
+                <a:srgbClr val="FFFFFF">
+                  <a:alpha val="0"/>
+                </a:srgbClr>
+              </a:clrTo>
+            </a:clrChange>
+            <a:extLst>
+              <a:ext uri="{28A0092B-C50C-407E-A947-70E740481C1C}">
+                <a14:useLocalDpi xmlns:a14="http://schemas.microsoft.com/office/drawing/2010/main" val="0"/>
+              </a:ext>
+            </a:extLst>
+          </a:blip>
+          <a:srcRect/>
+          <a:stretch>
+            <a:fillRect/>
+          </a:stretch>
+        </p:blipFill>
+        <p:spPr bwMode="auto">
+          <a:xfrm>
+            <a:off x="0" y="1233488"/>
+            <a:ext cx="3317875" cy="5624512"/>
+          </a:xfrm>
+          <a:prstGeom prst="rect">
+            <a:avLst/>
+          </a:prstGeom>
+          <a:noFill/>
+          <a:extLst>
+            <a:ext uri="{909E8E84-426E-40DD-AFC4-6F175D3DCCD1}">
+              <a14:hiddenFill xmlns:a14="http://schemas.microsoft.com/office/drawing/2010/main">
+                <a:solidFill>
+                  <a:srgbClr val="FFFFFF"/>
+                </a:solidFill>
+              </a14:hiddenFill>
+            </a:ext>
+          </a:extLst>
+        </p:spPr>
+      </p:pic>
+    </p:spTree>
+    <p:extLst>
+      <p:ext uri="{BB962C8B-B14F-4D97-AF65-F5344CB8AC3E}">
+        <p14:creationId xmlns:p14="http://schemas.microsoft.com/office/powerpoint/2010/main" val="2616626412"/>
+      </p:ext>
+    </p:extLst>
+  </p:cSld>
+  <p:clrMapOvr>
+    <a:masterClrMapping/>
+  </p:clrMapOvr>
+  <p:timing>
+    <p:tnLst>
+      <p:par>
+        <p:cTn id="1" dur="indefinite" restart="never" nodeType="tmRoot"/>
+      </p:par>
+    </p:tnLst>
+  </p:timing>
+</p:sld>
+</file>
+
+<file path=ppt/slides/slide8.xml><?xml version="1.0" encoding="utf-8"?>
+<p:sld xmlns:a="http://schemas.openxmlformats.org/drawingml/2006/main" xmlns:r="http://schemas.openxmlformats.org/officeDocument/2006/relationships" xmlns:p="http://schemas.openxmlformats.org/presentationml/2006/main">
+  <p:cSld>
+    <p:spTree>
+      <p:nvGrpSpPr>
+        <p:cNvPr id="1" name=""/>
+        <p:cNvGrpSpPr/>
+        <p:nvPr/>
+      </p:nvGrpSpPr>
+      <p:grpSpPr>
+        <a:xfrm>
+          <a:off x="0" y="0"/>
+          <a:ext cx="0" cy="0"/>
+          <a:chOff x="0" y="0"/>
+          <a:chExt cx="0" cy="0"/>
+        </a:xfrm>
+      </p:grpSpPr>
+      <p:sp>
+        <p:nvSpPr>
+          <p:cNvPr id="2" name="Titel 1"/>
+          <p:cNvSpPr>
+            <a:spLocks noGrp="1"/>
+          </p:cNvSpPr>
+          <p:nvPr>
+            <p:ph type="title"/>
+          </p:nvPr>
+        </p:nvSpPr>
+        <p:spPr/>
+        <p:txBody>
+          <a:bodyPr>
+            <a:normAutofit/>
+          </a:bodyPr>
+          <a:lstStyle/>
+          <a:p>
+            <a:r>
+              <a:rPr lang="nl-BE" sz="3600" cap="small" dirty="0" smtClean="0">
+                <a:ln w="18415" cmpd="sng">
+                  <a:solidFill>
+                    <a:schemeClr val="tx1">
+                      <a:alpha val="0"/>
+                    </a:schemeClr>
+                  </a:solidFill>
+                  <a:prstDash val="solid"/>
+                </a:ln>
+                <a:effectLst>
+                  <a:outerShdw blurRad="25400" dir="3600000" algn="tl" rotWithShape="0">
+                    <a:srgbClr val="000000">
+                      <a:alpha val="70000"/>
+                    </a:srgbClr>
                   </a:outerShdw>
                 </a:effectLst>
                 <a:latin typeface="Sitka Text" pitchFamily="2" charset="0"/>
               </a:rPr>
-              <a:t>Karina </a:t>
-            </a:r>
-            <a:r>
-              <a:rPr lang="nl-BE" sz="2700" cap="small" dirty="0" err="1" smtClean="0">
-                <a:effectLst>
-                  <a:outerShdw blurRad="50800" dist="38100" dir="5400000" algn="t" rotWithShape="0">
-                    <a:prstClr val="black">
-                      <a:alpha val="40000"/>
-                    </a:prstClr>
+              <a:t>Services </a:t>
+            </a:r>
+            <a:r>
+              <a:rPr lang="nl-BE" sz="3600" cap="small" dirty="0" err="1" smtClean="0">
+                <a:ln w="18415" cmpd="sng">
+                  <a:solidFill>
+                    <a:schemeClr val="tx1">
+                      <a:alpha val="0"/>
+                    </a:schemeClr>
+                  </a:solidFill>
+                  <a:prstDash val="solid"/>
+                </a:ln>
+                <a:effectLst>
+                  <a:outerShdw blurRad="25400" dir="3600000" algn="tl" rotWithShape="0">
+                    <a:srgbClr val="000000">
+                      <a:alpha val="70000"/>
+                    </a:srgbClr>
                   </a:outerShdw>
                 </a:effectLst>
                 <a:latin typeface="Sitka Text" pitchFamily="2" charset="0"/>
               </a:rPr>
-              <a:t>Karapetyan</a:t>
-            </a:r>
-            <a:endParaRPr lang="nl-BE" sz="2700" cap="small" dirty="0" smtClean="0">
+              <a:t>to</a:t>
+            </a:r>
+            <a:r>
+              <a:rPr lang="nl-BE" sz="3600" cap="small" dirty="0" smtClean="0">
+                <a:ln w="18415" cmpd="sng">
+                  <a:solidFill>
+                    <a:schemeClr val="tx1">
+                      <a:alpha val="0"/>
+                    </a:schemeClr>
+                  </a:solidFill>
+                  <a:prstDash val="solid"/>
+                </a:ln>
+                <a:effectLst>
+                  <a:outerShdw blurRad="25400" dir="3600000" algn="tl" rotWithShape="0">
+                    <a:srgbClr val="000000">
+                      <a:alpha val="70000"/>
+                    </a:srgbClr>
+                  </a:outerShdw>
+                </a:effectLst>
+                <a:latin typeface="Sitka Text" pitchFamily="2" charset="0"/>
+              </a:rPr>
+              <a:t> keep track of </a:t>
+            </a:r>
+            <a:r>
+              <a:rPr lang="nl-BE" sz="3600" cap="small" dirty="0" err="1" smtClean="0">
+                <a:ln w="18415" cmpd="sng">
+                  <a:solidFill>
+                    <a:schemeClr val="tx1">
+                      <a:alpha val="0"/>
+                    </a:schemeClr>
+                  </a:solidFill>
+                  <a:prstDash val="solid"/>
+                </a:ln>
+                <a:effectLst>
+                  <a:outerShdw blurRad="25400" dir="3600000" algn="tl" rotWithShape="0">
+                    <a:srgbClr val="000000">
+                      <a:alpha val="70000"/>
+                    </a:srgbClr>
+                  </a:outerShdw>
+                </a:effectLst>
+                <a:latin typeface="Sitka Text" pitchFamily="2" charset="0"/>
+              </a:rPr>
+              <a:t>lists</a:t>
+            </a:r>
+            <a:endParaRPr lang="nl-BE" sz="3600" cap="small" dirty="0">
+              <a:ln w="18415" cmpd="sng">
+                <a:solidFill>
+                  <a:schemeClr val="tx1">
+                    <a:alpha val="0"/>
+                  </a:schemeClr>
+                </a:solidFill>
+                <a:prstDash val="solid"/>
+              </a:ln>
               <a:effectLst>
-                <a:outerShdw blurRad="50800" dist="38100" dir="5400000" algn="t" rotWithShape="0">
-                  <a:prstClr val="black">
-                    <a:alpha val="40000"/>
-                  </a:prstClr>
+                <a:outerShdw blurRad="25400" dir="3600000" algn="tl" rotWithShape="0">
+                  <a:srgbClr val="000000">
+                    <a:alpha val="70000"/>
+                  </a:srgbClr>
                 </a:outerShdw>
               </a:effectLst>
               <a:latin typeface="Sitka Text" pitchFamily="2" charset="0"/>
             </a:endParaRPr>
           </a:p>
+        </p:txBody>
+      </p:sp>
+      <p:sp>
+        <p:nvSpPr>
+          <p:cNvPr id="3" name="Tijdelijke aanduiding voor inhoud 2"/>
+          <p:cNvSpPr>
+            <a:spLocks noGrp="1"/>
+          </p:cNvSpPr>
+          <p:nvPr>
+            <p:ph idx="1"/>
+          </p:nvPr>
+        </p:nvSpPr>
+        <p:spPr>
+          <a:xfrm>
+            <a:off x="457200" y="1124744"/>
+            <a:ext cx="8229600" cy="5001419"/>
+          </a:xfrm>
+        </p:spPr>
+        <p:txBody>
+          <a:bodyPr>
+            <a:normAutofit/>
+          </a:bodyPr>
+          <a:lstStyle/>
+          <a:p>
+            <a:r>
+              <a:rPr lang="nl-BE" sz="2800" dirty="0" smtClean="0"/>
+              <a:t>Services bevatten functies om:</a:t>
+            </a:r>
+          </a:p>
+          <a:p>
+            <a:pPr lvl="1"/>
+            <a:r>
+              <a:rPr lang="nl-BE" sz="2400" dirty="0" smtClean="0"/>
+              <a:t>Lijsten opvragen (specifieke criteria)</a:t>
+            </a:r>
+          </a:p>
+          <a:p>
+            <a:pPr lvl="1"/>
+            <a:r>
+              <a:rPr lang="nl-BE" sz="2400" dirty="0" smtClean="0"/>
+              <a:t>Lijsten bewerken (enkel mogelijk door service)</a:t>
+            </a:r>
+          </a:p>
+          <a:p>
+            <a:pPr lvl="1"/>
+            <a:r>
+              <a:rPr lang="nl-BE" sz="2400" dirty="0" smtClean="0"/>
+              <a:t>Alsook communicatie met buitenwereld mogelijk te maken</a:t>
+            </a:r>
+          </a:p>
+          <a:p>
+            <a:endParaRPr lang="nl-BE" dirty="0"/>
+          </a:p>
+          <a:p>
+            <a:r>
+              <a:rPr lang="nl-BE" sz="2800" dirty="0" smtClean="0"/>
+              <a:t>Lijsten gebruikt door services zijn </a:t>
+            </a:r>
+            <a:r>
+              <a:rPr lang="nl-BE" sz="2800" b="1" dirty="0" err="1" smtClean="0"/>
+              <a:t>unmodifiable</a:t>
+            </a:r>
+            <a:endParaRPr lang="nl-BE" sz="2800" b="1" dirty="0" smtClean="0"/>
+          </a:p>
           <a:p>
             <a:pPr marL="0" indent="0">
               <a:buNone/>
             </a:pPr>
-            <a:r>
-              <a:rPr lang="nl-BE" sz="2400" dirty="0" smtClean="0">
-                <a:solidFill>
-                  <a:schemeClr val="accent4">
-                    <a:lumMod val="50000"/>
+            <a:endParaRPr lang="nl-BE" dirty="0" smtClean="0"/>
+          </a:p>
+        </p:txBody>
+      </p:sp>
+    </p:spTree>
+    <p:extLst>
+      <p:ext uri="{BB962C8B-B14F-4D97-AF65-F5344CB8AC3E}">
+        <p14:creationId xmlns:p14="http://schemas.microsoft.com/office/powerpoint/2010/main" val="1617670185"/>
+      </p:ext>
+    </p:extLst>
+  </p:cSld>
+  <p:clrMapOvr>
+    <a:masterClrMapping/>
+  </p:clrMapOvr>
+  <p:timing>
+    <p:tnLst>
+      <p:par>
+        <p:cTn id="1" dur="indefinite" restart="never" nodeType="tmRoot"/>
+      </p:par>
+    </p:tnLst>
+  </p:timing>
+</p:sld>
+</file>
+
+<file path=ppt/slides/slide9.xml><?xml version="1.0" encoding="utf-8"?>
+<p:sld xmlns:a="http://schemas.openxmlformats.org/drawingml/2006/main" xmlns:r="http://schemas.openxmlformats.org/officeDocument/2006/relationships" xmlns:p="http://schemas.openxmlformats.org/presentationml/2006/main">
+  <p:cSld>
+    <p:spTree>
+      <p:nvGrpSpPr>
+        <p:cNvPr id="1" name=""/>
+        <p:cNvGrpSpPr/>
+        <p:nvPr/>
+      </p:nvGrpSpPr>
+      <p:grpSpPr>
+        <a:xfrm>
+          <a:off x="0" y="0"/>
+          <a:ext cx="0" cy="0"/>
+          <a:chOff x="0" y="0"/>
+          <a:chExt cx="0" cy="0"/>
+        </a:xfrm>
+      </p:grpSpPr>
+      <p:sp>
+        <p:nvSpPr>
+          <p:cNvPr id="2" name="Titel 1"/>
+          <p:cNvSpPr>
+            <a:spLocks noGrp="1"/>
+          </p:cNvSpPr>
+          <p:nvPr>
+            <p:ph type="title"/>
+          </p:nvPr>
+        </p:nvSpPr>
+        <p:spPr/>
+        <p:txBody>
+          <a:bodyPr>
+            <a:normAutofit/>
+          </a:bodyPr>
+          <a:lstStyle/>
+          <a:p>
+            <a:r>
+              <a:rPr lang="nl-BE" sz="3600" cap="small" dirty="0" err="1" smtClean="0">
+                <a:ln w="18415" cmpd="sng">
+                  <a:solidFill>
+                    <a:schemeClr val="tx1">
+                      <a:alpha val="0"/>
+                    </a:schemeClr>
+                  </a:solidFill>
+                  <a:prstDash val="solid"/>
+                </a:ln>
+                <a:effectLst>
+                  <a:outerShdw blurRad="25400" dir="3600000" algn="tl" rotWithShape="0">
+                    <a:srgbClr val="000000">
+                      <a:alpha val="70000"/>
+                    </a:srgbClr>
+                  </a:outerShdw>
+                </a:effectLst>
+                <a:latin typeface="Sitka Text" pitchFamily="2" charset="0"/>
+              </a:rPr>
+              <a:t>Usage</a:t>
+            </a:r>
+            <a:r>
+              <a:rPr lang="nl-BE" sz="3600" cap="small" dirty="0" smtClean="0">
+                <a:ln w="18415" cmpd="sng">
+                  <a:solidFill>
+                    <a:schemeClr val="tx1">
+                      <a:alpha val="0"/>
+                    </a:schemeClr>
+                  </a:solidFill>
+                  <a:prstDash val="solid"/>
+                </a:ln>
+                <a:effectLst>
+                  <a:outerShdw blurRad="25400" dir="3600000" algn="tl" rotWithShape="0">
+                    <a:srgbClr val="000000">
+                      <a:alpha val="70000"/>
+                    </a:srgbClr>
+                  </a:outerShdw>
+                </a:effectLst>
+                <a:latin typeface="Sitka Text" pitchFamily="2" charset="0"/>
+              </a:rPr>
+              <a:t> of </a:t>
+            </a:r>
+            <a:r>
+              <a:rPr lang="nl-BE" sz="3600" cap="small" dirty="0" err="1" smtClean="0">
+                <a:ln w="18415" cmpd="sng">
+                  <a:solidFill>
+                    <a:schemeClr val="tx1">
+                      <a:alpha val="0"/>
+                    </a:schemeClr>
+                  </a:solidFill>
+                  <a:prstDash val="solid"/>
+                </a:ln>
+                <a:effectLst>
+                  <a:outerShdw blurRad="25400" dir="3600000" algn="tl" rotWithShape="0">
+                    <a:srgbClr val="000000">
+                      <a:alpha val="70000"/>
+                    </a:srgbClr>
+                  </a:outerShdw>
+                </a:effectLst>
+                <a:latin typeface="Sitka Text" pitchFamily="2" charset="0"/>
+              </a:rPr>
+              <a:t>the</a:t>
+            </a:r>
+            <a:r>
+              <a:rPr lang="nl-BE" sz="3600" cap="small" dirty="0" smtClean="0">
+                <a:ln w="18415" cmpd="sng">
+                  <a:solidFill>
+                    <a:schemeClr val="tx1">
+                      <a:alpha val="0"/>
+                    </a:schemeClr>
+                  </a:solidFill>
+                  <a:prstDash val="solid"/>
+                </a:ln>
+                <a:effectLst>
+                  <a:outerShdw blurRad="25400" dir="3600000" algn="tl" rotWithShape="0">
+                    <a:srgbClr val="000000">
+                      <a:alpha val="70000"/>
+                    </a:srgbClr>
+                  </a:outerShdw>
+                </a:effectLst>
+                <a:latin typeface="Sitka Text" pitchFamily="2" charset="0"/>
+              </a:rPr>
+              <a:t> domain </a:t>
+            </a:r>
+            <a:r>
+              <a:rPr lang="nl-BE" sz="3600" cap="small" dirty="0" err="1" smtClean="0">
+                <a:ln w="18415" cmpd="sng">
+                  <a:solidFill>
+                    <a:schemeClr val="tx1">
+                      <a:alpha val="0"/>
+                    </a:schemeClr>
+                  </a:solidFill>
+                  <a:prstDash val="solid"/>
+                </a:ln>
+                <a:effectLst>
+                  <a:outerShdw blurRad="25400" dir="3600000" algn="tl" rotWithShape="0">
+                    <a:srgbClr val="000000">
+                      <a:alpha val="70000"/>
+                    </a:srgbClr>
+                  </a:outerShdw>
+                </a:effectLst>
+                <a:latin typeface="Sitka Text" pitchFamily="2" charset="0"/>
+              </a:rPr>
+              <a:t>layer</a:t>
+            </a:r>
+            <a:endParaRPr lang="nl-BE" sz="3600" cap="small" dirty="0">
+              <a:ln w="18415" cmpd="sng">
+                <a:solidFill>
+                  <a:schemeClr val="tx1">
+                    <a:alpha val="0"/>
                   </a:schemeClr>
                 </a:solidFill>
-                <a:effectLst>
-                  <a:outerShdw blurRad="76200" dist="38100" dir="5400000" algn="t" rotWithShape="0">
-                    <a:prstClr val="black">
-                      <a:alpha val="27000"/>
-                    </a:prstClr>
-                  </a:outerShdw>
-                </a:effectLst>
-                <a:latin typeface="Sitka Banner" pitchFamily="2" charset="0"/>
-              </a:rPr>
-              <a:t>Group work: 33 	Individual Work: 22	Study: 7</a:t>
-            </a:r>
-            <a:endParaRPr lang="nl-BE" sz="2400" dirty="0">
-              <a:solidFill>
-                <a:schemeClr val="accent4">
-                  <a:lumMod val="50000"/>
-                </a:schemeClr>
-              </a:solidFill>
+                <a:prstDash val="solid"/>
+              </a:ln>
               <a:effectLst>
-                <a:outerShdw blurRad="76200" dist="38100" dir="5400000" algn="t" rotWithShape="0">
-                  <a:prstClr val="black">
-                    <a:alpha val="27000"/>
-                  </a:prstClr>
-                </a:outerShdw>
-              </a:effectLst>
-              <a:latin typeface="Sitka Banner" pitchFamily="2" charset="0"/>
-            </a:endParaRPr>
-          </a:p>
-          <a:p>
-            <a:pPr marL="0" indent="0">
-              <a:buNone/>
-            </a:pPr>
-            <a:r>
-              <a:rPr lang="nl-BE" sz="2700" cap="small" dirty="0" smtClean="0">
-                <a:effectLst>
-                  <a:outerShdw blurRad="50800" dist="38100" dir="5400000" algn="t" rotWithShape="0">
-                    <a:prstClr val="black">
-                      <a:alpha val="40000"/>
-                    </a:prstClr>
-                  </a:outerShdw>
-                </a:effectLst>
-                <a:latin typeface="Sitka Text" pitchFamily="2" charset="0"/>
-              </a:rPr>
-              <a:t>Laurens </a:t>
-            </a:r>
-            <a:r>
-              <a:rPr lang="nl-BE" sz="2700" cap="small" dirty="0" err="1" smtClean="0">
-                <a:effectLst>
-                  <a:outerShdw blurRad="50800" dist="38100" dir="5400000" algn="t" rotWithShape="0">
-                    <a:prstClr val="black">
-                      <a:alpha val="40000"/>
-                    </a:prstClr>
-                  </a:outerShdw>
-                </a:effectLst>
-                <a:latin typeface="Sitka Text" pitchFamily="2" charset="0"/>
-              </a:rPr>
-              <a:t>Cleemput</a:t>
-            </a:r>
-            <a:endParaRPr lang="nl-BE" sz="2700" cap="small" dirty="0" smtClean="0">
-              <a:effectLst>
-                <a:outerShdw blurRad="50800" dist="38100" dir="5400000" algn="t" rotWithShape="0">
-                  <a:prstClr val="black">
-                    <a:alpha val="40000"/>
-                  </a:prstClr>
+                <a:outerShdw blurRad="25400" dir="3600000" algn="tl" rotWithShape="0">
+                  <a:srgbClr val="000000">
+                    <a:alpha val="70000"/>
+                  </a:srgbClr>
                 </a:outerShdw>
               </a:effectLst>
               <a:latin typeface="Sitka Text" pitchFamily="2" charset="0"/>
             </a:endParaRPr>
           </a:p>
-          <a:p>
-            <a:pPr marL="0" indent="0">
-              <a:buNone/>
-            </a:pPr>
-            <a:r>
-              <a:rPr lang="nl-BE" sz="2400" dirty="0" smtClean="0">
-                <a:solidFill>
-                  <a:schemeClr val="accent4">
-                    <a:lumMod val="50000"/>
-                  </a:schemeClr>
-                </a:solidFill>
-                <a:effectLst>
-                  <a:outerShdw blurRad="76200" dist="38100" dir="5400000" algn="t" rotWithShape="0">
-                    <a:prstClr val="black">
-                      <a:alpha val="27000"/>
-                    </a:prstClr>
-                  </a:outerShdw>
-                </a:effectLst>
-                <a:latin typeface="Sitka Banner" pitchFamily="2" charset="0"/>
-              </a:rPr>
-              <a:t>Group </a:t>
-            </a:r>
-            <a:r>
-              <a:rPr lang="nl-BE" sz="2400" dirty="0" err="1" smtClean="0">
-                <a:solidFill>
-                  <a:schemeClr val="accent4">
-                    <a:lumMod val="50000"/>
-                  </a:schemeClr>
-                </a:solidFill>
-                <a:effectLst>
-                  <a:outerShdw blurRad="76200" dist="38100" dir="5400000" algn="t" rotWithShape="0">
-                    <a:prstClr val="black">
-                      <a:alpha val="27000"/>
-                    </a:prstClr>
-                  </a:outerShdw>
-                </a:effectLst>
-                <a:latin typeface="Sitka Banner" pitchFamily="2" charset="0"/>
-              </a:rPr>
-              <a:t>work</a:t>
-            </a:r>
-            <a:r>
-              <a:rPr lang="nl-BE" sz="2400" dirty="0" smtClean="0">
-                <a:solidFill>
-                  <a:schemeClr val="accent4">
-                    <a:lumMod val="50000"/>
-                  </a:schemeClr>
-                </a:solidFill>
-                <a:effectLst>
-                  <a:outerShdw blurRad="76200" dist="38100" dir="5400000" algn="t" rotWithShape="0">
-                    <a:prstClr val="black">
-                      <a:alpha val="27000"/>
-                    </a:prstClr>
-                  </a:outerShdw>
-                </a:effectLst>
-                <a:latin typeface="Sitka Banner" pitchFamily="2" charset="0"/>
-              </a:rPr>
-              <a:t>: 33 	</a:t>
-            </a:r>
-            <a:r>
-              <a:rPr lang="nl-BE" sz="2400" dirty="0" err="1" smtClean="0">
-                <a:solidFill>
-                  <a:schemeClr val="accent4">
-                    <a:lumMod val="50000"/>
-                  </a:schemeClr>
-                </a:solidFill>
-                <a:effectLst>
-                  <a:outerShdw blurRad="76200" dist="38100" dir="5400000" algn="t" rotWithShape="0">
-                    <a:prstClr val="black">
-                      <a:alpha val="27000"/>
-                    </a:prstClr>
-                  </a:outerShdw>
-                </a:effectLst>
-                <a:latin typeface="Sitka Banner" pitchFamily="2" charset="0"/>
-              </a:rPr>
-              <a:t>Individual</a:t>
-            </a:r>
-            <a:r>
-              <a:rPr lang="nl-BE" sz="2400" dirty="0" smtClean="0">
-                <a:solidFill>
-                  <a:schemeClr val="accent4">
-                    <a:lumMod val="50000"/>
-                  </a:schemeClr>
-                </a:solidFill>
-                <a:effectLst>
-                  <a:outerShdw blurRad="76200" dist="38100" dir="5400000" algn="t" rotWithShape="0">
-                    <a:prstClr val="black">
-                      <a:alpha val="27000"/>
-                    </a:prstClr>
-                  </a:outerShdw>
-                </a:effectLst>
-                <a:latin typeface="Sitka Banner" pitchFamily="2" charset="0"/>
-              </a:rPr>
+        </p:txBody>
+      </p:sp>
+      <p:sp>
+        <p:nvSpPr>
+          <p:cNvPr id="4" name="Tijdelijke aanduiding voor inhoud 3"/>
+          <p:cNvSpPr>
+            <a:spLocks noGrp="1"/>
+          </p:cNvSpPr>
+          <p:nvPr>
+            <p:ph idx="1"/>
+          </p:nvPr>
+        </p:nvSpPr>
+        <p:spPr>
+          <a:xfrm>
+            <a:off x="179512" y="3573016"/>
+            <a:ext cx="8507288" cy="2553147"/>
+          </a:xfrm>
+        </p:spPr>
+        <p:txBody>
+          <a:bodyPr>
+            <a:normAutofit lnSpcReduction="10000"/>
+          </a:bodyPr>
+          <a:lstStyle/>
+          <a:p>
+            <a:r>
+              <a:rPr lang="nl-BE" sz="2000" dirty="0" smtClean="0"/>
+              <a:t>Toekennen van Tags </a:t>
+            </a:r>
+            <a:r>
+              <a:rPr lang="nl-BE" sz="2000" dirty="0" err="1" smtClean="0"/>
+              <a:t>d.m.v</a:t>
+            </a:r>
+            <a:r>
+              <a:rPr lang="nl-BE" sz="2000" dirty="0"/>
+              <a:t/>
+            </a:r>
+            <a:br>
+              <a:rPr lang="nl-BE" sz="2000" dirty="0"/>
+            </a:br>
+            <a:r>
+              <a:rPr lang="nl-BE" sz="2000" dirty="0" err="1" smtClean="0"/>
+              <a:t>TagAssignmentService</a:t>
+            </a:r>
+            <a:endParaRPr lang="nl-BE" sz="2000" dirty="0" smtClean="0"/>
+          </a:p>
+          <a:p>
+            <a:endParaRPr lang="nl-BE" sz="2000" dirty="0" smtClean="0"/>
+          </a:p>
+          <a:p>
+            <a:r>
+              <a:rPr lang="nl-BE" sz="2000" dirty="0" smtClean="0"/>
+              <a:t>Toewijzen van </a:t>
+            </a:r>
+            <a:r>
+              <a:rPr lang="nl-BE" sz="2000" dirty="0" err="1" smtClean="0"/>
+              <a:t>developer</a:t>
+            </a:r>
+            <a:r>
+              <a:rPr lang="nl-BE" sz="2000" dirty="0"/>
               <a:t> </a:t>
             </a:r>
             <a:r>
-              <a:rPr lang="nl-BE" sz="2400" dirty="0" err="1" smtClean="0">
-                <a:solidFill>
-                  <a:schemeClr val="accent4">
-                    <a:lumMod val="50000"/>
-                  </a:schemeClr>
-                </a:solidFill>
-                <a:effectLst>
-                  <a:outerShdw blurRad="76200" dist="38100" dir="5400000" algn="t" rotWithShape="0">
-                    <a:prstClr val="black">
-                      <a:alpha val="27000"/>
-                    </a:prstClr>
-                  </a:outerShdw>
-                </a:effectLst>
-                <a:latin typeface="Sitka Banner" pitchFamily="2" charset="0"/>
-              </a:rPr>
-              <a:t>Work</a:t>
-            </a:r>
-            <a:r>
-              <a:rPr lang="nl-BE" sz="2400" dirty="0" smtClean="0">
-                <a:solidFill>
-                  <a:schemeClr val="accent4">
-                    <a:lumMod val="50000"/>
-                  </a:schemeClr>
-                </a:solidFill>
-                <a:effectLst>
-                  <a:outerShdw blurRad="76200" dist="38100" dir="5400000" algn="t" rotWithShape="0">
-                    <a:prstClr val="black">
-                      <a:alpha val="27000"/>
-                    </a:prstClr>
-                  </a:outerShdw>
-                </a:effectLst>
-                <a:latin typeface="Sitka Banner" pitchFamily="2" charset="0"/>
-              </a:rPr>
-              <a:t>: 16	</a:t>
-            </a:r>
-            <a:r>
-              <a:rPr lang="nl-BE" sz="2400" dirty="0" err="1" smtClean="0">
-                <a:solidFill>
-                  <a:schemeClr val="accent4">
-                    <a:lumMod val="50000"/>
-                  </a:schemeClr>
-                </a:solidFill>
-                <a:effectLst>
-                  <a:outerShdw blurRad="76200" dist="38100" dir="5400000" algn="t" rotWithShape="0">
-                    <a:prstClr val="black">
-                      <a:alpha val="27000"/>
-                    </a:prstClr>
-                  </a:outerShdw>
-                </a:effectLst>
-                <a:latin typeface="Sitka Banner" pitchFamily="2" charset="0"/>
-              </a:rPr>
-              <a:t>Study</a:t>
-            </a:r>
-            <a:r>
-              <a:rPr lang="nl-BE" sz="2400" dirty="0" smtClean="0">
-                <a:solidFill>
-                  <a:schemeClr val="accent4">
-                    <a:lumMod val="50000"/>
-                  </a:schemeClr>
-                </a:solidFill>
-                <a:effectLst>
-                  <a:outerShdw blurRad="76200" dist="38100" dir="5400000" algn="t" rotWithShape="0">
-                    <a:prstClr val="black">
-                      <a:alpha val="27000"/>
-                    </a:prstClr>
-                  </a:outerShdw>
-                </a:effectLst>
-                <a:latin typeface="Sitka Banner" pitchFamily="2" charset="0"/>
-              </a:rPr>
-              <a:t>: 8</a:t>
-            </a:r>
-          </a:p>
-          <a:p>
-            <a:pPr marL="0" indent="0">
-              <a:buNone/>
-            </a:pPr>
-            <a:r>
-              <a:rPr lang="nl-BE" sz="2700" cap="small" dirty="0" smtClean="0">
-                <a:effectLst>
-                  <a:outerShdw blurRad="50800" dist="38100" dir="5400000" algn="t" rotWithShape="0">
-                    <a:prstClr val="black">
-                      <a:alpha val="40000"/>
-                    </a:prstClr>
-                  </a:outerShdw>
-                </a:effectLst>
-                <a:latin typeface="Sitka Text" pitchFamily="2" charset="0"/>
-              </a:rPr>
-              <a:t>Tom Houben</a:t>
-            </a:r>
-          </a:p>
-          <a:p>
-            <a:pPr marL="0" indent="0">
-              <a:buNone/>
-            </a:pPr>
-            <a:r>
-              <a:rPr lang="nl-BE" sz="2400" dirty="0" smtClean="0">
-                <a:solidFill>
-                  <a:schemeClr val="accent4">
-                    <a:lumMod val="50000"/>
-                  </a:schemeClr>
-                </a:solidFill>
-                <a:effectLst>
-                  <a:outerShdw blurRad="76200" dist="38100" dir="5400000" algn="t" rotWithShape="0">
-                    <a:prstClr val="black">
-                      <a:alpha val="27000"/>
-                    </a:prstClr>
-                  </a:outerShdw>
-                </a:effectLst>
-                <a:latin typeface="Sitka Banner" pitchFamily="2" charset="0"/>
-              </a:rPr>
-              <a:t>Group </a:t>
-            </a:r>
-            <a:r>
-              <a:rPr lang="nl-BE" sz="2400" dirty="0" err="1" smtClean="0">
-                <a:solidFill>
-                  <a:schemeClr val="accent4">
-                    <a:lumMod val="50000"/>
-                  </a:schemeClr>
-                </a:solidFill>
-                <a:effectLst>
-                  <a:outerShdw blurRad="76200" dist="38100" dir="5400000" algn="t" rotWithShape="0">
-                    <a:prstClr val="black">
-                      <a:alpha val="27000"/>
-                    </a:prstClr>
-                  </a:outerShdw>
-                </a:effectLst>
-                <a:latin typeface="Sitka Banner" pitchFamily="2" charset="0"/>
-              </a:rPr>
-              <a:t>work</a:t>
-            </a:r>
-            <a:r>
-              <a:rPr lang="nl-BE" sz="2400" dirty="0" smtClean="0">
-                <a:solidFill>
-                  <a:schemeClr val="accent4">
-                    <a:lumMod val="50000"/>
-                  </a:schemeClr>
-                </a:solidFill>
-                <a:effectLst>
-                  <a:outerShdw blurRad="76200" dist="38100" dir="5400000" algn="t" rotWithShape="0">
-                    <a:prstClr val="black">
-                      <a:alpha val="27000"/>
-                    </a:prstClr>
-                  </a:outerShdw>
-                </a:effectLst>
-                <a:latin typeface="Sitka Banner" pitchFamily="2" charset="0"/>
-              </a:rPr>
-              <a:t>:  33	</a:t>
-            </a:r>
-            <a:r>
-              <a:rPr lang="nl-BE" sz="2400" dirty="0" err="1" smtClean="0">
-                <a:solidFill>
-                  <a:schemeClr val="accent4">
-                    <a:lumMod val="50000"/>
-                  </a:schemeClr>
-                </a:solidFill>
-                <a:effectLst>
-                  <a:outerShdw blurRad="76200" dist="38100" dir="5400000" algn="t" rotWithShape="0">
-                    <a:prstClr val="black">
-                      <a:alpha val="27000"/>
-                    </a:prstClr>
-                  </a:outerShdw>
-                </a:effectLst>
-                <a:latin typeface="Sitka Banner" pitchFamily="2" charset="0"/>
-              </a:rPr>
-              <a:t>Individual</a:t>
-            </a:r>
-            <a:r>
-              <a:rPr lang="nl-BE" sz="2400" dirty="0" smtClean="0">
-                <a:solidFill>
-                  <a:schemeClr val="accent4">
-                    <a:lumMod val="50000"/>
-                  </a:schemeClr>
-                </a:solidFill>
-                <a:effectLst>
-                  <a:outerShdw blurRad="76200" dist="38100" dir="5400000" algn="t" rotWithShape="0">
-                    <a:prstClr val="black">
-                      <a:alpha val="27000"/>
-                    </a:prstClr>
-                  </a:outerShdw>
-                </a:effectLst>
-                <a:latin typeface="Sitka Banner" pitchFamily="2" charset="0"/>
-              </a:rPr>
-              <a:t> </a:t>
-            </a:r>
-            <a:r>
-              <a:rPr lang="nl-BE" sz="2400" dirty="0" err="1" smtClean="0">
-                <a:solidFill>
-                  <a:schemeClr val="accent4">
-                    <a:lumMod val="50000"/>
-                  </a:schemeClr>
-                </a:solidFill>
-                <a:effectLst>
-                  <a:outerShdw blurRad="76200" dist="38100" dir="5400000" algn="t" rotWithShape="0">
-                    <a:prstClr val="black">
-                      <a:alpha val="27000"/>
-                    </a:prstClr>
-                  </a:outerShdw>
-                </a:effectLst>
-                <a:latin typeface="Sitka Banner" pitchFamily="2" charset="0"/>
-              </a:rPr>
-              <a:t>Work</a:t>
-            </a:r>
-            <a:r>
-              <a:rPr lang="nl-BE" sz="2400" dirty="0" smtClean="0">
-                <a:solidFill>
-                  <a:schemeClr val="accent4">
-                    <a:lumMod val="50000"/>
-                  </a:schemeClr>
-                </a:solidFill>
-                <a:effectLst>
-                  <a:outerShdw blurRad="76200" dist="38100" dir="5400000" algn="t" rotWithShape="0">
-                    <a:prstClr val="black">
-                      <a:alpha val="27000"/>
-                    </a:prstClr>
-                  </a:outerShdw>
-                </a:effectLst>
-                <a:latin typeface="Sitka Banner" pitchFamily="2" charset="0"/>
-              </a:rPr>
-              <a:t>: 20	</a:t>
-            </a:r>
-            <a:r>
-              <a:rPr lang="nl-BE" sz="2400" dirty="0" err="1" smtClean="0">
-                <a:solidFill>
-                  <a:schemeClr val="accent4">
-                    <a:lumMod val="50000"/>
-                  </a:schemeClr>
-                </a:solidFill>
-                <a:effectLst>
-                  <a:outerShdw blurRad="76200" dist="38100" dir="5400000" algn="t" rotWithShape="0">
-                    <a:prstClr val="black">
-                      <a:alpha val="27000"/>
-                    </a:prstClr>
-                  </a:outerShdw>
-                </a:effectLst>
-                <a:latin typeface="Sitka Banner" pitchFamily="2" charset="0"/>
-              </a:rPr>
-              <a:t>Study</a:t>
-            </a:r>
-            <a:r>
-              <a:rPr lang="nl-BE" sz="2400" dirty="0" smtClean="0">
-                <a:solidFill>
-                  <a:schemeClr val="accent4">
-                    <a:lumMod val="50000"/>
-                  </a:schemeClr>
-                </a:solidFill>
-                <a:effectLst>
-                  <a:outerShdw blurRad="76200" dist="38100" dir="5400000" algn="t" rotWithShape="0">
-                    <a:prstClr val="black">
-                      <a:alpha val="27000"/>
-                    </a:prstClr>
-                  </a:outerShdw>
-                </a:effectLst>
-                <a:latin typeface="Sitka Banner" pitchFamily="2" charset="0"/>
-              </a:rPr>
-              <a:t>: 6</a:t>
-            </a:r>
-          </a:p>
-          <a:p>
-            <a:pPr marL="0" indent="0">
-              <a:buNone/>
-            </a:pPr>
-            <a:r>
-              <a:rPr lang="nl-BE" sz="2700" cap="small" dirty="0" smtClean="0">
-                <a:effectLst>
-                  <a:outerShdw blurRad="50800" dist="38100" dir="5400000" algn="t" rotWithShape="0">
-                    <a:prstClr val="black">
-                      <a:alpha val="40000"/>
-                    </a:prstClr>
-                  </a:outerShdw>
-                </a:effectLst>
-                <a:latin typeface="Sitka Text" pitchFamily="2" charset="0"/>
-              </a:rPr>
-              <a:t>Tri </a:t>
-            </a:r>
-            <a:r>
-              <a:rPr lang="nl-BE" sz="2700" cap="small" dirty="0" err="1" smtClean="0">
-                <a:effectLst>
-                  <a:outerShdw blurRad="50800" dist="38100" dir="5400000" algn="t" rotWithShape="0">
-                    <a:prstClr val="black">
-                      <a:alpha val="40000"/>
-                    </a:prstClr>
-                  </a:outerShdw>
-                </a:effectLst>
-                <a:latin typeface="Sitka Text" pitchFamily="2" charset="0"/>
-              </a:rPr>
-              <a:t>Tran</a:t>
-            </a:r>
-            <a:endParaRPr lang="nl-BE" sz="2700" cap="small" dirty="0" smtClean="0">
-              <a:effectLst>
-                <a:outerShdw blurRad="50800" dist="38100" dir="5400000" algn="t" rotWithShape="0">
-                  <a:prstClr val="black">
-                    <a:alpha val="40000"/>
-                  </a:prstClr>
-                </a:outerShdw>
-              </a:effectLst>
-              <a:latin typeface="Sitka Text" pitchFamily="2" charset="0"/>
-            </a:endParaRPr>
-          </a:p>
-          <a:p>
-            <a:pPr marL="0" indent="0">
-              <a:buNone/>
-            </a:pPr>
-            <a:r>
-              <a:rPr lang="nl-BE" sz="2400" dirty="0" smtClean="0">
-                <a:solidFill>
-                  <a:schemeClr val="accent4">
-                    <a:lumMod val="50000"/>
-                  </a:schemeClr>
-                </a:solidFill>
-                <a:effectLst>
-                  <a:outerShdw blurRad="76200" dist="38100" dir="5400000" algn="t" rotWithShape="0">
-                    <a:prstClr val="black">
-                      <a:alpha val="27000"/>
-                    </a:prstClr>
-                  </a:outerShdw>
-                </a:effectLst>
-                <a:latin typeface="Sitka Banner" pitchFamily="2" charset="0"/>
-              </a:rPr>
-              <a:t>Group </a:t>
-            </a:r>
-            <a:r>
-              <a:rPr lang="nl-BE" sz="2400" dirty="0" err="1" smtClean="0">
-                <a:solidFill>
-                  <a:schemeClr val="accent4">
-                    <a:lumMod val="50000"/>
-                  </a:schemeClr>
-                </a:solidFill>
-                <a:effectLst>
-                  <a:outerShdw blurRad="76200" dist="38100" dir="5400000" algn="t" rotWithShape="0">
-                    <a:prstClr val="black">
-                      <a:alpha val="27000"/>
-                    </a:prstClr>
-                  </a:outerShdw>
-                </a:effectLst>
-                <a:latin typeface="Sitka Banner" pitchFamily="2" charset="0"/>
-              </a:rPr>
-              <a:t>work</a:t>
-            </a:r>
-            <a:r>
-              <a:rPr lang="nl-BE" sz="2400" dirty="0" smtClean="0">
-                <a:solidFill>
-                  <a:schemeClr val="accent4">
-                    <a:lumMod val="50000"/>
-                  </a:schemeClr>
-                </a:solidFill>
-                <a:effectLst>
-                  <a:outerShdw blurRad="76200" dist="38100" dir="5400000" algn="t" rotWithShape="0">
-                    <a:prstClr val="black">
-                      <a:alpha val="27000"/>
-                    </a:prstClr>
-                  </a:outerShdw>
-                </a:effectLst>
-                <a:latin typeface="Sitka Banner" pitchFamily="2" charset="0"/>
-              </a:rPr>
-              <a:t>: 33 	</a:t>
-            </a:r>
-            <a:r>
-              <a:rPr lang="nl-BE" sz="2400" dirty="0" err="1" smtClean="0">
-                <a:solidFill>
-                  <a:schemeClr val="accent4">
-                    <a:lumMod val="50000"/>
-                  </a:schemeClr>
-                </a:solidFill>
-                <a:effectLst>
-                  <a:outerShdw blurRad="76200" dist="38100" dir="5400000" algn="t" rotWithShape="0">
-                    <a:prstClr val="black">
-                      <a:alpha val="27000"/>
-                    </a:prstClr>
-                  </a:outerShdw>
-                </a:effectLst>
-                <a:latin typeface="Sitka Banner" pitchFamily="2" charset="0"/>
-              </a:rPr>
-              <a:t>Individual</a:t>
-            </a:r>
-            <a:r>
-              <a:rPr lang="nl-BE" sz="2400" dirty="0" smtClean="0">
-                <a:solidFill>
-                  <a:schemeClr val="accent4">
-                    <a:lumMod val="50000"/>
-                  </a:schemeClr>
-                </a:solidFill>
-                <a:effectLst>
-                  <a:outerShdw blurRad="76200" dist="38100" dir="5400000" algn="t" rotWithShape="0">
-                    <a:prstClr val="black">
-                      <a:alpha val="27000"/>
-                    </a:prstClr>
-                  </a:outerShdw>
-                </a:effectLst>
-                <a:latin typeface="Sitka Banner" pitchFamily="2" charset="0"/>
-              </a:rPr>
-              <a:t> </a:t>
-            </a:r>
-            <a:r>
-              <a:rPr lang="nl-BE" sz="2400" dirty="0" err="1" smtClean="0">
-                <a:solidFill>
-                  <a:schemeClr val="accent4">
-                    <a:lumMod val="50000"/>
-                  </a:schemeClr>
-                </a:solidFill>
-                <a:effectLst>
-                  <a:outerShdw blurRad="76200" dist="38100" dir="5400000" algn="t" rotWithShape="0">
-                    <a:prstClr val="black">
-                      <a:alpha val="27000"/>
-                    </a:prstClr>
-                  </a:outerShdw>
-                </a:effectLst>
-                <a:latin typeface="Sitka Banner" pitchFamily="2" charset="0"/>
-              </a:rPr>
-              <a:t>Work</a:t>
-            </a:r>
-            <a:r>
-              <a:rPr lang="nl-BE" sz="2400" dirty="0" smtClean="0">
-                <a:solidFill>
-                  <a:schemeClr val="accent4">
-                    <a:lumMod val="50000"/>
-                  </a:schemeClr>
-                </a:solidFill>
-                <a:effectLst>
-                  <a:outerShdw blurRad="76200" dist="38100" dir="5400000" algn="t" rotWithShape="0">
-                    <a:prstClr val="black">
-                      <a:alpha val="27000"/>
-                    </a:prstClr>
-                  </a:outerShdw>
-                </a:effectLst>
-                <a:latin typeface="Sitka Banner" pitchFamily="2" charset="0"/>
-              </a:rPr>
-              <a:t>: 40	</a:t>
-            </a:r>
-            <a:r>
-              <a:rPr lang="nl-BE" sz="2400" dirty="0" err="1" smtClean="0">
-                <a:solidFill>
-                  <a:schemeClr val="accent4">
-                    <a:lumMod val="50000"/>
-                  </a:schemeClr>
-                </a:solidFill>
-                <a:effectLst>
-                  <a:outerShdw blurRad="76200" dist="38100" dir="5400000" algn="t" rotWithShape="0">
-                    <a:prstClr val="black">
-                      <a:alpha val="27000"/>
-                    </a:prstClr>
-                  </a:outerShdw>
-                </a:effectLst>
-                <a:latin typeface="Sitka Banner" pitchFamily="2" charset="0"/>
-              </a:rPr>
-              <a:t>Study</a:t>
-            </a:r>
-            <a:r>
-              <a:rPr lang="nl-BE" sz="2400" dirty="0" smtClean="0">
-                <a:solidFill>
-                  <a:schemeClr val="accent4">
-                    <a:lumMod val="50000"/>
-                  </a:schemeClr>
-                </a:solidFill>
-                <a:effectLst>
-                  <a:outerShdw blurRad="76200" dist="38100" dir="5400000" algn="t" rotWithShape="0">
-                    <a:prstClr val="black">
-                      <a:alpha val="27000"/>
-                    </a:prstClr>
-                  </a:outerShdw>
-                </a:effectLst>
-                <a:latin typeface="Sitka Banner" pitchFamily="2" charset="0"/>
-              </a:rPr>
-              <a:t>: 15</a:t>
-            </a:r>
-          </a:p>
-          <a:p>
-            <a:pPr marL="0" indent="0">
-              <a:buNone/>
-            </a:pPr>
-            <a:endParaRPr lang="nl-BE" b="1" dirty="0"/>
-          </a:p>
-        </p:txBody>
-      </p:sp>
+              <a:rPr lang="nl-BE" sz="2000" dirty="0" smtClean="0"/>
+              <a:t>d.m.v.</a:t>
+            </a:r>
+            <a:br>
+              <a:rPr lang="nl-BE" sz="2000" dirty="0" smtClean="0"/>
+            </a:br>
+            <a:r>
+              <a:rPr lang="nl-BE" sz="2000" dirty="0" err="1" smtClean="0"/>
+              <a:t>DeveloperAssignmentService</a:t>
+            </a:r>
+            <a:endParaRPr lang="nl-BE" sz="2000" dirty="0" smtClean="0"/>
+          </a:p>
+          <a:p>
+            <a:endParaRPr lang="nl-BE" sz="2000" dirty="0"/>
+          </a:p>
+          <a:p>
+            <a:r>
+              <a:rPr lang="nl-BE" sz="2000" dirty="0" smtClean="0"/>
+              <a:t>Nieuwe klasse voor speciale functies</a:t>
+            </a:r>
+            <a:br>
+              <a:rPr lang="nl-BE" sz="2000" dirty="0" smtClean="0"/>
+            </a:br>
+            <a:r>
+              <a:rPr lang="nl-BE" sz="2000" dirty="0" smtClean="0">
+                <a:sym typeface="Wingdings" panose="05000000000000000000" pitchFamily="2" charset="2"/>
+              </a:rPr>
+              <a:t> pure </a:t>
+            </a:r>
+            <a:r>
+              <a:rPr lang="nl-BE" sz="2000" dirty="0" err="1" smtClean="0">
+                <a:sym typeface="Wingdings" panose="05000000000000000000" pitchFamily="2" charset="2"/>
+              </a:rPr>
+              <a:t>fabrication</a:t>
+            </a:r>
+            <a:endParaRPr lang="nl-BE" sz="2000" dirty="0" smtClean="0"/>
+          </a:p>
+        </p:txBody>
+      </p:sp>
+      <p:pic>
+        <p:nvPicPr>
+          <p:cNvPr id="3074" name="Picture 2" descr="C:\Users\Laurens\Documents\IntelliJ Projects\SWOP2016\presentatie\Diagram Images\Puntje 2\AssignmentServices.png"/>
+          <p:cNvPicPr>
+            <a:picLocks noChangeAspect="1" noChangeArrowheads="1"/>
+          </p:cNvPicPr>
+          <p:nvPr/>
+        </p:nvPicPr>
+        <p:blipFill>
+          <a:blip r:embed="rId2">
+            <a:clrChange>
+              <a:clrFrom>
+                <a:srgbClr val="FFFFFF"/>
+              </a:clrFrom>
+              <a:clrTo>
+                <a:srgbClr val="FFFFFF">
+                  <a:alpha val="0"/>
+                </a:srgbClr>
+              </a:clrTo>
+            </a:clrChange>
+            <a:extLst>
+              <a:ext uri="{28A0092B-C50C-407E-A947-70E740481C1C}">
+                <a14:useLocalDpi xmlns:a14="http://schemas.microsoft.com/office/drawing/2010/main" val="0"/>
+              </a:ext>
+            </a:extLst>
+          </a:blip>
+          <a:srcRect/>
+          <a:stretch>
+            <a:fillRect/>
+          </a:stretch>
+        </p:blipFill>
+        <p:spPr bwMode="auto">
+          <a:xfrm>
+            <a:off x="2682799" y="1225704"/>
+            <a:ext cx="6482161" cy="5615136"/>
+          </a:xfrm>
+          <a:prstGeom prst="rect">
+            <a:avLst/>
+          </a:prstGeom>
+          <a:noFill/>
+          <a:extLst>
+            <a:ext uri="{909E8E84-426E-40DD-AFC4-6F175D3DCCD1}">
+              <a14:hiddenFill xmlns:a14="http://schemas.microsoft.com/office/drawing/2010/main">
+                <a:solidFill>
+                  <a:srgbClr val="FFFFFF"/>
+                </a:solidFill>
+              </a14:hiddenFill>
+            </a:ext>
+          </a:extLst>
+        </p:spPr>
+      </p:pic>
     </p:spTree>
     <p:extLst>
       <p:ext uri="{BB962C8B-B14F-4D97-AF65-F5344CB8AC3E}">
-        <p14:creationId xmlns:p14="http://schemas.microsoft.com/office/powerpoint/2010/main" xmlns="" val="1581702792"/>
+        <p14:creationId xmlns:p14="http://schemas.microsoft.com/office/powerpoint/2010/main" val="4089071672"/>
       </p:ext>
     </p:extLst>
   </p:cSld>

</xml_diff>

<commit_message>
Added fragments of SD's to Presentation
</commit_message>
<xml_diff>
--- a/presentatie/SWOP Presentatie Inhoud.pptx
+++ b/presentatie/SWOP Presentatie Inhoud.pptx
@@ -11,16 +11,18 @@
     <p:sldId id="264" r:id="rId5"/>
     <p:sldId id="265" r:id="rId6"/>
     <p:sldId id="258" r:id="rId7"/>
-    <p:sldId id="266" r:id="rId8"/>
-    <p:sldId id="268" r:id="rId9"/>
-    <p:sldId id="267" r:id="rId10"/>
-    <p:sldId id="259" r:id="rId11"/>
-    <p:sldId id="269" r:id="rId12"/>
-    <p:sldId id="270" r:id="rId13"/>
-    <p:sldId id="260" r:id="rId14"/>
-    <p:sldId id="261" r:id="rId15"/>
-    <p:sldId id="271" r:id="rId16"/>
-    <p:sldId id="262" r:id="rId17"/>
+    <p:sldId id="272" r:id="rId8"/>
+    <p:sldId id="266" r:id="rId9"/>
+    <p:sldId id="273" r:id="rId10"/>
+    <p:sldId id="268" r:id="rId11"/>
+    <p:sldId id="267" r:id="rId12"/>
+    <p:sldId id="259" r:id="rId13"/>
+    <p:sldId id="269" r:id="rId14"/>
+    <p:sldId id="270" r:id="rId15"/>
+    <p:sldId id="260" r:id="rId16"/>
+    <p:sldId id="261" r:id="rId17"/>
+    <p:sldId id="271" r:id="rId18"/>
+    <p:sldId id="262" r:id="rId19"/>
   </p:sldIdLst>
   <p:sldSz cx="9144000" cy="6858000" type="screen4x3"/>
   <p:notesSz cx="6858000" cy="9144000"/>
@@ -121,7 +123,7 @@
   </p:defaultTextStyle>
   <p:extLst>
     <p:ext uri="{EFAFB233-063F-42B5-8137-9DF3F51BA10A}">
-      <p15:sldGuideLst xmlns="" xmlns:p15="http://schemas.microsoft.com/office/powerpoint/2012/main">
+      <p15:sldGuideLst xmlns:p15="http://schemas.microsoft.com/office/powerpoint/2012/main" xmlns="">
         <p15:guide id="1" orient="horz" pos="2160">
           <p15:clr>
             <a:srgbClr val="A4A3A4"/>
@@ -3564,6 +3566,27 @@
           <a:lstStyle/>
           <a:p>
             <a:r>
+              <a:rPr lang="nl-BE" sz="3600" cap="small" dirty="0" smtClean="0">
+                <a:ln w="18415" cmpd="sng">
+                  <a:solidFill>
+                    <a:schemeClr val="tx1">
+                      <a:alpha val="0"/>
+                    </a:schemeClr>
+                  </a:solidFill>
+                  <a:prstDash val="solid"/>
+                </a:ln>
+                <a:effectLst>
+                  <a:outerShdw blurRad="25400" dir="3600000" algn="tl" rotWithShape="0">
+                    <a:srgbClr val="000000">
+                      <a:alpha val="70000"/>
+                    </a:srgbClr>
+                  </a:outerShdw>
+                </a:effectLst>
+                <a:latin typeface="Sitka Text" pitchFamily="2" charset="0"/>
+              </a:rPr>
+              <a:t>Services </a:t>
+            </a:r>
+            <a:r>
               <a:rPr lang="nl-BE" sz="3600" cap="small" dirty="0" err="1" smtClean="0">
                 <a:ln w="18415" cmpd="sng">
                   <a:solidFill>
@@ -3582,7 +3605,7 @@
                 </a:effectLst>
                 <a:latin typeface="Sitka Text" pitchFamily="2" charset="0"/>
               </a:rPr>
-              <a:t>Extensibility</a:t>
+              <a:t>to</a:t>
             </a:r>
             <a:r>
               <a:rPr lang="nl-BE" sz="3600" cap="small" dirty="0" smtClean="0">
@@ -3603,28 +3626,7 @@
                 </a:effectLst>
                 <a:latin typeface="Sitka Text" pitchFamily="2" charset="0"/>
               </a:rPr>
-              <a:t> of </a:t>
-            </a:r>
-            <a:r>
-              <a:rPr lang="nl-BE" sz="3600" cap="small" dirty="0" smtClean="0">
-                <a:ln w="18415" cmpd="sng">
-                  <a:solidFill>
-                    <a:schemeClr val="tx1">
-                      <a:alpha val="0"/>
-                    </a:schemeClr>
-                  </a:solidFill>
-                  <a:prstDash val="solid"/>
-                </a:ln>
-                <a:effectLst>
-                  <a:outerShdw blurRad="25400" dir="3600000" algn="tl" rotWithShape="0">
-                    <a:srgbClr val="000000">
-                      <a:alpha val="70000"/>
-                    </a:srgbClr>
-                  </a:outerShdw>
-                </a:effectLst>
-                <a:latin typeface="Sitka Text" pitchFamily="2" charset="0"/>
-              </a:rPr>
-              <a:t>system: Controller </a:t>
+              <a:t> keep track of </a:t>
             </a:r>
             <a:r>
               <a:rPr lang="nl-BE" sz="3600" cap="small" dirty="0" err="1" smtClean="0">
@@ -3645,7 +3647,7 @@
                 </a:effectLst>
                 <a:latin typeface="Sitka Text" pitchFamily="2" charset="0"/>
               </a:rPr>
-              <a:t>layer</a:t>
+              <a:t>lists</a:t>
             </a:r>
             <a:endParaRPr lang="nl-BE" sz="3600" cap="small" dirty="0">
               <a:ln w="18415" cmpd="sng">
@@ -3678,7 +3680,12 @@
             <p:ph idx="1"/>
           </p:nvPr>
         </p:nvSpPr>
-        <p:spPr/>
+        <p:spPr>
+          <a:xfrm>
+            <a:off x="457200" y="1124744"/>
+            <a:ext cx="8229600" cy="5001419"/>
+          </a:xfrm>
+        </p:spPr>
         <p:txBody>
           <a:bodyPr>
             <a:normAutofit/>
@@ -3686,58 +3693,57 @@
           <a:lstStyle/>
           <a:p>
             <a:r>
+              <a:rPr lang="nl-BE" sz="2800" dirty="0" smtClean="0"/>
+              <a:t>Services bevatten functies om:</a:t>
+            </a:r>
+          </a:p>
+          <a:p>
+            <a:pPr lvl="1"/>
+            <a:r>
               <a:rPr lang="nl-BE" sz="2400" dirty="0" smtClean="0"/>
-              <a:t>Flexibel toevoegen van </a:t>
-            </a:r>
-            <a:r>
-              <a:rPr lang="nl-BE" sz="2400" dirty="0" err="1" smtClean="0"/>
-              <a:t>use</a:t>
-            </a:r>
+              <a:t>Lijsten opvragen (specifieke criteria)</a:t>
+            </a:r>
+          </a:p>
+          <a:p>
+            <a:pPr lvl="1"/>
             <a:r>
               <a:rPr lang="nl-BE" sz="2400" dirty="0" smtClean="0"/>
-              <a:t> cases</a:t>
-            </a:r>
-          </a:p>
-          <a:p>
+              <a:t>Lijsten bewerken (enkel mogelijk door service)</a:t>
+            </a:r>
+          </a:p>
+          <a:p>
+            <a:pPr lvl="1"/>
             <a:r>
               <a:rPr lang="nl-BE" sz="2400" dirty="0" smtClean="0"/>
-              <a:t>User type toevoegen gaat eenvoudig</a:t>
-            </a:r>
-          </a:p>
-          <a:p>
-            <a:r>
-              <a:rPr lang="nl-BE" sz="2400" dirty="0" smtClean="0"/>
-              <a:t>UI is onafhankelijk van </a:t>
-            </a:r>
-            <a:r>
-              <a:rPr lang="nl-BE" sz="2400" dirty="0" err="1" smtClean="0"/>
-              <a:t>domeinlaag</a:t>
-            </a:r>
-            <a:endParaRPr lang="nl-BE" sz="2400" dirty="0" smtClean="0"/>
-          </a:p>
-          <a:p>
-            <a:r>
-              <a:rPr lang="nl-BE" sz="2400" dirty="0" smtClean="0"/>
-              <a:t>Interface voor </a:t>
-            </a:r>
-            <a:r>
-              <a:rPr lang="nl-BE" sz="2400" dirty="0" err="1" smtClean="0"/>
-              <a:t>initializer</a:t>
-            </a:r>
-            <a:r>
-              <a:rPr lang="nl-BE" sz="2400" dirty="0" smtClean="0"/>
-              <a:t> maakt nieuwe beginsituaties eenvoudig te implementeren</a:t>
-            </a:r>
-          </a:p>
-          <a:p>
-            <a:endParaRPr lang="nl-BE" sz="2400" dirty="0"/>
+              <a:t>Alsook communicatie met buitenwereld mogelijk te maken</a:t>
+            </a:r>
+          </a:p>
+          <a:p>
+            <a:endParaRPr lang="nl-BE" dirty="0"/>
+          </a:p>
+          <a:p>
+            <a:r>
+              <a:rPr lang="nl-BE" sz="2800" dirty="0" smtClean="0"/>
+              <a:t>Lijsten gebruikt door services zijn </a:t>
+            </a:r>
+            <a:r>
+              <a:rPr lang="nl-BE" sz="2800" b="1" dirty="0" err="1" smtClean="0"/>
+              <a:t>unmodifiable</a:t>
+            </a:r>
+            <a:endParaRPr lang="nl-BE" sz="2800" b="1" dirty="0" smtClean="0"/>
+          </a:p>
+          <a:p>
+            <a:pPr marL="0" indent="0">
+              <a:buNone/>
+            </a:pPr>
+            <a:endParaRPr lang="nl-BE" dirty="0" smtClean="0"/>
           </a:p>
         </p:txBody>
       </p:sp>
     </p:spTree>
     <p:extLst>
       <p:ext uri="{BB962C8B-B14F-4D97-AF65-F5344CB8AC3E}">
-        <p14:creationId xmlns:p14="http://schemas.microsoft.com/office/powerpoint/2010/main" val="2444210159"/>
+        <p14:creationId xmlns:p14="http://schemas.microsoft.com/office/powerpoint/2010/main" val="1617670185"/>
       </p:ext>
     </p:extLst>
   </p:cSld>
@@ -3807,7 +3813,7 @@
                 </a:effectLst>
                 <a:latin typeface="Sitka Text" pitchFamily="2" charset="0"/>
               </a:rPr>
-              <a:t>Extensibility</a:t>
+              <a:t>Usage</a:t>
             </a:r>
             <a:r>
               <a:rPr lang="nl-BE" sz="3600" cap="small" dirty="0" smtClean="0">
@@ -3831,6 +3837,27 @@
               <a:t> of </a:t>
             </a:r>
             <a:r>
+              <a:rPr lang="nl-BE" sz="3600" cap="small" dirty="0" err="1" smtClean="0">
+                <a:ln w="18415" cmpd="sng">
+                  <a:solidFill>
+                    <a:schemeClr val="tx1">
+                      <a:alpha val="0"/>
+                    </a:schemeClr>
+                  </a:solidFill>
+                  <a:prstDash val="solid"/>
+                </a:ln>
+                <a:effectLst>
+                  <a:outerShdw blurRad="25400" dir="3600000" algn="tl" rotWithShape="0">
+                    <a:srgbClr val="000000">
+                      <a:alpha val="70000"/>
+                    </a:srgbClr>
+                  </a:outerShdw>
+                </a:effectLst>
+                <a:latin typeface="Sitka Text" pitchFamily="2" charset="0"/>
+              </a:rPr>
+              <a:t>the</a:t>
+            </a:r>
+            <a:r>
               <a:rPr lang="nl-BE" sz="3600" cap="small" dirty="0" smtClean="0">
                 <a:ln w="18415" cmpd="sng">
                   <a:solidFill>
@@ -3849,7 +3876,7 @@
                 </a:effectLst>
                 <a:latin typeface="Sitka Text" pitchFamily="2" charset="0"/>
               </a:rPr>
-              <a:t>system: Domain </a:t>
+              <a:t> domain </a:t>
             </a:r>
             <a:r>
               <a:rPr lang="nl-BE" sz="3600" cap="small" dirty="0" err="1" smtClean="0">
@@ -3895,7 +3922,7 @@
       </p:sp>
       <p:sp>
         <p:nvSpPr>
-          <p:cNvPr id="3" name="Tijdelijke aanduiding voor inhoud 2"/>
+          <p:cNvPr id="4" name="Tijdelijke aanduiding voor inhoud 3"/>
           <p:cNvSpPr>
             <a:spLocks noGrp="1"/>
           </p:cNvSpPr>
@@ -3903,94 +3930,150 @@
             <p:ph idx="1"/>
           </p:nvPr>
         </p:nvSpPr>
-        <p:spPr/>
+        <p:spPr>
+          <a:xfrm>
+            <a:off x="179512" y="3573016"/>
+            <a:ext cx="8507288" cy="2553147"/>
+          </a:xfrm>
+        </p:spPr>
         <p:txBody>
           <a:bodyPr>
-            <a:normAutofit/>
+            <a:normAutofit lnSpcReduction="10000"/>
           </a:bodyPr>
           <a:lstStyle/>
           <a:p>
             <a:r>
-              <a:rPr lang="nl-BE" sz="2400" dirty="0" err="1" smtClean="0"/>
-              <a:t>Domeinlaag</a:t>
-            </a:r>
-            <a:r>
-              <a:rPr lang="nl-BE" sz="2400" dirty="0" smtClean="0"/>
-              <a:t> is opgesplitst:</a:t>
-            </a:r>
-          </a:p>
-          <a:p>
-            <a:pPr lvl="1"/>
-            <a:r>
               <a:rPr lang="nl-BE" sz="2000" dirty="0" smtClean="0"/>
-              <a:t>Functies doorgeven aan services</a:t>
-            </a:r>
-          </a:p>
-          <a:p>
-            <a:pPr lvl="1"/>
+              <a:t>Toekennen van Tags </a:t>
+            </a:r>
+            <a:r>
+              <a:rPr lang="nl-BE" sz="2000" dirty="0" err="1" smtClean="0"/>
+              <a:t>d.m.v</a:t>
+            </a:r>
+            <a:r>
+              <a:rPr lang="nl-BE" sz="2000" dirty="0"/>
+              <a:t/>
+            </a:r>
+            <a:br>
+              <a:rPr lang="nl-BE" sz="2000" dirty="0"/>
+            </a:br>
+            <a:r>
+              <a:rPr lang="nl-BE" sz="2000" dirty="0" err="1" smtClean="0"/>
+              <a:t>TagAssignmentService</a:t>
+            </a:r>
+            <a:endParaRPr lang="nl-BE" sz="2000" dirty="0" smtClean="0"/>
+          </a:p>
+          <a:p>
+            <a:endParaRPr lang="nl-BE" sz="2000" dirty="0" smtClean="0"/>
+          </a:p>
+          <a:p>
             <a:r>
               <a:rPr lang="nl-BE" sz="2000" dirty="0" smtClean="0"/>
-              <a:t>Lagere koppeling met andere functies uit eenzelfde laag (?)</a:t>
-            </a:r>
-          </a:p>
-          <a:p>
-            <a:pPr lvl="1"/>
+              <a:t>Toewijzen van </a:t>
+            </a:r>
+            <a:r>
+              <a:rPr lang="nl-BE" sz="2000" dirty="0" err="1" smtClean="0"/>
+              <a:t>developer</a:t>
+            </a:r>
+            <a:r>
+              <a:rPr lang="nl-BE" sz="2000" dirty="0"/>
+              <a:t> </a:t>
+            </a:r>
             <a:r>
               <a:rPr lang="nl-BE" sz="2000" dirty="0" smtClean="0"/>
-              <a:t>Voorbeeld: geen dubbele associaties</a:t>
-            </a:r>
-          </a:p>
-          <a:p>
-            <a:pPr lvl="1"/>
+              <a:t>d.m.v.</a:t>
+            </a:r>
+            <a:br>
+              <a:rPr lang="nl-BE" sz="2000" dirty="0" smtClean="0"/>
+            </a:br>
+            <a:r>
+              <a:rPr lang="nl-BE" sz="2000" dirty="0" err="1" smtClean="0"/>
+              <a:t>DeveloperAssignmentService</a:t>
+            </a:r>
+            <a:endParaRPr lang="nl-BE" sz="2000" dirty="0" smtClean="0"/>
+          </a:p>
+          <a:p>
             <a:endParaRPr lang="nl-BE" sz="2000" dirty="0"/>
           </a:p>
           <a:p>
-            <a:pPr marL="400050"/>
-            <a:r>
-              <a:rPr lang="nl-BE" sz="2400" dirty="0" smtClean="0"/>
-              <a:t>Eenvoudig om nieuwe tags toe te voegen</a:t>
-            </a:r>
-          </a:p>
-          <a:p>
-            <a:pPr marL="400050"/>
-            <a:endParaRPr lang="nl-BE" sz="2400" dirty="0"/>
-          </a:p>
-          <a:p>
-            <a:pPr marL="400050"/>
-            <a:r>
-              <a:rPr lang="nl-BE" sz="2400" dirty="0" err="1" smtClean="0"/>
-              <a:t>Subsystems</a:t>
-            </a:r>
-            <a:r>
-              <a:rPr lang="nl-BE" sz="2400" dirty="0" smtClean="0"/>
-              <a:t> + </a:t>
-            </a:r>
-            <a:r>
-              <a:rPr lang="nl-BE" sz="2400" dirty="0" err="1" smtClean="0"/>
-              <a:t>bugreports</a:t>
-            </a:r>
-            <a:r>
-              <a:rPr lang="nl-BE" sz="2400" dirty="0" smtClean="0"/>
-              <a:t> zijn “</a:t>
-            </a:r>
-            <a:r>
-              <a:rPr lang="nl-BE" sz="2400" dirty="0" err="1" smtClean="0"/>
-              <a:t>value”klassen</a:t>
-            </a:r>
-            <a:r>
-              <a:rPr lang="nl-BE" sz="2400" dirty="0" smtClean="0"/>
-              <a:t> </a:t>
-            </a:r>
-          </a:p>
-          <a:p>
-            <a:endParaRPr lang="nl-BE" sz="2400" dirty="0"/>
-          </a:p>
-        </p:txBody>
-      </p:sp>
+            <a:r>
+              <a:rPr lang="nl-BE" sz="2000" dirty="0" smtClean="0"/>
+              <a:t>Nieuwe klasse voor speciale functies</a:t>
+            </a:r>
+            <a:br>
+              <a:rPr lang="nl-BE" sz="2000" dirty="0" smtClean="0"/>
+            </a:br>
+            <a:r>
+              <a:rPr lang="nl-BE" sz="2000" dirty="0" smtClean="0">
+                <a:sym typeface="Wingdings" panose="05000000000000000000" pitchFamily="2" charset="2"/>
+              </a:rPr>
+              <a:t> pure </a:t>
+            </a:r>
+            <a:r>
+              <a:rPr lang="nl-BE" sz="2000" dirty="0" err="1" smtClean="0">
+                <a:sym typeface="Wingdings" panose="05000000000000000000" pitchFamily="2" charset="2"/>
+              </a:rPr>
+              <a:t>fabrication</a:t>
+            </a:r>
+            <a:endParaRPr lang="nl-BE" sz="2000" dirty="0" smtClean="0"/>
+          </a:p>
+        </p:txBody>
+      </p:sp>
+      <p:pic>
+        <p:nvPicPr>
+          <p:cNvPr id="3074" name="Picture 2" descr="C:\Users\Laurens\Documents\IntelliJ Projects\SWOP2016\presentatie\Diagram Images\Puntje 2\AssignmentServices.png"/>
+          <p:cNvPicPr>
+            <a:picLocks noChangeAspect="1" noChangeArrowheads="1"/>
+          </p:cNvPicPr>
+          <p:nvPr/>
+        </p:nvPicPr>
+        <p:blipFill>
+          <a:blip r:embed="rId2">
+            <a:clrChange>
+              <a:clrFrom>
+                <a:srgbClr val="FFFFFF"/>
+              </a:clrFrom>
+              <a:clrTo>
+                <a:srgbClr val="FFFFFF">
+                  <a:alpha val="0"/>
+                </a:srgbClr>
+              </a:clrTo>
+            </a:clrChange>
+            <a:extLst>
+              <a:ext uri="{28A0092B-C50C-407E-A947-70E740481C1C}">
+                <a14:useLocalDpi xmlns:a14="http://schemas.microsoft.com/office/drawing/2010/main" val="0"/>
+              </a:ext>
+            </a:extLst>
+          </a:blip>
+          <a:srcRect/>
+          <a:stretch>
+            <a:fillRect/>
+          </a:stretch>
+        </p:blipFill>
+        <p:spPr bwMode="auto">
+          <a:xfrm>
+            <a:off x="2682799" y="1225704"/>
+            <a:ext cx="6482161" cy="5615136"/>
+          </a:xfrm>
+          <a:prstGeom prst="rect">
+            <a:avLst/>
+          </a:prstGeom>
+          <a:noFill/>
+          <a:extLst>
+            <a:ext uri="{909E8E84-426E-40DD-AFC4-6F175D3DCCD1}">
+              <a14:hiddenFill xmlns:a14="http://schemas.microsoft.com/office/drawing/2010/main">
+                <a:solidFill>
+                  <a:srgbClr val="FFFFFF"/>
+                </a:solidFill>
+              </a14:hiddenFill>
+            </a:ext>
+          </a:extLst>
+        </p:spPr>
+      </p:pic>
     </p:spTree>
     <p:extLst>
       <p:ext uri="{BB962C8B-B14F-4D97-AF65-F5344CB8AC3E}">
-        <p14:creationId xmlns:p14="http://schemas.microsoft.com/office/powerpoint/2010/main" val="2991894533"/>
+        <p14:creationId xmlns:p14="http://schemas.microsoft.com/office/powerpoint/2010/main" val="4089071672"/>
       </p:ext>
     </p:extLst>
   </p:cSld>
@@ -4060,7 +4143,7 @@
                 </a:effectLst>
                 <a:latin typeface="Sitka Text" pitchFamily="2" charset="0"/>
               </a:rPr>
-              <a:t>Possible</a:t>
+              <a:t>Extensibility</a:t>
             </a:r>
             <a:r>
               <a:rPr lang="nl-BE" sz="3600" cap="small" dirty="0" smtClean="0">
@@ -4081,7 +4164,7 @@
                 </a:effectLst>
                 <a:latin typeface="Sitka Text" pitchFamily="2" charset="0"/>
               </a:rPr>
-              <a:t> </a:t>
+              <a:t> of system: Controller </a:t>
             </a:r>
             <a:r>
               <a:rPr lang="nl-BE" sz="3600" cap="small" dirty="0" err="1" smtClean="0">
@@ -4102,7 +4185,7 @@
                 </a:effectLst>
                 <a:latin typeface="Sitka Text" pitchFamily="2" charset="0"/>
               </a:rPr>
-              <a:t>improvements</a:t>
+              <a:t>layer</a:t>
             </a:r>
             <a:endParaRPr lang="nl-BE" sz="3600" cap="small" dirty="0">
               <a:ln w="18415" cmpd="sng">
@@ -4144,117 +4227,57 @@
           <a:p>
             <a:r>
               <a:rPr lang="nl-BE" sz="2400" dirty="0" smtClean="0"/>
-              <a:t>Klassen voor </a:t>
+              <a:t>Flexibel toevoegen van </a:t>
             </a:r>
             <a:r>
               <a:rPr lang="nl-BE" sz="2400" dirty="0" err="1" smtClean="0"/>
-              <a:t>Admin</a:t>
+              <a:t>use</a:t>
             </a:r>
             <a:r>
               <a:rPr lang="nl-BE" sz="2400" dirty="0" smtClean="0"/>
-              <a:t>, </a:t>
+              <a:t> cases</a:t>
+            </a:r>
+          </a:p>
+          <a:p>
+            <a:r>
+              <a:rPr lang="nl-BE" sz="2400" dirty="0" smtClean="0"/>
+              <a:t>User type toevoegen gaat eenvoudig</a:t>
+            </a:r>
+          </a:p>
+          <a:p>
+            <a:r>
+              <a:rPr lang="nl-BE" sz="2400" dirty="0" smtClean="0"/>
+              <a:t>UI is onafhankelijk van </a:t>
             </a:r>
             <a:r>
               <a:rPr lang="nl-BE" sz="2400" dirty="0" err="1" smtClean="0"/>
-              <a:t>Issuer</a:t>
-            </a:r>
+              <a:t>domeinlaag</a:t>
+            </a:r>
+            <a:endParaRPr lang="nl-BE" sz="2400" dirty="0" smtClean="0"/>
+          </a:p>
+          <a:p>
             <a:r>
               <a:rPr lang="nl-BE" sz="2400" dirty="0" smtClean="0"/>
-              <a:t> &amp; Developer zijn overbodig</a:t>
-            </a:r>
-          </a:p>
-          <a:p>
-            <a:pPr lvl="1"/>
-            <a:r>
-              <a:rPr lang="nl-BE" sz="2000" dirty="0" smtClean="0"/>
-              <a:t>Functionaliteit in controller</a:t>
+              <a:t>Interface voor </a:t>
+            </a:r>
+            <a:r>
+              <a:rPr lang="nl-BE" sz="2400" dirty="0" err="1" smtClean="0"/>
+              <a:t>initializer</a:t>
+            </a:r>
+            <a:r>
+              <a:rPr lang="nl-BE" sz="2400" dirty="0" smtClean="0"/>
+              <a:t> maakt nieuwe beginsituaties eenvoudig te implementeren</a:t>
             </a:r>
           </a:p>
           <a:p>
             <a:endParaRPr lang="nl-BE" sz="2400" dirty="0"/>
-          </a:p>
-          <a:p>
-            <a:r>
-              <a:rPr lang="nl-BE" sz="2400" dirty="0" smtClean="0"/>
-              <a:t>Vermijden dat tags van elkaar afweten</a:t>
-            </a:r>
-            <a:endParaRPr lang="nl-BE" sz="2000" dirty="0"/>
-          </a:p>
-          <a:p>
-            <a:pPr lvl="1"/>
-            <a:r>
-              <a:rPr lang="nl-BE" sz="2000" dirty="0" smtClean="0"/>
-              <a:t>Nieuwe klasse voor </a:t>
-            </a:r>
-            <a:r>
-              <a:rPr lang="nl-BE" sz="2000" dirty="0" err="1" smtClean="0"/>
-              <a:t>overgangfunctionaliteit</a:t>
-            </a:r>
-            <a:endParaRPr lang="nl-BE" sz="2000" dirty="0" smtClean="0"/>
-          </a:p>
-          <a:p>
-            <a:endParaRPr lang="nl-BE" sz="2400" dirty="0"/>
-          </a:p>
-          <a:p>
-            <a:r>
-              <a:rPr lang="nl-BE" sz="2400" dirty="0" smtClean="0"/>
-              <a:t>Opzoeken van </a:t>
-            </a:r>
-            <a:r>
-              <a:rPr lang="nl-BE" sz="2400" dirty="0" err="1" smtClean="0"/>
-              <a:t>bugreport</a:t>
-            </a:r>
-            <a:r>
-              <a:rPr lang="nl-BE" sz="2400" dirty="0" smtClean="0"/>
-              <a:t> implementeren m.b.v. </a:t>
-            </a:r>
-            <a:r>
-              <a:rPr lang="nl-BE" sz="2400" dirty="0" err="1" smtClean="0"/>
-              <a:t>strategy</a:t>
-            </a:r>
-            <a:r>
-              <a:rPr lang="nl-BE" sz="2400" dirty="0" smtClean="0"/>
-              <a:t> </a:t>
-            </a:r>
-            <a:r>
-              <a:rPr lang="nl-BE" sz="2400" dirty="0" err="1" smtClean="0"/>
-              <a:t>pattern</a:t>
-            </a:r>
-            <a:endParaRPr lang="nl-BE" sz="2400" dirty="0" smtClean="0"/>
-          </a:p>
-          <a:p>
-            <a:pPr lvl="1"/>
-            <a:r>
-              <a:rPr lang="nl-BE" sz="2000" dirty="0" smtClean="0"/>
-              <a:t>Interface “</a:t>
-            </a:r>
-            <a:r>
-              <a:rPr lang="nl-BE" sz="2000" dirty="0" err="1" smtClean="0"/>
-              <a:t>ISearch</a:t>
-            </a:r>
-            <a:r>
-              <a:rPr lang="nl-BE" sz="2000" dirty="0" smtClean="0"/>
-              <a:t>”</a:t>
-            </a:r>
-          </a:p>
-          <a:p>
-            <a:pPr lvl="1"/>
-            <a:r>
-              <a:rPr lang="nl-BE" sz="2000" dirty="0" smtClean="0"/>
-              <a:t>Resulteert in lagere koppeling in </a:t>
-            </a:r>
-            <a:r>
-              <a:rPr lang="nl-BE" sz="2000" dirty="0" err="1" smtClean="0"/>
-              <a:t>BugReportService</a:t>
-            </a:r>
-            <a:endParaRPr lang="nl-BE" sz="2000" dirty="0" smtClean="0"/>
           </a:p>
         </p:txBody>
       </p:sp>
     </p:spTree>
     <p:extLst>
       <p:ext uri="{BB962C8B-B14F-4D97-AF65-F5344CB8AC3E}">
-        <p14:creationId xmlns:p14="http://schemas.microsoft.com/office/powerpoint/2010/main" val="674970378"/>
+        <p14:creationId xmlns:p14="http://schemas.microsoft.com/office/powerpoint/2010/main" val="2444210159"/>
       </p:ext>
     </p:extLst>
   </p:cSld>
@@ -4324,7 +4347,7 @@
                 </a:effectLst>
                 <a:latin typeface="Sitka Text" pitchFamily="2" charset="0"/>
               </a:rPr>
-              <a:t>Testing</a:t>
+              <a:t>Extensibility</a:t>
             </a:r>
             <a:r>
               <a:rPr lang="nl-BE" sz="3600" cap="small" dirty="0" smtClean="0">
@@ -4345,7 +4368,28 @@
                 </a:effectLst>
                 <a:latin typeface="Sitka Text" pitchFamily="2" charset="0"/>
               </a:rPr>
-              <a:t> approach</a:t>
+              <a:t> of system: Domain </a:t>
+            </a:r>
+            <a:r>
+              <a:rPr lang="nl-BE" sz="3600" cap="small" dirty="0" err="1" smtClean="0">
+                <a:ln w="18415" cmpd="sng">
+                  <a:solidFill>
+                    <a:schemeClr val="tx1">
+                      <a:alpha val="0"/>
+                    </a:schemeClr>
+                  </a:solidFill>
+                  <a:prstDash val="solid"/>
+                </a:ln>
+                <a:effectLst>
+                  <a:outerShdw blurRad="25400" dir="3600000" algn="tl" rotWithShape="0">
+                    <a:srgbClr val="000000">
+                      <a:alpha val="70000"/>
+                    </a:srgbClr>
+                  </a:outerShdw>
+                </a:effectLst>
+                <a:latin typeface="Sitka Text" pitchFamily="2" charset="0"/>
+              </a:rPr>
+              <a:t>layer</a:t>
             </a:r>
             <a:endParaRPr lang="nl-BE" sz="3600" cap="small" dirty="0">
               <a:ln w="18415" cmpd="sng">
@@ -4385,146 +4429,87 @@
           </a:bodyPr>
           <a:lstStyle/>
           <a:p>
-            <a:pPr marL="0" indent="0">
-              <a:buNone/>
-            </a:pPr>
-            <a:r>
-              <a:rPr lang="nl-BE" sz="2400" b="1" dirty="0" smtClean="0"/>
-              <a:t>Twee mogelijkheden:</a:t>
-            </a:r>
-          </a:p>
-          <a:p>
-            <a:pPr marL="457200" indent="-457200">
-              <a:buFont typeface="+mj-lt"/>
-              <a:buAutoNum type="arabicPeriod"/>
-            </a:pPr>
+            <a:r>
+              <a:rPr lang="nl-BE" sz="2400" dirty="0" err="1" smtClean="0"/>
+              <a:t>Domeinlaag</a:t>
+            </a:r>
             <a:r>
               <a:rPr lang="nl-BE" sz="2400" dirty="0" smtClean="0"/>
-              <a:t>Test schrijven voor elke klasse in zelfde package</a:t>
-            </a:r>
-          </a:p>
-          <a:p>
-            <a:pPr marL="457200" indent="-457200">
-              <a:buFont typeface="+mj-lt"/>
-              <a:buAutoNum type="arabicPeriod"/>
-            </a:pPr>
+              <a:t> is opgesplitst:</a:t>
+            </a:r>
+          </a:p>
+          <a:p>
+            <a:pPr lvl="1"/>
+            <a:r>
+              <a:rPr lang="nl-BE" sz="2000" dirty="0" smtClean="0"/>
+              <a:t>Functies doorgeven aan services</a:t>
+            </a:r>
+          </a:p>
+          <a:p>
+            <a:pPr lvl="1"/>
+            <a:r>
+              <a:rPr lang="nl-BE" sz="2000" dirty="0" smtClean="0"/>
+              <a:t>Lagere koppeling met andere functies uit eenzelfde laag (?)</a:t>
+            </a:r>
+          </a:p>
+          <a:p>
+            <a:pPr lvl="1"/>
+            <a:r>
+              <a:rPr lang="nl-BE" sz="2000" dirty="0" smtClean="0"/>
+              <a:t>Voorbeeld: geen dubbele associaties</a:t>
+            </a:r>
+          </a:p>
+          <a:p>
+            <a:pPr lvl="1"/>
+            <a:endParaRPr lang="nl-BE" sz="2000" dirty="0"/>
+          </a:p>
+          <a:p>
+            <a:pPr marL="400050"/>
+            <a:r>
+              <a:rPr lang="nl-BE" sz="2400" dirty="0" smtClean="0"/>
+              <a:t>Eenvoudig om nieuwe tags toe te voegen</a:t>
+            </a:r>
+          </a:p>
+          <a:p>
+            <a:pPr marL="400050"/>
             <a:endParaRPr lang="nl-BE" sz="2400" dirty="0"/>
           </a:p>
           <a:p>
-            <a:pPr marL="457200" indent="-457200">
-              <a:buFont typeface="+mj-lt"/>
-              <a:buAutoNum type="arabicPeriod"/>
-            </a:pPr>
+            <a:pPr marL="400050"/>
+            <a:r>
+              <a:rPr lang="nl-BE" sz="2400" dirty="0" err="1" smtClean="0"/>
+              <a:t>Subsystems</a:t>
+            </a:r>
             <a:r>
               <a:rPr lang="nl-BE" sz="2400" dirty="0" smtClean="0"/>
-              <a:t>Via een hogere laag een lagere laag testen</a:t>
-            </a:r>
-          </a:p>
-          <a:p>
-            <a:pPr lvl="1" indent="-342900">
-              <a:buFont typeface="Wingdings"/>
-              <a:buChar char="à"/>
-            </a:pPr>
-            <a:r>
-              <a:rPr lang="nl-BE" sz="2000" dirty="0" smtClean="0">
-                <a:sym typeface="Wingdings" panose="05000000000000000000" pitchFamily="2" charset="2"/>
-              </a:rPr>
-              <a:t>Noodzakelijk wegens </a:t>
-            </a:r>
-            <a:r>
-              <a:rPr lang="nl-BE" sz="2000" dirty="0" err="1" smtClean="0">
-                <a:sym typeface="Wingdings" panose="05000000000000000000" pitchFamily="2" charset="2"/>
-              </a:rPr>
-              <a:t>visibility</a:t>
-            </a:r>
-            <a:r>
-              <a:rPr lang="nl-BE" sz="2000" dirty="0" smtClean="0">
-                <a:sym typeface="Wingdings" panose="05000000000000000000" pitchFamily="2" charset="2"/>
-              </a:rPr>
-              <a:t> constraints</a:t>
-            </a:r>
-          </a:p>
-          <a:p>
-            <a:pPr lvl="1" indent="-342900">
-              <a:buFont typeface="Wingdings"/>
-              <a:buChar char="à"/>
-            </a:pPr>
-            <a:r>
-              <a:rPr lang="nl-BE" sz="2000" dirty="0" smtClean="0">
-                <a:sym typeface="Wingdings" panose="05000000000000000000" pitchFamily="2" charset="2"/>
-              </a:rPr>
-              <a:t>Moeilijker wegens gelaagde hiërarchie</a:t>
-            </a:r>
-          </a:p>
-          <a:p>
-            <a:pPr marL="0" indent="0">
-              <a:buNone/>
-            </a:pPr>
-            <a:endParaRPr lang="nl-BE" sz="2400" dirty="0">
-              <a:sym typeface="Wingdings" panose="05000000000000000000" pitchFamily="2" charset="2"/>
-            </a:endParaRPr>
-          </a:p>
-          <a:p>
-            <a:pPr marL="0" indent="0">
-              <a:buNone/>
-            </a:pPr>
-            <a:r>
-              <a:rPr lang="nl-BE" sz="2400" b="1" dirty="0" smtClean="0">
-                <a:sym typeface="Wingdings" panose="05000000000000000000" pitchFamily="2" charset="2"/>
-              </a:rPr>
-              <a:t>Test strategie voor </a:t>
-            </a:r>
-            <a:r>
-              <a:rPr lang="nl-BE" sz="2400" b="1" dirty="0" err="1" smtClean="0">
-                <a:sym typeface="Wingdings" panose="05000000000000000000" pitchFamily="2" charset="2"/>
-              </a:rPr>
-              <a:t>use</a:t>
-            </a:r>
-            <a:r>
-              <a:rPr lang="nl-BE" sz="2400" b="1" dirty="0" smtClean="0">
-                <a:sym typeface="Wingdings" panose="05000000000000000000" pitchFamily="2" charset="2"/>
-              </a:rPr>
-              <a:t> cases</a:t>
-            </a:r>
-            <a:endParaRPr lang="nl-BE" sz="2400" dirty="0" smtClean="0">
-              <a:sym typeface="Wingdings" panose="05000000000000000000" pitchFamily="2" charset="2"/>
-            </a:endParaRPr>
-          </a:p>
-          <a:p>
-            <a:r>
-              <a:rPr lang="nl-BE" sz="2400" dirty="0" err="1" smtClean="0">
-                <a:sym typeface="Wingdings" panose="05000000000000000000" pitchFamily="2" charset="2"/>
-              </a:rPr>
-              <a:t>TestUI</a:t>
-            </a:r>
-            <a:r>
-              <a:rPr lang="nl-BE" sz="2400" dirty="0" smtClean="0">
-                <a:sym typeface="Wingdings" panose="05000000000000000000" pitchFamily="2" charset="2"/>
-              </a:rPr>
-              <a:t>  IUI  vaste waarden voor elke </a:t>
-            </a:r>
-            <a:r>
-              <a:rPr lang="nl-BE" sz="2400" dirty="0" err="1" smtClean="0">
-                <a:sym typeface="Wingdings" panose="05000000000000000000" pitchFamily="2" charset="2"/>
-              </a:rPr>
-              <a:t>use</a:t>
-            </a:r>
-            <a:r>
-              <a:rPr lang="nl-BE" sz="2400" dirty="0" smtClean="0">
-                <a:sym typeface="Wingdings" panose="05000000000000000000" pitchFamily="2" charset="2"/>
-              </a:rPr>
-              <a:t> case  testen</a:t>
-            </a:r>
-            <a:endParaRPr lang="nl-BE" sz="2400" dirty="0">
-              <a:sym typeface="Wingdings" panose="05000000000000000000" pitchFamily="2" charset="2"/>
-            </a:endParaRPr>
+              <a:t> + </a:t>
+            </a:r>
+            <a:r>
+              <a:rPr lang="nl-BE" sz="2400" dirty="0" err="1" smtClean="0"/>
+              <a:t>bugreports</a:t>
+            </a:r>
+            <a:r>
+              <a:rPr lang="nl-BE" sz="2400" dirty="0" smtClean="0"/>
+              <a:t> zijn “</a:t>
+            </a:r>
+            <a:r>
+              <a:rPr lang="nl-BE" sz="2400" dirty="0" err="1" smtClean="0"/>
+              <a:t>value”klassen</a:t>
+            </a:r>
+            <a:r>
+              <a:rPr lang="nl-BE" sz="2400" dirty="0" smtClean="0"/>
+              <a:t> </a:t>
+            </a:r>
+          </a:p>
+          <a:p>
+            <a:endParaRPr lang="nl-BE" sz="2400" dirty="0"/>
           </a:p>
         </p:txBody>
       </p:sp>
     </p:spTree>
     <p:extLst>
       <p:ext uri="{BB962C8B-B14F-4D97-AF65-F5344CB8AC3E}">
-        <p14:creationId xmlns:p14="http://schemas.microsoft.com/office/powerpoint/2010/main" val="3176464878"/>
+        <p14:creationId xmlns:p14="http://schemas.microsoft.com/office/powerpoint/2010/main" val="2991894533"/>
       </p:ext>
     </p:extLst>
   </p:cSld>
@@ -4576,6 +4561,540 @@
           <a:lstStyle/>
           <a:p>
             <a:r>
+              <a:rPr lang="nl-BE" sz="3600" cap="small" dirty="0" err="1" smtClean="0">
+                <a:ln w="18415" cmpd="sng">
+                  <a:solidFill>
+                    <a:schemeClr val="tx1">
+                      <a:alpha val="0"/>
+                    </a:schemeClr>
+                  </a:solidFill>
+                  <a:prstDash val="solid"/>
+                </a:ln>
+                <a:effectLst>
+                  <a:outerShdw blurRad="25400" dir="3600000" algn="tl" rotWithShape="0">
+                    <a:srgbClr val="000000">
+                      <a:alpha val="70000"/>
+                    </a:srgbClr>
+                  </a:outerShdw>
+                </a:effectLst>
+                <a:latin typeface="Sitka Text" pitchFamily="2" charset="0"/>
+              </a:rPr>
+              <a:t>Possible</a:t>
+            </a:r>
+            <a:r>
+              <a:rPr lang="nl-BE" sz="3600" cap="small" dirty="0" smtClean="0">
+                <a:ln w="18415" cmpd="sng">
+                  <a:solidFill>
+                    <a:schemeClr val="tx1">
+                      <a:alpha val="0"/>
+                    </a:schemeClr>
+                  </a:solidFill>
+                  <a:prstDash val="solid"/>
+                </a:ln>
+                <a:effectLst>
+                  <a:outerShdw blurRad="25400" dir="3600000" algn="tl" rotWithShape="0">
+                    <a:srgbClr val="000000">
+                      <a:alpha val="70000"/>
+                    </a:srgbClr>
+                  </a:outerShdw>
+                </a:effectLst>
+                <a:latin typeface="Sitka Text" pitchFamily="2" charset="0"/>
+              </a:rPr>
+              <a:t> </a:t>
+            </a:r>
+            <a:r>
+              <a:rPr lang="nl-BE" sz="3600" cap="small" dirty="0" err="1" smtClean="0">
+                <a:ln w="18415" cmpd="sng">
+                  <a:solidFill>
+                    <a:schemeClr val="tx1">
+                      <a:alpha val="0"/>
+                    </a:schemeClr>
+                  </a:solidFill>
+                  <a:prstDash val="solid"/>
+                </a:ln>
+                <a:effectLst>
+                  <a:outerShdw blurRad="25400" dir="3600000" algn="tl" rotWithShape="0">
+                    <a:srgbClr val="000000">
+                      <a:alpha val="70000"/>
+                    </a:srgbClr>
+                  </a:outerShdw>
+                </a:effectLst>
+                <a:latin typeface="Sitka Text" pitchFamily="2" charset="0"/>
+              </a:rPr>
+              <a:t>improvements</a:t>
+            </a:r>
+            <a:endParaRPr lang="nl-BE" sz="3600" cap="small" dirty="0">
+              <a:ln w="18415" cmpd="sng">
+                <a:solidFill>
+                  <a:schemeClr val="tx1">
+                    <a:alpha val="0"/>
+                  </a:schemeClr>
+                </a:solidFill>
+                <a:prstDash val="solid"/>
+              </a:ln>
+              <a:effectLst>
+                <a:outerShdw blurRad="25400" dir="3600000" algn="tl" rotWithShape="0">
+                  <a:srgbClr val="000000">
+                    <a:alpha val="70000"/>
+                  </a:srgbClr>
+                </a:outerShdw>
+              </a:effectLst>
+              <a:latin typeface="Sitka Text" pitchFamily="2" charset="0"/>
+            </a:endParaRPr>
+          </a:p>
+        </p:txBody>
+      </p:sp>
+      <p:sp>
+        <p:nvSpPr>
+          <p:cNvPr id="3" name="Tijdelijke aanduiding voor inhoud 2"/>
+          <p:cNvSpPr>
+            <a:spLocks noGrp="1"/>
+          </p:cNvSpPr>
+          <p:nvPr>
+            <p:ph idx="1"/>
+          </p:nvPr>
+        </p:nvSpPr>
+        <p:spPr/>
+        <p:txBody>
+          <a:bodyPr>
+            <a:normAutofit/>
+          </a:bodyPr>
+          <a:lstStyle/>
+          <a:p>
+            <a:r>
+              <a:rPr lang="nl-BE" sz="2400" dirty="0" smtClean="0"/>
+              <a:t>Klassen voor </a:t>
+            </a:r>
+            <a:r>
+              <a:rPr lang="nl-BE" sz="2400" dirty="0" err="1" smtClean="0"/>
+              <a:t>Admin</a:t>
+            </a:r>
+            <a:r>
+              <a:rPr lang="nl-BE" sz="2400" dirty="0" smtClean="0"/>
+              <a:t>, </a:t>
+            </a:r>
+            <a:r>
+              <a:rPr lang="nl-BE" sz="2400" dirty="0" err="1" smtClean="0"/>
+              <a:t>Issuer</a:t>
+            </a:r>
+            <a:r>
+              <a:rPr lang="nl-BE" sz="2400" dirty="0" smtClean="0"/>
+              <a:t> &amp; Developer zijn overbodig</a:t>
+            </a:r>
+          </a:p>
+          <a:p>
+            <a:pPr lvl="1"/>
+            <a:r>
+              <a:rPr lang="nl-BE" sz="2000" dirty="0" smtClean="0"/>
+              <a:t>Functionaliteit in controller</a:t>
+            </a:r>
+          </a:p>
+          <a:p>
+            <a:endParaRPr lang="nl-BE" sz="2400" dirty="0"/>
+          </a:p>
+          <a:p>
+            <a:r>
+              <a:rPr lang="nl-BE" sz="2400" dirty="0" smtClean="0"/>
+              <a:t>Vermijden dat tags van elkaar afweten</a:t>
+            </a:r>
+            <a:endParaRPr lang="nl-BE" sz="2000" dirty="0"/>
+          </a:p>
+          <a:p>
+            <a:pPr lvl="1"/>
+            <a:r>
+              <a:rPr lang="nl-BE" sz="2000" dirty="0" smtClean="0"/>
+              <a:t>Nieuwe klasse voor </a:t>
+            </a:r>
+            <a:r>
+              <a:rPr lang="nl-BE" sz="2000" dirty="0" err="1" smtClean="0"/>
+              <a:t>overgangfunctionaliteit</a:t>
+            </a:r>
+            <a:endParaRPr lang="nl-BE" sz="2000" dirty="0" smtClean="0"/>
+          </a:p>
+          <a:p>
+            <a:endParaRPr lang="nl-BE" sz="2400" dirty="0"/>
+          </a:p>
+          <a:p>
+            <a:r>
+              <a:rPr lang="nl-BE" sz="2400" dirty="0" smtClean="0"/>
+              <a:t>Opzoeken van </a:t>
+            </a:r>
+            <a:r>
+              <a:rPr lang="nl-BE" sz="2400" dirty="0" err="1" smtClean="0"/>
+              <a:t>bugreport</a:t>
+            </a:r>
+            <a:r>
+              <a:rPr lang="nl-BE" sz="2400" dirty="0" smtClean="0"/>
+              <a:t> implementeren m.b.v. </a:t>
+            </a:r>
+            <a:r>
+              <a:rPr lang="nl-BE" sz="2400" dirty="0" err="1" smtClean="0"/>
+              <a:t>strategy</a:t>
+            </a:r>
+            <a:r>
+              <a:rPr lang="nl-BE" sz="2400" dirty="0" smtClean="0"/>
+              <a:t> </a:t>
+            </a:r>
+            <a:r>
+              <a:rPr lang="nl-BE" sz="2400" dirty="0" err="1" smtClean="0"/>
+              <a:t>pattern</a:t>
+            </a:r>
+            <a:endParaRPr lang="nl-BE" sz="2400" dirty="0" smtClean="0"/>
+          </a:p>
+          <a:p>
+            <a:pPr lvl="1"/>
+            <a:r>
+              <a:rPr lang="nl-BE" sz="2000" dirty="0" smtClean="0"/>
+              <a:t>Interface “</a:t>
+            </a:r>
+            <a:r>
+              <a:rPr lang="nl-BE" sz="2000" dirty="0" err="1" smtClean="0"/>
+              <a:t>ISearch</a:t>
+            </a:r>
+            <a:r>
+              <a:rPr lang="nl-BE" sz="2000" dirty="0" smtClean="0"/>
+              <a:t>”</a:t>
+            </a:r>
+          </a:p>
+          <a:p>
+            <a:pPr lvl="1"/>
+            <a:r>
+              <a:rPr lang="nl-BE" sz="2000" dirty="0" smtClean="0"/>
+              <a:t>Resulteert in lagere koppeling in </a:t>
+            </a:r>
+            <a:r>
+              <a:rPr lang="nl-BE" sz="2000" dirty="0" err="1" smtClean="0"/>
+              <a:t>BugReportService</a:t>
+            </a:r>
+            <a:endParaRPr lang="nl-BE" sz="2000" dirty="0" smtClean="0"/>
+          </a:p>
+        </p:txBody>
+      </p:sp>
+    </p:spTree>
+    <p:extLst>
+      <p:ext uri="{BB962C8B-B14F-4D97-AF65-F5344CB8AC3E}">
+        <p14:creationId xmlns:p14="http://schemas.microsoft.com/office/powerpoint/2010/main" val="674970378"/>
+      </p:ext>
+    </p:extLst>
+  </p:cSld>
+  <p:clrMapOvr>
+    <a:masterClrMapping/>
+  </p:clrMapOvr>
+  <p:timing>
+    <p:tnLst>
+      <p:par>
+        <p:cTn id="1" dur="indefinite" restart="never" nodeType="tmRoot"/>
+      </p:par>
+    </p:tnLst>
+  </p:timing>
+</p:sld>
+</file>
+
+<file path=ppt/slides/slide15.xml><?xml version="1.0" encoding="utf-8"?>
+<p:sld xmlns:a="http://schemas.openxmlformats.org/drawingml/2006/main" xmlns:r="http://schemas.openxmlformats.org/officeDocument/2006/relationships" xmlns:p="http://schemas.openxmlformats.org/presentationml/2006/main">
+  <p:cSld>
+    <p:spTree>
+      <p:nvGrpSpPr>
+        <p:cNvPr id="1" name=""/>
+        <p:cNvGrpSpPr/>
+        <p:nvPr/>
+      </p:nvGrpSpPr>
+      <p:grpSpPr>
+        <a:xfrm>
+          <a:off x="0" y="0"/>
+          <a:ext cx="0" cy="0"/>
+          <a:chOff x="0" y="0"/>
+          <a:chExt cx="0" cy="0"/>
+        </a:xfrm>
+      </p:grpSpPr>
+      <p:sp>
+        <p:nvSpPr>
+          <p:cNvPr id="2" name="Titel 1"/>
+          <p:cNvSpPr>
+            <a:spLocks noGrp="1"/>
+          </p:cNvSpPr>
+          <p:nvPr>
+            <p:ph type="title"/>
+          </p:nvPr>
+        </p:nvSpPr>
+        <p:spPr/>
+        <p:txBody>
+          <a:bodyPr>
+            <a:normAutofit/>
+          </a:bodyPr>
+          <a:lstStyle/>
+          <a:p>
+            <a:r>
+              <a:rPr lang="nl-BE" sz="3600" cap="small" dirty="0" err="1" smtClean="0">
+                <a:ln w="18415" cmpd="sng">
+                  <a:solidFill>
+                    <a:schemeClr val="tx1">
+                      <a:alpha val="0"/>
+                    </a:schemeClr>
+                  </a:solidFill>
+                  <a:prstDash val="solid"/>
+                </a:ln>
+                <a:effectLst>
+                  <a:outerShdw blurRad="25400" dir="3600000" algn="tl" rotWithShape="0">
+                    <a:srgbClr val="000000">
+                      <a:alpha val="70000"/>
+                    </a:srgbClr>
+                  </a:outerShdw>
+                </a:effectLst>
+                <a:latin typeface="Sitka Text" pitchFamily="2" charset="0"/>
+              </a:rPr>
+              <a:t>Testing</a:t>
+            </a:r>
+            <a:r>
+              <a:rPr lang="nl-BE" sz="3600" cap="small" dirty="0" smtClean="0">
+                <a:ln w="18415" cmpd="sng">
+                  <a:solidFill>
+                    <a:schemeClr val="tx1">
+                      <a:alpha val="0"/>
+                    </a:schemeClr>
+                  </a:solidFill>
+                  <a:prstDash val="solid"/>
+                </a:ln>
+                <a:effectLst>
+                  <a:outerShdw blurRad="25400" dir="3600000" algn="tl" rotWithShape="0">
+                    <a:srgbClr val="000000">
+                      <a:alpha val="70000"/>
+                    </a:srgbClr>
+                  </a:outerShdw>
+                </a:effectLst>
+                <a:latin typeface="Sitka Text" pitchFamily="2" charset="0"/>
+              </a:rPr>
+              <a:t> approach</a:t>
+            </a:r>
+            <a:endParaRPr lang="nl-BE" sz="3600" cap="small" dirty="0">
+              <a:ln w="18415" cmpd="sng">
+                <a:solidFill>
+                  <a:schemeClr val="tx1">
+                    <a:alpha val="0"/>
+                  </a:schemeClr>
+                </a:solidFill>
+                <a:prstDash val="solid"/>
+              </a:ln>
+              <a:effectLst>
+                <a:outerShdw blurRad="25400" dir="3600000" algn="tl" rotWithShape="0">
+                  <a:srgbClr val="000000">
+                    <a:alpha val="70000"/>
+                  </a:srgbClr>
+                </a:outerShdw>
+              </a:effectLst>
+              <a:latin typeface="Sitka Text" pitchFamily="2" charset="0"/>
+            </a:endParaRPr>
+          </a:p>
+        </p:txBody>
+      </p:sp>
+      <p:sp>
+        <p:nvSpPr>
+          <p:cNvPr id="3" name="Tijdelijke aanduiding voor inhoud 2"/>
+          <p:cNvSpPr>
+            <a:spLocks noGrp="1"/>
+          </p:cNvSpPr>
+          <p:nvPr>
+            <p:ph idx="1"/>
+          </p:nvPr>
+        </p:nvSpPr>
+        <p:spPr/>
+        <p:txBody>
+          <a:bodyPr>
+            <a:normAutofit/>
+          </a:bodyPr>
+          <a:lstStyle/>
+          <a:p>
+            <a:pPr marL="0" indent="0">
+              <a:buNone/>
+            </a:pPr>
+            <a:r>
+              <a:rPr lang="nl-BE" sz="2400" b="1" dirty="0" smtClean="0"/>
+              <a:t>Twee mogelijkheden:</a:t>
+            </a:r>
+          </a:p>
+          <a:p>
+            <a:pPr marL="457200" indent="-457200">
+              <a:buFont typeface="+mj-lt"/>
+              <a:buAutoNum type="arabicPeriod"/>
+            </a:pPr>
+            <a:r>
+              <a:rPr lang="nl-BE" sz="2400" dirty="0" smtClean="0"/>
+              <a:t>Test schrijven voor elke klasse in zelfde package</a:t>
+            </a:r>
+          </a:p>
+          <a:p>
+            <a:pPr marL="457200" indent="-457200">
+              <a:buFont typeface="+mj-lt"/>
+              <a:buAutoNum type="arabicPeriod"/>
+            </a:pPr>
+            <a:endParaRPr lang="nl-BE" sz="2400" dirty="0"/>
+          </a:p>
+          <a:p>
+            <a:pPr marL="457200" indent="-457200">
+              <a:buFont typeface="+mj-lt"/>
+              <a:buAutoNum type="arabicPeriod"/>
+            </a:pPr>
+            <a:r>
+              <a:rPr lang="nl-BE" sz="2400" dirty="0" smtClean="0"/>
+              <a:t>Via een hogere laag een lagere laag testen</a:t>
+            </a:r>
+          </a:p>
+          <a:p>
+            <a:pPr lvl="1" indent="-342900">
+              <a:buFont typeface="Wingdings"/>
+              <a:buChar char="à"/>
+            </a:pPr>
+            <a:r>
+              <a:rPr lang="nl-BE" sz="2000" dirty="0" smtClean="0">
+                <a:sym typeface="Wingdings" panose="05000000000000000000" pitchFamily="2" charset="2"/>
+              </a:rPr>
+              <a:t>Noodzakelijk wegens </a:t>
+            </a:r>
+            <a:r>
+              <a:rPr lang="nl-BE" sz="2000" dirty="0" err="1" smtClean="0">
+                <a:sym typeface="Wingdings" panose="05000000000000000000" pitchFamily="2" charset="2"/>
+              </a:rPr>
+              <a:t>visibility</a:t>
+            </a:r>
+            <a:r>
+              <a:rPr lang="nl-BE" sz="2000" dirty="0" smtClean="0">
+                <a:sym typeface="Wingdings" panose="05000000000000000000" pitchFamily="2" charset="2"/>
+              </a:rPr>
+              <a:t> constraints</a:t>
+            </a:r>
+          </a:p>
+          <a:p>
+            <a:pPr lvl="1" indent="-342900">
+              <a:buFont typeface="Wingdings"/>
+              <a:buChar char="à"/>
+            </a:pPr>
+            <a:r>
+              <a:rPr lang="nl-BE" sz="2000" dirty="0" smtClean="0">
+                <a:sym typeface="Wingdings" panose="05000000000000000000" pitchFamily="2" charset="2"/>
+              </a:rPr>
+              <a:t>Moeilijker wegens gelaagde hiërarchie</a:t>
+            </a:r>
+          </a:p>
+          <a:p>
+            <a:pPr marL="0" indent="0">
+              <a:buNone/>
+            </a:pPr>
+            <a:endParaRPr lang="nl-BE" sz="2400" dirty="0">
+              <a:sym typeface="Wingdings" panose="05000000000000000000" pitchFamily="2" charset="2"/>
+            </a:endParaRPr>
+          </a:p>
+          <a:p>
+            <a:pPr marL="0" indent="0">
+              <a:buNone/>
+            </a:pPr>
+            <a:r>
+              <a:rPr lang="nl-BE" sz="2400" b="1" dirty="0" smtClean="0">
+                <a:sym typeface="Wingdings" panose="05000000000000000000" pitchFamily="2" charset="2"/>
+              </a:rPr>
+              <a:t>Test strategie voor </a:t>
+            </a:r>
+            <a:r>
+              <a:rPr lang="nl-BE" sz="2400" b="1" dirty="0" err="1" smtClean="0">
+                <a:sym typeface="Wingdings" panose="05000000000000000000" pitchFamily="2" charset="2"/>
+              </a:rPr>
+              <a:t>use</a:t>
+            </a:r>
+            <a:r>
+              <a:rPr lang="nl-BE" sz="2400" b="1" dirty="0" smtClean="0">
+                <a:sym typeface="Wingdings" panose="05000000000000000000" pitchFamily="2" charset="2"/>
+              </a:rPr>
+              <a:t> cases</a:t>
+            </a:r>
+            <a:endParaRPr lang="nl-BE" sz="2400" dirty="0" smtClean="0">
+              <a:sym typeface="Wingdings" panose="05000000000000000000" pitchFamily="2" charset="2"/>
+            </a:endParaRPr>
+          </a:p>
+          <a:p>
+            <a:r>
+              <a:rPr lang="nl-BE" sz="2400" dirty="0" err="1" smtClean="0">
+                <a:sym typeface="Wingdings" panose="05000000000000000000" pitchFamily="2" charset="2"/>
+              </a:rPr>
+              <a:t>TestUI</a:t>
+            </a:r>
+            <a:r>
+              <a:rPr lang="nl-BE" sz="2400" dirty="0" smtClean="0">
+                <a:sym typeface="Wingdings" panose="05000000000000000000" pitchFamily="2" charset="2"/>
+              </a:rPr>
+              <a:t>  IUI  vaste waarden voor elke </a:t>
+            </a:r>
+            <a:r>
+              <a:rPr lang="nl-BE" sz="2400" dirty="0" err="1" smtClean="0">
+                <a:sym typeface="Wingdings" panose="05000000000000000000" pitchFamily="2" charset="2"/>
+              </a:rPr>
+              <a:t>use</a:t>
+            </a:r>
+            <a:r>
+              <a:rPr lang="nl-BE" sz="2400" dirty="0" smtClean="0">
+                <a:sym typeface="Wingdings" panose="05000000000000000000" pitchFamily="2" charset="2"/>
+              </a:rPr>
+              <a:t> case  testen</a:t>
+            </a:r>
+            <a:endParaRPr lang="nl-BE" sz="2400" dirty="0">
+              <a:sym typeface="Wingdings" panose="05000000000000000000" pitchFamily="2" charset="2"/>
+            </a:endParaRPr>
+          </a:p>
+        </p:txBody>
+      </p:sp>
+    </p:spTree>
+    <p:extLst>
+      <p:ext uri="{BB962C8B-B14F-4D97-AF65-F5344CB8AC3E}">
+        <p14:creationId xmlns:p14="http://schemas.microsoft.com/office/powerpoint/2010/main" val="3176464878"/>
+      </p:ext>
+    </p:extLst>
+  </p:cSld>
+  <p:clrMapOvr>
+    <a:masterClrMapping/>
+  </p:clrMapOvr>
+  <p:timing>
+    <p:tnLst>
+      <p:par>
+        <p:cTn id="1" dur="indefinite" restart="never" nodeType="tmRoot"/>
+      </p:par>
+    </p:tnLst>
+  </p:timing>
+</p:sld>
+</file>
+
+<file path=ppt/slides/slide16.xml><?xml version="1.0" encoding="utf-8"?>
+<p:sld xmlns:a="http://schemas.openxmlformats.org/drawingml/2006/main" xmlns:r="http://schemas.openxmlformats.org/officeDocument/2006/relationships" xmlns:p="http://schemas.openxmlformats.org/presentationml/2006/main">
+  <p:cSld>
+    <p:spTree>
+      <p:nvGrpSpPr>
+        <p:cNvPr id="1" name=""/>
+        <p:cNvGrpSpPr/>
+        <p:nvPr/>
+      </p:nvGrpSpPr>
+      <p:grpSpPr>
+        <a:xfrm>
+          <a:off x="0" y="0"/>
+          <a:ext cx="0" cy="0"/>
+          <a:chOff x="0" y="0"/>
+          <a:chExt cx="0" cy="0"/>
+        </a:xfrm>
+      </p:grpSpPr>
+      <p:sp>
+        <p:nvSpPr>
+          <p:cNvPr id="2" name="Titel 1"/>
+          <p:cNvSpPr>
+            <a:spLocks noGrp="1"/>
+          </p:cNvSpPr>
+          <p:nvPr>
+            <p:ph type="title"/>
+          </p:nvPr>
+        </p:nvSpPr>
+        <p:spPr/>
+        <p:txBody>
+          <a:bodyPr>
+            <a:normAutofit/>
+          </a:bodyPr>
+          <a:lstStyle/>
+          <a:p>
+            <a:r>
               <a:rPr lang="nl-BE" sz="3600" cap="small" dirty="0" smtClean="0">
                 <a:ln w="18415" cmpd="sng">
                   <a:solidFill>
@@ -4656,7 +5175,7 @@
 </p:sld>
 </file>
 
-<file path=ppt/slides/slide15.xml><?xml version="1.0" encoding="utf-8"?>
+<file path=ppt/slides/slide17.xml><?xml version="1.0" encoding="utf-8"?>
 <p:sld xmlns:a="http://schemas.openxmlformats.org/drawingml/2006/main" xmlns:r="http://schemas.openxmlformats.org/officeDocument/2006/relationships" xmlns:p="http://schemas.openxmlformats.org/presentationml/2006/main">
   <p:cSld>
     <p:bg>
@@ -4732,7 +5251,7 @@
 </p:sld>
 </file>
 
-<file path=ppt/slides/slide16.xml><?xml version="1.0" encoding="utf-8"?>
+<file path=ppt/slides/slide18.xml><?xml version="1.0" encoding="utf-8"?>
 <p:sld xmlns:a="http://schemas.openxmlformats.org/drawingml/2006/main" xmlns:r="http://schemas.openxmlformats.org/officeDocument/2006/relationships" xmlns:p="http://schemas.openxmlformats.org/presentationml/2006/main">
   <p:cSld>
     <p:spTree>
@@ -5072,43 +5591,7 @@
                 </a:effectLst>
                 <a:latin typeface="Sitka Banner" pitchFamily="2" charset="0"/>
               </a:rPr>
-              <a:t>: </a:t>
-            </a:r>
-            <a:r>
-              <a:rPr lang="nl-BE" sz="2400" dirty="0" smtClean="0">
-                <a:solidFill>
-                  <a:schemeClr val="accent4">
-                    <a:lumMod val="50000"/>
-                  </a:schemeClr>
-                </a:solidFill>
-                <a:effectLst>
-                  <a:outerShdw blurRad="76200" dist="38100" dir="5400000" algn="t" rotWithShape="0">
-                    <a:prstClr val="black">
-                      <a:alpha val="27000"/>
-                    </a:prstClr>
-                  </a:outerShdw>
-                </a:effectLst>
-                <a:latin typeface="Sitka Banner" pitchFamily="2" charset="0"/>
-              </a:rPr>
-              <a:t>19</a:t>
-            </a:r>
-            <a:r>
-              <a:rPr lang="nl-BE" sz="2400" dirty="0" smtClean="0">
-                <a:solidFill>
-                  <a:schemeClr val="accent4">
-                    <a:lumMod val="50000"/>
-                  </a:schemeClr>
-                </a:solidFill>
-                <a:effectLst>
-                  <a:outerShdw blurRad="76200" dist="38100" dir="5400000" algn="t" rotWithShape="0">
-                    <a:prstClr val="black">
-                      <a:alpha val="27000"/>
-                    </a:prstClr>
-                  </a:outerShdw>
-                </a:effectLst>
-                <a:latin typeface="Sitka Banner" pitchFamily="2" charset="0"/>
-              </a:rPr>
-              <a:t>	</a:t>
+              <a:t>: 19	</a:t>
             </a:r>
             <a:r>
               <a:rPr lang="nl-BE" sz="2400" dirty="0" err="1" smtClean="0">
@@ -6820,6 +7303,87 @@
 </file>
 
 <file path=ppt/slides/slide7.xml><?xml version="1.0" encoding="utf-8"?>
+<p:sld xmlns:a="http://schemas.openxmlformats.org/drawingml/2006/main" xmlns:r="http://schemas.openxmlformats.org/officeDocument/2006/relationships" xmlns:p="http://schemas.openxmlformats.org/presentationml/2006/main">
+  <p:cSld>
+    <p:spTree>
+      <p:nvGrpSpPr>
+        <p:cNvPr id="1" name=""/>
+        <p:cNvGrpSpPr/>
+        <p:nvPr/>
+      </p:nvGrpSpPr>
+      <p:grpSpPr>
+        <a:xfrm>
+          <a:off x="0" y="0"/>
+          <a:ext cx="0" cy="0"/>
+          <a:chOff x="0" y="0"/>
+          <a:chExt cx="0" cy="0"/>
+        </a:xfrm>
+      </p:grpSpPr>
+      <p:pic>
+        <p:nvPicPr>
+          <p:cNvPr id="1026" name="Picture 2" descr="C:\Users\Laurens\Documents\IntelliJ Projects\SWOP2016\diagrams\sequence diagrams\SWOP1 Use Case 2.png"/>
+          <p:cNvPicPr>
+            <a:picLocks noChangeAspect="1" noChangeArrowheads="1"/>
+          </p:cNvPicPr>
+          <p:nvPr/>
+        </p:nvPicPr>
+        <p:blipFill>
+          <a:blip r:embed="rId2">
+            <a:clrChange>
+              <a:clrFrom>
+                <a:srgbClr val="FFFFFF"/>
+              </a:clrFrom>
+              <a:clrTo>
+                <a:srgbClr val="FFFFFF">
+                  <a:alpha val="0"/>
+                </a:srgbClr>
+              </a:clrTo>
+            </a:clrChange>
+            <a:extLst>
+              <a:ext uri="{28A0092B-C50C-407E-A947-70E740481C1C}">
+                <a14:useLocalDpi xmlns:a14="http://schemas.microsoft.com/office/drawing/2010/main" val="0"/>
+              </a:ext>
+            </a:extLst>
+          </a:blip>
+          <a:srcRect/>
+          <a:stretch>
+            <a:fillRect/>
+          </a:stretch>
+        </p:blipFill>
+        <p:spPr bwMode="auto">
+          <a:xfrm>
+            <a:off x="0" y="188640"/>
+            <a:ext cx="9144000" cy="6442843"/>
+          </a:xfrm>
+          <a:prstGeom prst="rect">
+            <a:avLst/>
+          </a:prstGeom>
+          <a:noFill/>
+          <a:extLst>
+            <a:ext uri="{909E8E84-426E-40DD-AFC4-6F175D3DCCD1}">
+              <a14:hiddenFill xmlns:a14="http://schemas.microsoft.com/office/drawing/2010/main">
+                <a:solidFill>
+                  <a:srgbClr val="FFFFFF"/>
+                </a:solidFill>
+              </a14:hiddenFill>
+            </a:ext>
+          </a:extLst>
+        </p:spPr>
+      </p:pic>
+    </p:spTree>
+    <p:extLst>
+      <p:ext uri="{BB962C8B-B14F-4D97-AF65-F5344CB8AC3E}">
+        <p14:creationId xmlns:p14="http://schemas.microsoft.com/office/powerpoint/2010/main" val="3099093902"/>
+      </p:ext>
+    </p:extLst>
+  </p:cSld>
+  <p:clrMapOvr>
+    <a:masterClrMapping/>
+  </p:clrMapOvr>
+</p:sld>
+</file>
+
+<file path=ppt/slides/slide8.xml><?xml version="1.0" encoding="utf-8"?>
 <p:sld xmlns:a="http://schemas.openxmlformats.org/drawingml/2006/main" xmlns:r="http://schemas.openxmlformats.org/officeDocument/2006/relationships" xmlns:p="http://schemas.openxmlformats.org/presentationml/2006/main">
   <p:cSld>
     <p:spTree>
@@ -7088,235 +7652,6 @@
 </p:sld>
 </file>
 
-<file path=ppt/slides/slide8.xml><?xml version="1.0" encoding="utf-8"?>
-<p:sld xmlns:a="http://schemas.openxmlformats.org/drawingml/2006/main" xmlns:r="http://schemas.openxmlformats.org/officeDocument/2006/relationships" xmlns:p="http://schemas.openxmlformats.org/presentationml/2006/main">
-  <p:cSld>
-    <p:spTree>
-      <p:nvGrpSpPr>
-        <p:cNvPr id="1" name=""/>
-        <p:cNvGrpSpPr/>
-        <p:nvPr/>
-      </p:nvGrpSpPr>
-      <p:grpSpPr>
-        <a:xfrm>
-          <a:off x="0" y="0"/>
-          <a:ext cx="0" cy="0"/>
-          <a:chOff x="0" y="0"/>
-          <a:chExt cx="0" cy="0"/>
-        </a:xfrm>
-      </p:grpSpPr>
-      <p:sp>
-        <p:nvSpPr>
-          <p:cNvPr id="2" name="Titel 1"/>
-          <p:cNvSpPr>
-            <a:spLocks noGrp="1"/>
-          </p:cNvSpPr>
-          <p:nvPr>
-            <p:ph type="title"/>
-          </p:nvPr>
-        </p:nvSpPr>
-        <p:spPr/>
-        <p:txBody>
-          <a:bodyPr>
-            <a:normAutofit/>
-          </a:bodyPr>
-          <a:lstStyle/>
-          <a:p>
-            <a:r>
-              <a:rPr lang="nl-BE" sz="3600" cap="small" dirty="0" smtClean="0">
-                <a:ln w="18415" cmpd="sng">
-                  <a:solidFill>
-                    <a:schemeClr val="tx1">
-                      <a:alpha val="0"/>
-                    </a:schemeClr>
-                  </a:solidFill>
-                  <a:prstDash val="solid"/>
-                </a:ln>
-                <a:effectLst>
-                  <a:outerShdw blurRad="25400" dir="3600000" algn="tl" rotWithShape="0">
-                    <a:srgbClr val="000000">
-                      <a:alpha val="70000"/>
-                    </a:srgbClr>
-                  </a:outerShdw>
-                </a:effectLst>
-                <a:latin typeface="Sitka Text" pitchFamily="2" charset="0"/>
-              </a:rPr>
-              <a:t>Services </a:t>
-            </a:r>
-            <a:r>
-              <a:rPr lang="nl-BE" sz="3600" cap="small" dirty="0" err="1" smtClean="0">
-                <a:ln w="18415" cmpd="sng">
-                  <a:solidFill>
-                    <a:schemeClr val="tx1">
-                      <a:alpha val="0"/>
-                    </a:schemeClr>
-                  </a:solidFill>
-                  <a:prstDash val="solid"/>
-                </a:ln>
-                <a:effectLst>
-                  <a:outerShdw blurRad="25400" dir="3600000" algn="tl" rotWithShape="0">
-                    <a:srgbClr val="000000">
-                      <a:alpha val="70000"/>
-                    </a:srgbClr>
-                  </a:outerShdw>
-                </a:effectLst>
-                <a:latin typeface="Sitka Text" pitchFamily="2" charset="0"/>
-              </a:rPr>
-              <a:t>to</a:t>
-            </a:r>
-            <a:r>
-              <a:rPr lang="nl-BE" sz="3600" cap="small" dirty="0" smtClean="0">
-                <a:ln w="18415" cmpd="sng">
-                  <a:solidFill>
-                    <a:schemeClr val="tx1">
-                      <a:alpha val="0"/>
-                    </a:schemeClr>
-                  </a:solidFill>
-                  <a:prstDash val="solid"/>
-                </a:ln>
-                <a:effectLst>
-                  <a:outerShdw blurRad="25400" dir="3600000" algn="tl" rotWithShape="0">
-                    <a:srgbClr val="000000">
-                      <a:alpha val="70000"/>
-                    </a:srgbClr>
-                  </a:outerShdw>
-                </a:effectLst>
-                <a:latin typeface="Sitka Text" pitchFamily="2" charset="0"/>
-              </a:rPr>
-              <a:t> keep track of </a:t>
-            </a:r>
-            <a:r>
-              <a:rPr lang="nl-BE" sz="3600" cap="small" dirty="0" err="1" smtClean="0">
-                <a:ln w="18415" cmpd="sng">
-                  <a:solidFill>
-                    <a:schemeClr val="tx1">
-                      <a:alpha val="0"/>
-                    </a:schemeClr>
-                  </a:solidFill>
-                  <a:prstDash val="solid"/>
-                </a:ln>
-                <a:effectLst>
-                  <a:outerShdw blurRad="25400" dir="3600000" algn="tl" rotWithShape="0">
-                    <a:srgbClr val="000000">
-                      <a:alpha val="70000"/>
-                    </a:srgbClr>
-                  </a:outerShdw>
-                </a:effectLst>
-                <a:latin typeface="Sitka Text" pitchFamily="2" charset="0"/>
-              </a:rPr>
-              <a:t>lists</a:t>
-            </a:r>
-            <a:endParaRPr lang="nl-BE" sz="3600" cap="small" dirty="0">
-              <a:ln w="18415" cmpd="sng">
-                <a:solidFill>
-                  <a:schemeClr val="tx1">
-                    <a:alpha val="0"/>
-                  </a:schemeClr>
-                </a:solidFill>
-                <a:prstDash val="solid"/>
-              </a:ln>
-              <a:effectLst>
-                <a:outerShdw blurRad="25400" dir="3600000" algn="tl" rotWithShape="0">
-                  <a:srgbClr val="000000">
-                    <a:alpha val="70000"/>
-                  </a:srgbClr>
-                </a:outerShdw>
-              </a:effectLst>
-              <a:latin typeface="Sitka Text" pitchFamily="2" charset="0"/>
-            </a:endParaRPr>
-          </a:p>
-        </p:txBody>
-      </p:sp>
-      <p:sp>
-        <p:nvSpPr>
-          <p:cNvPr id="3" name="Tijdelijke aanduiding voor inhoud 2"/>
-          <p:cNvSpPr>
-            <a:spLocks noGrp="1"/>
-          </p:cNvSpPr>
-          <p:nvPr>
-            <p:ph idx="1"/>
-          </p:nvPr>
-        </p:nvSpPr>
-        <p:spPr>
-          <a:xfrm>
-            <a:off x="457200" y="1124744"/>
-            <a:ext cx="8229600" cy="5001419"/>
-          </a:xfrm>
-        </p:spPr>
-        <p:txBody>
-          <a:bodyPr>
-            <a:normAutofit/>
-          </a:bodyPr>
-          <a:lstStyle/>
-          <a:p>
-            <a:r>
-              <a:rPr lang="nl-BE" sz="2800" dirty="0" smtClean="0"/>
-              <a:t>Services bevatten functies om:</a:t>
-            </a:r>
-          </a:p>
-          <a:p>
-            <a:pPr lvl="1"/>
-            <a:r>
-              <a:rPr lang="nl-BE" sz="2400" dirty="0" smtClean="0"/>
-              <a:t>Lijsten opvragen (specifieke criteria)</a:t>
-            </a:r>
-          </a:p>
-          <a:p>
-            <a:pPr lvl="1"/>
-            <a:r>
-              <a:rPr lang="nl-BE" sz="2400" dirty="0" smtClean="0"/>
-              <a:t>Lijsten bewerken (enkel mogelijk door service)</a:t>
-            </a:r>
-          </a:p>
-          <a:p>
-            <a:pPr lvl="1"/>
-            <a:r>
-              <a:rPr lang="nl-BE" sz="2400" dirty="0" smtClean="0"/>
-              <a:t>Alsook communicatie met buitenwereld mogelijk te maken</a:t>
-            </a:r>
-          </a:p>
-          <a:p>
-            <a:endParaRPr lang="nl-BE" dirty="0"/>
-          </a:p>
-          <a:p>
-            <a:r>
-              <a:rPr lang="nl-BE" sz="2800" dirty="0" smtClean="0"/>
-              <a:t>Lijsten gebruikt door services zijn </a:t>
-            </a:r>
-            <a:r>
-              <a:rPr lang="nl-BE" sz="2800" b="1" dirty="0" err="1" smtClean="0"/>
-              <a:t>unmodifiable</a:t>
-            </a:r>
-            <a:endParaRPr lang="nl-BE" sz="2800" b="1" dirty="0" smtClean="0"/>
-          </a:p>
-          <a:p>
-            <a:pPr marL="0" indent="0">
-              <a:buNone/>
-            </a:pPr>
-            <a:endParaRPr lang="nl-BE" dirty="0" smtClean="0"/>
-          </a:p>
-        </p:txBody>
-      </p:sp>
-    </p:spTree>
-    <p:extLst>
-      <p:ext uri="{BB962C8B-B14F-4D97-AF65-F5344CB8AC3E}">
-        <p14:creationId xmlns:p14="http://schemas.microsoft.com/office/powerpoint/2010/main" val="1617670185"/>
-      </p:ext>
-    </p:extLst>
-  </p:cSld>
-  <p:clrMapOvr>
-    <a:masterClrMapping/>
-  </p:clrMapOvr>
-  <p:timing>
-    <p:tnLst>
-      <p:par>
-        <p:cTn id="1" dur="indefinite" restart="never" nodeType="tmRoot"/>
-      </p:par>
-    </p:tnLst>
-  </p:timing>
-</p:sld>
-</file>
-
 <file path=ppt/slides/slide9.xml><?xml version="1.0" encoding="utf-8"?>
 <p:sld xmlns:a="http://schemas.openxmlformats.org/drawingml/2006/main" xmlns:r="http://schemas.openxmlformats.org/officeDocument/2006/relationships" xmlns:p="http://schemas.openxmlformats.org/presentationml/2006/main">
   <p:cSld>
@@ -7334,257 +7669,15 @@
           <a:chExt cx="0" cy="0"/>
         </a:xfrm>
       </p:grpSpPr>
-      <p:sp>
-        <p:nvSpPr>
-          <p:cNvPr id="2" name="Titel 1"/>
-          <p:cNvSpPr>
-            <a:spLocks noGrp="1"/>
-          </p:cNvSpPr>
-          <p:nvPr>
-            <p:ph type="title"/>
-          </p:nvPr>
-        </p:nvSpPr>
-        <p:spPr/>
-        <p:txBody>
-          <a:bodyPr>
-            <a:normAutofit/>
-          </a:bodyPr>
-          <a:lstStyle/>
-          <a:p>
-            <a:r>
-              <a:rPr lang="nl-BE" sz="3600" cap="small" dirty="0" err="1" smtClean="0">
-                <a:ln w="18415" cmpd="sng">
-                  <a:solidFill>
-                    <a:schemeClr val="tx1">
-                      <a:alpha val="0"/>
-                    </a:schemeClr>
-                  </a:solidFill>
-                  <a:prstDash val="solid"/>
-                </a:ln>
-                <a:effectLst>
-                  <a:outerShdw blurRad="25400" dir="3600000" algn="tl" rotWithShape="0">
-                    <a:srgbClr val="000000">
-                      <a:alpha val="70000"/>
-                    </a:srgbClr>
-                  </a:outerShdw>
-                </a:effectLst>
-                <a:latin typeface="Sitka Text" pitchFamily="2" charset="0"/>
-              </a:rPr>
-              <a:t>Usage</a:t>
-            </a:r>
-            <a:r>
-              <a:rPr lang="nl-BE" sz="3600" cap="small" dirty="0" smtClean="0">
-                <a:ln w="18415" cmpd="sng">
-                  <a:solidFill>
-                    <a:schemeClr val="tx1">
-                      <a:alpha val="0"/>
-                    </a:schemeClr>
-                  </a:solidFill>
-                  <a:prstDash val="solid"/>
-                </a:ln>
-                <a:effectLst>
-                  <a:outerShdw blurRad="25400" dir="3600000" algn="tl" rotWithShape="0">
-                    <a:srgbClr val="000000">
-                      <a:alpha val="70000"/>
-                    </a:srgbClr>
-                  </a:outerShdw>
-                </a:effectLst>
-                <a:latin typeface="Sitka Text" pitchFamily="2" charset="0"/>
-              </a:rPr>
-              <a:t> of </a:t>
-            </a:r>
-            <a:r>
-              <a:rPr lang="nl-BE" sz="3600" cap="small" dirty="0" err="1" smtClean="0">
-                <a:ln w="18415" cmpd="sng">
-                  <a:solidFill>
-                    <a:schemeClr val="tx1">
-                      <a:alpha val="0"/>
-                    </a:schemeClr>
-                  </a:solidFill>
-                  <a:prstDash val="solid"/>
-                </a:ln>
-                <a:effectLst>
-                  <a:outerShdw blurRad="25400" dir="3600000" algn="tl" rotWithShape="0">
-                    <a:srgbClr val="000000">
-                      <a:alpha val="70000"/>
-                    </a:srgbClr>
-                  </a:outerShdw>
-                </a:effectLst>
-                <a:latin typeface="Sitka Text" pitchFamily="2" charset="0"/>
-              </a:rPr>
-              <a:t>the</a:t>
-            </a:r>
-            <a:r>
-              <a:rPr lang="nl-BE" sz="3600" cap="small" dirty="0" smtClean="0">
-                <a:ln w="18415" cmpd="sng">
-                  <a:solidFill>
-                    <a:schemeClr val="tx1">
-                      <a:alpha val="0"/>
-                    </a:schemeClr>
-                  </a:solidFill>
-                  <a:prstDash val="solid"/>
-                </a:ln>
-                <a:effectLst>
-                  <a:outerShdw blurRad="25400" dir="3600000" algn="tl" rotWithShape="0">
-                    <a:srgbClr val="000000">
-                      <a:alpha val="70000"/>
-                    </a:srgbClr>
-                  </a:outerShdw>
-                </a:effectLst>
-                <a:latin typeface="Sitka Text" pitchFamily="2" charset="0"/>
-              </a:rPr>
-              <a:t> domain </a:t>
-            </a:r>
-            <a:r>
-              <a:rPr lang="nl-BE" sz="3600" cap="small" dirty="0" err="1" smtClean="0">
-                <a:ln w="18415" cmpd="sng">
-                  <a:solidFill>
-                    <a:schemeClr val="tx1">
-                      <a:alpha val="0"/>
-                    </a:schemeClr>
-                  </a:solidFill>
-                  <a:prstDash val="solid"/>
-                </a:ln>
-                <a:effectLst>
-                  <a:outerShdw blurRad="25400" dir="3600000" algn="tl" rotWithShape="0">
-                    <a:srgbClr val="000000">
-                      <a:alpha val="70000"/>
-                    </a:srgbClr>
-                  </a:outerShdw>
-                </a:effectLst>
-                <a:latin typeface="Sitka Text" pitchFamily="2" charset="0"/>
-              </a:rPr>
-              <a:t>layer</a:t>
-            </a:r>
-            <a:endParaRPr lang="nl-BE" sz="3600" cap="small" dirty="0">
-              <a:ln w="18415" cmpd="sng">
-                <a:solidFill>
-                  <a:schemeClr val="tx1">
-                    <a:alpha val="0"/>
-                  </a:schemeClr>
-                </a:solidFill>
-                <a:prstDash val="solid"/>
-              </a:ln>
-              <a:effectLst>
-                <a:outerShdw blurRad="25400" dir="3600000" algn="tl" rotWithShape="0">
-                  <a:srgbClr val="000000">
-                    <a:alpha val="70000"/>
-                  </a:srgbClr>
-                </a:outerShdw>
-              </a:effectLst>
-              <a:latin typeface="Sitka Text" pitchFamily="2" charset="0"/>
-            </a:endParaRPr>
-          </a:p>
-        </p:txBody>
-      </p:sp>
-      <p:sp>
-        <p:nvSpPr>
-          <p:cNvPr id="4" name="Tijdelijke aanduiding voor inhoud 3"/>
-          <p:cNvSpPr>
-            <a:spLocks noGrp="1"/>
-          </p:cNvSpPr>
-          <p:nvPr>
-            <p:ph idx="1"/>
-          </p:nvPr>
-        </p:nvSpPr>
-        <p:spPr>
-          <a:xfrm>
-            <a:off x="179512" y="3573016"/>
-            <a:ext cx="8507288" cy="2553147"/>
-          </a:xfrm>
-        </p:spPr>
-        <p:txBody>
-          <a:bodyPr>
-            <a:normAutofit lnSpcReduction="10000"/>
-          </a:bodyPr>
-          <a:lstStyle/>
-          <a:p>
-            <a:r>
-              <a:rPr lang="nl-BE" sz="2000" dirty="0" smtClean="0"/>
-              <a:t>Toekennen van Tags </a:t>
-            </a:r>
-            <a:r>
-              <a:rPr lang="nl-BE" sz="2000" dirty="0" err="1" smtClean="0"/>
-              <a:t>d.m.v</a:t>
-            </a:r>
-            <a:r>
-              <a:rPr lang="nl-BE" sz="2000" dirty="0"/>
-              <a:t/>
-            </a:r>
-            <a:br>
-              <a:rPr lang="nl-BE" sz="2000" dirty="0"/>
-            </a:br>
-            <a:r>
-              <a:rPr lang="nl-BE" sz="2000" dirty="0" err="1" smtClean="0"/>
-              <a:t>TagAssignmentService</a:t>
-            </a:r>
-            <a:endParaRPr lang="nl-BE" sz="2000" dirty="0" smtClean="0"/>
-          </a:p>
-          <a:p>
-            <a:endParaRPr lang="nl-BE" sz="2000" dirty="0" smtClean="0"/>
-          </a:p>
-          <a:p>
-            <a:r>
-              <a:rPr lang="nl-BE" sz="2000" dirty="0" smtClean="0"/>
-              <a:t>Toewijzen van </a:t>
-            </a:r>
-            <a:r>
-              <a:rPr lang="nl-BE" sz="2000" dirty="0" err="1" smtClean="0"/>
-              <a:t>developer</a:t>
-            </a:r>
-            <a:r>
-              <a:rPr lang="nl-BE" sz="2000" dirty="0"/>
-              <a:t> </a:t>
-            </a:r>
-            <a:r>
-              <a:rPr lang="nl-BE" sz="2000" dirty="0" smtClean="0"/>
-              <a:t>d.m.v.</a:t>
-            </a:r>
-            <a:br>
-              <a:rPr lang="nl-BE" sz="2000" dirty="0" smtClean="0"/>
-            </a:br>
-            <a:r>
-              <a:rPr lang="nl-BE" sz="2000" dirty="0" err="1" smtClean="0"/>
-              <a:t>DeveloperAssignmentService</a:t>
-            </a:r>
-            <a:endParaRPr lang="nl-BE" sz="2000" dirty="0" smtClean="0"/>
-          </a:p>
-          <a:p>
-            <a:endParaRPr lang="nl-BE" sz="2000" dirty="0"/>
-          </a:p>
-          <a:p>
-            <a:r>
-              <a:rPr lang="nl-BE" sz="2000" dirty="0" smtClean="0"/>
-              <a:t>Nieuwe klasse voor speciale functies</a:t>
-            </a:r>
-            <a:br>
-              <a:rPr lang="nl-BE" sz="2000" dirty="0" smtClean="0"/>
-            </a:br>
-            <a:r>
-              <a:rPr lang="nl-BE" sz="2000" dirty="0" smtClean="0">
-                <a:sym typeface="Wingdings" panose="05000000000000000000" pitchFamily="2" charset="2"/>
-              </a:rPr>
-              <a:t> pure </a:t>
-            </a:r>
-            <a:r>
-              <a:rPr lang="nl-BE" sz="2000" dirty="0" err="1" smtClean="0">
-                <a:sym typeface="Wingdings" panose="05000000000000000000" pitchFamily="2" charset="2"/>
-              </a:rPr>
-              <a:t>fabrication</a:t>
-            </a:r>
-            <a:endParaRPr lang="nl-BE" sz="2000" dirty="0" smtClean="0"/>
-          </a:p>
-        </p:txBody>
-      </p:sp>
       <p:pic>
         <p:nvPicPr>
-          <p:cNvPr id="3074" name="Picture 2" descr="C:\Users\Laurens\Documents\IntelliJ Projects\SWOP2016\presentatie\Diagram Images\Puntje 2\AssignmentServices.png"/>
+          <p:cNvPr id="2050" name="Picture 2" descr="C:\Users\Laurens\Documents\IntelliJ Projects\SWOP2016\diagrams\sequence diagrams\SWOP1 Use Case 7.png"/>
           <p:cNvPicPr>
             <a:picLocks noChangeAspect="1" noChangeArrowheads="1"/>
           </p:cNvPicPr>
           <p:nvPr/>
         </p:nvPicPr>
-        <p:blipFill>
+        <p:blipFill rotWithShape="1">
           <a:blip r:embed="rId2">
             <a:clrChange>
               <a:clrFrom>
@@ -7602,15 +7695,13 @@
               </a:ext>
             </a:extLst>
           </a:blip>
-          <a:srcRect/>
-          <a:stretch>
-            <a:fillRect/>
-          </a:stretch>
+          <a:srcRect t="38731" b="23368"/>
+          <a:stretch/>
         </p:blipFill>
         <p:spPr bwMode="auto">
           <a:xfrm>
-            <a:off x="2682799" y="1225704"/>
-            <a:ext cx="6482161" cy="5615136"/>
+            <a:off x="323528" y="763861"/>
+            <a:ext cx="8437563" cy="5905499"/>
           </a:xfrm>
           <a:prstGeom prst="rect">
             <a:avLst/>
@@ -7627,23 +7718,65 @@
           </a:extLst>
         </p:spPr>
       </p:pic>
+      <p:pic>
+        <p:nvPicPr>
+          <p:cNvPr id="2051" name="Picture 3" descr="C:\Users\Laurens\Documents\IntelliJ Projects\SWOP2016\diagrams\sequence diagrams\SWOP1 Use Case 7.png"/>
+          <p:cNvPicPr>
+            <a:picLocks noChangeAspect="1" noChangeArrowheads="1"/>
+          </p:cNvPicPr>
+          <p:nvPr/>
+        </p:nvPicPr>
+        <p:blipFill rotWithShape="1">
+          <a:blip r:embed="rId2">
+            <a:clrChange>
+              <a:clrFrom>
+                <a:srgbClr val="FFFFFF"/>
+              </a:clrFrom>
+              <a:clrTo>
+                <a:srgbClr val="FFFFFF">
+                  <a:alpha val="0"/>
+                </a:srgbClr>
+              </a:clrTo>
+            </a:clrChange>
+            <a:extLst>
+              <a:ext uri="{28A0092B-C50C-407E-A947-70E740481C1C}">
+                <a14:useLocalDpi xmlns:a14="http://schemas.microsoft.com/office/drawing/2010/main" val="0"/>
+              </a:ext>
+            </a:extLst>
+          </a:blip>
+          <a:srcRect b="96726"/>
+          <a:stretch/>
+        </p:blipFill>
+        <p:spPr bwMode="auto">
+          <a:xfrm>
+            <a:off x="323526" y="260648"/>
+            <a:ext cx="8437563" cy="510108"/>
+          </a:xfrm>
+          <a:prstGeom prst="rect">
+            <a:avLst/>
+          </a:prstGeom>
+          <a:noFill/>
+          <a:extLst>
+            <a:ext uri="{909E8E84-426E-40DD-AFC4-6F175D3DCCD1}">
+              <a14:hiddenFill xmlns:a14="http://schemas.microsoft.com/office/drawing/2010/main">
+                <a:solidFill>
+                  <a:srgbClr val="FFFFFF"/>
+                </a:solidFill>
+              </a14:hiddenFill>
+            </a:ext>
+          </a:extLst>
+        </p:spPr>
+      </p:pic>
     </p:spTree>
     <p:extLst>
       <p:ext uri="{BB962C8B-B14F-4D97-AF65-F5344CB8AC3E}">
-        <p14:creationId xmlns:p14="http://schemas.microsoft.com/office/powerpoint/2010/main" val="4089071672"/>
+        <p14:creationId xmlns:p14="http://schemas.microsoft.com/office/powerpoint/2010/main" val="4023666941"/>
       </p:ext>
     </p:extLst>
   </p:cSld>
   <p:clrMapOvr>
     <a:masterClrMapping/>
   </p:clrMapOvr>
-  <p:timing>
-    <p:tnLst>
-      <p:par>
-        <p:cTn id="1" dur="indefinite" restart="never" nodeType="tmRoot"/>
-      </p:par>
-    </p:tnLst>
-  </p:timing>
 </p:sld>
 </file>
 

</xml_diff>

<commit_message>
Uur aanpassing :: groepsuren dubbel geteld in individuele uren
</commit_message>
<xml_diff>
--- a/presentatie/SWOP Presentatie Inhoud.pptx
+++ b/presentatie/SWOP Presentatie Inhoud.pptx
@@ -123,7 +123,7 @@
   </p:defaultTextStyle>
   <p:extLst>
     <p:ext uri="{EFAFB233-063F-42B5-8137-9DF3F51BA10A}">
-      <p15:sldGuideLst xmlns:p15="http://schemas.microsoft.com/office/powerpoint/2012/main" xmlns="">
+      <p15:sldGuideLst xmlns:p15="http://schemas.microsoft.com/office/powerpoint/2012/main">
         <p15:guide id="1" orient="horz" pos="2160">
           <p15:clr>
             <a:srgbClr val="A4A3A4"/>
@@ -365,7 +365,7 @@
             <a:fld id="{91663F60-0288-4BD7-9F87-79CFFEA98662}" type="slidenum">
               <a:rPr lang="nl-BE" smtClean="0"/>
               <a:pPr/>
-              <a:t>‹nr.›</a:t>
+              <a:t>‹#›</a:t>
             </a:fld>
             <a:endParaRPr lang="nl-BE"/>
           </a:p>
@@ -537,7 +537,7 @@
             <a:fld id="{91663F60-0288-4BD7-9F87-79CFFEA98662}" type="slidenum">
               <a:rPr lang="nl-BE" smtClean="0"/>
               <a:pPr/>
-              <a:t>‹nr.›</a:t>
+              <a:t>‹#›</a:t>
             </a:fld>
             <a:endParaRPr lang="nl-BE"/>
           </a:p>
@@ -719,7 +719,7 @@
             <a:fld id="{91663F60-0288-4BD7-9F87-79CFFEA98662}" type="slidenum">
               <a:rPr lang="nl-BE" smtClean="0"/>
               <a:pPr/>
-              <a:t>‹nr.›</a:t>
+              <a:t>‹#›</a:t>
             </a:fld>
             <a:endParaRPr lang="nl-BE"/>
           </a:p>
@@ -891,7 +891,7 @@
             <a:fld id="{91663F60-0288-4BD7-9F87-79CFFEA98662}" type="slidenum">
               <a:rPr lang="nl-BE" smtClean="0"/>
               <a:pPr/>
-              <a:t>‹nr.›</a:t>
+              <a:t>‹#›</a:t>
             </a:fld>
             <a:endParaRPr lang="nl-BE"/>
           </a:p>
@@ -1139,7 +1139,7 @@
             <a:fld id="{91663F60-0288-4BD7-9F87-79CFFEA98662}" type="slidenum">
               <a:rPr lang="nl-BE" smtClean="0"/>
               <a:pPr/>
-              <a:t>‹nr.›</a:t>
+              <a:t>‹#›</a:t>
             </a:fld>
             <a:endParaRPr lang="nl-BE"/>
           </a:p>
@@ -1429,7 +1429,7 @@
             <a:fld id="{91663F60-0288-4BD7-9F87-79CFFEA98662}" type="slidenum">
               <a:rPr lang="nl-BE" smtClean="0"/>
               <a:pPr/>
-              <a:t>‹nr.›</a:t>
+              <a:t>‹#›</a:t>
             </a:fld>
             <a:endParaRPr lang="nl-BE"/>
           </a:p>
@@ -1853,7 +1853,7 @@
             <a:fld id="{91663F60-0288-4BD7-9F87-79CFFEA98662}" type="slidenum">
               <a:rPr lang="nl-BE" smtClean="0"/>
               <a:pPr/>
-              <a:t>‹nr.›</a:t>
+              <a:t>‹#›</a:t>
             </a:fld>
             <a:endParaRPr lang="nl-BE"/>
           </a:p>
@@ -1973,7 +1973,7 @@
             <a:fld id="{91663F60-0288-4BD7-9F87-79CFFEA98662}" type="slidenum">
               <a:rPr lang="nl-BE" smtClean="0"/>
               <a:pPr/>
-              <a:t>‹nr.›</a:t>
+              <a:t>‹#›</a:t>
             </a:fld>
             <a:endParaRPr lang="nl-BE"/>
           </a:p>
@@ -2070,7 +2070,7 @@
             <a:fld id="{91663F60-0288-4BD7-9F87-79CFFEA98662}" type="slidenum">
               <a:rPr lang="nl-BE" smtClean="0"/>
               <a:pPr/>
-              <a:t>‹nr.›</a:t>
+              <a:t>‹#›</a:t>
             </a:fld>
             <a:endParaRPr lang="nl-BE"/>
           </a:p>
@@ -2349,7 +2349,7 @@
             <a:fld id="{91663F60-0288-4BD7-9F87-79CFFEA98662}" type="slidenum">
               <a:rPr lang="nl-BE" smtClean="0"/>
               <a:pPr/>
-              <a:t>‹nr.›</a:t>
+              <a:t>‹#›</a:t>
             </a:fld>
             <a:endParaRPr lang="nl-BE"/>
           </a:p>
@@ -2604,7 +2604,7 @@
             <a:fld id="{91663F60-0288-4BD7-9F87-79CFFEA98662}" type="slidenum">
               <a:rPr lang="nl-BE" smtClean="0"/>
               <a:pPr/>
-              <a:t>‹nr.›</a:t>
+              <a:t>‹#›</a:t>
             </a:fld>
             <a:endParaRPr lang="nl-BE"/>
           </a:p>
@@ -2879,7 +2879,7 @@
             <a:fld id="{91663F60-0288-4BD7-9F87-79CFFEA98662}" type="slidenum">
               <a:rPr lang="nl-BE" smtClean="0"/>
               <a:pPr/>
-              <a:t>‹nr.›</a:t>
+              <a:t>‹#›</a:t>
             </a:fld>
             <a:endParaRPr lang="nl-BE"/>
           </a:p>
@@ -4120,7 +4120,7 @@
         <p:spPr/>
         <p:txBody>
           <a:bodyPr>
-            <a:normAutofit/>
+            <a:normAutofit fontScale="90000"/>
           </a:bodyPr>
           <a:lstStyle/>
           <a:p>
@@ -4324,7 +4324,7 @@
         <p:spPr/>
         <p:txBody>
           <a:bodyPr>
-            <a:normAutofit/>
+            <a:normAutofit fontScale="90000"/>
           </a:bodyPr>
           <a:lstStyle/>
           <a:p>
@@ -5969,7 +5969,7 @@
               <a:t>Work</a:t>
             </a:r>
             <a:r>
-              <a:rPr lang="nl-BE" sz="2400" dirty="0" smtClean="0">
+              <a:rPr lang="nl-BE" sz="2400" smtClean="0">
                 <a:solidFill>
                   <a:schemeClr val="accent4">
                     <a:lumMod val="50000"/>
@@ -5984,10 +5984,10 @@
                 </a:effectLst>
                 <a:latin typeface="Sitka Banner" pitchFamily="2" charset="0"/>
               </a:rPr>
-              <a:t>: 40	</a:t>
-            </a:r>
-            <a:r>
-              <a:rPr lang="nl-BE" sz="2400" dirty="0" err="1" smtClean="0">
+              <a:t>: </a:t>
+            </a:r>
+            <a:r>
+              <a:rPr lang="nl-BE" sz="2400" smtClean="0">
                 <a:solidFill>
                   <a:schemeClr val="accent4">
                     <a:lumMod val="50000"/>
@@ -6002,7 +6002,7 @@
                 </a:effectLst>
                 <a:latin typeface="Sitka Banner" pitchFamily="2" charset="0"/>
               </a:rPr>
-              <a:t>Study</a:t>
+              <a:t>25</a:t>
             </a:r>
             <a:r>
               <a:rPr lang="nl-BE" sz="2400" dirty="0" smtClean="0">
@@ -6020,8 +6020,77 @@
                 </a:effectLst>
                 <a:latin typeface="Sitka Banner" pitchFamily="2" charset="0"/>
               </a:rPr>
-              <a:t>: 15</a:t>
-            </a:r>
+              <a:t>	</a:t>
+            </a:r>
+            <a:r>
+              <a:rPr lang="nl-BE" sz="2400" dirty="0" err="1" smtClean="0">
+                <a:solidFill>
+                  <a:schemeClr val="accent4">
+                    <a:lumMod val="50000"/>
+                  </a:schemeClr>
+                </a:solidFill>
+                <a:effectLst>
+                  <a:outerShdw blurRad="76200" dist="38100" dir="5400000" algn="t" rotWithShape="0">
+                    <a:prstClr val="black">
+                      <a:alpha val="27000"/>
+                    </a:prstClr>
+                  </a:outerShdw>
+                </a:effectLst>
+                <a:latin typeface="Sitka Banner" pitchFamily="2" charset="0"/>
+              </a:rPr>
+              <a:t>Study</a:t>
+            </a:r>
+            <a:r>
+              <a:rPr lang="nl-BE" sz="2400" smtClean="0">
+                <a:solidFill>
+                  <a:schemeClr val="accent4">
+                    <a:lumMod val="50000"/>
+                  </a:schemeClr>
+                </a:solidFill>
+                <a:effectLst>
+                  <a:outerShdw blurRad="76200" dist="38100" dir="5400000" algn="t" rotWithShape="0">
+                    <a:prstClr val="black">
+                      <a:alpha val="27000"/>
+                    </a:prstClr>
+                  </a:outerShdw>
+                </a:effectLst>
+                <a:latin typeface="Sitka Banner" pitchFamily="2" charset="0"/>
+              </a:rPr>
+              <a:t>: </a:t>
+            </a:r>
+            <a:r>
+              <a:rPr lang="nl-BE" sz="2400">
+                <a:solidFill>
+                  <a:schemeClr val="accent4">
+                    <a:lumMod val="50000"/>
+                  </a:schemeClr>
+                </a:solidFill>
+                <a:effectLst>
+                  <a:outerShdw blurRad="76200" dist="38100" dir="5400000" algn="t" rotWithShape="0">
+                    <a:prstClr val="black">
+                      <a:alpha val="27000"/>
+                    </a:prstClr>
+                  </a:outerShdw>
+                </a:effectLst>
+                <a:latin typeface="Sitka Banner" pitchFamily="2" charset="0"/>
+              </a:rPr>
+              <a:t>8</a:t>
+            </a:r>
+            <a:endParaRPr lang="nl-BE" sz="2400" dirty="0" smtClean="0">
+              <a:solidFill>
+                <a:schemeClr val="accent4">
+                  <a:lumMod val="50000"/>
+                </a:schemeClr>
+              </a:solidFill>
+              <a:effectLst>
+                <a:outerShdw blurRad="76200" dist="38100" dir="5400000" algn="t" rotWithShape="0">
+                  <a:prstClr val="black">
+                    <a:alpha val="27000"/>
+                  </a:prstClr>
+                </a:outerShdw>
+              </a:effectLst>
+              <a:latin typeface="Sitka Banner" pitchFamily="2" charset="0"/>
+            </a:endParaRPr>
           </a:p>
           <a:p>
             <a:pPr marL="0" indent="0">

</xml_diff>

<commit_message>
Groepsuren herdaan (waren weg door merge conflict)
</commit_message>
<xml_diff>
--- a/presentatie/SWOP Presentatie Inhoud.pptx
+++ b/presentatie/SWOP Presentatie Inhoud.pptx
@@ -122,7 +122,7 @@
   </p:defaultTextStyle>
   <p:extLst>
     <p:ext uri="{EFAFB233-063F-42B5-8137-9DF3F51BA10A}">
-      <p15:sldGuideLst xmlns="" xmlns:p15="http://schemas.microsoft.com/office/powerpoint/2012/main">
+      <p15:sldGuideLst xmlns:p15="http://schemas.microsoft.com/office/powerpoint/2012/main">
         <p15:guide id="1" orient="horz" pos="2160">
           <p15:clr>
             <a:srgbClr val="A4A3A4"/>
@@ -321,7 +321,7 @@
             <a:fld id="{0F5E03E0-8FDD-4F94-8780-E28EA23ED5EC}" type="datetimeFigureOut">
               <a:rPr lang="nl-BE" smtClean="0"/>
               <a:pPr/>
-              <a:t>15/03/2016</a:t>
+              <a:t>15/03/16</a:t>
             </a:fld>
             <a:endParaRPr lang="nl-BE"/>
           </a:p>
@@ -364,7 +364,7 @@
             <a:fld id="{91663F60-0288-4BD7-9F87-79CFFEA98662}" type="slidenum">
               <a:rPr lang="nl-BE" smtClean="0"/>
               <a:pPr/>
-              <a:t>‹Nr.›</a:t>
+              <a:t>‹nr.›</a:t>
             </a:fld>
             <a:endParaRPr lang="nl-BE"/>
           </a:p>
@@ -373,7 +373,7 @@
     </p:spTree>
     <p:extLst>
       <p:ext uri="{BB962C8B-B14F-4D97-AF65-F5344CB8AC3E}">
-        <p14:creationId xmlns:p14="http://schemas.microsoft.com/office/powerpoint/2010/main" xmlns="" val="3963083300"/>
+        <p14:creationId xmlns:p14="http://schemas.microsoft.com/office/powerpoint/2010/main" val="3963083300"/>
       </p:ext>
     </p:extLst>
   </p:cSld>
@@ -496,7 +496,7 @@
             <a:fld id="{0F5E03E0-8FDD-4F94-8780-E28EA23ED5EC}" type="datetimeFigureOut">
               <a:rPr lang="nl-BE" smtClean="0"/>
               <a:pPr/>
-              <a:t>15/03/2016</a:t>
+              <a:t>15/03/16</a:t>
             </a:fld>
             <a:endParaRPr lang="nl-BE"/>
           </a:p>
@@ -539,7 +539,7 @@
             <a:fld id="{91663F60-0288-4BD7-9F87-79CFFEA98662}" type="slidenum">
               <a:rPr lang="nl-BE" smtClean="0"/>
               <a:pPr/>
-              <a:t>‹Nr.›</a:t>
+              <a:t>‹nr.›</a:t>
             </a:fld>
             <a:endParaRPr lang="nl-BE"/>
           </a:p>
@@ -548,7 +548,7 @@
     </p:spTree>
     <p:extLst>
       <p:ext uri="{BB962C8B-B14F-4D97-AF65-F5344CB8AC3E}">
-        <p14:creationId xmlns:p14="http://schemas.microsoft.com/office/powerpoint/2010/main" xmlns="" val="1367293728"/>
+        <p14:creationId xmlns:p14="http://schemas.microsoft.com/office/powerpoint/2010/main" val="1367293728"/>
       </p:ext>
     </p:extLst>
   </p:cSld>
@@ -681,7 +681,7 @@
             <a:fld id="{0F5E03E0-8FDD-4F94-8780-E28EA23ED5EC}" type="datetimeFigureOut">
               <a:rPr lang="nl-BE" smtClean="0"/>
               <a:pPr/>
-              <a:t>15/03/2016</a:t>
+              <a:t>15/03/16</a:t>
             </a:fld>
             <a:endParaRPr lang="nl-BE"/>
           </a:p>
@@ -724,7 +724,7 @@
             <a:fld id="{91663F60-0288-4BD7-9F87-79CFFEA98662}" type="slidenum">
               <a:rPr lang="nl-BE" smtClean="0"/>
               <a:pPr/>
-              <a:t>‹Nr.›</a:t>
+              <a:t>‹nr.›</a:t>
             </a:fld>
             <a:endParaRPr lang="nl-BE"/>
           </a:p>
@@ -733,7 +733,7 @@
     </p:spTree>
     <p:extLst>
       <p:ext uri="{BB962C8B-B14F-4D97-AF65-F5344CB8AC3E}">
-        <p14:creationId xmlns:p14="http://schemas.microsoft.com/office/powerpoint/2010/main" xmlns="" val="3320721104"/>
+        <p14:creationId xmlns:p14="http://schemas.microsoft.com/office/powerpoint/2010/main" val="3320721104"/>
       </p:ext>
     </p:extLst>
   </p:cSld>
@@ -856,7 +856,7 @@
             <a:fld id="{0F5E03E0-8FDD-4F94-8780-E28EA23ED5EC}" type="datetimeFigureOut">
               <a:rPr lang="nl-BE" smtClean="0"/>
               <a:pPr/>
-              <a:t>15/03/2016</a:t>
+              <a:t>15/03/16</a:t>
             </a:fld>
             <a:endParaRPr lang="nl-BE"/>
           </a:p>
@@ -899,7 +899,7 @@
             <a:fld id="{91663F60-0288-4BD7-9F87-79CFFEA98662}" type="slidenum">
               <a:rPr lang="nl-BE" smtClean="0"/>
               <a:pPr/>
-              <a:t>‹Nr.›</a:t>
+              <a:t>‹nr.›</a:t>
             </a:fld>
             <a:endParaRPr lang="nl-BE"/>
           </a:p>
@@ -908,7 +908,7 @@
     </p:spTree>
     <p:extLst>
       <p:ext uri="{BB962C8B-B14F-4D97-AF65-F5344CB8AC3E}">
-        <p14:creationId xmlns:p14="http://schemas.microsoft.com/office/powerpoint/2010/main" xmlns="" val="1971972017"/>
+        <p14:creationId xmlns:p14="http://schemas.microsoft.com/office/powerpoint/2010/main" val="1971972017"/>
       </p:ext>
     </p:extLst>
   </p:cSld>
@@ -1107,7 +1107,7 @@
             <a:fld id="{0F5E03E0-8FDD-4F94-8780-E28EA23ED5EC}" type="datetimeFigureOut">
               <a:rPr lang="nl-BE" smtClean="0"/>
               <a:pPr/>
-              <a:t>15/03/2016</a:t>
+              <a:t>15/03/16</a:t>
             </a:fld>
             <a:endParaRPr lang="nl-BE"/>
           </a:p>
@@ -1150,7 +1150,7 @@
             <a:fld id="{91663F60-0288-4BD7-9F87-79CFFEA98662}" type="slidenum">
               <a:rPr lang="nl-BE" smtClean="0"/>
               <a:pPr/>
-              <a:t>‹Nr.›</a:t>
+              <a:t>‹nr.›</a:t>
             </a:fld>
             <a:endParaRPr lang="nl-BE"/>
           </a:p>
@@ -1159,7 +1159,7 @@
     </p:spTree>
     <p:extLst>
       <p:ext uri="{BB962C8B-B14F-4D97-AF65-F5344CB8AC3E}">
-        <p14:creationId xmlns:p14="http://schemas.microsoft.com/office/powerpoint/2010/main" xmlns="" val="1541596771"/>
+        <p14:creationId xmlns:p14="http://schemas.microsoft.com/office/powerpoint/2010/main" val="1541596771"/>
       </p:ext>
     </p:extLst>
   </p:cSld>
@@ -1400,7 +1400,7 @@
             <a:fld id="{0F5E03E0-8FDD-4F94-8780-E28EA23ED5EC}" type="datetimeFigureOut">
               <a:rPr lang="nl-BE" smtClean="0"/>
               <a:pPr/>
-              <a:t>15/03/2016</a:t>
+              <a:t>15/03/16</a:t>
             </a:fld>
             <a:endParaRPr lang="nl-BE"/>
           </a:p>
@@ -1443,7 +1443,7 @@
             <a:fld id="{91663F60-0288-4BD7-9F87-79CFFEA98662}" type="slidenum">
               <a:rPr lang="nl-BE" smtClean="0"/>
               <a:pPr/>
-              <a:t>‹Nr.›</a:t>
+              <a:t>‹nr.›</a:t>
             </a:fld>
             <a:endParaRPr lang="nl-BE"/>
           </a:p>
@@ -1452,7 +1452,7 @@
     </p:spTree>
     <p:extLst>
       <p:ext uri="{BB962C8B-B14F-4D97-AF65-F5344CB8AC3E}">
-        <p14:creationId xmlns:p14="http://schemas.microsoft.com/office/powerpoint/2010/main" xmlns="" val="1047982118"/>
+        <p14:creationId xmlns:p14="http://schemas.microsoft.com/office/powerpoint/2010/main" val="1047982118"/>
       </p:ext>
     </p:extLst>
   </p:cSld>
@@ -1827,7 +1827,7 @@
             <a:fld id="{0F5E03E0-8FDD-4F94-8780-E28EA23ED5EC}" type="datetimeFigureOut">
               <a:rPr lang="nl-BE" smtClean="0"/>
               <a:pPr/>
-              <a:t>15/03/2016</a:t>
+              <a:t>15/03/16</a:t>
             </a:fld>
             <a:endParaRPr lang="nl-BE"/>
           </a:p>
@@ -1870,7 +1870,7 @@
             <a:fld id="{91663F60-0288-4BD7-9F87-79CFFEA98662}" type="slidenum">
               <a:rPr lang="nl-BE" smtClean="0"/>
               <a:pPr/>
-              <a:t>‹Nr.›</a:t>
+              <a:t>‹nr.›</a:t>
             </a:fld>
             <a:endParaRPr lang="nl-BE"/>
           </a:p>
@@ -1879,7 +1879,7 @@
     </p:spTree>
     <p:extLst>
       <p:ext uri="{BB962C8B-B14F-4D97-AF65-F5344CB8AC3E}">
-        <p14:creationId xmlns:p14="http://schemas.microsoft.com/office/powerpoint/2010/main" xmlns="" val="2185725893"/>
+        <p14:creationId xmlns:p14="http://schemas.microsoft.com/office/powerpoint/2010/main" val="2185725893"/>
       </p:ext>
     </p:extLst>
   </p:cSld>
@@ -1950,7 +1950,7 @@
             <a:fld id="{0F5E03E0-8FDD-4F94-8780-E28EA23ED5EC}" type="datetimeFigureOut">
               <a:rPr lang="nl-BE" smtClean="0"/>
               <a:pPr/>
-              <a:t>15/03/2016</a:t>
+              <a:t>15/03/16</a:t>
             </a:fld>
             <a:endParaRPr lang="nl-BE"/>
           </a:p>
@@ -1993,7 +1993,7 @@
             <a:fld id="{91663F60-0288-4BD7-9F87-79CFFEA98662}" type="slidenum">
               <a:rPr lang="nl-BE" smtClean="0"/>
               <a:pPr/>
-              <a:t>‹Nr.›</a:t>
+              <a:t>‹nr.›</a:t>
             </a:fld>
             <a:endParaRPr lang="nl-BE"/>
           </a:p>
@@ -2002,7 +2002,7 @@
     </p:spTree>
     <p:extLst>
       <p:ext uri="{BB962C8B-B14F-4D97-AF65-F5344CB8AC3E}">
-        <p14:creationId xmlns:p14="http://schemas.microsoft.com/office/powerpoint/2010/main" xmlns="" val="1565659618"/>
+        <p14:creationId xmlns:p14="http://schemas.microsoft.com/office/powerpoint/2010/main" val="1565659618"/>
       </p:ext>
     </p:extLst>
   </p:cSld>
@@ -2050,7 +2050,7 @@
             <a:fld id="{0F5E03E0-8FDD-4F94-8780-E28EA23ED5EC}" type="datetimeFigureOut">
               <a:rPr lang="nl-BE" smtClean="0"/>
               <a:pPr/>
-              <a:t>15/03/2016</a:t>
+              <a:t>15/03/16</a:t>
             </a:fld>
             <a:endParaRPr lang="nl-BE"/>
           </a:p>
@@ -2093,7 +2093,7 @@
             <a:fld id="{91663F60-0288-4BD7-9F87-79CFFEA98662}" type="slidenum">
               <a:rPr lang="nl-BE" smtClean="0"/>
               <a:pPr/>
-              <a:t>‹Nr.›</a:t>
+              <a:t>‹nr.›</a:t>
             </a:fld>
             <a:endParaRPr lang="nl-BE"/>
           </a:p>
@@ -2102,7 +2102,7 @@
     </p:spTree>
     <p:extLst>
       <p:ext uri="{BB962C8B-B14F-4D97-AF65-F5344CB8AC3E}">
-        <p14:creationId xmlns:p14="http://schemas.microsoft.com/office/powerpoint/2010/main" xmlns="" val="2302775655"/>
+        <p14:creationId xmlns:p14="http://schemas.microsoft.com/office/powerpoint/2010/main" val="2302775655"/>
       </p:ext>
     </p:extLst>
   </p:cSld>
@@ -2332,7 +2332,7 @@
             <a:fld id="{0F5E03E0-8FDD-4F94-8780-E28EA23ED5EC}" type="datetimeFigureOut">
               <a:rPr lang="nl-BE" smtClean="0"/>
               <a:pPr/>
-              <a:t>15/03/2016</a:t>
+              <a:t>15/03/16</a:t>
             </a:fld>
             <a:endParaRPr lang="nl-BE"/>
           </a:p>
@@ -2375,7 +2375,7 @@
             <a:fld id="{91663F60-0288-4BD7-9F87-79CFFEA98662}" type="slidenum">
               <a:rPr lang="nl-BE" smtClean="0"/>
               <a:pPr/>
-              <a:t>‹Nr.›</a:t>
+              <a:t>‹nr.›</a:t>
             </a:fld>
             <a:endParaRPr lang="nl-BE"/>
           </a:p>
@@ -2384,7 +2384,7 @@
     </p:spTree>
     <p:extLst>
       <p:ext uri="{BB962C8B-B14F-4D97-AF65-F5344CB8AC3E}">
-        <p14:creationId xmlns:p14="http://schemas.microsoft.com/office/powerpoint/2010/main" xmlns="" val="2384358470"/>
+        <p14:creationId xmlns:p14="http://schemas.microsoft.com/office/powerpoint/2010/main" val="2384358470"/>
       </p:ext>
     </p:extLst>
   </p:cSld>
@@ -2590,7 +2590,7 @@
             <a:fld id="{0F5E03E0-8FDD-4F94-8780-E28EA23ED5EC}" type="datetimeFigureOut">
               <a:rPr lang="nl-BE" smtClean="0"/>
               <a:pPr/>
-              <a:t>15/03/2016</a:t>
+              <a:t>15/03/16</a:t>
             </a:fld>
             <a:endParaRPr lang="nl-BE"/>
           </a:p>
@@ -2633,7 +2633,7 @@
             <a:fld id="{91663F60-0288-4BD7-9F87-79CFFEA98662}" type="slidenum">
               <a:rPr lang="nl-BE" smtClean="0"/>
               <a:pPr/>
-              <a:t>‹Nr.›</a:t>
+              <a:t>‹nr.›</a:t>
             </a:fld>
             <a:endParaRPr lang="nl-BE"/>
           </a:p>
@@ -2642,7 +2642,7 @@
     </p:spTree>
     <p:extLst>
       <p:ext uri="{BB962C8B-B14F-4D97-AF65-F5344CB8AC3E}">
-        <p14:creationId xmlns:p14="http://schemas.microsoft.com/office/powerpoint/2010/main" xmlns="" val="221485852"/>
+        <p14:creationId xmlns:p14="http://schemas.microsoft.com/office/powerpoint/2010/main" val="221485852"/>
       </p:ext>
     </p:extLst>
   </p:cSld>
@@ -2832,7 +2832,7 @@
             <a:fld id="{0F5E03E0-8FDD-4F94-8780-E28EA23ED5EC}" type="datetimeFigureOut">
               <a:rPr lang="nl-BE" smtClean="0"/>
               <a:pPr/>
-              <a:t>15/03/2016</a:t>
+              <a:t>15/03/16</a:t>
             </a:fld>
             <a:endParaRPr lang="nl-BE"/>
           </a:p>
@@ -2911,7 +2911,7 @@
             <a:fld id="{91663F60-0288-4BD7-9F87-79CFFEA98662}" type="slidenum">
               <a:rPr lang="nl-BE" smtClean="0"/>
               <a:pPr/>
-              <a:t>‹Nr.›</a:t>
+              <a:t>‹nr.›</a:t>
             </a:fld>
             <a:endParaRPr lang="nl-BE"/>
           </a:p>
@@ -2920,7 +2920,7 @@
     </p:spTree>
     <p:extLst>
       <p:ext uri="{BB962C8B-B14F-4D97-AF65-F5344CB8AC3E}">
-        <p14:creationId xmlns:p14="http://schemas.microsoft.com/office/powerpoint/2010/main" xmlns="" val="2268232388"/>
+        <p14:creationId xmlns:p14="http://schemas.microsoft.com/office/powerpoint/2010/main" val="2268232388"/>
       </p:ext>
     </p:extLst>
   </p:cSld>
@@ -3549,7 +3549,7 @@
     </p:spTree>
     <p:extLst>
       <p:ext uri="{BB962C8B-B14F-4D97-AF65-F5344CB8AC3E}">
-        <p14:creationId xmlns:p14="http://schemas.microsoft.com/office/powerpoint/2010/main" xmlns="" val="1089514898"/>
+        <p14:creationId xmlns:p14="http://schemas.microsoft.com/office/powerpoint/2010/main" val="1089514898"/>
       </p:ext>
     </p:extLst>
   </p:cSld>
@@ -3735,19 +3735,7 @@
               <a:rPr lang="nl-BE" sz="2800" dirty="0" smtClean="0">
                 <a:latin typeface="Sitka Display" pitchFamily="2" charset="0"/>
               </a:rPr>
-              <a:t> </a:t>
-            </a:r>
-            <a:r>
-              <a:rPr lang="nl-BE" sz="2800" dirty="0" smtClean="0">
-                <a:latin typeface="Sitka Display" pitchFamily="2" charset="0"/>
-              </a:rPr>
-              <a:t>  Services </a:t>
-            </a:r>
-            <a:r>
-              <a:rPr lang="nl-BE" sz="2800" dirty="0" smtClean="0">
-                <a:latin typeface="Sitka Display" pitchFamily="2" charset="0"/>
-              </a:rPr>
-              <a:t>bevatten functies om:</a:t>
+              <a:t>   Services bevatten functies om:</a:t>
             </a:r>
           </a:p>
           <a:p>
@@ -3808,7 +3796,7 @@
     </p:spTree>
     <p:extLst>
       <p:ext uri="{BB962C8B-B14F-4D97-AF65-F5344CB8AC3E}">
-        <p14:creationId xmlns:p14="http://schemas.microsoft.com/office/powerpoint/2010/main" xmlns="" val="1617670185"/>
+        <p14:creationId xmlns:p14="http://schemas.microsoft.com/office/powerpoint/2010/main" val="1617670185"/>
       </p:ext>
     </p:extLst>
   </p:cSld>
@@ -4010,7 +3998,7 @@
             </a:clrChange>
             <a:extLst>
               <a:ext uri="{28A0092B-C50C-407E-A947-70E740481C1C}">
-                <a14:useLocalDpi xmlns:a14="http://schemas.microsoft.com/office/drawing/2010/main" xmlns="" val="0"/>
+                <a14:useLocalDpi xmlns:a14="http://schemas.microsoft.com/office/drawing/2010/main" val="0"/>
               </a:ext>
             </a:extLst>
           </a:blip>
@@ -4030,7 +4018,7 @@
           <a:noFill/>
           <a:extLst>
             <a:ext uri="{909E8E84-426E-40DD-AFC4-6F175D3DCCD1}">
-              <a14:hiddenFill xmlns:a14="http://schemas.microsoft.com/office/drawing/2010/main" xmlns="">
+              <a14:hiddenFill xmlns:a14="http://schemas.microsoft.com/office/drawing/2010/main">
                 <a:solidFill>
                   <a:srgbClr val="FFFFFF"/>
                 </a:solidFill>
@@ -4192,7 +4180,7 @@
     </p:spTree>
     <p:extLst>
       <p:ext uri="{BB962C8B-B14F-4D97-AF65-F5344CB8AC3E}">
-        <p14:creationId xmlns:p14="http://schemas.microsoft.com/office/powerpoint/2010/main" xmlns="" val="4089071672"/>
+        <p14:creationId xmlns:p14="http://schemas.microsoft.com/office/powerpoint/2010/main" val="4089071672"/>
       </p:ext>
     </p:extLst>
   </p:cSld>
@@ -4401,13 +4389,15 @@
               <a:rPr lang="nl-BE" sz="2400" dirty="0" smtClean="0">
                 <a:latin typeface="Sitka Display" pitchFamily="2" charset="0"/>
               </a:rPr>
-              <a:t>Interface voor initializer maakt nieuwe beginsituaties eenvoudig te </a:t>
-            </a:r>
+              <a:t>Interface voor initializer maakt nieuwe beginsituaties eenvoudig te implementeren</a:t>
+            </a:r>
+          </a:p>
+          <a:p>
             <a:r>
               <a:rPr lang="nl-BE" sz="2400" dirty="0" smtClean="0">
                 <a:latin typeface="Sitka Display" pitchFamily="2" charset="0"/>
               </a:rPr>
-              <a:t>implementeren</a:t>
+              <a:t>Eenvoudig om nieuwe tags toe te voegen</a:t>
             </a:r>
           </a:p>
           <a:p>
@@ -4415,50 +4405,15 @@
               <a:rPr lang="nl-BE" sz="2400" dirty="0" smtClean="0">
                 <a:latin typeface="Sitka Display" pitchFamily="2" charset="0"/>
               </a:rPr>
-              <a:t>Eenvoudig om nieuwe tags toe te </a:t>
-            </a:r>
-            <a:r>
-              <a:rPr lang="nl-BE" sz="2400" dirty="0" smtClean="0">
-                <a:latin typeface="Sitka Display" pitchFamily="2" charset="0"/>
-              </a:rPr>
-              <a:t>voegen</a:t>
-            </a:r>
-          </a:p>
-          <a:p>
-            <a:r>
-              <a:rPr lang="nl-BE" sz="2400" dirty="0" smtClean="0">
-                <a:latin typeface="Sitka Display" pitchFamily="2" charset="0"/>
-              </a:rPr>
-              <a:t>Subsystems </a:t>
-            </a:r>
-            <a:r>
-              <a:rPr lang="nl-BE" sz="2400" dirty="0" smtClean="0">
-                <a:latin typeface="Sitka Display" pitchFamily="2" charset="0"/>
-              </a:rPr>
-              <a:t>en </a:t>
-            </a:r>
-            <a:r>
-              <a:rPr lang="nl-BE" sz="2400" dirty="0" smtClean="0">
-                <a:latin typeface="Sitka Display" pitchFamily="2" charset="0"/>
-              </a:rPr>
-              <a:t>B</a:t>
-            </a:r>
-            <a:r>
-              <a:rPr lang="nl-BE" sz="2400" dirty="0" smtClean="0">
-                <a:latin typeface="Sitka Display" pitchFamily="2" charset="0"/>
-              </a:rPr>
-              <a:t>ugreports zijn onafhankelijk van Projects</a:t>
-            </a:r>
+              <a:t>Subsystems en Bugreports zijn onafhankelijk van Projects</a:t>
+            </a:r>
+          </a:p>
+          <a:p>
             <a:endParaRPr lang="nl-BE" sz="2400" dirty="0" smtClean="0">
               <a:latin typeface="Sitka Display" pitchFamily="2" charset="0"/>
             </a:endParaRPr>
           </a:p>
           <a:p>
-            <a:endParaRPr lang="nl-BE" sz="2400" dirty="0" smtClean="0">
-              <a:latin typeface="Sitka Display" pitchFamily="2" charset="0"/>
-            </a:endParaRPr>
-          </a:p>
-          <a:p>
             <a:endParaRPr lang="nl-BE" sz="2400" dirty="0"/>
           </a:p>
         </p:txBody>
@@ -4466,7 +4421,7 @@
     </p:spTree>
     <p:extLst>
       <p:ext uri="{BB962C8B-B14F-4D97-AF65-F5344CB8AC3E}">
-        <p14:creationId xmlns:p14="http://schemas.microsoft.com/office/powerpoint/2010/main" xmlns="" val="2444210159"/>
+        <p14:creationId xmlns:p14="http://schemas.microsoft.com/office/powerpoint/2010/main" val="2444210159"/>
       </p:ext>
     </p:extLst>
   </p:cSld>
@@ -4781,7 +4736,7 @@
     </p:spTree>
     <p:extLst>
       <p:ext uri="{BB962C8B-B14F-4D97-AF65-F5344CB8AC3E}">
-        <p14:creationId xmlns:p14="http://schemas.microsoft.com/office/powerpoint/2010/main" xmlns="" val="674970378"/>
+        <p14:creationId xmlns:p14="http://schemas.microsoft.com/office/powerpoint/2010/main" val="674970378"/>
       </p:ext>
     </p:extLst>
   </p:cSld>
@@ -5055,7 +5010,7 @@
     </p:spTree>
     <p:extLst>
       <p:ext uri="{BB962C8B-B14F-4D97-AF65-F5344CB8AC3E}">
-        <p14:creationId xmlns:p14="http://schemas.microsoft.com/office/powerpoint/2010/main" xmlns="" val="3176464878"/>
+        <p14:creationId xmlns:p14="http://schemas.microsoft.com/office/powerpoint/2010/main" val="3176464878"/>
       </p:ext>
     </p:extLst>
   </p:cSld>
@@ -5173,7 +5128,7 @@
     </p:spTree>
     <p:extLst>
       <p:ext uri="{BB962C8B-B14F-4D97-AF65-F5344CB8AC3E}">
-        <p14:creationId xmlns:p14="http://schemas.microsoft.com/office/powerpoint/2010/main" xmlns="" val="3405605565"/>
+        <p14:creationId xmlns:p14="http://schemas.microsoft.com/office/powerpoint/2010/main" val="3405605565"/>
       </p:ext>
     </p:extLst>
   </p:cSld>
@@ -5259,7 +5214,7 @@
     </p:spTree>
     <p:extLst>
       <p:ext uri="{BB962C8B-B14F-4D97-AF65-F5344CB8AC3E}">
-        <p14:creationId xmlns:p14="http://schemas.microsoft.com/office/powerpoint/2010/main" xmlns="" val="353185348"/>
+        <p14:creationId xmlns:p14="http://schemas.microsoft.com/office/powerpoint/2010/main" val="353185348"/>
       </p:ext>
     </p:extLst>
   </p:cSld>
@@ -5927,7 +5882,7 @@
               <a:t>Work</a:t>
             </a:r>
             <a:r>
-              <a:rPr lang="nl-BE" sz="2400" dirty="0" smtClean="0">
+              <a:rPr lang="nl-BE" sz="2400" smtClean="0">
                 <a:solidFill>
                   <a:schemeClr val="accent4">
                     <a:lumMod val="50000"/>
@@ -5942,10 +5897,10 @@
                 </a:effectLst>
                 <a:latin typeface="Sitka Banner" pitchFamily="2" charset="0"/>
               </a:rPr>
-              <a:t>: 40	</a:t>
-            </a:r>
-            <a:r>
-              <a:rPr lang="nl-BE" sz="2400" dirty="0" err="1" smtClean="0">
+              <a:t>: </a:t>
+            </a:r>
+            <a:r>
+              <a:rPr lang="nl-BE" sz="2400" smtClean="0">
                 <a:solidFill>
                   <a:schemeClr val="accent4">
                     <a:lumMod val="50000"/>
@@ -5960,7 +5915,7 @@
                 </a:effectLst>
                 <a:latin typeface="Sitka Banner" pitchFamily="2" charset="0"/>
               </a:rPr>
-              <a:t>Study</a:t>
+              <a:t>25</a:t>
             </a:r>
             <a:r>
               <a:rPr lang="nl-BE" sz="2400" dirty="0" smtClean="0">
@@ -5978,8 +5933,77 @@
                 </a:effectLst>
                 <a:latin typeface="Sitka Banner" pitchFamily="2" charset="0"/>
               </a:rPr>
-              <a:t>: 15</a:t>
-            </a:r>
+              <a:t>	</a:t>
+            </a:r>
+            <a:r>
+              <a:rPr lang="nl-BE" sz="2400" dirty="0" err="1" smtClean="0">
+                <a:solidFill>
+                  <a:schemeClr val="accent4">
+                    <a:lumMod val="50000"/>
+                  </a:schemeClr>
+                </a:solidFill>
+                <a:effectLst>
+                  <a:outerShdw blurRad="76200" dist="38100" dir="5400000" algn="t" rotWithShape="0">
+                    <a:prstClr val="black">
+                      <a:alpha val="27000"/>
+                    </a:prstClr>
+                  </a:outerShdw>
+                </a:effectLst>
+                <a:latin typeface="Sitka Banner" pitchFamily="2" charset="0"/>
+              </a:rPr>
+              <a:t>Study</a:t>
+            </a:r>
+            <a:r>
+              <a:rPr lang="nl-BE" sz="2400" smtClean="0">
+                <a:solidFill>
+                  <a:schemeClr val="accent4">
+                    <a:lumMod val="50000"/>
+                  </a:schemeClr>
+                </a:solidFill>
+                <a:effectLst>
+                  <a:outerShdw blurRad="76200" dist="38100" dir="5400000" algn="t" rotWithShape="0">
+                    <a:prstClr val="black">
+                      <a:alpha val="27000"/>
+                    </a:prstClr>
+                  </a:outerShdw>
+                </a:effectLst>
+                <a:latin typeface="Sitka Banner" pitchFamily="2" charset="0"/>
+              </a:rPr>
+              <a:t>: </a:t>
+            </a:r>
+            <a:r>
+              <a:rPr lang="nl-BE" sz="2400">
+                <a:solidFill>
+                  <a:schemeClr val="accent4">
+                    <a:lumMod val="50000"/>
+                  </a:schemeClr>
+                </a:solidFill>
+                <a:effectLst>
+                  <a:outerShdw blurRad="76200" dist="38100" dir="5400000" algn="t" rotWithShape="0">
+                    <a:prstClr val="black">
+                      <a:alpha val="27000"/>
+                    </a:prstClr>
+                  </a:outerShdw>
+                </a:effectLst>
+                <a:latin typeface="Sitka Banner" pitchFamily="2" charset="0"/>
+              </a:rPr>
+              <a:t>8</a:t>
+            </a:r>
+            <a:endParaRPr lang="nl-BE" sz="2400" dirty="0" smtClean="0">
+              <a:solidFill>
+                <a:schemeClr val="accent4">
+                  <a:lumMod val="50000"/>
+                </a:schemeClr>
+              </a:solidFill>
+              <a:effectLst>
+                <a:outerShdw blurRad="76200" dist="38100" dir="5400000" algn="t" rotWithShape="0">
+                  <a:prstClr val="black">
+                    <a:alpha val="27000"/>
+                  </a:prstClr>
+                </a:outerShdw>
+              </a:effectLst>
+              <a:latin typeface="Sitka Banner" pitchFamily="2" charset="0"/>
+            </a:endParaRPr>
           </a:p>
           <a:p>
             <a:pPr marL="0" indent="0">
@@ -5992,7 +6016,7 @@
     </p:spTree>
     <p:extLst>
       <p:ext uri="{BB962C8B-B14F-4D97-AF65-F5344CB8AC3E}">
-        <p14:creationId xmlns:p14="http://schemas.microsoft.com/office/powerpoint/2010/main" xmlns="" val="1581702792"/>
+        <p14:creationId xmlns:p14="http://schemas.microsoft.com/office/powerpoint/2010/main" val="1581702792"/>
       </p:ext>
     </p:extLst>
   </p:cSld>
@@ -6129,7 +6153,7 @@
           <a:noFill/>
           <a:extLst>
             <a:ext uri="{909E8E84-426E-40DD-AFC4-6F175D3DCCD1}">
-              <a14:hiddenFill xmlns:a14="http://schemas.microsoft.com/office/drawing/2010/main" xmlns="">
+              <a14:hiddenFill xmlns:a14="http://schemas.microsoft.com/office/drawing/2010/main">
                 <a:solidFill>
                   <a:srgbClr val="FFFFFF"/>
                 </a:solidFill>
@@ -6272,7 +6296,7 @@
     </p:spTree>
     <p:extLst>
       <p:ext uri="{BB962C8B-B14F-4D97-AF65-F5344CB8AC3E}">
-        <p14:creationId xmlns:p14="http://schemas.microsoft.com/office/powerpoint/2010/main" xmlns="" val="439526893"/>
+        <p14:creationId xmlns:p14="http://schemas.microsoft.com/office/powerpoint/2010/main" val="439526893"/>
       </p:ext>
     </p:extLst>
   </p:cSld>
@@ -6409,7 +6433,7 @@
           <a:noFill/>
           <a:extLst>
             <a:ext uri="{909E8E84-426E-40DD-AFC4-6F175D3DCCD1}">
-              <a14:hiddenFill xmlns:a14="http://schemas.microsoft.com/office/drawing/2010/main" xmlns="">
+              <a14:hiddenFill xmlns:a14="http://schemas.microsoft.com/office/drawing/2010/main">
                 <a:solidFill>
                   <a:srgbClr val="FFFFFF"/>
                 </a:solidFill>
@@ -6534,7 +6558,7 @@
     </p:spTree>
     <p:extLst>
       <p:ext uri="{BB962C8B-B14F-4D97-AF65-F5344CB8AC3E}">
-        <p14:creationId xmlns:p14="http://schemas.microsoft.com/office/powerpoint/2010/main" xmlns="" val="3969713707"/>
+        <p14:creationId xmlns:p14="http://schemas.microsoft.com/office/powerpoint/2010/main" val="3969713707"/>
       </p:ext>
     </p:extLst>
   </p:cSld>
@@ -6671,7 +6695,7 @@
           <a:noFill/>
           <a:extLst>
             <a:ext uri="{909E8E84-426E-40DD-AFC4-6F175D3DCCD1}">
-              <a14:hiddenFill xmlns:a14="http://schemas.microsoft.com/office/drawing/2010/main" xmlns="">
+              <a14:hiddenFill xmlns:a14="http://schemas.microsoft.com/office/drawing/2010/main">
                 <a:solidFill>
                   <a:srgbClr val="FFFFFF"/>
                 </a:solidFill>
@@ -6781,7 +6805,7 @@
     </p:spTree>
     <p:extLst>
       <p:ext uri="{BB962C8B-B14F-4D97-AF65-F5344CB8AC3E}">
-        <p14:creationId xmlns:p14="http://schemas.microsoft.com/office/powerpoint/2010/main" xmlns="" val="3380860586"/>
+        <p14:creationId xmlns:p14="http://schemas.microsoft.com/office/powerpoint/2010/main" val="3380860586"/>
       </p:ext>
     </p:extLst>
   </p:cSld>
@@ -6918,7 +6942,7 @@
           <a:noFill/>
           <a:extLst>
             <a:ext uri="{909E8E84-426E-40DD-AFC4-6F175D3DCCD1}">
-              <a14:hiddenFill xmlns:a14="http://schemas.microsoft.com/office/drawing/2010/main" xmlns="">
+              <a14:hiddenFill xmlns:a14="http://schemas.microsoft.com/office/drawing/2010/main">
                 <a:solidFill>
                   <a:srgbClr val="FFFFFF"/>
                 </a:solidFill>
@@ -7031,7 +7055,7 @@
     </p:spTree>
     <p:extLst>
       <p:ext uri="{BB962C8B-B14F-4D97-AF65-F5344CB8AC3E}">
-        <p14:creationId xmlns:p14="http://schemas.microsoft.com/office/powerpoint/2010/main" xmlns="" val="1739918512"/>
+        <p14:creationId xmlns:p14="http://schemas.microsoft.com/office/powerpoint/2010/main" val="1739918512"/>
       </p:ext>
     </p:extLst>
   </p:cSld>
@@ -7221,9 +7245,6 @@
               </a:rPr>
               <a:t>Belangrijke domeinklassen </a:t>
             </a:r>
-            <a:endParaRPr lang="nl-BE" sz="2800" dirty="0" smtClean="0">
-              <a:latin typeface="Sitka Display" pitchFamily="2" charset="0"/>
-            </a:endParaRPr>
           </a:p>
           <a:p>
             <a:pPr marL="0" indent="0">
@@ -7270,9 +7291,6 @@
               </a:rPr>
               <a:t>:</a:t>
             </a:r>
-            <a:endParaRPr lang="nl-BE" sz="2400" b="1" cap="small" dirty="0" smtClean="0">
-              <a:latin typeface="Sitka Display" pitchFamily="2" charset="0"/>
-            </a:endParaRPr>
           </a:p>
           <a:p>
             <a:r>
@@ -7351,7 +7369,7 @@
             </a:clrChange>
             <a:extLst>
               <a:ext uri="{28A0092B-C50C-407E-A947-70E740481C1C}">
-                <a14:useLocalDpi xmlns:a14="http://schemas.microsoft.com/office/drawing/2010/main" xmlns="" val="0"/>
+                <a14:useLocalDpi xmlns:a14="http://schemas.microsoft.com/office/drawing/2010/main" val="0"/>
               </a:ext>
             </a:extLst>
           </a:blip>
@@ -7371,7 +7389,7 @@
           <a:noFill/>
           <a:extLst>
             <a:ext uri="{909E8E84-426E-40DD-AFC4-6F175D3DCCD1}">
-              <a14:hiddenFill xmlns:a14="http://schemas.microsoft.com/office/drawing/2010/main" xmlns="">
+              <a14:hiddenFill xmlns:a14="http://schemas.microsoft.com/office/drawing/2010/main">
                 <a:solidFill>
                   <a:srgbClr val="FFFFFF"/>
                 </a:solidFill>
@@ -7383,7 +7401,7 @@
     </p:spTree>
     <p:extLst>
       <p:ext uri="{BB962C8B-B14F-4D97-AF65-F5344CB8AC3E}">
-        <p14:creationId xmlns:p14="http://schemas.microsoft.com/office/powerpoint/2010/main" xmlns="" val="983478496"/>
+        <p14:creationId xmlns:p14="http://schemas.microsoft.com/office/powerpoint/2010/main" val="983478496"/>
       </p:ext>
     </p:extLst>
   </p:cSld>
@@ -7442,7 +7460,7 @@
             </a:clrChange>
             <a:extLst>
               <a:ext uri="{28A0092B-C50C-407E-A947-70E740481C1C}">
-                <a14:useLocalDpi xmlns:a14="http://schemas.microsoft.com/office/drawing/2010/main" xmlns="" val="0"/>
+                <a14:useLocalDpi xmlns:a14="http://schemas.microsoft.com/office/drawing/2010/main" val="0"/>
               </a:ext>
             </a:extLst>
           </a:blip>
@@ -7462,7 +7480,7 @@
           <a:noFill/>
           <a:extLst>
             <a:ext uri="{909E8E84-426E-40DD-AFC4-6F175D3DCCD1}">
-              <a14:hiddenFill xmlns:a14="http://schemas.microsoft.com/office/drawing/2010/main" xmlns="">
+              <a14:hiddenFill xmlns:a14="http://schemas.microsoft.com/office/drawing/2010/main">
                 <a:solidFill>
                   <a:srgbClr val="FFFFFF"/>
                 </a:solidFill>
@@ -7474,7 +7492,7 @@
     </p:spTree>
     <p:extLst>
       <p:ext uri="{BB962C8B-B14F-4D97-AF65-F5344CB8AC3E}">
-        <p14:creationId xmlns:p14="http://schemas.microsoft.com/office/powerpoint/2010/main" xmlns="" val="3099093902"/>
+        <p14:creationId xmlns:p14="http://schemas.microsoft.com/office/powerpoint/2010/main" val="3099093902"/>
       </p:ext>
     </p:extLst>
   </p:cSld>
@@ -7663,7 +7681,7 @@
             </a:clrChange>
             <a:extLst>
               <a:ext uri="{28A0092B-C50C-407E-A947-70E740481C1C}">
-                <a14:useLocalDpi xmlns:a14="http://schemas.microsoft.com/office/drawing/2010/main" xmlns="" val="0"/>
+                <a14:useLocalDpi xmlns:a14="http://schemas.microsoft.com/office/drawing/2010/main" val="0"/>
               </a:ext>
             </a:extLst>
           </a:blip>
@@ -7683,7 +7701,7 @@
           <a:noFill/>
           <a:extLst>
             <a:ext uri="{909E8E84-426E-40DD-AFC4-6F175D3DCCD1}">
-              <a14:hiddenFill xmlns:a14="http://schemas.microsoft.com/office/drawing/2010/main" xmlns="">
+              <a14:hiddenFill xmlns:a14="http://schemas.microsoft.com/office/drawing/2010/main">
                 <a:solidFill>
                   <a:srgbClr val="FFFFFF"/>
                 </a:solidFill>
@@ -7714,7 +7732,7 @@
             </a:clrChange>
             <a:extLst>
               <a:ext uri="{28A0092B-C50C-407E-A947-70E740481C1C}">
-                <a14:useLocalDpi xmlns:a14="http://schemas.microsoft.com/office/drawing/2010/main" xmlns="" val="0"/>
+                <a14:useLocalDpi xmlns:a14="http://schemas.microsoft.com/office/drawing/2010/main" val="0"/>
               </a:ext>
             </a:extLst>
           </a:blip>
@@ -7734,7 +7752,7 @@
           <a:noFill/>
           <a:extLst>
             <a:ext uri="{909E8E84-426E-40DD-AFC4-6F175D3DCCD1}">
-              <a14:hiddenFill xmlns:a14="http://schemas.microsoft.com/office/drawing/2010/main" xmlns="">
+              <a14:hiddenFill xmlns:a14="http://schemas.microsoft.com/office/drawing/2010/main">
                 <a:solidFill>
                   <a:srgbClr val="FFFFFF"/>
                 </a:solidFill>
@@ -7746,7 +7764,7 @@
     </p:spTree>
     <p:extLst>
       <p:ext uri="{BB962C8B-B14F-4D97-AF65-F5344CB8AC3E}">
-        <p14:creationId xmlns:p14="http://schemas.microsoft.com/office/powerpoint/2010/main" xmlns="" val="2616626412"/>
+        <p14:creationId xmlns:p14="http://schemas.microsoft.com/office/powerpoint/2010/main" val="2616626412"/>
       </p:ext>
     </p:extLst>
   </p:cSld>
@@ -7805,7 +7823,7 @@
             </a:clrChange>
             <a:extLst>
               <a:ext uri="{28A0092B-C50C-407E-A947-70E740481C1C}">
-                <a14:useLocalDpi xmlns:a14="http://schemas.microsoft.com/office/drawing/2010/main" xmlns="" val="0"/>
+                <a14:useLocalDpi xmlns:a14="http://schemas.microsoft.com/office/drawing/2010/main" val="0"/>
               </a:ext>
             </a:extLst>
           </a:blip>
@@ -7823,7 +7841,7 @@
           <a:noFill/>
           <a:extLst>
             <a:ext uri="{909E8E84-426E-40DD-AFC4-6F175D3DCCD1}">
-              <a14:hiddenFill xmlns:a14="http://schemas.microsoft.com/office/drawing/2010/main" xmlns="">
+              <a14:hiddenFill xmlns:a14="http://schemas.microsoft.com/office/drawing/2010/main">
                 <a:solidFill>
                   <a:srgbClr val="FFFFFF"/>
                 </a:solidFill>
@@ -7854,7 +7872,7 @@
             </a:clrChange>
             <a:extLst>
               <a:ext uri="{28A0092B-C50C-407E-A947-70E740481C1C}">
-                <a14:useLocalDpi xmlns:a14="http://schemas.microsoft.com/office/drawing/2010/main" xmlns="" val="0"/>
+                <a14:useLocalDpi xmlns:a14="http://schemas.microsoft.com/office/drawing/2010/main" val="0"/>
               </a:ext>
             </a:extLst>
           </a:blip>
@@ -7872,7 +7890,7 @@
           <a:noFill/>
           <a:extLst>
             <a:ext uri="{909E8E84-426E-40DD-AFC4-6F175D3DCCD1}">
-              <a14:hiddenFill xmlns:a14="http://schemas.microsoft.com/office/drawing/2010/main" xmlns="">
+              <a14:hiddenFill xmlns:a14="http://schemas.microsoft.com/office/drawing/2010/main">
                 <a:solidFill>
                   <a:srgbClr val="FFFFFF"/>
                 </a:solidFill>
@@ -7884,7 +7902,7 @@
     </p:spTree>
     <p:extLst>
       <p:ext uri="{BB962C8B-B14F-4D97-AF65-F5344CB8AC3E}">
-        <p14:creationId xmlns:p14="http://schemas.microsoft.com/office/powerpoint/2010/main" xmlns="" val="4023666941"/>
+        <p14:creationId xmlns:p14="http://schemas.microsoft.com/office/powerpoint/2010/main" val="4023666941"/>
       </p:ext>
     </p:extLst>
   </p:cSld>

</xml_diff>

<commit_message>
Add rol overzicht voor beide iteratie :: namen nog in te vullen
</commit_message>
<xml_diff>
--- a/presentatie/SWOP Presentatie Inhoud.pptx
+++ b/presentatie/SWOP Presentatie Inhoud.pptx
@@ -19,9 +19,11 @@
     <p:sldId id="259" r:id="rId13"/>
     <p:sldId id="270" r:id="rId14"/>
     <p:sldId id="260" r:id="rId15"/>
-    <p:sldId id="261" r:id="rId16"/>
-    <p:sldId id="271" r:id="rId17"/>
-    <p:sldId id="262" r:id="rId18"/>
+    <p:sldId id="274" r:id="rId16"/>
+    <p:sldId id="261" r:id="rId17"/>
+    <p:sldId id="271" r:id="rId18"/>
+    <p:sldId id="262" r:id="rId19"/>
+    <p:sldId id="275" r:id="rId20"/>
   </p:sldIdLst>
   <p:sldSz cx="9144000" cy="6858000" type="screen4x3"/>
   <p:notesSz cx="6858000" cy="9144000"/>
@@ -321,7 +323,7 @@
             <a:fld id="{0F5E03E0-8FDD-4F94-8780-E28EA23ED5EC}" type="datetimeFigureOut">
               <a:rPr lang="nl-BE" smtClean="0"/>
               <a:pPr/>
-              <a:t>15/03/16</a:t>
+              <a:t>15/03/2016</a:t>
             </a:fld>
             <a:endParaRPr lang="nl-BE"/>
           </a:p>
@@ -364,7 +366,7 @@
             <a:fld id="{91663F60-0288-4BD7-9F87-79CFFEA98662}" type="slidenum">
               <a:rPr lang="nl-BE" smtClean="0"/>
               <a:pPr/>
-              <a:t>‹nr.›</a:t>
+              <a:t>‹#›</a:t>
             </a:fld>
             <a:endParaRPr lang="nl-BE"/>
           </a:p>
@@ -496,7 +498,7 @@
             <a:fld id="{0F5E03E0-8FDD-4F94-8780-E28EA23ED5EC}" type="datetimeFigureOut">
               <a:rPr lang="nl-BE" smtClean="0"/>
               <a:pPr/>
-              <a:t>15/03/16</a:t>
+              <a:t>15/03/2016</a:t>
             </a:fld>
             <a:endParaRPr lang="nl-BE"/>
           </a:p>
@@ -539,7 +541,7 @@
             <a:fld id="{91663F60-0288-4BD7-9F87-79CFFEA98662}" type="slidenum">
               <a:rPr lang="nl-BE" smtClean="0"/>
               <a:pPr/>
-              <a:t>‹nr.›</a:t>
+              <a:t>‹#›</a:t>
             </a:fld>
             <a:endParaRPr lang="nl-BE"/>
           </a:p>
@@ -681,7 +683,7 @@
             <a:fld id="{0F5E03E0-8FDD-4F94-8780-E28EA23ED5EC}" type="datetimeFigureOut">
               <a:rPr lang="nl-BE" smtClean="0"/>
               <a:pPr/>
-              <a:t>15/03/16</a:t>
+              <a:t>15/03/2016</a:t>
             </a:fld>
             <a:endParaRPr lang="nl-BE"/>
           </a:p>
@@ -724,7 +726,7 @@
             <a:fld id="{91663F60-0288-4BD7-9F87-79CFFEA98662}" type="slidenum">
               <a:rPr lang="nl-BE" smtClean="0"/>
               <a:pPr/>
-              <a:t>‹nr.›</a:t>
+              <a:t>‹#›</a:t>
             </a:fld>
             <a:endParaRPr lang="nl-BE"/>
           </a:p>
@@ -856,7 +858,7 @@
             <a:fld id="{0F5E03E0-8FDD-4F94-8780-E28EA23ED5EC}" type="datetimeFigureOut">
               <a:rPr lang="nl-BE" smtClean="0"/>
               <a:pPr/>
-              <a:t>15/03/16</a:t>
+              <a:t>15/03/2016</a:t>
             </a:fld>
             <a:endParaRPr lang="nl-BE"/>
           </a:p>
@@ -899,7 +901,7 @@
             <a:fld id="{91663F60-0288-4BD7-9F87-79CFFEA98662}" type="slidenum">
               <a:rPr lang="nl-BE" smtClean="0"/>
               <a:pPr/>
-              <a:t>‹nr.›</a:t>
+              <a:t>‹#›</a:t>
             </a:fld>
             <a:endParaRPr lang="nl-BE"/>
           </a:p>
@@ -1107,7 +1109,7 @@
             <a:fld id="{0F5E03E0-8FDD-4F94-8780-E28EA23ED5EC}" type="datetimeFigureOut">
               <a:rPr lang="nl-BE" smtClean="0"/>
               <a:pPr/>
-              <a:t>15/03/16</a:t>
+              <a:t>15/03/2016</a:t>
             </a:fld>
             <a:endParaRPr lang="nl-BE"/>
           </a:p>
@@ -1150,7 +1152,7 @@
             <a:fld id="{91663F60-0288-4BD7-9F87-79CFFEA98662}" type="slidenum">
               <a:rPr lang="nl-BE" smtClean="0"/>
               <a:pPr/>
-              <a:t>‹nr.›</a:t>
+              <a:t>‹#›</a:t>
             </a:fld>
             <a:endParaRPr lang="nl-BE"/>
           </a:p>
@@ -1400,7 +1402,7 @@
             <a:fld id="{0F5E03E0-8FDD-4F94-8780-E28EA23ED5EC}" type="datetimeFigureOut">
               <a:rPr lang="nl-BE" smtClean="0"/>
               <a:pPr/>
-              <a:t>15/03/16</a:t>
+              <a:t>15/03/2016</a:t>
             </a:fld>
             <a:endParaRPr lang="nl-BE"/>
           </a:p>
@@ -1443,7 +1445,7 @@
             <a:fld id="{91663F60-0288-4BD7-9F87-79CFFEA98662}" type="slidenum">
               <a:rPr lang="nl-BE" smtClean="0"/>
               <a:pPr/>
-              <a:t>‹nr.›</a:t>
+              <a:t>‹#›</a:t>
             </a:fld>
             <a:endParaRPr lang="nl-BE"/>
           </a:p>
@@ -1827,7 +1829,7 @@
             <a:fld id="{0F5E03E0-8FDD-4F94-8780-E28EA23ED5EC}" type="datetimeFigureOut">
               <a:rPr lang="nl-BE" smtClean="0"/>
               <a:pPr/>
-              <a:t>15/03/16</a:t>
+              <a:t>15/03/2016</a:t>
             </a:fld>
             <a:endParaRPr lang="nl-BE"/>
           </a:p>
@@ -1870,7 +1872,7 @@
             <a:fld id="{91663F60-0288-4BD7-9F87-79CFFEA98662}" type="slidenum">
               <a:rPr lang="nl-BE" smtClean="0"/>
               <a:pPr/>
-              <a:t>‹nr.›</a:t>
+              <a:t>‹#›</a:t>
             </a:fld>
             <a:endParaRPr lang="nl-BE"/>
           </a:p>
@@ -1950,7 +1952,7 @@
             <a:fld id="{0F5E03E0-8FDD-4F94-8780-E28EA23ED5EC}" type="datetimeFigureOut">
               <a:rPr lang="nl-BE" smtClean="0"/>
               <a:pPr/>
-              <a:t>15/03/16</a:t>
+              <a:t>15/03/2016</a:t>
             </a:fld>
             <a:endParaRPr lang="nl-BE"/>
           </a:p>
@@ -1993,7 +1995,7 @@
             <a:fld id="{91663F60-0288-4BD7-9F87-79CFFEA98662}" type="slidenum">
               <a:rPr lang="nl-BE" smtClean="0"/>
               <a:pPr/>
-              <a:t>‹nr.›</a:t>
+              <a:t>‹#›</a:t>
             </a:fld>
             <a:endParaRPr lang="nl-BE"/>
           </a:p>
@@ -2050,7 +2052,7 @@
             <a:fld id="{0F5E03E0-8FDD-4F94-8780-E28EA23ED5EC}" type="datetimeFigureOut">
               <a:rPr lang="nl-BE" smtClean="0"/>
               <a:pPr/>
-              <a:t>15/03/16</a:t>
+              <a:t>15/03/2016</a:t>
             </a:fld>
             <a:endParaRPr lang="nl-BE"/>
           </a:p>
@@ -2093,7 +2095,7 @@
             <a:fld id="{91663F60-0288-4BD7-9F87-79CFFEA98662}" type="slidenum">
               <a:rPr lang="nl-BE" smtClean="0"/>
               <a:pPr/>
-              <a:t>‹nr.›</a:t>
+              <a:t>‹#›</a:t>
             </a:fld>
             <a:endParaRPr lang="nl-BE"/>
           </a:p>
@@ -2332,7 +2334,7 @@
             <a:fld id="{0F5E03E0-8FDD-4F94-8780-E28EA23ED5EC}" type="datetimeFigureOut">
               <a:rPr lang="nl-BE" smtClean="0"/>
               <a:pPr/>
-              <a:t>15/03/16</a:t>
+              <a:t>15/03/2016</a:t>
             </a:fld>
             <a:endParaRPr lang="nl-BE"/>
           </a:p>
@@ -2375,7 +2377,7 @@
             <a:fld id="{91663F60-0288-4BD7-9F87-79CFFEA98662}" type="slidenum">
               <a:rPr lang="nl-BE" smtClean="0"/>
               <a:pPr/>
-              <a:t>‹nr.›</a:t>
+              <a:t>‹#›</a:t>
             </a:fld>
             <a:endParaRPr lang="nl-BE"/>
           </a:p>
@@ -2590,7 +2592,7 @@
             <a:fld id="{0F5E03E0-8FDD-4F94-8780-E28EA23ED5EC}" type="datetimeFigureOut">
               <a:rPr lang="nl-BE" smtClean="0"/>
               <a:pPr/>
-              <a:t>15/03/16</a:t>
+              <a:t>15/03/2016</a:t>
             </a:fld>
             <a:endParaRPr lang="nl-BE"/>
           </a:p>
@@ -2633,7 +2635,7 @@
             <a:fld id="{91663F60-0288-4BD7-9F87-79CFFEA98662}" type="slidenum">
               <a:rPr lang="nl-BE" smtClean="0"/>
               <a:pPr/>
-              <a:t>‹nr.›</a:t>
+              <a:t>‹#›</a:t>
             </a:fld>
             <a:endParaRPr lang="nl-BE"/>
           </a:p>
@@ -2832,7 +2834,7 @@
             <a:fld id="{0F5E03E0-8FDD-4F94-8780-E28EA23ED5EC}" type="datetimeFigureOut">
               <a:rPr lang="nl-BE" smtClean="0"/>
               <a:pPr/>
-              <a:t>15/03/16</a:t>
+              <a:t>15/03/2016</a:t>
             </a:fld>
             <a:endParaRPr lang="nl-BE"/>
           </a:p>
@@ -2911,7 +2913,7 @@
             <a:fld id="{91663F60-0288-4BD7-9F87-79CFFEA98662}" type="slidenum">
               <a:rPr lang="nl-BE" smtClean="0"/>
               <a:pPr/>
-              <a:t>‹nr.›</a:t>
+              <a:t>‹#›</a:t>
             </a:fld>
             <a:endParaRPr lang="nl-BE"/>
           </a:p>
@@ -4853,160 +4855,48 @@
           </a:p>
         </p:txBody>
       </p:sp>
-      <p:sp>
-        <p:nvSpPr>
-          <p:cNvPr id="3" name="Tijdelijke aanduiding voor inhoud 2"/>
-          <p:cNvSpPr>
-            <a:spLocks noGrp="1"/>
-          </p:cNvSpPr>
+      <p:pic>
+        <p:nvPicPr>
+          <p:cNvPr id="4" name="Content Placeholder 3"/>
+          <p:cNvPicPr>
+            <a:picLocks noGrp="1" noChangeAspect="1"/>
+          </p:cNvPicPr>
           <p:nvPr>
             <p:ph idx="1"/>
           </p:nvPr>
-        </p:nvSpPr>
-        <p:spPr/>
-        <p:txBody>
-          <a:bodyPr>
-            <a:normAutofit/>
-          </a:bodyPr>
-          <a:lstStyle/>
-          <a:p>
-            <a:pPr marL="0" indent="0">
-              <a:buNone/>
-            </a:pPr>
-            <a:r>
-              <a:rPr lang="nl-BE" sz="2800" b="1" cap="small" dirty="0" smtClean="0">
-                <a:latin typeface="Sitka Display" pitchFamily="2" charset="0"/>
-              </a:rPr>
-              <a:t>Twee mogelijkheden:</a:t>
-            </a:r>
-          </a:p>
-          <a:p>
-            <a:pPr marL="457200" indent="-457200">
-              <a:buFont typeface="+mj-lt"/>
-              <a:buAutoNum type="arabicPeriod"/>
-            </a:pPr>
-            <a:r>
-              <a:rPr lang="nl-BE" sz="2400" dirty="0" smtClean="0">
-                <a:latin typeface="Sitka Display" pitchFamily="2" charset="0"/>
-              </a:rPr>
-              <a:t>Test schrijven voor elke klasse in zelfde package</a:t>
-            </a:r>
-          </a:p>
-          <a:p>
-            <a:pPr marL="457200" indent="-457200">
-              <a:buFont typeface="+mj-lt"/>
-              <a:buAutoNum type="arabicPeriod"/>
-            </a:pPr>
-            <a:endParaRPr lang="nl-BE" sz="2400" dirty="0"/>
-          </a:p>
-          <a:p>
-            <a:pPr marL="457200" indent="-457200">
-              <a:buFont typeface="+mj-lt"/>
-              <a:buAutoNum type="arabicPeriod"/>
-            </a:pPr>
-            <a:r>
-              <a:rPr lang="nl-BE" sz="2400" dirty="0" smtClean="0">
-                <a:latin typeface="Sitka Display" pitchFamily="2" charset="0"/>
-              </a:rPr>
-              <a:t>Via een hogere laag een lagere laag testen</a:t>
-            </a:r>
-          </a:p>
-          <a:p>
-            <a:pPr lvl="1" indent="-342900">
-              <a:buFont typeface="Wingdings"/>
-              <a:buChar char="à"/>
-            </a:pPr>
-            <a:r>
-              <a:rPr lang="nl-BE" sz="2000" dirty="0" smtClean="0">
-                <a:latin typeface="Sitka Display" pitchFamily="2" charset="0"/>
-                <a:sym typeface="Wingdings" panose="05000000000000000000" pitchFamily="2" charset="2"/>
-              </a:rPr>
-              <a:t>Noodzakelijk wegens </a:t>
-            </a:r>
-            <a:r>
-              <a:rPr lang="nl-BE" sz="2000" dirty="0" err="1" smtClean="0">
-                <a:latin typeface="Sitka Display" pitchFamily="2" charset="0"/>
-                <a:sym typeface="Wingdings" panose="05000000000000000000" pitchFamily="2" charset="2"/>
-              </a:rPr>
-              <a:t>visibility</a:t>
-            </a:r>
-            <a:r>
-              <a:rPr lang="nl-BE" sz="2000" dirty="0" smtClean="0">
-                <a:latin typeface="Sitka Display" pitchFamily="2" charset="0"/>
-                <a:sym typeface="Wingdings" panose="05000000000000000000" pitchFamily="2" charset="2"/>
-              </a:rPr>
-              <a:t> constraints</a:t>
-            </a:r>
-          </a:p>
-          <a:p>
-            <a:pPr lvl="1" indent="-342900">
-              <a:buFont typeface="Wingdings"/>
-              <a:buChar char="à"/>
-            </a:pPr>
-            <a:r>
-              <a:rPr lang="nl-BE" sz="2000" dirty="0" smtClean="0">
-                <a:latin typeface="Sitka Display" pitchFamily="2" charset="0"/>
-                <a:sym typeface="Wingdings" panose="05000000000000000000" pitchFamily="2" charset="2"/>
-              </a:rPr>
-              <a:t>Moeilijker wegens gelaagde hiërarchie</a:t>
-            </a:r>
-          </a:p>
-          <a:p>
-            <a:pPr marL="0" indent="0">
-              <a:buNone/>
-            </a:pPr>
-            <a:endParaRPr lang="nl-BE" sz="2400" dirty="0">
-              <a:sym typeface="Wingdings" panose="05000000000000000000" pitchFamily="2" charset="2"/>
-            </a:endParaRPr>
-          </a:p>
-          <a:p>
-            <a:pPr marL="0" indent="0">
-              <a:buNone/>
-            </a:pPr>
-            <a:r>
-              <a:rPr lang="nl-BE" sz="2800" b="1" cap="small" dirty="0" smtClean="0">
-                <a:latin typeface="Sitka Display" pitchFamily="2" charset="0"/>
-                <a:sym typeface="Wingdings" panose="05000000000000000000" pitchFamily="2" charset="2"/>
-              </a:rPr>
-              <a:t>Test strategie voor use cases:</a:t>
-            </a:r>
-          </a:p>
-          <a:p>
-            <a:r>
-              <a:rPr lang="nl-BE" sz="2400" dirty="0" err="1" smtClean="0">
-                <a:latin typeface="Sitka Display" pitchFamily="2" charset="0"/>
-                <a:sym typeface="Wingdings" panose="05000000000000000000" pitchFamily="2" charset="2"/>
-              </a:rPr>
-              <a:t>TestUI</a:t>
-            </a:r>
-            <a:r>
-              <a:rPr lang="nl-BE" sz="2400" dirty="0" smtClean="0">
-                <a:latin typeface="Sitka Display" pitchFamily="2" charset="0"/>
-                <a:sym typeface="Wingdings" panose="05000000000000000000" pitchFamily="2" charset="2"/>
-              </a:rPr>
-              <a:t>  IUI  vaste waarden voor elke </a:t>
-            </a:r>
-            <a:r>
-              <a:rPr lang="nl-BE" sz="2400" dirty="0" err="1" smtClean="0">
-                <a:latin typeface="Sitka Display" pitchFamily="2" charset="0"/>
-                <a:sym typeface="Wingdings" panose="05000000000000000000" pitchFamily="2" charset="2"/>
-              </a:rPr>
-              <a:t>use</a:t>
-            </a:r>
-            <a:r>
-              <a:rPr lang="nl-BE" sz="2400" dirty="0" smtClean="0">
-                <a:latin typeface="Sitka Display" pitchFamily="2" charset="0"/>
-                <a:sym typeface="Wingdings" panose="05000000000000000000" pitchFamily="2" charset="2"/>
-              </a:rPr>
-              <a:t> case  testen</a:t>
-            </a:r>
-            <a:endParaRPr lang="nl-BE" sz="2400" dirty="0">
-              <a:latin typeface="Sitka Display" pitchFamily="2" charset="0"/>
-              <a:sym typeface="Wingdings" panose="05000000000000000000" pitchFamily="2" charset="2"/>
-            </a:endParaRPr>
-          </a:p>
-        </p:txBody>
-      </p:sp>
+        </p:nvPicPr>
+        <p:blipFill>
+          <a:blip r:embed="rId2">
+            <a:extLst>
+              <a:ext uri="{28A0092B-C50C-407E-A947-70E740481C1C}">
+                <a14:useLocalDpi xmlns:a14="http://schemas.microsoft.com/office/drawing/2010/main" val="0"/>
+              </a:ext>
+            </a:extLst>
+          </a:blip>
+          <a:stretch>
+            <a:fillRect/>
+          </a:stretch>
+        </p:blipFill>
+        <p:spPr>
+          <a:xfrm>
+            <a:off x="126294" y="1268760"/>
+            <a:ext cx="8891411" cy="5400600"/>
+          </a:xfrm>
+          <a:prstGeom prst="rect">
+            <a:avLst/>
+          </a:prstGeom>
+          <a:ln>
+            <a:noFill/>
+          </a:ln>
+          <a:effectLst>
+            <a:outerShdw blurRad="292100" dist="139700" dir="2700000" algn="tl" rotWithShape="0">
+              <a:srgbClr val="333333">
+                <a:alpha val="65000"/>
+              </a:srgbClr>
+            </a:outerShdw>
+          </a:effectLst>
+        </p:spPr>
+      </p:pic>
     </p:spTree>
     <p:extLst>
       <p:ext uri="{BB962C8B-B14F-4D97-AF65-F5344CB8AC3E}">
@@ -5065,6 +4955,280 @@
           <a:lstStyle/>
           <a:p>
             <a:r>
+              <a:rPr lang="nl-BE" sz="3600" cap="small" dirty="0" err="1" smtClean="0">
+                <a:ln w="18415" cmpd="sng">
+                  <a:solidFill>
+                    <a:schemeClr val="tx1">
+                      <a:alpha val="0"/>
+                    </a:schemeClr>
+                  </a:solidFill>
+                  <a:prstDash val="solid"/>
+                </a:ln>
+                <a:effectLst>
+                  <a:outerShdw blurRad="25400" dir="3600000" algn="tl" rotWithShape="0">
+                    <a:srgbClr val="000000">
+                      <a:alpha val="70000"/>
+                    </a:srgbClr>
+                  </a:outerShdw>
+                </a:effectLst>
+                <a:latin typeface="Sitka Text" pitchFamily="2" charset="0"/>
+              </a:rPr>
+              <a:t>Testing</a:t>
+            </a:r>
+            <a:r>
+              <a:rPr lang="nl-BE" sz="3600" cap="small" dirty="0" smtClean="0">
+                <a:ln w="18415" cmpd="sng">
+                  <a:solidFill>
+                    <a:schemeClr val="tx1">
+                      <a:alpha val="0"/>
+                    </a:schemeClr>
+                  </a:solidFill>
+                  <a:prstDash val="solid"/>
+                </a:ln>
+                <a:effectLst>
+                  <a:outerShdw blurRad="25400" dir="3600000" algn="tl" rotWithShape="0">
+                    <a:srgbClr val="000000">
+                      <a:alpha val="70000"/>
+                    </a:srgbClr>
+                  </a:outerShdw>
+                </a:effectLst>
+                <a:latin typeface="Sitka Text" pitchFamily="2" charset="0"/>
+              </a:rPr>
+              <a:t> approach</a:t>
+            </a:r>
+            <a:endParaRPr lang="nl-BE" sz="3600" cap="small" dirty="0">
+              <a:ln w="18415" cmpd="sng">
+                <a:solidFill>
+                  <a:schemeClr val="tx1">
+                    <a:alpha val="0"/>
+                  </a:schemeClr>
+                </a:solidFill>
+                <a:prstDash val="solid"/>
+              </a:ln>
+              <a:effectLst>
+                <a:outerShdw blurRad="25400" dir="3600000" algn="tl" rotWithShape="0">
+                  <a:srgbClr val="000000">
+                    <a:alpha val="70000"/>
+                  </a:srgbClr>
+                </a:outerShdw>
+              </a:effectLst>
+              <a:latin typeface="Sitka Text" pitchFamily="2" charset="0"/>
+            </a:endParaRPr>
+          </a:p>
+        </p:txBody>
+      </p:sp>
+      <p:sp>
+        <p:nvSpPr>
+          <p:cNvPr id="3" name="Tijdelijke aanduiding voor inhoud 2"/>
+          <p:cNvSpPr>
+            <a:spLocks noGrp="1"/>
+          </p:cNvSpPr>
+          <p:nvPr>
+            <p:ph idx="1"/>
+          </p:nvPr>
+        </p:nvSpPr>
+        <p:spPr/>
+        <p:txBody>
+          <a:bodyPr>
+            <a:normAutofit/>
+          </a:bodyPr>
+          <a:lstStyle/>
+          <a:p>
+            <a:pPr marL="0" indent="0">
+              <a:buNone/>
+            </a:pPr>
+            <a:r>
+              <a:rPr lang="nl-BE" sz="2800" b="1" cap="small" dirty="0" smtClean="0">
+                <a:latin typeface="Sitka Display" pitchFamily="2" charset="0"/>
+              </a:rPr>
+              <a:t>Twee mogelijkheden:</a:t>
+            </a:r>
+          </a:p>
+          <a:p>
+            <a:pPr marL="457200" indent="-457200">
+              <a:buFont typeface="+mj-lt"/>
+              <a:buAutoNum type="arabicPeriod"/>
+            </a:pPr>
+            <a:r>
+              <a:rPr lang="nl-BE" sz="2400" dirty="0" smtClean="0">
+                <a:latin typeface="Sitka Display" pitchFamily="2" charset="0"/>
+              </a:rPr>
+              <a:t>Test schrijven voor elke klasse in zelfde package</a:t>
+            </a:r>
+          </a:p>
+          <a:p>
+            <a:pPr marL="457200" indent="-457200">
+              <a:buFont typeface="+mj-lt"/>
+              <a:buAutoNum type="arabicPeriod"/>
+            </a:pPr>
+            <a:endParaRPr lang="nl-BE" sz="2400" dirty="0"/>
+          </a:p>
+          <a:p>
+            <a:pPr marL="457200" indent="-457200">
+              <a:buFont typeface="+mj-lt"/>
+              <a:buAutoNum type="arabicPeriod"/>
+            </a:pPr>
+            <a:r>
+              <a:rPr lang="nl-BE" sz="2400" dirty="0" smtClean="0">
+                <a:latin typeface="Sitka Display" pitchFamily="2" charset="0"/>
+              </a:rPr>
+              <a:t>Via een hogere laag een lagere laag testen</a:t>
+            </a:r>
+          </a:p>
+          <a:p>
+            <a:pPr lvl="1" indent="-342900">
+              <a:buFont typeface="Wingdings"/>
+              <a:buChar char="à"/>
+            </a:pPr>
+            <a:r>
+              <a:rPr lang="nl-BE" sz="2000" dirty="0" smtClean="0">
+                <a:latin typeface="Sitka Display" pitchFamily="2" charset="0"/>
+                <a:sym typeface="Wingdings" panose="05000000000000000000" pitchFamily="2" charset="2"/>
+              </a:rPr>
+              <a:t>Noodzakelijk wegens </a:t>
+            </a:r>
+            <a:r>
+              <a:rPr lang="nl-BE" sz="2000" dirty="0" err="1" smtClean="0">
+                <a:latin typeface="Sitka Display" pitchFamily="2" charset="0"/>
+                <a:sym typeface="Wingdings" panose="05000000000000000000" pitchFamily="2" charset="2"/>
+              </a:rPr>
+              <a:t>visibility</a:t>
+            </a:r>
+            <a:r>
+              <a:rPr lang="nl-BE" sz="2000" dirty="0" smtClean="0">
+                <a:latin typeface="Sitka Display" pitchFamily="2" charset="0"/>
+                <a:sym typeface="Wingdings" panose="05000000000000000000" pitchFamily="2" charset="2"/>
+              </a:rPr>
+              <a:t> constraints</a:t>
+            </a:r>
+          </a:p>
+          <a:p>
+            <a:pPr lvl="1" indent="-342900">
+              <a:buFont typeface="Wingdings"/>
+              <a:buChar char="à"/>
+            </a:pPr>
+            <a:r>
+              <a:rPr lang="nl-BE" sz="2000" dirty="0" smtClean="0">
+                <a:latin typeface="Sitka Display" pitchFamily="2" charset="0"/>
+                <a:sym typeface="Wingdings" panose="05000000000000000000" pitchFamily="2" charset="2"/>
+              </a:rPr>
+              <a:t>Moeilijker wegens gelaagde hiërarchie</a:t>
+            </a:r>
+          </a:p>
+          <a:p>
+            <a:pPr marL="0" indent="0">
+              <a:buNone/>
+            </a:pPr>
+            <a:endParaRPr lang="nl-BE" sz="2400" dirty="0">
+              <a:sym typeface="Wingdings" panose="05000000000000000000" pitchFamily="2" charset="2"/>
+            </a:endParaRPr>
+          </a:p>
+          <a:p>
+            <a:pPr marL="0" indent="0">
+              <a:buNone/>
+            </a:pPr>
+            <a:r>
+              <a:rPr lang="nl-BE" sz="2800" b="1" cap="small" dirty="0" smtClean="0">
+                <a:latin typeface="Sitka Display" pitchFamily="2" charset="0"/>
+                <a:sym typeface="Wingdings" panose="05000000000000000000" pitchFamily="2" charset="2"/>
+              </a:rPr>
+              <a:t>Test strategie voor use cases:</a:t>
+            </a:r>
+          </a:p>
+          <a:p>
+            <a:r>
+              <a:rPr lang="nl-BE" sz="2400" dirty="0" err="1" smtClean="0">
+                <a:latin typeface="Sitka Display" pitchFamily="2" charset="0"/>
+                <a:sym typeface="Wingdings" panose="05000000000000000000" pitchFamily="2" charset="2"/>
+              </a:rPr>
+              <a:t>TestUI</a:t>
+            </a:r>
+            <a:r>
+              <a:rPr lang="nl-BE" sz="2400" dirty="0" smtClean="0">
+                <a:latin typeface="Sitka Display" pitchFamily="2" charset="0"/>
+                <a:sym typeface="Wingdings" panose="05000000000000000000" pitchFamily="2" charset="2"/>
+              </a:rPr>
+              <a:t>  IUI  vaste waarden voor elke </a:t>
+            </a:r>
+            <a:r>
+              <a:rPr lang="nl-BE" sz="2400" dirty="0" err="1" smtClean="0">
+                <a:latin typeface="Sitka Display" pitchFamily="2" charset="0"/>
+                <a:sym typeface="Wingdings" panose="05000000000000000000" pitchFamily="2" charset="2"/>
+              </a:rPr>
+              <a:t>use</a:t>
+            </a:r>
+            <a:r>
+              <a:rPr lang="nl-BE" sz="2400" dirty="0" smtClean="0">
+                <a:latin typeface="Sitka Display" pitchFamily="2" charset="0"/>
+                <a:sym typeface="Wingdings" panose="05000000000000000000" pitchFamily="2" charset="2"/>
+              </a:rPr>
+              <a:t> case  testen</a:t>
+            </a:r>
+            <a:endParaRPr lang="nl-BE" sz="2400" dirty="0">
+              <a:latin typeface="Sitka Display" pitchFamily="2" charset="0"/>
+              <a:sym typeface="Wingdings" panose="05000000000000000000" pitchFamily="2" charset="2"/>
+            </a:endParaRPr>
+          </a:p>
+        </p:txBody>
+      </p:sp>
+    </p:spTree>
+    <p:extLst>
+      <p:ext uri="{BB962C8B-B14F-4D97-AF65-F5344CB8AC3E}">
+        <p14:creationId xmlns:p14="http://schemas.microsoft.com/office/powerpoint/2010/main" val="996989477"/>
+      </p:ext>
+    </p:extLst>
+  </p:cSld>
+  <p:clrMapOvr>
+    <a:masterClrMapping/>
+  </p:clrMapOvr>
+  <p:transition>
+    <p:fade/>
+  </p:transition>
+  <p:timing>
+    <p:tnLst>
+      <p:par>
+        <p:cTn id="1" dur="indefinite" restart="never" nodeType="tmRoot"/>
+      </p:par>
+    </p:tnLst>
+  </p:timing>
+</p:sld>
+</file>
+
+<file path=ppt/slides/slide16.xml><?xml version="1.0" encoding="utf-8"?>
+<p:sld xmlns:a="http://schemas.openxmlformats.org/drawingml/2006/main" xmlns:r="http://schemas.openxmlformats.org/officeDocument/2006/relationships" xmlns:p="http://schemas.openxmlformats.org/presentationml/2006/main">
+  <p:cSld>
+    <p:spTree>
+      <p:nvGrpSpPr>
+        <p:cNvPr id="1" name=""/>
+        <p:cNvGrpSpPr/>
+        <p:nvPr/>
+      </p:nvGrpSpPr>
+      <p:grpSpPr>
+        <a:xfrm>
+          <a:off x="0" y="0"/>
+          <a:ext cx="0" cy="0"/>
+          <a:chOff x="0" y="0"/>
+          <a:chExt cx="0" cy="0"/>
+        </a:xfrm>
+      </p:grpSpPr>
+      <p:sp>
+        <p:nvSpPr>
+          <p:cNvPr id="2" name="Titel 1"/>
+          <p:cNvSpPr>
+            <a:spLocks noGrp="1"/>
+          </p:cNvSpPr>
+          <p:nvPr>
+            <p:ph type="title"/>
+          </p:nvPr>
+        </p:nvSpPr>
+        <p:spPr/>
+        <p:txBody>
+          <a:bodyPr>
+            <a:normAutofit/>
+          </a:bodyPr>
+          <a:lstStyle/>
+          <a:p>
+            <a:r>
               <a:rPr lang="nl-BE" sz="3600" cap="small" dirty="0" smtClean="0">
                 <a:ln w="18415" cmpd="sng">
                   <a:solidFill>
@@ -5148,7 +5312,7 @@
 </p:sld>
 </file>
 
-<file path=ppt/slides/slide16.xml><?xml version="1.0" encoding="utf-8"?>
+<file path=ppt/slides/slide17.xml><?xml version="1.0" encoding="utf-8"?>
 <p:sld xmlns:a="http://schemas.openxmlformats.org/drawingml/2006/main" xmlns:r="http://schemas.openxmlformats.org/officeDocument/2006/relationships" xmlns:p="http://schemas.openxmlformats.org/presentationml/2006/main">
   <p:cSld>
     <p:bg>
@@ -5234,7 +5398,7 @@
 </p:sld>
 </file>
 
-<file path=ppt/slides/slide17.xml><?xml version="1.0" encoding="utf-8"?>
+<file path=ppt/slides/slide18.xml><?xml version="1.0" encoding="utf-8"?>
 <p:sld xmlns:a="http://schemas.openxmlformats.org/drawingml/2006/main" xmlns:r="http://schemas.openxmlformats.org/officeDocument/2006/relationships" xmlns:p="http://schemas.openxmlformats.org/presentationml/2006/main">
   <p:cSld>
     <p:spTree>
@@ -5897,25 +6061,7 @@
                 </a:effectLst>
                 <a:latin typeface="Sitka Banner" pitchFamily="2" charset="0"/>
               </a:rPr>
-              <a:t>: </a:t>
-            </a:r>
-            <a:r>
-              <a:rPr lang="nl-BE" sz="2400" smtClean="0">
-                <a:solidFill>
-                  <a:schemeClr val="accent4">
-                    <a:lumMod val="50000"/>
-                  </a:schemeClr>
-                </a:solidFill>
-                <a:effectLst>
-                  <a:outerShdw blurRad="76200" dist="38100" dir="5400000" algn="t" rotWithShape="0">
-                    <a:prstClr val="black">
-                      <a:alpha val="27000"/>
-                    </a:prstClr>
-                  </a:outerShdw>
-                </a:effectLst>
-                <a:latin typeface="Sitka Banner" pitchFamily="2" charset="0"/>
-              </a:rPr>
-              <a:t>25</a:t>
+              <a:t>: 25</a:t>
             </a:r>
             <a:r>
               <a:rPr lang="nl-BE" sz="2400" dirty="0" smtClean="0">
@@ -6033,6 +6179,314 @@
       </p:par>
     </p:tnLst>
   </p:timing>
+</p:sld>
+</file>
+
+<file path=ppt/slides/slide19.xml><?xml version="1.0" encoding="utf-8"?>
+<p:sld xmlns:a="http://schemas.openxmlformats.org/drawingml/2006/main" xmlns:r="http://schemas.openxmlformats.org/officeDocument/2006/relationships" xmlns:p="http://schemas.openxmlformats.org/presentationml/2006/main">
+  <p:cSld>
+    <p:spTree>
+      <p:nvGrpSpPr>
+        <p:cNvPr id="1" name=""/>
+        <p:cNvGrpSpPr/>
+        <p:nvPr/>
+      </p:nvGrpSpPr>
+      <p:grpSpPr>
+        <a:xfrm>
+          <a:off x="0" y="0"/>
+          <a:ext cx="0" cy="0"/>
+          <a:chOff x="0" y="0"/>
+          <a:chExt cx="0" cy="0"/>
+        </a:xfrm>
+      </p:grpSpPr>
+      <p:sp>
+        <p:nvSpPr>
+          <p:cNvPr id="2" name="Title 1"/>
+          <p:cNvSpPr>
+            <a:spLocks noGrp="1"/>
+          </p:cNvSpPr>
+          <p:nvPr>
+            <p:ph type="title"/>
+          </p:nvPr>
+        </p:nvSpPr>
+        <p:spPr/>
+        <p:txBody>
+          <a:bodyPr/>
+          <a:lstStyle/>
+          <a:p>
+            <a:r>
+              <a:rPr lang="en-GB" dirty="0" smtClean="0"/>
+              <a:t>ROLES</a:t>
+            </a:r>
+            <a:endParaRPr lang="en-GB" dirty="0"/>
+          </a:p>
+        </p:txBody>
+      </p:sp>
+      <p:graphicFrame>
+        <p:nvGraphicFramePr>
+          <p:cNvPr id="7" name="Content Placeholder 6"/>
+          <p:cNvGraphicFramePr>
+            <a:graphicFrameLocks noGrp="1"/>
+          </p:cNvGraphicFramePr>
+          <p:nvPr>
+            <p:ph idx="1"/>
+            <p:extLst>
+              <p:ext uri="{D42A27DB-BD31-4B8C-83A1-F6EECF244321}">
+                <p14:modId xmlns:p14="http://schemas.microsoft.com/office/powerpoint/2010/main" val="3140411669"/>
+              </p:ext>
+            </p:extLst>
+          </p:nvPr>
+        </p:nvGraphicFramePr>
+        <p:xfrm>
+          <a:off x="457200" y="1700808"/>
+          <a:ext cx="8229600" cy="4032448"/>
+        </p:xfrm>
+        <a:graphic>
+          <a:graphicData uri="http://schemas.openxmlformats.org/drawingml/2006/table">
+            <a:tbl>
+              <a:tblPr firstRow="1" bandRow="1">
+                <a:tableStyleId>{5940675A-B579-460E-94D1-54222C63F5DA}</a:tableStyleId>
+              </a:tblPr>
+              <a:tblGrid>
+                <a:gridCol w="2743200">
+                  <a:extLst>
+                    <a:ext uri="{9D8B030D-6E8A-4147-A177-3AD203B41FA5}">
+                      <a16:colId xmlns:a16="http://schemas.microsoft.com/office/drawing/2014/main" val="4022630451"/>
+                    </a:ext>
+                  </a:extLst>
+                </a:gridCol>
+                <a:gridCol w="2743200">
+                  <a:extLst>
+                    <a:ext uri="{9D8B030D-6E8A-4147-A177-3AD203B41FA5}">
+                      <a16:colId xmlns:a16="http://schemas.microsoft.com/office/drawing/2014/main" val="1276862258"/>
+                    </a:ext>
+                  </a:extLst>
+                </a:gridCol>
+                <a:gridCol w="2743200">
+                  <a:extLst>
+                    <a:ext uri="{9D8B030D-6E8A-4147-A177-3AD203B41FA5}">
+                      <a16:colId xmlns:a16="http://schemas.microsoft.com/office/drawing/2014/main" val="670422697"/>
+                    </a:ext>
+                  </a:extLst>
+                </a:gridCol>
+              </a:tblGrid>
+              <a:tr h="1008112">
+                <a:tc>
+                  <a:txBody>
+                    <a:bodyPr/>
+                    <a:lstStyle/>
+                    <a:p>
+                      <a:endParaRPr lang="en-GB" dirty="0"/>
+                    </a:p>
+                  </a:txBody>
+                  <a:tcPr/>
+                </a:tc>
+                <a:tc>
+                  <a:txBody>
+                    <a:bodyPr/>
+                    <a:lstStyle/>
+                    <a:p>
+                      <a:r>
+                        <a:rPr lang="en-GB" dirty="0" err="1" smtClean="0"/>
+                        <a:t>Iteratie</a:t>
+                      </a:r>
+                      <a:r>
+                        <a:rPr lang="en-GB" baseline="0" dirty="0" smtClean="0"/>
+                        <a:t> 1</a:t>
+                      </a:r>
+                      <a:endParaRPr lang="en-GB" dirty="0"/>
+                    </a:p>
+                  </a:txBody>
+                  <a:tcPr/>
+                </a:tc>
+                <a:tc>
+                  <a:txBody>
+                    <a:bodyPr/>
+                    <a:lstStyle/>
+                    <a:p>
+                      <a:r>
+                        <a:rPr lang="en-GB" dirty="0" err="1" smtClean="0"/>
+                        <a:t>Iteratie</a:t>
+                      </a:r>
+                      <a:r>
+                        <a:rPr lang="en-GB" dirty="0" smtClean="0"/>
+                        <a:t> 2</a:t>
+                      </a:r>
+                      <a:endParaRPr lang="en-GB" dirty="0"/>
+                    </a:p>
+                  </a:txBody>
+                  <a:tcPr/>
+                </a:tc>
+                <a:extLst>
+                  <a:ext uri="{0D108BD9-81ED-4DB2-BD59-A6C34878D82A}">
+                    <a16:rowId xmlns:a16="http://schemas.microsoft.com/office/drawing/2014/main" val="2789307922"/>
+                  </a:ext>
+                </a:extLst>
+              </a:tr>
+              <a:tr h="1008112">
+                <a:tc>
+                  <a:txBody>
+                    <a:bodyPr/>
+                    <a:lstStyle/>
+                    <a:p>
+                      <a:r>
+                        <a:rPr lang="en-GB" dirty="0" smtClean="0"/>
+                        <a:t>DESIGN COORDINATOR</a:t>
+                      </a:r>
+                      <a:endParaRPr lang="en-GB" dirty="0"/>
+                    </a:p>
+                  </a:txBody>
+                  <a:tcPr/>
+                </a:tc>
+                <a:tc>
+                  <a:txBody>
+                    <a:bodyPr/>
+                    <a:lstStyle/>
+                    <a:p>
+                      <a:r>
+                        <a:rPr lang="en-GB" dirty="0" smtClean="0"/>
+                        <a:t>NAME</a:t>
+                      </a:r>
+                      <a:endParaRPr lang="en-GB" dirty="0"/>
+                    </a:p>
+                  </a:txBody>
+                  <a:tcPr/>
+                </a:tc>
+                <a:tc>
+                  <a:txBody>
+                    <a:bodyPr/>
+                    <a:lstStyle/>
+                    <a:p>
+                      <a:r>
+                        <a:rPr lang="en-GB" dirty="0" smtClean="0"/>
+                        <a:t>NAME</a:t>
+                      </a:r>
+                      <a:endParaRPr lang="en-GB" dirty="0"/>
+                    </a:p>
+                  </a:txBody>
+                  <a:tcPr/>
+                </a:tc>
+                <a:extLst>
+                  <a:ext uri="{0D108BD9-81ED-4DB2-BD59-A6C34878D82A}">
+                    <a16:rowId xmlns:a16="http://schemas.microsoft.com/office/drawing/2014/main" val="3498730236"/>
+                  </a:ext>
+                </a:extLst>
+              </a:tr>
+              <a:tr h="1008112">
+                <a:tc>
+                  <a:txBody>
+                    <a:bodyPr/>
+                    <a:lstStyle/>
+                    <a:p>
+                      <a:r>
+                        <a:rPr lang="en-GB" dirty="0" smtClean="0"/>
+                        <a:t>TESTING COORDINATOR</a:t>
+                      </a:r>
+                      <a:endParaRPr lang="en-GB" dirty="0"/>
+                    </a:p>
+                  </a:txBody>
+                  <a:tcPr/>
+                </a:tc>
+                <a:tc>
+                  <a:txBody>
+                    <a:bodyPr/>
+                    <a:lstStyle/>
+                    <a:p>
+                      <a:r>
+                        <a:rPr lang="en-GB" dirty="0" smtClean="0"/>
+                        <a:t>NAME</a:t>
+                      </a:r>
+                      <a:endParaRPr lang="en-GB" dirty="0"/>
+                    </a:p>
+                  </a:txBody>
+                  <a:tcPr/>
+                </a:tc>
+                <a:tc>
+                  <a:txBody>
+                    <a:bodyPr/>
+                    <a:lstStyle/>
+                    <a:p>
+                      <a:r>
+                        <a:rPr lang="en-GB" dirty="0" smtClean="0"/>
+                        <a:t>NAME</a:t>
+                      </a:r>
+                      <a:endParaRPr lang="en-GB" dirty="0"/>
+                    </a:p>
+                  </a:txBody>
+                  <a:tcPr/>
+                </a:tc>
+                <a:extLst>
+                  <a:ext uri="{0D108BD9-81ED-4DB2-BD59-A6C34878D82A}">
+                    <a16:rowId xmlns:a16="http://schemas.microsoft.com/office/drawing/2014/main" val="4013628509"/>
+                  </a:ext>
+                </a:extLst>
+              </a:tr>
+              <a:tr h="1008112">
+                <a:tc>
+                  <a:txBody>
+                    <a:bodyPr/>
+                    <a:lstStyle/>
+                    <a:p>
+                      <a:r>
+                        <a:rPr lang="en-GB" dirty="0" smtClean="0"/>
+                        <a:t>DOMAIN COORDINATOR</a:t>
+                      </a:r>
+                      <a:endParaRPr lang="en-GB" dirty="0"/>
+                    </a:p>
+                  </a:txBody>
+                  <a:tcPr/>
+                </a:tc>
+                <a:tc>
+                  <a:txBody>
+                    <a:bodyPr/>
+                    <a:lstStyle/>
+                    <a:p>
+                      <a:r>
+                        <a:rPr lang="en-GB" dirty="0" smtClean="0"/>
+                        <a:t>NAME</a:t>
+                      </a:r>
+                      <a:endParaRPr lang="en-GB" dirty="0"/>
+                    </a:p>
+                  </a:txBody>
+                  <a:tcPr/>
+                </a:tc>
+                <a:tc>
+                  <a:txBody>
+                    <a:bodyPr/>
+                    <a:lstStyle/>
+                    <a:p>
+                      <a:r>
+                        <a:rPr lang="en-GB" smtClean="0"/>
+                        <a:t>NAME</a:t>
+                      </a:r>
+                      <a:endParaRPr lang="en-GB" dirty="0"/>
+                    </a:p>
+                  </a:txBody>
+                  <a:tcPr/>
+                </a:tc>
+                <a:extLst>
+                  <a:ext uri="{0D108BD9-81ED-4DB2-BD59-A6C34878D82A}">
+                    <a16:rowId xmlns:a16="http://schemas.microsoft.com/office/drawing/2014/main" val="1545046261"/>
+                  </a:ext>
+                </a:extLst>
+              </a:tr>
+            </a:tbl>
+          </a:graphicData>
+        </a:graphic>
+      </p:graphicFrame>
+    </p:spTree>
+    <p:extLst>
+      <p:ext uri="{BB962C8B-B14F-4D97-AF65-F5344CB8AC3E}">
+        <p14:creationId xmlns:p14="http://schemas.microsoft.com/office/powerpoint/2010/main" val="152465229"/>
+      </p:ext>
+    </p:extLst>
+  </p:cSld>
+  <p:clrMapOvr>
+    <a:masterClrMapping/>
+  </p:clrMapOvr>
+  <p:transition>
+    <p:fade/>
+  </p:transition>
 </p:sld>
 </file>
 

</xml_diff>

<commit_message>
Pdf van presentatie added
</commit_message>
<xml_diff>
--- a/presentatie/SWOP Presentatie Inhoud.pptx
+++ b/presentatie/SWOP Presentatie Inhoud.pptx
@@ -21,9 +21,8 @@
     <p:sldId id="274" r:id="rId15"/>
     <p:sldId id="260" r:id="rId16"/>
     <p:sldId id="261" r:id="rId17"/>
-    <p:sldId id="271" r:id="rId18"/>
-    <p:sldId id="262" r:id="rId19"/>
-    <p:sldId id="275" r:id="rId20"/>
+    <p:sldId id="262" r:id="rId18"/>
+    <p:sldId id="275" r:id="rId19"/>
   </p:sldIdLst>
   <p:sldSz cx="9144000" cy="6858000" type="screen4x3"/>
   <p:notesSz cx="6858000" cy="9144000"/>
@@ -124,7 +123,7 @@
   </p:defaultTextStyle>
   <p:extLst>
     <p:ext uri="{EFAFB233-063F-42B5-8137-9DF3F51BA10A}">
-      <p15:sldGuideLst xmlns="" xmlns:p15="http://schemas.microsoft.com/office/powerpoint/2012/main">
+      <p15:sldGuideLst xmlns:p15="http://schemas.microsoft.com/office/powerpoint/2012/main" xmlns="">
         <p15:guide id="1" orient="horz" pos="2160">
           <p15:clr>
             <a:srgbClr val="A4A3A4"/>
@@ -5335,92 +5334,6 @@
 <file path=ppt/slides/slide17.xml><?xml version="1.0" encoding="utf-8"?>
 <p:sld xmlns:a="http://schemas.openxmlformats.org/drawingml/2006/main" xmlns:r="http://schemas.openxmlformats.org/officeDocument/2006/relationships" xmlns:p="http://schemas.openxmlformats.org/presentationml/2006/main">
   <p:cSld>
-    <p:bg>
-      <p:bgPr>
-        <a:solidFill>
-          <a:schemeClr val="tx1"/>
-        </a:solidFill>
-        <a:effectLst/>
-      </p:bgPr>
-    </p:bg>
-    <p:spTree>
-      <p:nvGrpSpPr>
-        <p:cNvPr id="1" name=""/>
-        <p:cNvGrpSpPr/>
-        <p:nvPr/>
-      </p:nvGrpSpPr>
-      <p:grpSpPr>
-        <a:xfrm>
-          <a:off x="0" y="0"/>
-          <a:ext cx="0" cy="0"/>
-          <a:chOff x="0" y="0"/>
-          <a:chExt cx="0" cy="0"/>
-        </a:xfrm>
-      </p:grpSpPr>
-      <p:sp>
-        <p:nvSpPr>
-          <p:cNvPr id="2" name="Titel 1"/>
-          <p:cNvSpPr>
-            <a:spLocks noGrp="1"/>
-          </p:cNvSpPr>
-          <p:nvPr>
-            <p:ph type="title"/>
-          </p:nvPr>
-        </p:nvSpPr>
-        <p:spPr/>
-        <p:txBody>
-          <a:bodyPr/>
-          <a:lstStyle/>
-          <a:p>
-            <a:endParaRPr lang="nl-BE"/>
-          </a:p>
-        </p:txBody>
-      </p:sp>
-      <p:sp>
-        <p:nvSpPr>
-          <p:cNvPr id="3" name="Tijdelijke aanduiding voor inhoud 2"/>
-          <p:cNvSpPr>
-            <a:spLocks noGrp="1"/>
-          </p:cNvSpPr>
-          <p:nvPr>
-            <p:ph idx="1"/>
-          </p:nvPr>
-        </p:nvSpPr>
-        <p:spPr/>
-        <p:txBody>
-          <a:bodyPr/>
-          <a:lstStyle/>
-          <a:p>
-            <a:endParaRPr lang="nl-BE"/>
-          </a:p>
-        </p:txBody>
-      </p:sp>
-    </p:spTree>
-    <p:extLst>
-      <p:ext uri="{BB962C8B-B14F-4D97-AF65-F5344CB8AC3E}">
-        <p14:creationId xmlns:p14="http://schemas.microsoft.com/office/powerpoint/2010/main" val="353185348"/>
-      </p:ext>
-    </p:extLst>
-  </p:cSld>
-  <p:clrMapOvr>
-    <a:masterClrMapping/>
-  </p:clrMapOvr>
-  <p:transition>
-    <p:fade/>
-  </p:transition>
-  <p:timing>
-    <p:tnLst>
-      <p:par>
-        <p:cTn id="1" dur="indefinite" restart="never" nodeType="tmRoot"/>
-      </p:par>
-    </p:tnLst>
-  </p:timing>
-</p:sld>
-</file>
-
-<file path=ppt/slides/slide18.xml><?xml version="1.0" encoding="utf-8"?>
-<p:sld xmlns:a="http://schemas.openxmlformats.org/drawingml/2006/main" xmlns:r="http://schemas.openxmlformats.org/officeDocument/2006/relationships" xmlns:p="http://schemas.openxmlformats.org/presentationml/2006/main">
-  <p:cSld>
     <p:spTree>
       <p:nvGrpSpPr>
         <p:cNvPr id="1" name=""/>
@@ -6202,7 +6115,7 @@
 </p:sld>
 </file>
 
-<file path=ppt/slides/slide19.xml><?xml version="1.0" encoding="utf-8"?>
+<file path=ppt/slides/slide18.xml><?xml version="1.0" encoding="utf-8"?>
 <p:sld xmlns:a="http://schemas.openxmlformats.org/drawingml/2006/main" xmlns:r="http://schemas.openxmlformats.org/officeDocument/2006/relationships" xmlns:p="http://schemas.openxmlformats.org/presentationml/2006/main">
   <p:cSld>
     <p:spTree>
@@ -6248,21 +6161,21 @@
                 <a:gridCol w="2743200">
                   <a:extLst>
                     <a:ext uri="{9D8B030D-6E8A-4147-A177-3AD203B41FA5}">
-                      <a16:colId xmlns="" xmlns:a16="http://schemas.microsoft.com/office/drawing/2014/main" val="4022630451"/>
+                      <a16:colId xmlns:a16="http://schemas.microsoft.com/office/drawing/2014/main" xmlns="" val="4022630451"/>
                     </a:ext>
                   </a:extLst>
                 </a:gridCol>
                 <a:gridCol w="2743200">
                   <a:extLst>
                     <a:ext uri="{9D8B030D-6E8A-4147-A177-3AD203B41FA5}">
-                      <a16:colId xmlns="" xmlns:a16="http://schemas.microsoft.com/office/drawing/2014/main" val="1276862258"/>
+                      <a16:colId xmlns:a16="http://schemas.microsoft.com/office/drawing/2014/main" xmlns="" val="1276862258"/>
                     </a:ext>
                   </a:extLst>
                 </a:gridCol>
                 <a:gridCol w="2743200">
                   <a:extLst>
                     <a:ext uri="{9D8B030D-6E8A-4147-A177-3AD203B41FA5}">
-                      <a16:colId xmlns="" xmlns:a16="http://schemas.microsoft.com/office/drawing/2014/main" val="670422697"/>
+                      <a16:colId xmlns:a16="http://schemas.microsoft.com/office/drawing/2014/main" xmlns="" val="670422697"/>
                     </a:ext>
                   </a:extLst>
                 </a:gridCol>
@@ -6316,7 +6229,7 @@
                 </a:tc>
                 <a:extLst>
                   <a:ext uri="{0D108BD9-81ED-4DB2-BD59-A6C34878D82A}">
-                    <a16:rowId xmlns="" xmlns:a16="http://schemas.microsoft.com/office/drawing/2014/main" val="2789307922"/>
+                    <a16:rowId xmlns:a16="http://schemas.microsoft.com/office/drawing/2014/main" xmlns="" val="2789307922"/>
                   </a:ext>
                 </a:extLst>
               </a:tr>
@@ -6407,7 +6320,7 @@
                 </a:tc>
                 <a:extLst>
                   <a:ext uri="{0D108BD9-81ED-4DB2-BD59-A6C34878D82A}">
-                    <a16:rowId xmlns="" xmlns:a16="http://schemas.microsoft.com/office/drawing/2014/main" val="3498730236"/>
+                    <a16:rowId xmlns:a16="http://schemas.microsoft.com/office/drawing/2014/main" xmlns="" val="3498730236"/>
                   </a:ext>
                 </a:extLst>
               </a:tr>
@@ -6468,7 +6381,7 @@
                 </a:tc>
                 <a:extLst>
                   <a:ext uri="{0D108BD9-81ED-4DB2-BD59-A6C34878D82A}">
-                    <a16:rowId xmlns="" xmlns:a16="http://schemas.microsoft.com/office/drawing/2014/main" val="4013628509"/>
+                    <a16:rowId xmlns:a16="http://schemas.microsoft.com/office/drawing/2014/main" xmlns="" val="4013628509"/>
                   </a:ext>
                 </a:extLst>
               </a:tr>
@@ -6533,7 +6446,7 @@
                 </a:tc>
                 <a:extLst>
                   <a:ext uri="{0D108BD9-81ED-4DB2-BD59-A6C34878D82A}">
-                    <a16:rowId xmlns="" xmlns:a16="http://schemas.microsoft.com/office/drawing/2014/main" val="1545046261"/>
+                    <a16:rowId xmlns:a16="http://schemas.microsoft.com/office/drawing/2014/main" xmlns="" val="1545046261"/>
                   </a:ext>
                 </a:extLst>
               </a:tr>
@@ -7357,10 +7270,6 @@
               </a:rPr>
               <a:t> voorziet initiële gegevensstructuren</a:t>
             </a:r>
-            <a:endParaRPr lang="nl-BE" dirty="0" smtClean="0">
-              <a:latin typeface="Sitka Display" pitchFamily="2" charset="0"/>
-              <a:sym typeface="Wingdings" panose="05000000000000000000" pitchFamily="2" charset="2"/>
-            </a:endParaRPr>
           </a:p>
           <a:p>
             <a:pPr algn="just"/>

</xml_diff>